<commit_message>
Adding my own slides to the presentation. Didn't put Dyksen on there yet since I'm getting his permission for distributing them with our stuff in PDF form to the class. Might end up making my own instead.
</commit_message>
<xml_diff>
--- a/Buffer Overflow Attacks.pptx
+++ b/Buffer Overflow Attacks.pptx
@@ -4,6 +4,9 @@
   <p:sldMasterIdLst>
     <p:sldMasterId id="2147483672" r:id="rId1"/>
   </p:sldMasterIdLst>
+  <p:notesMasterIdLst>
+    <p:notesMasterId r:id="rId15"/>
+  </p:notesMasterIdLst>
   <p:sldIdLst>
     <p:sldId id="256" r:id="rId2"/>
     <p:sldId id="257" r:id="rId3"/>
@@ -12,6 +15,12 @@
     <p:sldId id="260" r:id="rId6"/>
     <p:sldId id="261" r:id="rId7"/>
     <p:sldId id="262" r:id="rId8"/>
+    <p:sldId id="281" r:id="rId9"/>
+    <p:sldId id="282" r:id="rId10"/>
+    <p:sldId id="283" r:id="rId11"/>
+    <p:sldId id="284" r:id="rId12"/>
+    <p:sldId id="285" r:id="rId13"/>
+    <p:sldId id="286" r:id="rId14"/>
   </p:sldIdLst>
   <p:sldSz cx="9144000" cy="6858000" type="screen4x3"/>
   <p:notesSz cx="6858000" cy="9144000"/>
@@ -126,12 +135,368 @@
             <p14:sldId id="260"/>
             <p14:sldId id="261"/>
             <p14:sldId id="262"/>
+            <p14:sldId id="281"/>
+            <p14:sldId id="282"/>
+            <p14:sldId id="283"/>
+            <p14:sldId id="284"/>
+            <p14:sldId id="285"/>
+            <p14:sldId id="286"/>
           </p14:sldIdLst>
         </p14:section>
       </p14:sectionLst>
     </p:ext>
   </p:extLst>
 </p:presentation>
+</file>
+
+<file path=ppt/notesMasters/notesMaster1.xml><?xml version="1.0" encoding="utf-8"?>
+<p:notesMaster xmlns:a="http://schemas.openxmlformats.org/drawingml/2006/main" xmlns:r="http://schemas.openxmlformats.org/officeDocument/2006/relationships" xmlns:p="http://schemas.openxmlformats.org/presentationml/2006/main">
+  <p:cSld>
+    <p:bg>
+      <p:bgRef idx="1001">
+        <a:schemeClr val="bg1"/>
+      </p:bgRef>
+    </p:bg>
+    <p:spTree>
+      <p:nvGrpSpPr>
+        <p:cNvPr id="1" name=""/>
+        <p:cNvGrpSpPr/>
+        <p:nvPr/>
+      </p:nvGrpSpPr>
+      <p:grpSpPr>
+        <a:xfrm>
+          <a:off x="0" y="0"/>
+          <a:ext cx="0" cy="0"/>
+          <a:chOff x="0" y="0"/>
+          <a:chExt cx="0" cy="0"/>
+        </a:xfrm>
+      </p:grpSpPr>
+      <p:sp>
+        <p:nvSpPr>
+          <p:cNvPr id="2" name="Header Placeholder 1"/>
+          <p:cNvSpPr>
+            <a:spLocks noGrp="1"/>
+          </p:cNvSpPr>
+          <p:nvPr>
+            <p:ph type="hdr" sz="quarter"/>
+          </p:nvPr>
+        </p:nvSpPr>
+        <p:spPr>
+          <a:xfrm>
+            <a:off x="0" y="0"/>
+            <a:ext cx="2971800" cy="457200"/>
+          </a:xfrm>
+          <a:prstGeom prst="rect">
+            <a:avLst/>
+          </a:prstGeom>
+        </p:spPr>
+        <p:txBody>
+          <a:bodyPr vert="horz" lIns="91440" tIns="45720" rIns="91440" bIns="45720" rtlCol="0"/>
+          <a:lstStyle>
+            <a:lvl1pPr algn="l">
+              <a:defRPr sz="1200"/>
+            </a:lvl1pPr>
+          </a:lstStyle>
+          <a:p>
+            <a:endParaRPr lang="en-US"/>
+          </a:p>
+        </p:txBody>
+      </p:sp>
+      <p:sp>
+        <p:nvSpPr>
+          <p:cNvPr id="3" name="Date Placeholder 2"/>
+          <p:cNvSpPr>
+            <a:spLocks noGrp="1"/>
+          </p:cNvSpPr>
+          <p:nvPr>
+            <p:ph type="dt" idx="1"/>
+          </p:nvPr>
+        </p:nvSpPr>
+        <p:spPr>
+          <a:xfrm>
+            <a:off x="3884613" y="0"/>
+            <a:ext cx="2971800" cy="457200"/>
+          </a:xfrm>
+          <a:prstGeom prst="rect">
+            <a:avLst/>
+          </a:prstGeom>
+        </p:spPr>
+        <p:txBody>
+          <a:bodyPr vert="horz" lIns="91440" tIns="45720" rIns="91440" bIns="45720" rtlCol="0"/>
+          <a:lstStyle>
+            <a:lvl1pPr algn="r">
+              <a:defRPr sz="1200"/>
+            </a:lvl1pPr>
+          </a:lstStyle>
+          <a:p>
+            <a:fld id="{9DED5714-D740-4F89-AAD5-E3BC8B06EDCA}" type="datetimeFigureOut">
+              <a:rPr lang="en-US" smtClean="0"/>
+              <a:t>3/29/2012</a:t>
+            </a:fld>
+            <a:endParaRPr lang="en-US"/>
+          </a:p>
+        </p:txBody>
+      </p:sp>
+      <p:sp>
+        <p:nvSpPr>
+          <p:cNvPr id="4" name="Slide Image Placeholder 3"/>
+          <p:cNvSpPr>
+            <a:spLocks noGrp="1" noRot="1" noChangeAspect="1"/>
+          </p:cNvSpPr>
+          <p:nvPr>
+            <p:ph type="sldImg" idx="2"/>
+          </p:nvPr>
+        </p:nvSpPr>
+        <p:spPr>
+          <a:xfrm>
+            <a:off x="1143000" y="685800"/>
+            <a:ext cx="4572000" cy="3429000"/>
+          </a:xfrm>
+          <a:prstGeom prst="rect">
+            <a:avLst/>
+          </a:prstGeom>
+          <a:noFill/>
+          <a:ln w="12700">
+            <a:solidFill>
+              <a:prstClr val="black"/>
+            </a:solidFill>
+          </a:ln>
+        </p:spPr>
+        <p:txBody>
+          <a:bodyPr vert="horz" lIns="91440" tIns="45720" rIns="91440" bIns="45720" rtlCol="0" anchor="ctr"/>
+          <a:lstStyle/>
+          <a:p>
+            <a:endParaRPr lang="en-US"/>
+          </a:p>
+        </p:txBody>
+      </p:sp>
+      <p:sp>
+        <p:nvSpPr>
+          <p:cNvPr id="5" name="Notes Placeholder 4"/>
+          <p:cNvSpPr>
+            <a:spLocks noGrp="1"/>
+          </p:cNvSpPr>
+          <p:nvPr>
+            <p:ph type="body" sz="quarter" idx="3"/>
+          </p:nvPr>
+        </p:nvSpPr>
+        <p:spPr>
+          <a:xfrm>
+            <a:off x="685800" y="4343400"/>
+            <a:ext cx="5486400" cy="4114800"/>
+          </a:xfrm>
+          <a:prstGeom prst="rect">
+            <a:avLst/>
+          </a:prstGeom>
+        </p:spPr>
+        <p:txBody>
+          <a:bodyPr vert="horz" lIns="91440" tIns="45720" rIns="91440" bIns="45720" rtlCol="0"/>
+          <a:lstStyle/>
+          <a:p>
+            <a:pPr lvl="0"/>
+            <a:r>
+              <a:rPr lang="en-US" smtClean="0"/>
+              <a:t>Click to edit Master text styles</a:t>
+            </a:r>
+          </a:p>
+          <a:p>
+            <a:pPr lvl="1"/>
+            <a:r>
+              <a:rPr lang="en-US" smtClean="0"/>
+              <a:t>Second level</a:t>
+            </a:r>
+          </a:p>
+          <a:p>
+            <a:pPr lvl="2"/>
+            <a:r>
+              <a:rPr lang="en-US" smtClean="0"/>
+              <a:t>Third level</a:t>
+            </a:r>
+          </a:p>
+          <a:p>
+            <a:pPr lvl="3"/>
+            <a:r>
+              <a:rPr lang="en-US" smtClean="0"/>
+              <a:t>Fourth level</a:t>
+            </a:r>
+          </a:p>
+          <a:p>
+            <a:pPr lvl="4"/>
+            <a:r>
+              <a:rPr lang="en-US" smtClean="0"/>
+              <a:t>Fifth level</a:t>
+            </a:r>
+            <a:endParaRPr lang="en-US"/>
+          </a:p>
+        </p:txBody>
+      </p:sp>
+      <p:sp>
+        <p:nvSpPr>
+          <p:cNvPr id="6" name="Footer Placeholder 5"/>
+          <p:cNvSpPr>
+            <a:spLocks noGrp="1"/>
+          </p:cNvSpPr>
+          <p:nvPr>
+            <p:ph type="ftr" sz="quarter" idx="4"/>
+          </p:nvPr>
+        </p:nvSpPr>
+        <p:spPr>
+          <a:xfrm>
+            <a:off x="0" y="8685213"/>
+            <a:ext cx="2971800" cy="457200"/>
+          </a:xfrm>
+          <a:prstGeom prst="rect">
+            <a:avLst/>
+          </a:prstGeom>
+        </p:spPr>
+        <p:txBody>
+          <a:bodyPr vert="horz" lIns="91440" tIns="45720" rIns="91440" bIns="45720" rtlCol="0" anchor="b"/>
+          <a:lstStyle>
+            <a:lvl1pPr algn="l">
+              <a:defRPr sz="1200"/>
+            </a:lvl1pPr>
+          </a:lstStyle>
+          <a:p>
+            <a:endParaRPr lang="en-US"/>
+          </a:p>
+        </p:txBody>
+      </p:sp>
+      <p:sp>
+        <p:nvSpPr>
+          <p:cNvPr id="7" name="Slide Number Placeholder 6"/>
+          <p:cNvSpPr>
+            <a:spLocks noGrp="1"/>
+          </p:cNvSpPr>
+          <p:nvPr>
+            <p:ph type="sldNum" sz="quarter" idx="5"/>
+          </p:nvPr>
+        </p:nvSpPr>
+        <p:spPr>
+          <a:xfrm>
+            <a:off x="3884613" y="8685213"/>
+            <a:ext cx="2971800" cy="457200"/>
+          </a:xfrm>
+          <a:prstGeom prst="rect">
+            <a:avLst/>
+          </a:prstGeom>
+        </p:spPr>
+        <p:txBody>
+          <a:bodyPr vert="horz" lIns="91440" tIns="45720" rIns="91440" bIns="45720" rtlCol="0" anchor="b"/>
+          <a:lstStyle>
+            <a:lvl1pPr algn="r">
+              <a:defRPr sz="1200"/>
+            </a:lvl1pPr>
+          </a:lstStyle>
+          <a:p>
+            <a:fld id="{9D0B4A42-F062-4908-9C81-A569921BC8B1}" type="slidenum">
+              <a:rPr lang="en-US" smtClean="0"/>
+              <a:t>‹#›</a:t>
+            </a:fld>
+            <a:endParaRPr lang="en-US"/>
+          </a:p>
+        </p:txBody>
+      </p:sp>
+    </p:spTree>
+    <p:extLst>
+      <p:ext uri="{BB962C8B-B14F-4D97-AF65-F5344CB8AC3E}">
+        <p14:creationId xmlns:p14="http://schemas.microsoft.com/office/powerpoint/2010/main" val="2734233371"/>
+      </p:ext>
+    </p:extLst>
+  </p:cSld>
+  <p:clrMap bg1="lt1" tx1="dk1" bg2="lt2" tx2="dk2" accent1="accent1" accent2="accent2" accent3="accent3" accent4="accent4" accent5="accent5" accent6="accent6" hlink="hlink" folHlink="folHlink"/>
+  <p:notesStyle>
+    <a:lvl1pPr marL="0" algn="l" defTabSz="914400" rtl="0" eaLnBrk="1" latinLnBrk="0" hangingPunct="1">
+      <a:defRPr sz="1200" kern="1200">
+        <a:solidFill>
+          <a:schemeClr val="tx1"/>
+        </a:solidFill>
+        <a:latin typeface="+mn-lt"/>
+        <a:ea typeface="+mn-ea"/>
+        <a:cs typeface="+mn-cs"/>
+      </a:defRPr>
+    </a:lvl1pPr>
+    <a:lvl2pPr marL="457200" algn="l" defTabSz="914400" rtl="0" eaLnBrk="1" latinLnBrk="0" hangingPunct="1">
+      <a:defRPr sz="1200" kern="1200">
+        <a:solidFill>
+          <a:schemeClr val="tx1"/>
+        </a:solidFill>
+        <a:latin typeface="+mn-lt"/>
+        <a:ea typeface="+mn-ea"/>
+        <a:cs typeface="+mn-cs"/>
+      </a:defRPr>
+    </a:lvl2pPr>
+    <a:lvl3pPr marL="914400" algn="l" defTabSz="914400" rtl="0" eaLnBrk="1" latinLnBrk="0" hangingPunct="1">
+      <a:defRPr sz="1200" kern="1200">
+        <a:solidFill>
+          <a:schemeClr val="tx1"/>
+        </a:solidFill>
+        <a:latin typeface="+mn-lt"/>
+        <a:ea typeface="+mn-ea"/>
+        <a:cs typeface="+mn-cs"/>
+      </a:defRPr>
+    </a:lvl3pPr>
+    <a:lvl4pPr marL="1371600" algn="l" defTabSz="914400" rtl="0" eaLnBrk="1" latinLnBrk="0" hangingPunct="1">
+      <a:defRPr sz="1200" kern="1200">
+        <a:solidFill>
+          <a:schemeClr val="tx1"/>
+        </a:solidFill>
+        <a:latin typeface="+mn-lt"/>
+        <a:ea typeface="+mn-ea"/>
+        <a:cs typeface="+mn-cs"/>
+      </a:defRPr>
+    </a:lvl4pPr>
+    <a:lvl5pPr marL="1828800" algn="l" defTabSz="914400" rtl="0" eaLnBrk="1" latinLnBrk="0" hangingPunct="1">
+      <a:defRPr sz="1200" kern="1200">
+        <a:solidFill>
+          <a:schemeClr val="tx1"/>
+        </a:solidFill>
+        <a:latin typeface="+mn-lt"/>
+        <a:ea typeface="+mn-ea"/>
+        <a:cs typeface="+mn-cs"/>
+      </a:defRPr>
+    </a:lvl5pPr>
+    <a:lvl6pPr marL="2286000" algn="l" defTabSz="914400" rtl="0" eaLnBrk="1" latinLnBrk="0" hangingPunct="1">
+      <a:defRPr sz="1200" kern="1200">
+        <a:solidFill>
+          <a:schemeClr val="tx1"/>
+        </a:solidFill>
+        <a:latin typeface="+mn-lt"/>
+        <a:ea typeface="+mn-ea"/>
+        <a:cs typeface="+mn-cs"/>
+      </a:defRPr>
+    </a:lvl6pPr>
+    <a:lvl7pPr marL="2743200" algn="l" defTabSz="914400" rtl="0" eaLnBrk="1" latinLnBrk="0" hangingPunct="1">
+      <a:defRPr sz="1200" kern="1200">
+        <a:solidFill>
+          <a:schemeClr val="tx1"/>
+        </a:solidFill>
+        <a:latin typeface="+mn-lt"/>
+        <a:ea typeface="+mn-ea"/>
+        <a:cs typeface="+mn-cs"/>
+      </a:defRPr>
+    </a:lvl7pPr>
+    <a:lvl8pPr marL="3200400" algn="l" defTabSz="914400" rtl="0" eaLnBrk="1" latinLnBrk="0" hangingPunct="1">
+      <a:defRPr sz="1200" kern="1200">
+        <a:solidFill>
+          <a:schemeClr val="tx1"/>
+        </a:solidFill>
+        <a:latin typeface="+mn-lt"/>
+        <a:ea typeface="+mn-ea"/>
+        <a:cs typeface="+mn-cs"/>
+      </a:defRPr>
+    </a:lvl8pPr>
+    <a:lvl9pPr marL="3657600" algn="l" defTabSz="914400" rtl="0" eaLnBrk="1" latinLnBrk="0" hangingPunct="1">
+      <a:defRPr sz="1200" kern="1200">
+        <a:solidFill>
+          <a:schemeClr val="tx1"/>
+        </a:solidFill>
+        <a:latin typeface="+mn-lt"/>
+        <a:ea typeface="+mn-ea"/>
+        <a:cs typeface="+mn-cs"/>
+      </a:defRPr>
+    </a:lvl9pPr>
+  </p:notesStyle>
+</p:notesMaster>
 </file>
 
 <file path=ppt/slideLayouts/slideLayout1.xml><?xml version="1.0" encoding="utf-8"?>
@@ -484,7 +849,7 @@
           <a:p>
             <a:fld id="{FB76FE03-F4FF-4405-A4BA-F447F9618E72}" type="datetimeFigureOut">
               <a:rPr lang="en-US" smtClean="0"/>
-              <a:t>3/28/2012</a:t>
+              <a:t>3/29/2012</a:t>
             </a:fld>
             <a:endParaRPr lang="en-US"/>
           </a:p>
@@ -749,7 +1114,7 @@
           <a:p>
             <a:fld id="{FB76FE03-F4FF-4405-A4BA-F447F9618E72}" type="datetimeFigureOut">
               <a:rPr lang="en-US" smtClean="0"/>
-              <a:t>3/28/2012</a:t>
+              <a:t>3/29/2012</a:t>
             </a:fld>
             <a:endParaRPr lang="en-US"/>
           </a:p>
@@ -1023,7 +1388,7 @@
           <a:p>
             <a:fld id="{FB76FE03-F4FF-4405-A4BA-F447F9618E72}" type="datetimeFigureOut">
               <a:rPr lang="en-US" smtClean="0"/>
-              <a:t>3/28/2012</a:t>
+              <a:t>3/29/2012</a:t>
             </a:fld>
             <a:endParaRPr lang="en-US"/>
           </a:p>
@@ -1240,7 +1605,7 @@
           <a:p>
             <a:fld id="{FB76FE03-F4FF-4405-A4BA-F447F9618E72}" type="datetimeFigureOut">
               <a:rPr lang="en-US" smtClean="0"/>
-              <a:t>3/28/2012</a:t>
+              <a:t>3/29/2012</a:t>
             </a:fld>
             <a:endParaRPr lang="en-US"/>
           </a:p>
@@ -1627,7 +1992,7 @@
           <a:p>
             <a:fld id="{FB76FE03-F4FF-4405-A4BA-F447F9618E72}" type="datetimeFigureOut">
               <a:rPr lang="en-US" smtClean="0"/>
-              <a:t>3/28/2012</a:t>
+              <a:t>3/29/2012</a:t>
             </a:fld>
             <a:endParaRPr lang="en-US"/>
           </a:p>
@@ -2008,7 +2373,7 @@
           <a:p>
             <a:fld id="{FB76FE03-F4FF-4405-A4BA-F447F9618E72}" type="datetimeFigureOut">
               <a:rPr lang="en-US" smtClean="0"/>
-              <a:t>3/28/2012</a:t>
+              <a:t>3/29/2012</a:t>
             </a:fld>
             <a:endParaRPr lang="en-US"/>
           </a:p>
@@ -2425,7 +2790,7 @@
           <a:p>
             <a:fld id="{FB76FE03-F4FF-4405-A4BA-F447F9618E72}" type="datetimeFigureOut">
               <a:rPr lang="en-US" smtClean="0"/>
-              <a:t>3/28/2012</a:t>
+              <a:t>3/29/2012</a:t>
             </a:fld>
             <a:endParaRPr lang="en-US"/>
           </a:p>
@@ -2538,7 +2903,7 @@
           <a:p>
             <a:fld id="{FB76FE03-F4FF-4405-A4BA-F447F9618E72}" type="datetimeFigureOut">
               <a:rPr lang="en-US" smtClean="0"/>
-              <a:t>3/28/2012</a:t>
+              <a:t>3/29/2012</a:t>
             </a:fld>
             <a:endParaRPr lang="en-US"/>
           </a:p>
@@ -2628,7 +2993,7 @@
           <a:p>
             <a:fld id="{FB76FE03-F4FF-4405-A4BA-F447F9618E72}" type="datetimeFigureOut">
               <a:rPr lang="en-US" smtClean="0"/>
-              <a:t>3/28/2012</a:t>
+              <a:t>3/29/2012</a:t>
             </a:fld>
             <a:endParaRPr lang="en-US"/>
           </a:p>
@@ -2837,7 +3202,7 @@
           <a:p>
             <a:fld id="{FB76FE03-F4FF-4405-A4BA-F447F9618E72}" type="datetimeFigureOut">
               <a:rPr lang="en-US" smtClean="0"/>
-              <a:t>3/28/2012</a:t>
+              <a:t>3/29/2012</a:t>
             </a:fld>
             <a:endParaRPr lang="en-US"/>
           </a:p>
@@ -3214,7 +3579,7 @@
           <a:p>
             <a:fld id="{FB76FE03-F4FF-4405-A4BA-F447F9618E72}" type="datetimeFigureOut">
               <a:rPr lang="en-US" smtClean="0"/>
-              <a:t>3/28/2012</a:t>
+              <a:t>3/29/2012</a:t>
             </a:fld>
             <a:endParaRPr lang="en-US"/>
           </a:p>
@@ -3761,7 +4126,7 @@
           <a:p>
             <a:fld id="{FB76FE03-F4FF-4405-A4BA-F447F9618E72}" type="datetimeFigureOut">
               <a:rPr lang="en-US" smtClean="0"/>
-              <a:t>3/28/2012</a:t>
+              <a:t>3/29/2012</a:t>
             </a:fld>
             <a:endParaRPr lang="en-US"/>
           </a:p>
@@ -4275,6 +4640,967 @@
 </p:sld>
 </file>
 
+<file path=ppt/slides/slide10.xml><?xml version="1.0" encoding="utf-8"?>
+<p:sld xmlns:a="http://schemas.openxmlformats.org/drawingml/2006/main" xmlns:r="http://schemas.openxmlformats.org/officeDocument/2006/relationships" xmlns:p="http://schemas.openxmlformats.org/presentationml/2006/main">
+  <p:cSld>
+    <p:spTree>
+      <p:nvGrpSpPr>
+        <p:cNvPr id="1" name=""/>
+        <p:cNvGrpSpPr/>
+        <p:nvPr/>
+      </p:nvGrpSpPr>
+      <p:grpSpPr>
+        <a:xfrm>
+          <a:off x="0" y="0"/>
+          <a:ext cx="0" cy="0"/>
+          <a:chOff x="0" y="0"/>
+          <a:chExt cx="0" cy="0"/>
+        </a:xfrm>
+      </p:grpSpPr>
+      <p:sp>
+        <p:nvSpPr>
+          <p:cNvPr id="2" name="Title 1"/>
+          <p:cNvSpPr>
+            <a:spLocks noGrp="1"/>
+          </p:cNvSpPr>
+          <p:nvPr>
+            <p:ph type="title"/>
+          </p:nvPr>
+        </p:nvSpPr>
+        <p:spPr/>
+        <p:txBody>
+          <a:bodyPr/>
+          <a:lstStyle/>
+          <a:p>
+            <a:r>
+              <a:rPr lang="en-US" dirty="0" smtClean="0"/>
+              <a:t>Ida - Disassembling</a:t>
+            </a:r>
+            <a:endParaRPr lang="en-US" dirty="0"/>
+          </a:p>
+        </p:txBody>
+      </p:sp>
+      <p:sp>
+        <p:nvSpPr>
+          <p:cNvPr id="3" name="Content Placeholder 2"/>
+          <p:cNvSpPr>
+            <a:spLocks noGrp="1"/>
+          </p:cNvSpPr>
+          <p:nvPr>
+            <p:ph idx="1"/>
+          </p:nvPr>
+        </p:nvSpPr>
+        <p:spPr/>
+        <p:txBody>
+          <a:bodyPr/>
+          <a:lstStyle/>
+          <a:p>
+            <a:r>
+              <a:rPr lang="en-US" dirty="0" smtClean="0"/>
+              <a:t>Open the file</a:t>
+            </a:r>
+          </a:p>
+          <a:p>
+            <a:r>
+              <a:rPr lang="en-US" dirty="0" smtClean="0"/>
+              <a:t>Pass through the options</a:t>
+            </a:r>
+          </a:p>
+          <a:p>
+            <a:r>
+              <a:rPr lang="en-US" dirty="0" smtClean="0"/>
+              <a:t>Right click on the view and click Text View</a:t>
+            </a:r>
+            <a:endParaRPr lang="en-US" dirty="0"/>
+          </a:p>
+        </p:txBody>
+      </p:sp>
+    </p:spTree>
+    <p:extLst>
+      <p:ext uri="{BB962C8B-B14F-4D97-AF65-F5344CB8AC3E}">
+        <p14:creationId xmlns:p14="http://schemas.microsoft.com/office/powerpoint/2010/main" val="1679836893"/>
+      </p:ext>
+    </p:extLst>
+  </p:cSld>
+  <p:clrMapOvr>
+    <a:masterClrMapping/>
+  </p:clrMapOvr>
+</p:sld>
+</file>
+
+<file path=ppt/slides/slide11.xml><?xml version="1.0" encoding="utf-8"?>
+<p:sld xmlns:a="http://schemas.openxmlformats.org/drawingml/2006/main" xmlns:r="http://schemas.openxmlformats.org/officeDocument/2006/relationships" xmlns:p="http://schemas.openxmlformats.org/presentationml/2006/main">
+  <p:cSld>
+    <p:spTree>
+      <p:nvGrpSpPr>
+        <p:cNvPr id="1" name=""/>
+        <p:cNvGrpSpPr/>
+        <p:nvPr/>
+      </p:nvGrpSpPr>
+      <p:grpSpPr>
+        <a:xfrm>
+          <a:off x="0" y="0"/>
+          <a:ext cx="0" cy="0"/>
+          <a:chOff x="0" y="0"/>
+          <a:chExt cx="0" cy="0"/>
+        </a:xfrm>
+      </p:grpSpPr>
+      <p:sp>
+        <p:nvSpPr>
+          <p:cNvPr id="2" name="Title 1"/>
+          <p:cNvSpPr>
+            <a:spLocks noGrp="1"/>
+          </p:cNvSpPr>
+          <p:nvPr>
+            <p:ph type="title"/>
+          </p:nvPr>
+        </p:nvSpPr>
+        <p:spPr/>
+        <p:txBody>
+          <a:bodyPr/>
+          <a:lstStyle/>
+          <a:p>
+            <a:r>
+              <a:rPr lang="en-US" dirty="0" err="1" smtClean="0"/>
+              <a:t>OllyDbg</a:t>
+            </a:r>
+            <a:r>
+              <a:rPr lang="en-US" dirty="0" smtClean="0"/>
+              <a:t> - Debugging</a:t>
+            </a:r>
+            <a:endParaRPr lang="en-US" dirty="0"/>
+          </a:p>
+        </p:txBody>
+      </p:sp>
+      <p:sp>
+        <p:nvSpPr>
+          <p:cNvPr id="3" name="Content Placeholder 2"/>
+          <p:cNvSpPr>
+            <a:spLocks noGrp="1"/>
+          </p:cNvSpPr>
+          <p:nvPr>
+            <p:ph idx="1"/>
+          </p:nvPr>
+        </p:nvSpPr>
+        <p:spPr/>
+        <p:txBody>
+          <a:bodyPr/>
+          <a:lstStyle/>
+          <a:p>
+            <a:r>
+              <a:rPr lang="en-US" dirty="0" smtClean="0"/>
+              <a:t>Open the .exe or attach to the running process</a:t>
+            </a:r>
+          </a:p>
+          <a:p>
+            <a:r>
+              <a:rPr lang="en-US" dirty="0" smtClean="0"/>
+              <a:t>Enter your data into the process</a:t>
+            </a:r>
+          </a:p>
+          <a:p>
+            <a:r>
+              <a:rPr lang="en-US" dirty="0" smtClean="0"/>
+              <a:t>Check out the stack, </a:t>
+            </a:r>
+            <a:r>
+              <a:rPr lang="en-US" dirty="0" err="1" smtClean="0"/>
+              <a:t>esp</a:t>
+            </a:r>
+            <a:r>
+              <a:rPr lang="en-US" dirty="0" smtClean="0"/>
+              <a:t>, </a:t>
+            </a:r>
+            <a:r>
+              <a:rPr lang="en-US" dirty="0" err="1" smtClean="0"/>
+              <a:t>ebp</a:t>
+            </a:r>
+            <a:r>
+              <a:rPr lang="en-US" dirty="0" smtClean="0"/>
+              <a:t>, and </a:t>
+            </a:r>
+            <a:r>
+              <a:rPr lang="en-US" dirty="0" err="1" smtClean="0"/>
+              <a:t>eip</a:t>
+            </a:r>
+            <a:r>
+              <a:rPr lang="en-US" dirty="0" smtClean="0"/>
+              <a:t> registers at the time of the crash</a:t>
+            </a:r>
+          </a:p>
+          <a:p>
+            <a:r>
+              <a:rPr lang="en-US" dirty="0" smtClean="0"/>
+              <a:t>If possible</a:t>
+            </a:r>
+          </a:p>
+          <a:p>
+            <a:pPr lvl="1"/>
+            <a:r>
+              <a:rPr lang="en-US" dirty="0" smtClean="0"/>
+              <a:t>Open the source file</a:t>
+            </a:r>
+          </a:p>
+          <a:p>
+            <a:pPr lvl="1"/>
+            <a:r>
+              <a:rPr lang="en-US" dirty="0" smtClean="0"/>
+              <a:t>Run until the buffer overflow should occur</a:t>
+            </a:r>
+          </a:p>
+        </p:txBody>
+      </p:sp>
+    </p:spTree>
+    <p:extLst>
+      <p:ext uri="{BB962C8B-B14F-4D97-AF65-F5344CB8AC3E}">
+        <p14:creationId xmlns:p14="http://schemas.microsoft.com/office/powerpoint/2010/main" val="2745096001"/>
+      </p:ext>
+    </p:extLst>
+  </p:cSld>
+  <p:clrMapOvr>
+    <a:masterClrMapping/>
+  </p:clrMapOvr>
+</p:sld>
+</file>
+
+<file path=ppt/slides/slide12.xml><?xml version="1.0" encoding="utf-8"?>
+<p:sld xmlns:a="http://schemas.openxmlformats.org/drawingml/2006/main" xmlns:r="http://schemas.openxmlformats.org/officeDocument/2006/relationships" xmlns:p="http://schemas.openxmlformats.org/presentationml/2006/main">
+  <p:cSld>
+    <p:spTree>
+      <p:nvGrpSpPr>
+        <p:cNvPr id="1" name=""/>
+        <p:cNvGrpSpPr/>
+        <p:nvPr/>
+      </p:nvGrpSpPr>
+      <p:grpSpPr>
+        <a:xfrm>
+          <a:off x="0" y="0"/>
+          <a:ext cx="0" cy="0"/>
+          <a:chOff x="0" y="0"/>
+          <a:chExt cx="0" cy="0"/>
+        </a:xfrm>
+      </p:grpSpPr>
+      <p:sp>
+        <p:nvSpPr>
+          <p:cNvPr id="2" name="Title 1"/>
+          <p:cNvSpPr>
+            <a:spLocks noGrp="1"/>
+          </p:cNvSpPr>
+          <p:nvPr>
+            <p:ph type="title"/>
+          </p:nvPr>
+        </p:nvSpPr>
+        <p:spPr/>
+        <p:txBody>
+          <a:bodyPr/>
+          <a:lstStyle/>
+          <a:p>
+            <a:r>
+              <a:rPr lang="en-US" dirty="0" err="1" smtClean="0"/>
+              <a:t>Shellcoding</a:t>
+            </a:r>
+            <a:endParaRPr lang="en-US" dirty="0"/>
+          </a:p>
+        </p:txBody>
+      </p:sp>
+      <p:sp>
+        <p:nvSpPr>
+          <p:cNvPr id="3" name="Content Placeholder 2"/>
+          <p:cNvSpPr>
+            <a:spLocks noGrp="1"/>
+          </p:cNvSpPr>
+          <p:nvPr>
+            <p:ph idx="1"/>
+          </p:nvPr>
+        </p:nvSpPr>
+        <p:spPr/>
+        <p:txBody>
+          <a:bodyPr>
+            <a:normAutofit/>
+          </a:bodyPr>
+          <a:lstStyle/>
+          <a:p>
+            <a:r>
+              <a:rPr lang="en-US" dirty="0" smtClean="0"/>
+              <a:t>Find a solid assembly base (unless you want to write it all yourself…)</a:t>
+            </a:r>
+          </a:p>
+          <a:p>
+            <a:r>
+              <a:rPr lang="en-US" dirty="0" smtClean="0"/>
+              <a:t>Find your system call memory addresses with </a:t>
+            </a:r>
+            <a:r>
+              <a:rPr lang="en-US" dirty="0" err="1" smtClean="0"/>
+              <a:t>arwin</a:t>
+            </a:r>
+            <a:endParaRPr lang="en-US" dirty="0" smtClean="0"/>
+          </a:p>
+          <a:p>
+            <a:r>
+              <a:rPr lang="en-US" dirty="0" smtClean="0"/>
+              <a:t>Decide what you want to do</a:t>
+            </a:r>
+          </a:p>
+          <a:p>
+            <a:r>
+              <a:rPr lang="en-US" dirty="0" err="1" smtClean="0"/>
+              <a:t>nasm</a:t>
+            </a:r>
+            <a:r>
+              <a:rPr lang="en-US" dirty="0" smtClean="0"/>
+              <a:t> into </a:t>
+            </a:r>
+            <a:r>
+              <a:rPr lang="en-US" dirty="0" err="1" smtClean="0"/>
+              <a:t>bytecode</a:t>
+            </a:r>
+            <a:endParaRPr lang="en-US" dirty="0" smtClean="0"/>
+          </a:p>
+          <a:p>
+            <a:r>
+              <a:rPr lang="en-US" dirty="0" err="1" smtClean="0"/>
+              <a:t>Objdump</a:t>
+            </a:r>
+            <a:r>
+              <a:rPr lang="en-US" dirty="0" smtClean="0"/>
+              <a:t> to get the </a:t>
+            </a:r>
+            <a:r>
+              <a:rPr lang="en-US" dirty="0" err="1" smtClean="0"/>
+              <a:t>bytecode</a:t>
+            </a:r>
+            <a:r>
+              <a:rPr lang="en-US" dirty="0" smtClean="0"/>
+              <a:t> in text format</a:t>
+            </a:r>
+          </a:p>
+          <a:p>
+            <a:r>
+              <a:rPr lang="en-US" dirty="0" smtClean="0"/>
+              <a:t>Determine big-endian or little-endian (this is </a:t>
+            </a:r>
+            <a:r>
+              <a:rPr lang="en-US" smtClean="0"/>
+              <a:t>where that matters)</a:t>
+            </a:r>
+            <a:endParaRPr lang="en-US" dirty="0" smtClean="0"/>
+          </a:p>
+          <a:p>
+            <a:endParaRPr lang="en-US" dirty="0"/>
+          </a:p>
+        </p:txBody>
+      </p:sp>
+    </p:spTree>
+    <p:extLst>
+      <p:ext uri="{BB962C8B-B14F-4D97-AF65-F5344CB8AC3E}">
+        <p14:creationId xmlns:p14="http://schemas.microsoft.com/office/powerpoint/2010/main" val="1144610127"/>
+      </p:ext>
+    </p:extLst>
+  </p:cSld>
+  <p:clrMapOvr>
+    <a:masterClrMapping/>
+  </p:clrMapOvr>
+</p:sld>
+</file>
+
+<file path=ppt/slides/slide13.xml><?xml version="1.0" encoding="utf-8"?>
+<p:sld xmlns:a="http://schemas.openxmlformats.org/drawingml/2006/main" xmlns:r="http://schemas.openxmlformats.org/officeDocument/2006/relationships" xmlns:p="http://schemas.openxmlformats.org/presentationml/2006/main">
+  <p:cSld>
+    <p:spTree>
+      <p:nvGrpSpPr>
+        <p:cNvPr id="1" name=""/>
+        <p:cNvGrpSpPr/>
+        <p:nvPr/>
+      </p:nvGrpSpPr>
+      <p:grpSpPr>
+        <a:xfrm>
+          <a:off x="0" y="0"/>
+          <a:ext cx="0" cy="0"/>
+          <a:chOff x="0" y="0"/>
+          <a:chExt cx="0" cy="0"/>
+        </a:xfrm>
+      </p:grpSpPr>
+      <p:sp>
+        <p:nvSpPr>
+          <p:cNvPr id="2" name="Title 1"/>
+          <p:cNvSpPr>
+            <a:spLocks noGrp="1"/>
+          </p:cNvSpPr>
+          <p:nvPr>
+            <p:ph type="title"/>
+          </p:nvPr>
+        </p:nvSpPr>
+        <p:spPr/>
+        <p:txBody>
+          <a:bodyPr/>
+          <a:lstStyle/>
+          <a:p>
+            <a:r>
+              <a:rPr lang="en-US" dirty="0" smtClean="0"/>
+              <a:t>Assembly</a:t>
+            </a:r>
+            <a:endParaRPr lang="en-US" dirty="0"/>
+          </a:p>
+        </p:txBody>
+      </p:sp>
+      <p:sp>
+        <p:nvSpPr>
+          <p:cNvPr id="3" name="Content Placeholder 2"/>
+          <p:cNvSpPr>
+            <a:spLocks noGrp="1"/>
+          </p:cNvSpPr>
+          <p:nvPr>
+            <p:ph idx="1"/>
+          </p:nvPr>
+        </p:nvSpPr>
+        <p:spPr>
+          <a:xfrm>
+            <a:off x="457200" y="1600200"/>
+            <a:ext cx="8229600" cy="4953000"/>
+          </a:xfrm>
+        </p:spPr>
+        <p:txBody>
+          <a:bodyPr>
+            <a:noAutofit/>
+          </a:bodyPr>
+          <a:lstStyle/>
+          <a:p>
+            <a:pPr marL="0" indent="0">
+              <a:buNone/>
+            </a:pPr>
+            <a:r>
+              <a:rPr lang="en-US" sz="1400" dirty="0" err="1" smtClean="0"/>
+              <a:t>jmp</a:t>
+            </a:r>
+            <a:r>
+              <a:rPr lang="en-US" sz="1400" dirty="0" smtClean="0"/>
+              <a:t> </a:t>
+            </a:r>
+            <a:r>
+              <a:rPr lang="en-US" sz="1400" dirty="0"/>
+              <a:t>short </a:t>
+            </a:r>
+            <a:r>
+              <a:rPr lang="en-US" sz="1400" dirty="0" err="1"/>
+              <a:t>GetCommand</a:t>
+            </a:r>
+            <a:r>
+              <a:rPr lang="en-US" sz="1400" dirty="0"/>
+              <a:t> </a:t>
+            </a:r>
+            <a:r>
+              <a:rPr lang="en-US" sz="1400" dirty="0" smtClean="0"/>
+              <a:t>	;</a:t>
+            </a:r>
+            <a:r>
+              <a:rPr lang="en-US" sz="1400" dirty="0"/>
+              <a:t>jump to the location of the command string</a:t>
+            </a:r>
+          </a:p>
+          <a:p>
+            <a:pPr marL="0" indent="0">
+              <a:buNone/>
+            </a:pPr>
+            <a:r>
+              <a:rPr lang="en-US" sz="1400" dirty="0" err="1"/>
+              <a:t>CommandReturn</a:t>
+            </a:r>
+            <a:r>
+              <a:rPr lang="en-US" sz="1400" dirty="0"/>
+              <a:t>: </a:t>
+            </a:r>
+            <a:r>
+              <a:rPr lang="en-US" sz="1400" dirty="0" smtClean="0"/>
+              <a:t>	;</a:t>
+            </a:r>
+            <a:r>
+              <a:rPr lang="en-US" sz="1400" dirty="0"/>
+              <a:t>Define a label to call so that string address is pushed onto stack</a:t>
+            </a:r>
+          </a:p>
+          <a:p>
+            <a:pPr marL="0" indent="0">
+              <a:buNone/>
+            </a:pPr>
+            <a:r>
+              <a:rPr lang="en-US" sz="1400" dirty="0"/>
+              <a:t>    pop </a:t>
+            </a:r>
+            <a:r>
+              <a:rPr lang="en-US" sz="1400" dirty="0" err="1"/>
+              <a:t>ebx</a:t>
+            </a:r>
+            <a:r>
+              <a:rPr lang="en-US" sz="1400" dirty="0"/>
+              <a:t> </a:t>
+            </a:r>
+            <a:r>
+              <a:rPr lang="en-US" sz="1400" dirty="0" smtClean="0"/>
+              <a:t>		;</a:t>
+            </a:r>
+            <a:r>
+              <a:rPr lang="en-US" sz="1400" dirty="0" err="1"/>
+              <a:t>ebx</a:t>
+            </a:r>
+            <a:r>
+              <a:rPr lang="en-US" sz="1400" dirty="0"/>
+              <a:t> now points to the string</a:t>
+            </a:r>
+          </a:p>
+          <a:p>
+            <a:pPr marL="0" indent="0">
+              <a:buNone/>
+            </a:pPr>
+            <a:endParaRPr lang="en-US" sz="1400" dirty="0"/>
+          </a:p>
+          <a:p>
+            <a:pPr marL="0" indent="0">
+              <a:buNone/>
+            </a:pPr>
+            <a:r>
+              <a:rPr lang="en-US" sz="1400" dirty="0"/>
+              <a:t>    </a:t>
+            </a:r>
+            <a:r>
+              <a:rPr lang="en-US" sz="1400" dirty="0" err="1"/>
+              <a:t>xor</a:t>
+            </a:r>
+            <a:r>
+              <a:rPr lang="en-US" sz="1400" dirty="0"/>
+              <a:t> </a:t>
+            </a:r>
+            <a:r>
+              <a:rPr lang="en-US" sz="1400" dirty="0" err="1"/>
+              <a:t>eax,eax</a:t>
+            </a:r>
+            <a:r>
+              <a:rPr lang="en-US" sz="1400" dirty="0"/>
+              <a:t> </a:t>
+            </a:r>
+            <a:r>
+              <a:rPr lang="en-US" sz="1400" dirty="0" smtClean="0"/>
+              <a:t>	;</a:t>
+            </a:r>
+            <a:r>
+              <a:rPr lang="en-US" sz="1400" dirty="0"/>
+              <a:t>empties out </a:t>
+            </a:r>
+            <a:r>
+              <a:rPr lang="en-US" sz="1400" dirty="0" err="1"/>
+              <a:t>eax</a:t>
+            </a:r>
+            <a:endParaRPr lang="en-US" sz="1400" dirty="0"/>
+          </a:p>
+          <a:p>
+            <a:pPr marL="0" indent="0">
+              <a:buNone/>
+            </a:pPr>
+            <a:r>
+              <a:rPr lang="en-US" sz="1400" dirty="0"/>
+              <a:t>    push </a:t>
+            </a:r>
+            <a:r>
+              <a:rPr lang="en-US" sz="1400" dirty="0" err="1"/>
+              <a:t>eax</a:t>
+            </a:r>
+            <a:r>
+              <a:rPr lang="en-US" sz="1400" dirty="0"/>
+              <a:t> </a:t>
+            </a:r>
+            <a:r>
+              <a:rPr lang="en-US" sz="1400" dirty="0" smtClean="0"/>
+              <a:t>		;</a:t>
+            </a:r>
+            <a:r>
+              <a:rPr lang="en-US" sz="1400" dirty="0"/>
+              <a:t>push null onto stack as empty parameter value</a:t>
+            </a:r>
+          </a:p>
+          <a:p>
+            <a:pPr marL="0" indent="0">
+              <a:buNone/>
+            </a:pPr>
+            <a:r>
+              <a:rPr lang="en-US" sz="1400" dirty="0"/>
+              <a:t>    push </a:t>
+            </a:r>
+            <a:r>
+              <a:rPr lang="en-US" sz="1400" dirty="0" err="1"/>
+              <a:t>ebx</a:t>
+            </a:r>
+            <a:r>
+              <a:rPr lang="en-US" sz="1400" dirty="0"/>
+              <a:t> </a:t>
+            </a:r>
+            <a:r>
+              <a:rPr lang="en-US" sz="1400" dirty="0" smtClean="0"/>
+              <a:t>		;</a:t>
+            </a:r>
+            <a:r>
+              <a:rPr lang="en-US" sz="1400" dirty="0"/>
+              <a:t>push the command string onto the stack</a:t>
+            </a:r>
+          </a:p>
+          <a:p>
+            <a:pPr marL="0" indent="0">
+              <a:buNone/>
+            </a:pPr>
+            <a:r>
+              <a:rPr lang="en-US" sz="1400" dirty="0"/>
+              <a:t>    </a:t>
+            </a:r>
+            <a:r>
+              <a:rPr lang="en-US" sz="1400" dirty="0" err="1"/>
+              <a:t>mov</a:t>
+            </a:r>
+            <a:r>
+              <a:rPr lang="en-US" sz="1400" dirty="0"/>
+              <a:t> ebx,0x7c86250d </a:t>
+            </a:r>
+            <a:r>
+              <a:rPr lang="en-US" sz="1400" dirty="0" smtClean="0"/>
+              <a:t>	;</a:t>
+            </a:r>
+            <a:r>
+              <a:rPr lang="en-US" sz="1400" dirty="0"/>
+              <a:t>place address of </a:t>
+            </a:r>
+            <a:r>
+              <a:rPr lang="en-US" sz="1400" dirty="0" err="1"/>
+              <a:t>WinExec</a:t>
+            </a:r>
+            <a:r>
+              <a:rPr lang="en-US" sz="1400" dirty="0"/>
+              <a:t> into </a:t>
+            </a:r>
+            <a:r>
+              <a:rPr lang="en-US" sz="1400" dirty="0" err="1"/>
+              <a:t>ebx</a:t>
+            </a:r>
+            <a:endParaRPr lang="en-US" sz="1400" dirty="0"/>
+          </a:p>
+          <a:p>
+            <a:pPr marL="0" indent="0">
+              <a:buNone/>
+            </a:pPr>
+            <a:r>
+              <a:rPr lang="en-US" sz="1400" dirty="0"/>
+              <a:t>    call </a:t>
+            </a:r>
+            <a:r>
+              <a:rPr lang="en-US" sz="1400" dirty="0" err="1"/>
+              <a:t>ebx</a:t>
+            </a:r>
+            <a:r>
+              <a:rPr lang="en-US" sz="1400" dirty="0"/>
+              <a:t> </a:t>
+            </a:r>
+            <a:r>
+              <a:rPr lang="en-US" sz="1400" dirty="0" smtClean="0"/>
+              <a:t>		;</a:t>
+            </a:r>
+            <a:r>
+              <a:rPr lang="en-US" sz="1400" dirty="0"/>
+              <a:t>call </a:t>
+            </a:r>
+            <a:r>
+              <a:rPr lang="en-US" sz="1400" dirty="0" err="1"/>
+              <a:t>WinExec</a:t>
+            </a:r>
+            <a:r>
+              <a:rPr lang="en-US" sz="1400" dirty="0"/>
+              <a:t>(</a:t>
+            </a:r>
+            <a:r>
+              <a:rPr lang="en-US" sz="1400" dirty="0" err="1"/>
+              <a:t>path,showcode</a:t>
+            </a:r>
+            <a:r>
+              <a:rPr lang="en-US" sz="1400" dirty="0"/>
+              <a:t>)</a:t>
+            </a:r>
+          </a:p>
+          <a:p>
+            <a:pPr marL="0" indent="0">
+              <a:buNone/>
+            </a:pPr>
+            <a:endParaRPr lang="en-US" sz="1400" dirty="0"/>
+          </a:p>
+          <a:p>
+            <a:pPr marL="0" indent="0">
+              <a:buNone/>
+            </a:pPr>
+            <a:r>
+              <a:rPr lang="en-US" sz="1400" dirty="0"/>
+              <a:t>    </a:t>
+            </a:r>
+            <a:r>
+              <a:rPr lang="en-US" sz="1400" dirty="0" err="1"/>
+              <a:t>xor</a:t>
+            </a:r>
+            <a:r>
+              <a:rPr lang="en-US" sz="1400" dirty="0"/>
+              <a:t> </a:t>
+            </a:r>
+            <a:r>
+              <a:rPr lang="en-US" sz="1400" dirty="0" err="1" smtClean="0"/>
+              <a:t>eax,eax</a:t>
+            </a:r>
+            <a:r>
+              <a:rPr lang="en-US" sz="1400" dirty="0" smtClean="0"/>
+              <a:t>	;</a:t>
+            </a:r>
+            <a:r>
+              <a:rPr lang="en-US" sz="1400" dirty="0"/>
+              <a:t>zero the register </a:t>
+            </a:r>
+            <a:r>
+              <a:rPr lang="en-US" sz="1400" dirty="0" smtClean="0"/>
+              <a:t>to </a:t>
+            </a:r>
+            <a:r>
+              <a:rPr lang="en-US" sz="1400" dirty="0"/>
+              <a:t>clear </a:t>
+            </a:r>
+            <a:r>
+              <a:rPr lang="en-US" sz="1400" dirty="0" err="1"/>
+              <a:t>WinExec</a:t>
+            </a:r>
+            <a:r>
+              <a:rPr lang="en-US" sz="1400" dirty="0"/>
+              <a:t> return value (return values are often </a:t>
+            </a:r>
+            <a:r>
+              <a:rPr lang="en-US" sz="1400" dirty="0" smtClean="0"/>
+              <a:t>in </a:t>
+            </a:r>
+            <a:r>
+              <a:rPr lang="en-US" sz="1400" dirty="0" err="1"/>
+              <a:t>eax</a:t>
+            </a:r>
+            <a:r>
+              <a:rPr lang="en-US" sz="1400" dirty="0"/>
+              <a:t>)</a:t>
+            </a:r>
+          </a:p>
+          <a:p>
+            <a:pPr marL="0" indent="0">
+              <a:buNone/>
+            </a:pPr>
+            <a:r>
+              <a:rPr lang="en-US" sz="1400" dirty="0"/>
+              <a:t>    push </a:t>
+            </a:r>
+            <a:r>
+              <a:rPr lang="en-US" sz="1400" dirty="0" err="1"/>
+              <a:t>eax</a:t>
+            </a:r>
+            <a:r>
+              <a:rPr lang="en-US" sz="1400" dirty="0"/>
+              <a:t> </a:t>
+            </a:r>
+            <a:r>
+              <a:rPr lang="en-US" sz="1400" dirty="0" smtClean="0"/>
+              <a:t>		;</a:t>
+            </a:r>
+            <a:r>
+              <a:rPr lang="en-US" sz="1400" dirty="0"/>
+              <a:t>push null onto stack as empty parameter value</a:t>
+            </a:r>
+          </a:p>
+          <a:p>
+            <a:pPr marL="0" indent="0">
+              <a:buNone/>
+            </a:pPr>
+            <a:r>
+              <a:rPr lang="en-US" sz="1400" dirty="0"/>
+              <a:t>    </a:t>
+            </a:r>
+            <a:r>
+              <a:rPr lang="en-US" sz="1400" dirty="0" err="1"/>
+              <a:t>mov</a:t>
+            </a:r>
+            <a:r>
+              <a:rPr lang="en-US" sz="1400" dirty="0"/>
+              <a:t> ebx,0x7c81cb12 </a:t>
+            </a:r>
+            <a:r>
+              <a:rPr lang="en-US" sz="1400" dirty="0" smtClean="0"/>
+              <a:t>	;</a:t>
+            </a:r>
+            <a:r>
+              <a:rPr lang="en-US" sz="1400" dirty="0"/>
+              <a:t>place address of </a:t>
+            </a:r>
+            <a:r>
+              <a:rPr lang="en-US" sz="1400" dirty="0" err="1"/>
+              <a:t>ExitProcess</a:t>
+            </a:r>
+            <a:r>
+              <a:rPr lang="en-US" sz="1400" dirty="0"/>
+              <a:t> into </a:t>
+            </a:r>
+            <a:r>
+              <a:rPr lang="en-US" sz="1400" dirty="0" err="1"/>
+              <a:t>ebx</a:t>
+            </a:r>
+            <a:endParaRPr lang="en-US" sz="1400" dirty="0"/>
+          </a:p>
+          <a:p>
+            <a:pPr marL="0" indent="0">
+              <a:buNone/>
+            </a:pPr>
+            <a:r>
+              <a:rPr lang="en-US" sz="1400" dirty="0"/>
+              <a:t>    call </a:t>
+            </a:r>
+            <a:r>
+              <a:rPr lang="en-US" sz="1400" dirty="0" err="1"/>
+              <a:t>ebx</a:t>
+            </a:r>
+            <a:r>
+              <a:rPr lang="en-US" sz="1400" dirty="0"/>
+              <a:t> </a:t>
+            </a:r>
+            <a:r>
+              <a:rPr lang="en-US" sz="1400" dirty="0" smtClean="0"/>
+              <a:t>		;</a:t>
+            </a:r>
+            <a:r>
+              <a:rPr lang="en-US" sz="1400" dirty="0"/>
+              <a:t>call </a:t>
+            </a:r>
+            <a:r>
+              <a:rPr lang="en-US" sz="1400" dirty="0" err="1"/>
+              <a:t>ExitProcess</a:t>
+            </a:r>
+            <a:r>
+              <a:rPr lang="en-US" sz="1400" dirty="0"/>
+              <a:t>(0);</a:t>
+            </a:r>
+          </a:p>
+          <a:p>
+            <a:pPr marL="0" indent="0">
+              <a:buNone/>
+            </a:pPr>
+            <a:endParaRPr lang="en-US" sz="1400" dirty="0"/>
+          </a:p>
+          <a:p>
+            <a:pPr marL="0" indent="0">
+              <a:buNone/>
+            </a:pPr>
+            <a:r>
+              <a:rPr lang="en-US" sz="1400" dirty="0" err="1"/>
+              <a:t>GetCommand</a:t>
+            </a:r>
+            <a:r>
+              <a:rPr lang="en-US" sz="1400" dirty="0"/>
+              <a:t>: </a:t>
+            </a:r>
+            <a:r>
+              <a:rPr lang="en-US" sz="1400" dirty="0" smtClean="0"/>
+              <a:t>	;</a:t>
+            </a:r>
+            <a:r>
+              <a:rPr lang="en-US" sz="1400" dirty="0"/>
+              <a:t>Define label for location of command string</a:t>
+            </a:r>
+          </a:p>
+          <a:p>
+            <a:pPr marL="0" indent="0">
+              <a:buNone/>
+            </a:pPr>
+            <a:r>
+              <a:rPr lang="en-US" sz="1400" dirty="0"/>
+              <a:t>    call </a:t>
+            </a:r>
+            <a:r>
+              <a:rPr lang="en-US" sz="1400" dirty="0" err="1" smtClean="0"/>
+              <a:t>CommandReturn</a:t>
+            </a:r>
+            <a:r>
+              <a:rPr lang="en-US" sz="1400" dirty="0" smtClean="0"/>
+              <a:t>	;</a:t>
+            </a:r>
+            <a:r>
+              <a:rPr lang="en-US" sz="1400" dirty="0"/>
+              <a:t>call the return label so the return address (location of string) is pushed onto stack</a:t>
+            </a:r>
+          </a:p>
+          <a:p>
+            <a:pPr marL="0" indent="0">
+              <a:buNone/>
+            </a:pPr>
+            <a:r>
+              <a:rPr lang="en-US" sz="1400" dirty="0"/>
+              <a:t>    </a:t>
+            </a:r>
+            <a:r>
+              <a:rPr lang="en-US" sz="1400" dirty="0" err="1"/>
+              <a:t>db</a:t>
+            </a:r>
+            <a:r>
+              <a:rPr lang="en-US" sz="1400" dirty="0"/>
+              <a:t> "calc.exe" </a:t>
+            </a:r>
+            <a:r>
+              <a:rPr lang="en-US" sz="1400" dirty="0" smtClean="0"/>
+              <a:t>	;</a:t>
+            </a:r>
+            <a:r>
+              <a:rPr lang="en-US" sz="1400" dirty="0"/>
+              <a:t>Write the raw bytes into the </a:t>
+            </a:r>
+            <a:r>
+              <a:rPr lang="en-US" sz="1400" dirty="0" err="1"/>
+              <a:t>shellcode</a:t>
+            </a:r>
+            <a:r>
+              <a:rPr lang="en-US" sz="1400" dirty="0"/>
+              <a:t> that represent our string.</a:t>
+            </a:r>
+          </a:p>
+          <a:p>
+            <a:pPr marL="0" indent="0">
+              <a:buNone/>
+            </a:pPr>
+            <a:r>
+              <a:rPr lang="en-US" sz="1400" dirty="0"/>
+              <a:t>    </a:t>
+            </a:r>
+            <a:r>
+              <a:rPr lang="en-US" sz="1400" dirty="0" err="1"/>
+              <a:t>db</a:t>
+            </a:r>
+            <a:r>
+              <a:rPr lang="en-US" sz="1400" dirty="0"/>
+              <a:t> 0x00 </a:t>
+            </a:r>
+            <a:r>
+              <a:rPr lang="en-US" sz="1400" dirty="0" smtClean="0"/>
+              <a:t>		;</a:t>
+            </a:r>
+            <a:r>
+              <a:rPr lang="en-US" sz="1400" dirty="0"/>
+              <a:t>Terminate our string with a null character.</a:t>
+            </a:r>
+          </a:p>
+        </p:txBody>
+      </p:sp>
+    </p:spTree>
+    <p:extLst>
+      <p:ext uri="{BB962C8B-B14F-4D97-AF65-F5344CB8AC3E}">
+        <p14:creationId xmlns:p14="http://schemas.microsoft.com/office/powerpoint/2010/main" val="2086306334"/>
+      </p:ext>
+    </p:extLst>
+  </p:cSld>
+  <p:clrMapOvr>
+    <a:masterClrMapping/>
+  </p:clrMapOvr>
+</p:sld>
+</file>
+
 <file path=ppt/slides/slide2.xml><?xml version="1.0" encoding="utf-8"?>
 <p:sld xmlns:a="http://schemas.openxmlformats.org/drawingml/2006/main" xmlns:r="http://schemas.openxmlformats.org/officeDocument/2006/relationships" xmlns:p="http://schemas.openxmlformats.org/presentationml/2006/main">
   <p:cSld>
@@ -5149,11 +6475,7 @@
             </a:r>
             <a:r>
               <a:rPr lang="en-US" smtClean="0"/>
-              <a:t>Seg</a:t>
-            </a:r>
-            <a:r>
-              <a:rPr lang="en-US" smtClean="0"/>
-              <a:t>mentation fault.</a:t>
+              <a:t>Segmentation fault.</a:t>
             </a:r>
             <a:endParaRPr lang="en-US" dirty="0"/>
           </a:p>
@@ -5163,6 +6485,322 @@
     <p:extLst>
       <p:ext uri="{BB962C8B-B14F-4D97-AF65-F5344CB8AC3E}">
         <p14:creationId xmlns:p14="http://schemas.microsoft.com/office/powerpoint/2010/main" val="346983588"/>
+      </p:ext>
+    </p:extLst>
+  </p:cSld>
+  <p:clrMapOvr>
+    <a:masterClrMapping/>
+  </p:clrMapOvr>
+</p:sld>
+</file>
+
+<file path=ppt/slides/slide8.xml><?xml version="1.0" encoding="utf-8"?>
+<p:sld xmlns:a="http://schemas.openxmlformats.org/drawingml/2006/main" xmlns:r="http://schemas.openxmlformats.org/officeDocument/2006/relationships" xmlns:p="http://schemas.openxmlformats.org/presentationml/2006/main">
+  <p:cSld>
+    <p:spTree>
+      <p:nvGrpSpPr>
+        <p:cNvPr id="1" name=""/>
+        <p:cNvGrpSpPr/>
+        <p:nvPr/>
+      </p:nvGrpSpPr>
+      <p:grpSpPr>
+        <a:xfrm>
+          <a:off x="0" y="0"/>
+          <a:ext cx="0" cy="0"/>
+          <a:chOff x="0" y="0"/>
+          <a:chExt cx="0" cy="0"/>
+        </a:xfrm>
+      </p:grpSpPr>
+      <p:sp>
+        <p:nvSpPr>
+          <p:cNvPr id="2" name="Title 1"/>
+          <p:cNvSpPr>
+            <a:spLocks noGrp="1"/>
+          </p:cNvSpPr>
+          <p:nvPr>
+            <p:ph type="title"/>
+          </p:nvPr>
+        </p:nvSpPr>
+        <p:spPr/>
+        <p:txBody>
+          <a:bodyPr/>
+          <a:lstStyle/>
+          <a:p>
+            <a:r>
+              <a:rPr lang="en-US" dirty="0" smtClean="0"/>
+              <a:t>General Overview - Windows</a:t>
+            </a:r>
+            <a:endParaRPr lang="en-US" dirty="0"/>
+          </a:p>
+        </p:txBody>
+      </p:sp>
+      <p:sp>
+        <p:nvSpPr>
+          <p:cNvPr id="3" name="Content Placeholder 2"/>
+          <p:cNvSpPr>
+            <a:spLocks noGrp="1"/>
+          </p:cNvSpPr>
+          <p:nvPr>
+            <p:ph idx="1"/>
+          </p:nvPr>
+        </p:nvSpPr>
+        <p:spPr/>
+        <p:txBody>
+          <a:bodyPr>
+            <a:normAutofit/>
+          </a:bodyPr>
+          <a:lstStyle/>
+          <a:p>
+            <a:r>
+              <a:rPr lang="en-US" dirty="0" smtClean="0"/>
+              <a:t>Run the vulnerable program with lots of input and watch if it explodes</a:t>
+            </a:r>
+          </a:p>
+          <a:p>
+            <a:r>
+              <a:rPr lang="en-US" dirty="0" smtClean="0"/>
+              <a:t>If it does explode, run it in </a:t>
+            </a:r>
+            <a:r>
+              <a:rPr lang="en-US" dirty="0" err="1" smtClean="0"/>
+              <a:t>Olly</a:t>
+            </a:r>
+            <a:r>
+              <a:rPr lang="en-US" dirty="0" smtClean="0"/>
+              <a:t> and check out the values when it crashes</a:t>
+            </a:r>
+          </a:p>
+          <a:p>
+            <a:r>
+              <a:rPr lang="en-US" dirty="0" smtClean="0"/>
+              <a:t>Disassemble it in IDA to get a better idea of the execution</a:t>
+            </a:r>
+          </a:p>
+          <a:p>
+            <a:r>
+              <a:rPr lang="en-US" dirty="0" smtClean="0"/>
+              <a:t>Craft some input, run it through </a:t>
+            </a:r>
+            <a:r>
+              <a:rPr lang="en-US" dirty="0" err="1" smtClean="0"/>
+              <a:t>nasm</a:t>
+            </a:r>
+            <a:r>
+              <a:rPr lang="en-US" dirty="0" smtClean="0"/>
+              <a:t> and </a:t>
+            </a:r>
+            <a:r>
+              <a:rPr lang="en-US" dirty="0" err="1" smtClean="0"/>
+              <a:t>objdump</a:t>
+            </a:r>
+            <a:r>
+              <a:rPr lang="en-US" dirty="0" smtClean="0"/>
+              <a:t> to get </a:t>
+            </a:r>
+            <a:r>
+              <a:rPr lang="en-US" dirty="0" err="1" smtClean="0"/>
+              <a:t>bytecode</a:t>
+            </a:r>
+            <a:endParaRPr lang="en-US" dirty="0" smtClean="0"/>
+          </a:p>
+          <a:p>
+            <a:r>
+              <a:rPr lang="en-US" dirty="0" smtClean="0"/>
+              <a:t>Run the program with Perl giving it the </a:t>
+            </a:r>
+            <a:r>
+              <a:rPr lang="en-US" dirty="0" err="1" smtClean="0"/>
+              <a:t>bytecode</a:t>
+            </a:r>
+            <a:endParaRPr lang="en-US" dirty="0" smtClean="0"/>
+          </a:p>
+          <a:p>
+            <a:r>
+              <a:rPr lang="en-US" dirty="0" smtClean="0">
+                <a:hlinkClick r:id="rId2"/>
+              </a:rPr>
+              <a:t>Do bad stuff</a:t>
+            </a:r>
+            <a:r>
+              <a:rPr lang="en-US" dirty="0" smtClean="0"/>
+              <a:t>!</a:t>
+            </a:r>
+          </a:p>
+        </p:txBody>
+      </p:sp>
+    </p:spTree>
+    <p:extLst>
+      <p:ext uri="{BB962C8B-B14F-4D97-AF65-F5344CB8AC3E}">
+        <p14:creationId xmlns:p14="http://schemas.microsoft.com/office/powerpoint/2010/main" val="1201785406"/>
+      </p:ext>
+    </p:extLst>
+  </p:cSld>
+  <p:clrMapOvr>
+    <a:masterClrMapping/>
+  </p:clrMapOvr>
+</p:sld>
+</file>
+
+<file path=ppt/slides/slide9.xml><?xml version="1.0" encoding="utf-8"?>
+<p:sld xmlns:a="http://schemas.openxmlformats.org/drawingml/2006/main" xmlns:r="http://schemas.openxmlformats.org/officeDocument/2006/relationships" xmlns:p="http://schemas.openxmlformats.org/presentationml/2006/main">
+  <p:cSld>
+    <p:spTree>
+      <p:nvGrpSpPr>
+        <p:cNvPr id="1" name=""/>
+        <p:cNvGrpSpPr/>
+        <p:nvPr/>
+      </p:nvGrpSpPr>
+      <p:grpSpPr>
+        <a:xfrm>
+          <a:off x="0" y="0"/>
+          <a:ext cx="0" cy="0"/>
+          <a:chOff x="0" y="0"/>
+          <a:chExt cx="0" cy="0"/>
+        </a:xfrm>
+      </p:grpSpPr>
+      <p:sp>
+        <p:nvSpPr>
+          <p:cNvPr id="2" name="Title 1"/>
+          <p:cNvSpPr>
+            <a:spLocks noGrp="1"/>
+          </p:cNvSpPr>
+          <p:nvPr>
+            <p:ph type="title"/>
+          </p:nvPr>
+        </p:nvSpPr>
+        <p:spPr/>
+        <p:txBody>
+          <a:bodyPr/>
+          <a:lstStyle/>
+          <a:p>
+            <a:r>
+              <a:rPr lang="en-US" dirty="0" smtClean="0"/>
+              <a:t>Tools - Windows</a:t>
+            </a:r>
+            <a:endParaRPr lang="en-US" dirty="0"/>
+          </a:p>
+        </p:txBody>
+      </p:sp>
+      <p:sp>
+        <p:nvSpPr>
+          <p:cNvPr id="3" name="Content Placeholder 2"/>
+          <p:cNvSpPr>
+            <a:spLocks noGrp="1"/>
+          </p:cNvSpPr>
+          <p:nvPr>
+            <p:ph idx="1"/>
+          </p:nvPr>
+        </p:nvSpPr>
+        <p:spPr/>
+        <p:txBody>
+          <a:bodyPr>
+            <a:normAutofit/>
+          </a:bodyPr>
+          <a:lstStyle/>
+          <a:p>
+            <a:r>
+              <a:rPr lang="en-US" dirty="0" smtClean="0">
+                <a:hlinkClick r:id="rId2"/>
+              </a:rPr>
+              <a:t>Visual C++</a:t>
+            </a:r>
+            <a:endParaRPr lang="en-US" dirty="0" smtClean="0"/>
+          </a:p>
+          <a:p>
+            <a:r>
+              <a:rPr lang="en-US" dirty="0" smtClean="0">
+                <a:hlinkClick r:id="rId3"/>
+              </a:rPr>
+              <a:t>Ida</a:t>
+            </a:r>
+            <a:endParaRPr lang="en-US" dirty="0" smtClean="0"/>
+          </a:p>
+          <a:p>
+            <a:r>
+              <a:rPr lang="en-US" dirty="0" err="1" smtClean="0">
+                <a:hlinkClick r:id="rId3"/>
+              </a:rPr>
+              <a:t>Ollydbg</a:t>
+            </a:r>
+            <a:endParaRPr lang="en-US" dirty="0" smtClean="0"/>
+          </a:p>
+          <a:p>
+            <a:endParaRPr lang="en-US" dirty="0" smtClean="0"/>
+          </a:p>
+          <a:p>
+            <a:r>
+              <a:rPr lang="en-US" dirty="0" smtClean="0"/>
+              <a:t>Additional Tools</a:t>
+            </a:r>
+          </a:p>
+          <a:p>
+            <a:pPr lvl="1"/>
+            <a:r>
+              <a:rPr lang="en-US" dirty="0" smtClean="0">
+                <a:hlinkClick r:id="rId4"/>
+              </a:rPr>
+              <a:t>Cygwin</a:t>
+            </a:r>
+            <a:r>
+              <a:rPr lang="en-US" dirty="0" smtClean="0"/>
+              <a:t> (</a:t>
+            </a:r>
+            <a:r>
+              <a:rPr lang="en-US" dirty="0" err="1" smtClean="0">
+                <a:hlinkClick r:id="rId5"/>
+              </a:rPr>
+              <a:t>arwin</a:t>
+            </a:r>
+            <a:r>
+              <a:rPr lang="en-US" dirty="0" smtClean="0"/>
+              <a:t>, </a:t>
+            </a:r>
+            <a:r>
+              <a:rPr lang="en-US" dirty="0" err="1" smtClean="0"/>
+              <a:t>nasm</a:t>
+            </a:r>
+            <a:r>
+              <a:rPr lang="en-US" dirty="0" smtClean="0"/>
+              <a:t>, </a:t>
+            </a:r>
+            <a:r>
+              <a:rPr lang="en-US" dirty="0" err="1" smtClean="0"/>
+              <a:t>objdump</a:t>
+            </a:r>
+            <a:r>
+              <a:rPr lang="en-US" dirty="0" smtClean="0"/>
+              <a:t>)</a:t>
+            </a:r>
+          </a:p>
+          <a:p>
+            <a:pPr lvl="1"/>
+            <a:r>
+              <a:rPr lang="en-US" dirty="0" err="1" smtClean="0">
+                <a:hlinkClick r:id="rId6"/>
+              </a:rPr>
+              <a:t>Faultmon</a:t>
+            </a:r>
+            <a:endParaRPr lang="en-US" dirty="0" smtClean="0"/>
+          </a:p>
+          <a:p>
+            <a:pPr lvl="1"/>
+            <a:r>
+              <a:rPr lang="en-US" dirty="0" smtClean="0">
+                <a:hlinkClick r:id="rId7"/>
+              </a:rPr>
+              <a:t>Perl</a:t>
+            </a:r>
+            <a:r>
+              <a:rPr lang="en-US" dirty="0" smtClean="0"/>
+              <a:t> (Strawberry)</a:t>
+            </a:r>
+          </a:p>
+        </p:txBody>
+      </p:sp>
+    </p:spTree>
+    <p:extLst>
+      <p:ext uri="{BB962C8B-B14F-4D97-AF65-F5344CB8AC3E}">
+        <p14:creationId xmlns:p14="http://schemas.microsoft.com/office/powerpoint/2010/main" val="4095574421"/>
       </p:ext>
     </p:extLst>
   </p:cSld>
@@ -5487,4 +7125,289 @@
   <a:objectDefaults/>
   <a:extraClrSchemeLst/>
 </a:theme>
+</file>
+
+<file path=ppt/theme/theme2.xml><?xml version="1.0" encoding="utf-8"?>
+<a:theme xmlns:a="http://schemas.openxmlformats.org/drawingml/2006/main" name="Office Theme">
+  <a:themeElements>
+    <a:clrScheme name="Office">
+      <a:dk1>
+        <a:sysClr val="windowText" lastClr="000000"/>
+      </a:dk1>
+      <a:lt1>
+        <a:sysClr val="window" lastClr="FFFFFF"/>
+      </a:lt1>
+      <a:dk2>
+        <a:srgbClr val="1F497D"/>
+      </a:dk2>
+      <a:lt2>
+        <a:srgbClr val="EEECE1"/>
+      </a:lt2>
+      <a:accent1>
+        <a:srgbClr val="4F81BD"/>
+      </a:accent1>
+      <a:accent2>
+        <a:srgbClr val="C0504D"/>
+      </a:accent2>
+      <a:accent3>
+        <a:srgbClr val="9BBB59"/>
+      </a:accent3>
+      <a:accent4>
+        <a:srgbClr val="8064A2"/>
+      </a:accent4>
+      <a:accent5>
+        <a:srgbClr val="4BACC6"/>
+      </a:accent5>
+      <a:accent6>
+        <a:srgbClr val="F79646"/>
+      </a:accent6>
+      <a:hlink>
+        <a:srgbClr val="0000FF"/>
+      </a:hlink>
+      <a:folHlink>
+        <a:srgbClr val="800080"/>
+      </a:folHlink>
+    </a:clrScheme>
+    <a:fontScheme name="Office">
+      <a:majorFont>
+        <a:latin typeface="Calibri"/>
+        <a:ea typeface=""/>
+        <a:cs typeface=""/>
+        <a:font script="Jpan" typeface="ＭＳ Ｐゴシック"/>
+        <a:font script="Hang" typeface="맑은 고딕"/>
+        <a:font script="Hans" typeface="宋体"/>
+        <a:font script="Hant" typeface="新細明體"/>
+        <a:font script="Arab" typeface="Times New Roman"/>
+        <a:font script="Hebr" typeface="Times New Roman"/>
+        <a:font script="Thai" typeface="Angsana New"/>
+        <a:font script="Ethi" typeface="Nyala"/>
+        <a:font script="Beng" typeface="Vrinda"/>
+        <a:font script="Gujr" typeface="Shruti"/>
+        <a:font script="Khmr" typeface="MoolBoran"/>
+        <a:font script="Knda" typeface="Tunga"/>
+        <a:font script="Guru" typeface="Raavi"/>
+        <a:font script="Cans" typeface="Euphemia"/>
+        <a:font script="Cher" typeface="Plantagenet Cherokee"/>
+        <a:font script="Yiii" typeface="Microsoft Yi Baiti"/>
+        <a:font script="Tibt" typeface="Microsoft Himalaya"/>
+        <a:font script="Thaa" typeface="MV Boli"/>
+        <a:font script="Deva" typeface="Mangal"/>
+        <a:font script="Telu" typeface="Gautami"/>
+        <a:font script="Taml" typeface="Latha"/>
+        <a:font script="Syrc" typeface="Estrangelo Edessa"/>
+        <a:font script="Orya" typeface="Kalinga"/>
+        <a:font script="Mlym" typeface="Kartika"/>
+        <a:font script="Laoo" typeface="DokChampa"/>
+        <a:font script="Sinh" typeface="Iskoola Pota"/>
+        <a:font script="Mong" typeface="Mongolian Baiti"/>
+        <a:font script="Viet" typeface="Times New Roman"/>
+        <a:font script="Uigh" typeface="Microsoft Uighur"/>
+        <a:font script="Geor" typeface="Sylfaen"/>
+      </a:majorFont>
+      <a:minorFont>
+        <a:latin typeface="Calibri"/>
+        <a:ea typeface=""/>
+        <a:cs typeface=""/>
+        <a:font script="Jpan" typeface="ＭＳ Ｐゴシック"/>
+        <a:font script="Hang" typeface="맑은 고딕"/>
+        <a:font script="Hans" typeface="宋体"/>
+        <a:font script="Hant" typeface="新細明體"/>
+        <a:font script="Arab" typeface="Arial"/>
+        <a:font script="Hebr" typeface="Arial"/>
+        <a:font script="Thai" typeface="Cordia New"/>
+        <a:font script="Ethi" typeface="Nyala"/>
+        <a:font script="Beng" typeface="Vrinda"/>
+        <a:font script="Gujr" typeface="Shruti"/>
+        <a:font script="Khmr" typeface="DaunPenh"/>
+        <a:font script="Knda" typeface="Tunga"/>
+        <a:font script="Guru" typeface="Raavi"/>
+        <a:font script="Cans" typeface="Euphemia"/>
+        <a:font script="Cher" typeface="Plantagenet Cherokee"/>
+        <a:font script="Yiii" typeface="Microsoft Yi Baiti"/>
+        <a:font script="Tibt" typeface="Microsoft Himalaya"/>
+        <a:font script="Thaa" typeface="MV Boli"/>
+        <a:font script="Deva" typeface="Mangal"/>
+        <a:font script="Telu" typeface="Gautami"/>
+        <a:font script="Taml" typeface="Latha"/>
+        <a:font script="Syrc" typeface="Estrangelo Edessa"/>
+        <a:font script="Orya" typeface="Kalinga"/>
+        <a:font script="Mlym" typeface="Kartika"/>
+        <a:font script="Laoo" typeface="DokChampa"/>
+        <a:font script="Sinh" typeface="Iskoola Pota"/>
+        <a:font script="Mong" typeface="Mongolian Baiti"/>
+        <a:font script="Viet" typeface="Arial"/>
+        <a:font script="Uigh" typeface="Microsoft Uighur"/>
+        <a:font script="Geor" typeface="Sylfaen"/>
+      </a:minorFont>
+    </a:fontScheme>
+    <a:fmtScheme name="Office">
+      <a:fillStyleLst>
+        <a:solidFill>
+          <a:schemeClr val="phClr"/>
+        </a:solidFill>
+        <a:gradFill rotWithShape="1">
+          <a:gsLst>
+            <a:gs pos="0">
+              <a:schemeClr val="phClr">
+                <a:tint val="50000"/>
+                <a:satMod val="300000"/>
+              </a:schemeClr>
+            </a:gs>
+            <a:gs pos="35000">
+              <a:schemeClr val="phClr">
+                <a:tint val="37000"/>
+                <a:satMod val="300000"/>
+              </a:schemeClr>
+            </a:gs>
+            <a:gs pos="100000">
+              <a:schemeClr val="phClr">
+                <a:tint val="15000"/>
+                <a:satMod val="350000"/>
+              </a:schemeClr>
+            </a:gs>
+          </a:gsLst>
+          <a:lin ang="16200000" scaled="1"/>
+        </a:gradFill>
+        <a:gradFill rotWithShape="1">
+          <a:gsLst>
+            <a:gs pos="0">
+              <a:schemeClr val="phClr">
+                <a:shade val="51000"/>
+                <a:satMod val="130000"/>
+              </a:schemeClr>
+            </a:gs>
+            <a:gs pos="80000">
+              <a:schemeClr val="phClr">
+                <a:shade val="93000"/>
+                <a:satMod val="130000"/>
+              </a:schemeClr>
+            </a:gs>
+            <a:gs pos="100000">
+              <a:schemeClr val="phClr">
+                <a:shade val="94000"/>
+                <a:satMod val="135000"/>
+              </a:schemeClr>
+            </a:gs>
+          </a:gsLst>
+          <a:lin ang="16200000" scaled="0"/>
+        </a:gradFill>
+      </a:fillStyleLst>
+      <a:lnStyleLst>
+        <a:ln w="9525" cap="flat" cmpd="sng" algn="ctr">
+          <a:solidFill>
+            <a:schemeClr val="phClr">
+              <a:shade val="95000"/>
+              <a:satMod val="105000"/>
+            </a:schemeClr>
+          </a:solidFill>
+          <a:prstDash val="solid"/>
+        </a:ln>
+        <a:ln w="25400" cap="flat" cmpd="sng" algn="ctr">
+          <a:solidFill>
+            <a:schemeClr val="phClr"/>
+          </a:solidFill>
+          <a:prstDash val="solid"/>
+        </a:ln>
+        <a:ln w="38100" cap="flat" cmpd="sng" algn="ctr">
+          <a:solidFill>
+            <a:schemeClr val="phClr"/>
+          </a:solidFill>
+          <a:prstDash val="solid"/>
+        </a:ln>
+      </a:lnStyleLst>
+      <a:effectStyleLst>
+        <a:effectStyle>
+          <a:effectLst>
+            <a:outerShdw blurRad="40000" dist="20000" dir="5400000" rotWithShape="0">
+              <a:srgbClr val="000000">
+                <a:alpha val="38000"/>
+              </a:srgbClr>
+            </a:outerShdw>
+          </a:effectLst>
+        </a:effectStyle>
+        <a:effectStyle>
+          <a:effectLst>
+            <a:outerShdw blurRad="40000" dist="23000" dir="5400000" rotWithShape="0">
+              <a:srgbClr val="000000">
+                <a:alpha val="35000"/>
+              </a:srgbClr>
+            </a:outerShdw>
+          </a:effectLst>
+        </a:effectStyle>
+        <a:effectStyle>
+          <a:effectLst>
+            <a:outerShdw blurRad="40000" dist="23000" dir="5400000" rotWithShape="0">
+              <a:srgbClr val="000000">
+                <a:alpha val="35000"/>
+              </a:srgbClr>
+            </a:outerShdw>
+          </a:effectLst>
+          <a:scene3d>
+            <a:camera prst="orthographicFront">
+              <a:rot lat="0" lon="0" rev="0"/>
+            </a:camera>
+            <a:lightRig rig="threePt" dir="t">
+              <a:rot lat="0" lon="0" rev="1200000"/>
+            </a:lightRig>
+          </a:scene3d>
+          <a:sp3d>
+            <a:bevelT w="63500" h="25400"/>
+          </a:sp3d>
+        </a:effectStyle>
+      </a:effectStyleLst>
+      <a:bgFillStyleLst>
+        <a:solidFill>
+          <a:schemeClr val="phClr"/>
+        </a:solidFill>
+        <a:gradFill rotWithShape="1">
+          <a:gsLst>
+            <a:gs pos="0">
+              <a:schemeClr val="phClr">
+                <a:tint val="40000"/>
+                <a:satMod val="350000"/>
+              </a:schemeClr>
+            </a:gs>
+            <a:gs pos="40000">
+              <a:schemeClr val="phClr">
+                <a:tint val="45000"/>
+                <a:shade val="99000"/>
+                <a:satMod val="350000"/>
+              </a:schemeClr>
+            </a:gs>
+            <a:gs pos="100000">
+              <a:schemeClr val="phClr">
+                <a:shade val="20000"/>
+                <a:satMod val="255000"/>
+              </a:schemeClr>
+            </a:gs>
+          </a:gsLst>
+          <a:path path="circle">
+            <a:fillToRect l="50000" t="-80000" r="50000" b="180000"/>
+          </a:path>
+        </a:gradFill>
+        <a:gradFill rotWithShape="1">
+          <a:gsLst>
+            <a:gs pos="0">
+              <a:schemeClr val="phClr">
+                <a:tint val="80000"/>
+                <a:satMod val="300000"/>
+              </a:schemeClr>
+            </a:gs>
+            <a:gs pos="100000">
+              <a:schemeClr val="phClr">
+                <a:shade val="30000"/>
+                <a:satMod val="200000"/>
+              </a:schemeClr>
+            </a:gs>
+          </a:gsLst>
+          <a:path path="circle">
+            <a:fillToRect l="50000" t="50000" r="50000" b="50000"/>
+          </a:path>
+        </a:gradFill>
+      </a:bgFillStyleLst>
+    </a:fmtScheme>
+  </a:themeElements>
+  <a:objectDefaults/>
+  <a:extraClrSchemeLst/>
+</a:theme>
 </file>
</xml_diff>

<commit_message>
adding some gdb debugging slides to the presentation
</commit_message>
<xml_diff>
--- a/Buffer Overflow Attacks.pptx
+++ b/Buffer Overflow Attacks.pptx
@@ -5,7 +5,7 @@
     <p:sldMasterId id="2147483672" r:id="rId1"/>
   </p:sldMasterIdLst>
   <p:notesMasterIdLst>
-    <p:notesMasterId r:id="rId33"/>
+    <p:notesMasterId r:id="rId37"/>
   </p:notesMasterIdLst>
   <p:sldIdLst>
     <p:sldId id="256" r:id="rId2"/>
@@ -37,8 +37,12 @@
     <p:sldId id="282" r:id="rId28"/>
     <p:sldId id="283" r:id="rId29"/>
     <p:sldId id="284" r:id="rId30"/>
-    <p:sldId id="285" r:id="rId31"/>
-    <p:sldId id="286" r:id="rId32"/>
+    <p:sldId id="305" r:id="rId31"/>
+    <p:sldId id="306" r:id="rId32"/>
+    <p:sldId id="307" r:id="rId33"/>
+    <p:sldId id="308" r:id="rId34"/>
+    <p:sldId id="285" r:id="rId35"/>
+    <p:sldId id="286" r:id="rId36"/>
   </p:sldIdLst>
   <p:sldSz cx="9144000" cy="6858000" type="screen4x3"/>
   <p:notesSz cx="6858000" cy="9144000"/>
@@ -175,6 +179,10 @@
             <p14:sldId id="282"/>
             <p14:sldId id="283"/>
             <p14:sldId id="284"/>
+            <p14:sldId id="305"/>
+            <p14:sldId id="306"/>
+            <p14:sldId id="307"/>
+            <p14:sldId id="308"/>
             <p14:sldId id="285"/>
             <p14:sldId id="286"/>
           </p14:sldIdLst>
@@ -267,7 +275,7 @@
           <a:p>
             <a:fld id="{9DED5714-D740-4F89-AAD5-E3BC8B06EDCA}" type="datetimeFigureOut">
               <a:rPr lang="en-US" smtClean="0"/>
-              <a:t>3/29/2012</a:t>
+              <a:t>4/12/2012</a:t>
             </a:fld>
             <a:endParaRPr lang="en-US"/>
           </a:p>
@@ -7553,7 +7561,7 @@
           <a:p>
             <a:fld id="{FB76FE03-F4FF-4405-A4BA-F447F9618E72}" type="datetimeFigureOut">
               <a:rPr lang="en-US" smtClean="0"/>
-              <a:t>3/29/2012</a:t>
+              <a:t>4/12/2012</a:t>
             </a:fld>
             <a:endParaRPr lang="en-US"/>
           </a:p>
@@ -7818,7 +7826,7 @@
           <a:p>
             <a:fld id="{FB76FE03-F4FF-4405-A4BA-F447F9618E72}" type="datetimeFigureOut">
               <a:rPr lang="en-US" smtClean="0"/>
-              <a:t>3/29/2012</a:t>
+              <a:t>4/12/2012</a:t>
             </a:fld>
             <a:endParaRPr lang="en-US"/>
           </a:p>
@@ -8092,7 +8100,7 @@
           <a:p>
             <a:fld id="{FB76FE03-F4FF-4405-A4BA-F447F9618E72}" type="datetimeFigureOut">
               <a:rPr lang="en-US" smtClean="0"/>
-              <a:t>3/29/2012</a:t>
+              <a:t>4/12/2012</a:t>
             </a:fld>
             <a:endParaRPr lang="en-US"/>
           </a:p>
@@ -8309,7 +8317,7 @@
           <a:p>
             <a:fld id="{FB76FE03-F4FF-4405-A4BA-F447F9618E72}" type="datetimeFigureOut">
               <a:rPr lang="en-US" smtClean="0"/>
-              <a:t>3/29/2012</a:t>
+              <a:t>4/12/2012</a:t>
             </a:fld>
             <a:endParaRPr lang="en-US"/>
           </a:p>
@@ -8696,7 +8704,7 @@
           <a:p>
             <a:fld id="{FB76FE03-F4FF-4405-A4BA-F447F9618E72}" type="datetimeFigureOut">
               <a:rPr lang="en-US" smtClean="0"/>
-              <a:t>3/29/2012</a:t>
+              <a:t>4/12/2012</a:t>
             </a:fld>
             <a:endParaRPr lang="en-US"/>
           </a:p>
@@ -9077,7 +9085,7 @@
           <a:p>
             <a:fld id="{FB76FE03-F4FF-4405-A4BA-F447F9618E72}" type="datetimeFigureOut">
               <a:rPr lang="en-US" smtClean="0"/>
-              <a:t>3/29/2012</a:t>
+              <a:t>4/12/2012</a:t>
             </a:fld>
             <a:endParaRPr lang="en-US"/>
           </a:p>
@@ -9494,7 +9502,7 @@
           <a:p>
             <a:fld id="{FB76FE03-F4FF-4405-A4BA-F447F9618E72}" type="datetimeFigureOut">
               <a:rPr lang="en-US" smtClean="0"/>
-              <a:t>3/29/2012</a:t>
+              <a:t>4/12/2012</a:t>
             </a:fld>
             <a:endParaRPr lang="en-US"/>
           </a:p>
@@ -9607,7 +9615,7 @@
           <a:p>
             <a:fld id="{FB76FE03-F4FF-4405-A4BA-F447F9618E72}" type="datetimeFigureOut">
               <a:rPr lang="en-US" smtClean="0"/>
-              <a:t>3/29/2012</a:t>
+              <a:t>4/12/2012</a:t>
             </a:fld>
             <a:endParaRPr lang="en-US"/>
           </a:p>
@@ -9697,7 +9705,7 @@
           <a:p>
             <a:fld id="{FB76FE03-F4FF-4405-A4BA-F447F9618E72}" type="datetimeFigureOut">
               <a:rPr lang="en-US" smtClean="0"/>
-              <a:t>3/29/2012</a:t>
+              <a:t>4/12/2012</a:t>
             </a:fld>
             <a:endParaRPr lang="en-US"/>
           </a:p>
@@ -9906,7 +9914,7 @@
           <a:p>
             <a:fld id="{FB76FE03-F4FF-4405-A4BA-F447F9618E72}" type="datetimeFigureOut">
               <a:rPr lang="en-US" smtClean="0"/>
-              <a:t>3/29/2012</a:t>
+              <a:t>4/12/2012</a:t>
             </a:fld>
             <a:endParaRPr lang="en-US"/>
           </a:p>
@@ -10283,7 +10291,7 @@
           <a:p>
             <a:fld id="{FB76FE03-F4FF-4405-A4BA-F447F9618E72}" type="datetimeFigureOut">
               <a:rPr lang="en-US" smtClean="0"/>
-              <a:t>3/29/2012</a:t>
+              <a:t>4/12/2012</a:t>
             </a:fld>
             <a:endParaRPr lang="en-US"/>
           </a:p>
@@ -10830,7 +10838,7 @@
           <a:p>
             <a:fld id="{FB76FE03-F4FF-4405-A4BA-F447F9618E72}" type="datetimeFigureOut">
               <a:rPr lang="en-US" smtClean="0"/>
-              <a:t>3/29/2012</a:t>
+              <a:t>4/12/2012</a:t>
             </a:fld>
             <a:endParaRPr lang="en-US"/>
           </a:p>
@@ -33026,8 +33034,12 @@
           <a:lstStyle/>
           <a:p>
             <a:r>
-              <a:rPr lang="en-US" dirty="0" err="1" smtClean="0"/>
-              <a:t>Shellcoding</a:t>
+              <a:rPr lang="en-US" dirty="0" smtClean="0"/>
+              <a:t>Tools - </a:t>
+            </a:r>
+            <a:r>
+              <a:rPr lang="en-US" dirty="0" smtClean="0"/>
+              <a:t>Unix</a:t>
             </a:r>
             <a:endParaRPr lang="en-US" dirty="0"/>
           </a:p>
@@ -33051,6 +33063,1035 @@
           <a:lstStyle/>
           <a:p>
             <a:r>
+              <a:rPr lang="en-US" dirty="0" smtClean="0">
+                <a:hlinkClick r:id="rId2"/>
+              </a:rPr>
+              <a:t>GCC</a:t>
+            </a:r>
+            <a:endParaRPr lang="en-US" dirty="0" smtClean="0"/>
+          </a:p>
+          <a:p>
+            <a:r>
+              <a:rPr lang="en-US" dirty="0" smtClean="0">
+                <a:hlinkClick r:id="rId3"/>
+              </a:rPr>
+              <a:t>GDB</a:t>
+            </a:r>
+            <a:endParaRPr lang="en-US" dirty="0" smtClean="0"/>
+          </a:p>
+          <a:p>
+            <a:endParaRPr lang="en-US" dirty="0" smtClean="0"/>
+          </a:p>
+          <a:p>
+            <a:endParaRPr lang="en-US" dirty="0" smtClean="0"/>
+          </a:p>
+          <a:p>
+            <a:r>
+              <a:rPr lang="en-US" dirty="0" smtClean="0"/>
+              <a:t>Additional </a:t>
+            </a:r>
+            <a:r>
+              <a:rPr lang="en-US" dirty="0" smtClean="0"/>
+              <a:t>Tools</a:t>
+            </a:r>
+          </a:p>
+          <a:p>
+            <a:pPr lvl="1"/>
+            <a:r>
+              <a:rPr lang="en-US" dirty="0" err="1" smtClean="0"/>
+              <a:t>objdump</a:t>
+            </a:r>
+            <a:endParaRPr lang="en-US" dirty="0"/>
+          </a:p>
+          <a:p>
+            <a:pPr lvl="1"/>
+            <a:r>
+              <a:rPr lang="en-US" dirty="0" err="1" smtClean="0"/>
+              <a:t>nasm</a:t>
+            </a:r>
+            <a:endParaRPr lang="en-US" dirty="0" smtClean="0"/>
+          </a:p>
+          <a:p>
+            <a:pPr lvl="1"/>
+            <a:r>
+              <a:rPr lang="en-US" dirty="0" err="1" smtClean="0"/>
+              <a:t>execstack</a:t>
+            </a:r>
+            <a:endParaRPr lang="en-US" dirty="0" smtClean="0"/>
+          </a:p>
+        </p:txBody>
+      </p:sp>
+    </p:spTree>
+    <p:extLst>
+      <p:ext uri="{BB962C8B-B14F-4D97-AF65-F5344CB8AC3E}">
+        <p14:creationId xmlns:p14="http://schemas.microsoft.com/office/powerpoint/2010/main" val="2226267564"/>
+      </p:ext>
+    </p:extLst>
+  </p:cSld>
+  <p:clrMapOvr>
+    <a:masterClrMapping/>
+  </p:clrMapOvr>
+</p:sld>
+</file>
+
+<file path=ppt/slides/slide31.xml><?xml version="1.0" encoding="utf-8"?>
+<p:sld xmlns:a="http://schemas.openxmlformats.org/drawingml/2006/main" xmlns:r="http://schemas.openxmlformats.org/officeDocument/2006/relationships" xmlns:p="http://schemas.openxmlformats.org/presentationml/2006/main">
+  <p:cSld>
+    <p:spTree>
+      <p:nvGrpSpPr>
+        <p:cNvPr id="1" name=""/>
+        <p:cNvGrpSpPr/>
+        <p:nvPr/>
+      </p:nvGrpSpPr>
+      <p:grpSpPr>
+        <a:xfrm>
+          <a:off x="0" y="0"/>
+          <a:ext cx="0" cy="0"/>
+          <a:chOff x="0" y="0"/>
+          <a:chExt cx="0" cy="0"/>
+        </a:xfrm>
+      </p:grpSpPr>
+      <p:sp>
+        <p:nvSpPr>
+          <p:cNvPr id="2" name="Title 1"/>
+          <p:cNvSpPr>
+            <a:spLocks noGrp="1"/>
+          </p:cNvSpPr>
+          <p:nvPr>
+            <p:ph type="title"/>
+          </p:nvPr>
+        </p:nvSpPr>
+        <p:spPr/>
+        <p:txBody>
+          <a:bodyPr>
+            <a:normAutofit/>
+          </a:bodyPr>
+          <a:lstStyle/>
+          <a:p>
+            <a:r>
+              <a:rPr lang="en-US" dirty="0" smtClean="0"/>
+              <a:t>GCC &amp; GDB</a:t>
+            </a:r>
+            <a:endParaRPr lang="en-US" dirty="0"/>
+          </a:p>
+        </p:txBody>
+      </p:sp>
+      <p:sp>
+        <p:nvSpPr>
+          <p:cNvPr id="3" name="Content Placeholder 2"/>
+          <p:cNvSpPr>
+            <a:spLocks noGrp="1"/>
+          </p:cNvSpPr>
+          <p:nvPr>
+            <p:ph idx="1"/>
+          </p:nvPr>
+        </p:nvSpPr>
+        <p:spPr/>
+        <p:txBody>
+          <a:bodyPr/>
+          <a:lstStyle/>
+          <a:p>
+            <a:r>
+              <a:rPr lang="en-US" dirty="0" smtClean="0"/>
+              <a:t>Making your program </a:t>
+            </a:r>
+            <a:r>
+              <a:rPr lang="en-US" dirty="0" err="1" smtClean="0"/>
+              <a:t>debuggable</a:t>
+            </a:r>
+            <a:endParaRPr lang="en-US" dirty="0" smtClean="0"/>
+          </a:p>
+          <a:p>
+            <a:pPr lvl="1"/>
+            <a:r>
+              <a:rPr lang="en-US" dirty="0" err="1" smtClean="0"/>
+              <a:t>gcc</a:t>
+            </a:r>
+            <a:r>
+              <a:rPr lang="en-US" dirty="0" smtClean="0"/>
+              <a:t> </a:t>
+            </a:r>
+            <a:r>
+              <a:rPr lang="en-US" b="1" dirty="0" smtClean="0">
+                <a:solidFill>
+                  <a:srgbClr val="FF0000"/>
+                </a:solidFill>
+              </a:rPr>
+              <a:t>-g  </a:t>
+            </a:r>
+            <a:r>
+              <a:rPr lang="en-US" dirty="0" smtClean="0">
+                <a:solidFill>
+                  <a:schemeClr val="accent2">
+                    <a:lumMod val="50000"/>
+                  </a:schemeClr>
+                </a:solidFill>
+              </a:rPr>
+              <a:t>-o  </a:t>
+            </a:r>
+            <a:r>
+              <a:rPr lang="en-US" dirty="0" err="1" smtClean="0">
+                <a:solidFill>
+                  <a:schemeClr val="accent2">
+                    <a:lumMod val="50000"/>
+                  </a:schemeClr>
+                </a:solidFill>
+              </a:rPr>
+              <a:t>my_program</a:t>
+            </a:r>
+            <a:r>
+              <a:rPr lang="en-US" dirty="0" smtClean="0">
+                <a:solidFill>
+                  <a:schemeClr val="accent2">
+                    <a:lumMod val="50000"/>
+                  </a:schemeClr>
+                </a:solidFill>
+              </a:rPr>
+              <a:t> </a:t>
+            </a:r>
+            <a:r>
+              <a:rPr lang="en-US" dirty="0" err="1" smtClean="0">
+                <a:solidFill>
+                  <a:schemeClr val="accent2">
+                    <a:lumMod val="50000"/>
+                  </a:schemeClr>
+                </a:solidFill>
+              </a:rPr>
+              <a:t>my_program.c</a:t>
+            </a:r>
+            <a:endParaRPr lang="en-US" dirty="0" smtClean="0">
+              <a:solidFill>
+                <a:schemeClr val="accent2">
+                  <a:lumMod val="50000"/>
+                </a:schemeClr>
+              </a:solidFill>
+            </a:endParaRPr>
+          </a:p>
+          <a:p>
+            <a:endParaRPr lang="en-US" dirty="0">
+              <a:solidFill>
+                <a:schemeClr val="accent2">
+                  <a:lumMod val="50000"/>
+                </a:schemeClr>
+              </a:solidFill>
+            </a:endParaRPr>
+          </a:p>
+          <a:p>
+            <a:r>
+              <a:rPr lang="en-US" dirty="0" smtClean="0">
+                <a:solidFill>
+                  <a:schemeClr val="accent2">
+                    <a:lumMod val="50000"/>
+                  </a:schemeClr>
+                </a:solidFill>
+              </a:rPr>
+              <a:t>Debugging for overflows</a:t>
+            </a:r>
+          </a:p>
+          <a:p>
+            <a:pPr lvl="1"/>
+            <a:r>
+              <a:rPr lang="en-US" dirty="0" smtClean="0">
+                <a:solidFill>
+                  <a:schemeClr val="accent2">
+                    <a:lumMod val="50000"/>
+                  </a:schemeClr>
+                </a:solidFill>
+              </a:rPr>
+              <a:t>break &lt;symbol&gt;</a:t>
+            </a:r>
+          </a:p>
+          <a:p>
+            <a:pPr lvl="2"/>
+            <a:r>
+              <a:rPr lang="en-US" dirty="0" smtClean="0">
+                <a:solidFill>
+                  <a:schemeClr val="accent2">
+                    <a:lumMod val="50000"/>
+                  </a:schemeClr>
+                </a:solidFill>
+              </a:rPr>
+              <a:t>Symbols include line number, function name, assembler label</a:t>
+            </a:r>
+          </a:p>
+          <a:p>
+            <a:pPr lvl="2"/>
+            <a:r>
+              <a:rPr lang="en-US" dirty="0">
+                <a:solidFill>
+                  <a:schemeClr val="accent2">
+                    <a:lumMod val="50000"/>
+                  </a:schemeClr>
+                </a:solidFill>
+              </a:rPr>
+              <a:t>C</a:t>
+            </a:r>
+            <a:r>
+              <a:rPr lang="en-US" dirty="0" smtClean="0">
+                <a:solidFill>
+                  <a:schemeClr val="accent2">
+                    <a:lumMod val="50000"/>
+                  </a:schemeClr>
+                </a:solidFill>
+              </a:rPr>
+              <a:t>ommand also mapped to character ‘b’</a:t>
+            </a:r>
+          </a:p>
+          <a:p>
+            <a:pPr lvl="2"/>
+            <a:endParaRPr lang="en-US" dirty="0">
+              <a:solidFill>
+                <a:schemeClr val="accent2">
+                  <a:lumMod val="50000"/>
+                </a:schemeClr>
+              </a:solidFill>
+            </a:endParaRPr>
+          </a:p>
+          <a:p>
+            <a:pPr lvl="2"/>
+            <a:endParaRPr lang="en-US" dirty="0" smtClean="0">
+              <a:solidFill>
+                <a:schemeClr val="accent2">
+                  <a:lumMod val="50000"/>
+                </a:schemeClr>
+              </a:solidFill>
+            </a:endParaRPr>
+          </a:p>
+        </p:txBody>
+      </p:sp>
+      <p:pic>
+        <p:nvPicPr>
+          <p:cNvPr id="1026" name="Picture 2"/>
+          <p:cNvPicPr>
+            <a:picLocks noChangeAspect="1" noChangeArrowheads="1"/>
+          </p:cNvPicPr>
+          <p:nvPr/>
+        </p:nvPicPr>
+        <p:blipFill>
+          <a:blip r:embed="rId2">
+            <a:extLst>
+              <a:ext uri="{28A0092B-C50C-407E-A947-70E740481C1C}">
+                <a14:useLocalDpi xmlns:a14="http://schemas.microsoft.com/office/drawing/2010/main" val="0"/>
+              </a:ext>
+            </a:extLst>
+          </a:blip>
+          <a:srcRect/>
+          <a:stretch>
+            <a:fillRect/>
+          </a:stretch>
+        </p:blipFill>
+        <p:spPr bwMode="auto">
+          <a:xfrm>
+            <a:off x="817554" y="4343400"/>
+            <a:ext cx="7508893" cy="2362200"/>
+          </a:xfrm>
+          <a:prstGeom prst="rect">
+            <a:avLst/>
+          </a:prstGeom>
+          <a:noFill/>
+          <a:ln>
+            <a:noFill/>
+          </a:ln>
+          <a:effectLst/>
+          <a:extLst>
+            <a:ext uri="{909E8E84-426E-40DD-AFC4-6F175D3DCCD1}">
+              <a14:hiddenFill xmlns:a14="http://schemas.microsoft.com/office/drawing/2010/main">
+                <a:solidFill>
+                  <a:schemeClr val="accent1"/>
+                </a:solidFill>
+              </a14:hiddenFill>
+            </a:ext>
+            <a:ext uri="{91240B29-F687-4F45-9708-019B960494DF}">
+              <a14:hiddenLine xmlns:a14="http://schemas.microsoft.com/office/drawing/2010/main" w="9525">
+                <a:solidFill>
+                  <a:schemeClr val="tx1"/>
+                </a:solidFill>
+                <a:miter lim="800000"/>
+                <a:headEnd/>
+                <a:tailEnd/>
+              </a14:hiddenLine>
+            </a:ext>
+            <a:ext uri="{AF507438-7753-43E0-B8FC-AC1667EBCBE1}">
+              <a14:hiddenEffects xmlns:a14="http://schemas.microsoft.com/office/drawing/2010/main">
+                <a:effectLst>
+                  <a:outerShdw dist="35921" dir="2700000" algn="ctr" rotWithShape="0">
+                    <a:schemeClr val="bg2"/>
+                  </a:outerShdw>
+                </a:effectLst>
+              </a14:hiddenEffects>
+            </a:ext>
+          </a:extLst>
+        </p:spPr>
+      </p:pic>
+    </p:spTree>
+    <p:extLst>
+      <p:ext uri="{BB962C8B-B14F-4D97-AF65-F5344CB8AC3E}">
+        <p14:creationId xmlns:p14="http://schemas.microsoft.com/office/powerpoint/2010/main" val="889830066"/>
+      </p:ext>
+    </p:extLst>
+  </p:cSld>
+  <p:clrMapOvr>
+    <a:masterClrMapping/>
+  </p:clrMapOvr>
+</p:sld>
+</file>
+
+<file path=ppt/slides/slide32.xml><?xml version="1.0" encoding="utf-8"?>
+<p:sld xmlns:a="http://schemas.openxmlformats.org/drawingml/2006/main" xmlns:r="http://schemas.openxmlformats.org/officeDocument/2006/relationships" xmlns:p="http://schemas.openxmlformats.org/presentationml/2006/main">
+  <p:cSld>
+    <p:spTree>
+      <p:nvGrpSpPr>
+        <p:cNvPr id="1" name=""/>
+        <p:cNvGrpSpPr/>
+        <p:nvPr/>
+      </p:nvGrpSpPr>
+      <p:grpSpPr>
+        <a:xfrm>
+          <a:off x="0" y="0"/>
+          <a:ext cx="0" cy="0"/>
+          <a:chOff x="0" y="0"/>
+          <a:chExt cx="0" cy="0"/>
+        </a:xfrm>
+      </p:grpSpPr>
+      <p:sp>
+        <p:nvSpPr>
+          <p:cNvPr id="2" name="Title 1"/>
+          <p:cNvSpPr>
+            <a:spLocks noGrp="1"/>
+          </p:cNvSpPr>
+          <p:nvPr>
+            <p:ph type="title"/>
+          </p:nvPr>
+        </p:nvSpPr>
+        <p:spPr/>
+        <p:txBody>
+          <a:bodyPr>
+            <a:normAutofit/>
+          </a:bodyPr>
+          <a:lstStyle/>
+          <a:p>
+            <a:r>
+              <a:rPr lang="en-US" dirty="0" smtClean="0"/>
+              <a:t>GCC &amp; GDB</a:t>
+            </a:r>
+            <a:endParaRPr lang="en-US" dirty="0"/>
+          </a:p>
+        </p:txBody>
+      </p:sp>
+      <p:sp>
+        <p:nvSpPr>
+          <p:cNvPr id="3" name="Content Placeholder 2"/>
+          <p:cNvSpPr>
+            <a:spLocks noGrp="1"/>
+          </p:cNvSpPr>
+          <p:nvPr>
+            <p:ph idx="1"/>
+          </p:nvPr>
+        </p:nvSpPr>
+        <p:spPr/>
+        <p:txBody>
+          <a:bodyPr/>
+          <a:lstStyle/>
+          <a:p>
+            <a:r>
+              <a:rPr lang="en-US" dirty="0" smtClean="0"/>
+              <a:t>Making your program </a:t>
+            </a:r>
+            <a:r>
+              <a:rPr lang="en-US" dirty="0" err="1" smtClean="0"/>
+              <a:t>debuggable</a:t>
+            </a:r>
+            <a:endParaRPr lang="en-US" dirty="0" smtClean="0"/>
+          </a:p>
+          <a:p>
+            <a:pPr lvl="1"/>
+            <a:r>
+              <a:rPr lang="en-US" dirty="0" err="1" smtClean="0"/>
+              <a:t>gcc</a:t>
+            </a:r>
+            <a:r>
+              <a:rPr lang="en-US" dirty="0" smtClean="0"/>
+              <a:t> </a:t>
+            </a:r>
+            <a:r>
+              <a:rPr lang="en-US" b="1" dirty="0" smtClean="0">
+                <a:solidFill>
+                  <a:srgbClr val="FF0000"/>
+                </a:solidFill>
+              </a:rPr>
+              <a:t>-g  </a:t>
+            </a:r>
+            <a:r>
+              <a:rPr lang="en-US" dirty="0" smtClean="0">
+                <a:solidFill>
+                  <a:schemeClr val="accent2">
+                    <a:lumMod val="50000"/>
+                  </a:schemeClr>
+                </a:solidFill>
+              </a:rPr>
+              <a:t>-o  </a:t>
+            </a:r>
+            <a:r>
+              <a:rPr lang="en-US" dirty="0" err="1" smtClean="0">
+                <a:solidFill>
+                  <a:schemeClr val="accent2">
+                    <a:lumMod val="50000"/>
+                  </a:schemeClr>
+                </a:solidFill>
+              </a:rPr>
+              <a:t>my_program</a:t>
+            </a:r>
+            <a:r>
+              <a:rPr lang="en-US" dirty="0" smtClean="0">
+                <a:solidFill>
+                  <a:schemeClr val="accent2">
+                    <a:lumMod val="50000"/>
+                  </a:schemeClr>
+                </a:solidFill>
+              </a:rPr>
+              <a:t> </a:t>
+            </a:r>
+            <a:r>
+              <a:rPr lang="en-US" dirty="0" err="1" smtClean="0">
+                <a:solidFill>
+                  <a:schemeClr val="accent2">
+                    <a:lumMod val="50000"/>
+                  </a:schemeClr>
+                </a:solidFill>
+              </a:rPr>
+              <a:t>my_program.c</a:t>
+            </a:r>
+            <a:endParaRPr lang="en-US" dirty="0" smtClean="0">
+              <a:solidFill>
+                <a:schemeClr val="accent2">
+                  <a:lumMod val="50000"/>
+                </a:schemeClr>
+              </a:solidFill>
+            </a:endParaRPr>
+          </a:p>
+          <a:p>
+            <a:endParaRPr lang="en-US" dirty="0">
+              <a:solidFill>
+                <a:schemeClr val="accent2">
+                  <a:lumMod val="50000"/>
+                </a:schemeClr>
+              </a:solidFill>
+            </a:endParaRPr>
+          </a:p>
+          <a:p>
+            <a:r>
+              <a:rPr lang="en-US" dirty="0" smtClean="0">
+                <a:solidFill>
+                  <a:schemeClr val="accent2">
+                    <a:lumMod val="50000"/>
+                  </a:schemeClr>
+                </a:solidFill>
+              </a:rPr>
+              <a:t>Debugging for overflows</a:t>
+            </a:r>
+          </a:p>
+          <a:p>
+            <a:pPr lvl="1"/>
+            <a:r>
+              <a:rPr lang="en-US" dirty="0" smtClean="0">
+                <a:solidFill>
+                  <a:schemeClr val="accent2">
+                    <a:lumMod val="50000"/>
+                  </a:schemeClr>
+                </a:solidFill>
+              </a:rPr>
+              <a:t>info frame</a:t>
+            </a:r>
+          </a:p>
+          <a:p>
+            <a:pPr lvl="2"/>
+            <a:r>
+              <a:rPr lang="en-US" dirty="0">
+                <a:solidFill>
+                  <a:schemeClr val="accent2">
+                    <a:lumMod val="50000"/>
+                  </a:schemeClr>
+                </a:solidFill>
+              </a:rPr>
+              <a:t>P</a:t>
+            </a:r>
+            <a:r>
+              <a:rPr lang="en-US" dirty="0" smtClean="0">
+                <a:solidFill>
+                  <a:schemeClr val="accent2">
+                    <a:lumMod val="50000"/>
+                  </a:schemeClr>
+                </a:solidFill>
+              </a:rPr>
+              <a:t>rints everything the debugger knows about the current stack frame</a:t>
+            </a:r>
+          </a:p>
+          <a:p>
+            <a:pPr lvl="2"/>
+            <a:r>
+              <a:rPr lang="en-US" dirty="0" smtClean="0">
+                <a:solidFill>
+                  <a:schemeClr val="accent2">
+                    <a:lumMod val="50000"/>
+                  </a:schemeClr>
+                </a:solidFill>
+              </a:rPr>
+              <a:t>Program needs to be executing</a:t>
+            </a:r>
+            <a:endParaRPr lang="en-US" dirty="0">
+              <a:solidFill>
+                <a:schemeClr val="accent2">
+                  <a:lumMod val="50000"/>
+                </a:schemeClr>
+              </a:solidFill>
+            </a:endParaRPr>
+          </a:p>
+          <a:p>
+            <a:pPr lvl="2"/>
+            <a:endParaRPr lang="en-US" dirty="0" smtClean="0">
+              <a:solidFill>
+                <a:schemeClr val="accent2">
+                  <a:lumMod val="50000"/>
+                </a:schemeClr>
+              </a:solidFill>
+            </a:endParaRPr>
+          </a:p>
+        </p:txBody>
+      </p:sp>
+      <p:pic>
+        <p:nvPicPr>
+          <p:cNvPr id="2050" name="Picture 2"/>
+          <p:cNvPicPr>
+            <a:picLocks noChangeAspect="1" noChangeArrowheads="1"/>
+          </p:cNvPicPr>
+          <p:nvPr/>
+        </p:nvPicPr>
+        <p:blipFill>
+          <a:blip r:embed="rId2">
+            <a:extLst>
+              <a:ext uri="{28A0092B-C50C-407E-A947-70E740481C1C}">
+                <a14:useLocalDpi xmlns:a14="http://schemas.microsoft.com/office/drawing/2010/main" val="0"/>
+              </a:ext>
+            </a:extLst>
+          </a:blip>
+          <a:srcRect/>
+          <a:stretch>
+            <a:fillRect/>
+          </a:stretch>
+        </p:blipFill>
+        <p:spPr bwMode="auto">
+          <a:xfrm>
+            <a:off x="532776" y="4419600"/>
+            <a:ext cx="8078449" cy="2209800"/>
+          </a:xfrm>
+          <a:prstGeom prst="rect">
+            <a:avLst/>
+          </a:prstGeom>
+          <a:noFill/>
+          <a:ln>
+            <a:noFill/>
+          </a:ln>
+          <a:effectLst/>
+          <a:extLst>
+            <a:ext uri="{909E8E84-426E-40DD-AFC4-6F175D3DCCD1}">
+              <a14:hiddenFill xmlns:a14="http://schemas.microsoft.com/office/drawing/2010/main">
+                <a:solidFill>
+                  <a:schemeClr val="accent1"/>
+                </a:solidFill>
+              </a14:hiddenFill>
+            </a:ext>
+            <a:ext uri="{91240B29-F687-4F45-9708-019B960494DF}">
+              <a14:hiddenLine xmlns:a14="http://schemas.microsoft.com/office/drawing/2010/main" w="9525">
+                <a:solidFill>
+                  <a:schemeClr val="tx1"/>
+                </a:solidFill>
+                <a:miter lim="800000"/>
+                <a:headEnd/>
+                <a:tailEnd/>
+              </a14:hiddenLine>
+            </a:ext>
+            <a:ext uri="{AF507438-7753-43E0-B8FC-AC1667EBCBE1}">
+              <a14:hiddenEffects xmlns:a14="http://schemas.microsoft.com/office/drawing/2010/main">
+                <a:effectLst>
+                  <a:outerShdw dist="35921" dir="2700000" algn="ctr" rotWithShape="0">
+                    <a:schemeClr val="bg2"/>
+                  </a:outerShdw>
+                </a:effectLst>
+              </a14:hiddenEffects>
+            </a:ext>
+          </a:extLst>
+        </p:spPr>
+      </p:pic>
+    </p:spTree>
+    <p:extLst>
+      <p:ext uri="{BB962C8B-B14F-4D97-AF65-F5344CB8AC3E}">
+        <p14:creationId xmlns:p14="http://schemas.microsoft.com/office/powerpoint/2010/main" val="2616460768"/>
+      </p:ext>
+    </p:extLst>
+  </p:cSld>
+  <p:clrMapOvr>
+    <a:masterClrMapping/>
+  </p:clrMapOvr>
+</p:sld>
+</file>
+
+<file path=ppt/slides/slide33.xml><?xml version="1.0" encoding="utf-8"?>
+<p:sld xmlns:a="http://schemas.openxmlformats.org/drawingml/2006/main" xmlns:r="http://schemas.openxmlformats.org/officeDocument/2006/relationships" xmlns:p="http://schemas.openxmlformats.org/presentationml/2006/main">
+  <p:cSld>
+    <p:spTree>
+      <p:nvGrpSpPr>
+        <p:cNvPr id="1" name=""/>
+        <p:cNvGrpSpPr/>
+        <p:nvPr/>
+      </p:nvGrpSpPr>
+      <p:grpSpPr>
+        <a:xfrm>
+          <a:off x="0" y="0"/>
+          <a:ext cx="0" cy="0"/>
+          <a:chOff x="0" y="0"/>
+          <a:chExt cx="0" cy="0"/>
+        </a:xfrm>
+      </p:grpSpPr>
+      <p:sp>
+        <p:nvSpPr>
+          <p:cNvPr id="2" name="Title 1"/>
+          <p:cNvSpPr>
+            <a:spLocks noGrp="1"/>
+          </p:cNvSpPr>
+          <p:nvPr>
+            <p:ph type="title"/>
+          </p:nvPr>
+        </p:nvSpPr>
+        <p:spPr/>
+        <p:txBody>
+          <a:bodyPr>
+            <a:normAutofit/>
+          </a:bodyPr>
+          <a:lstStyle/>
+          <a:p>
+            <a:r>
+              <a:rPr lang="en-US" dirty="0" smtClean="0"/>
+              <a:t>GCC &amp; GDB</a:t>
+            </a:r>
+            <a:endParaRPr lang="en-US" dirty="0"/>
+          </a:p>
+        </p:txBody>
+      </p:sp>
+      <p:sp>
+        <p:nvSpPr>
+          <p:cNvPr id="3" name="Content Placeholder 2"/>
+          <p:cNvSpPr>
+            <a:spLocks noGrp="1"/>
+          </p:cNvSpPr>
+          <p:nvPr>
+            <p:ph idx="1"/>
+          </p:nvPr>
+        </p:nvSpPr>
+        <p:spPr/>
+        <p:txBody>
+          <a:bodyPr/>
+          <a:lstStyle/>
+          <a:p>
+            <a:r>
+              <a:rPr lang="en-US" dirty="0" smtClean="0"/>
+              <a:t>Making your program </a:t>
+            </a:r>
+            <a:r>
+              <a:rPr lang="en-US" dirty="0" err="1" smtClean="0"/>
+              <a:t>debuggable</a:t>
+            </a:r>
+            <a:endParaRPr lang="en-US" dirty="0" smtClean="0"/>
+          </a:p>
+          <a:p>
+            <a:pPr lvl="1"/>
+            <a:r>
+              <a:rPr lang="en-US" dirty="0" err="1" smtClean="0"/>
+              <a:t>gcc</a:t>
+            </a:r>
+            <a:r>
+              <a:rPr lang="en-US" dirty="0" smtClean="0"/>
+              <a:t> </a:t>
+            </a:r>
+            <a:r>
+              <a:rPr lang="en-US" b="1" dirty="0" smtClean="0">
+                <a:solidFill>
+                  <a:srgbClr val="FF0000"/>
+                </a:solidFill>
+              </a:rPr>
+              <a:t>-g  </a:t>
+            </a:r>
+            <a:r>
+              <a:rPr lang="en-US" dirty="0" smtClean="0">
+                <a:solidFill>
+                  <a:schemeClr val="accent2">
+                    <a:lumMod val="50000"/>
+                  </a:schemeClr>
+                </a:solidFill>
+              </a:rPr>
+              <a:t>-o  </a:t>
+            </a:r>
+            <a:r>
+              <a:rPr lang="en-US" dirty="0" err="1" smtClean="0">
+                <a:solidFill>
+                  <a:schemeClr val="accent2">
+                    <a:lumMod val="50000"/>
+                  </a:schemeClr>
+                </a:solidFill>
+              </a:rPr>
+              <a:t>my_program</a:t>
+            </a:r>
+            <a:r>
+              <a:rPr lang="en-US" dirty="0" smtClean="0">
+                <a:solidFill>
+                  <a:schemeClr val="accent2">
+                    <a:lumMod val="50000"/>
+                  </a:schemeClr>
+                </a:solidFill>
+              </a:rPr>
+              <a:t> </a:t>
+            </a:r>
+            <a:r>
+              <a:rPr lang="en-US" dirty="0" err="1" smtClean="0">
+                <a:solidFill>
+                  <a:schemeClr val="accent2">
+                    <a:lumMod val="50000"/>
+                  </a:schemeClr>
+                </a:solidFill>
+              </a:rPr>
+              <a:t>my_program.c</a:t>
+            </a:r>
+            <a:endParaRPr lang="en-US" dirty="0" smtClean="0">
+              <a:solidFill>
+                <a:schemeClr val="accent2">
+                  <a:lumMod val="50000"/>
+                </a:schemeClr>
+              </a:solidFill>
+            </a:endParaRPr>
+          </a:p>
+          <a:p>
+            <a:endParaRPr lang="en-US" dirty="0">
+              <a:solidFill>
+                <a:schemeClr val="accent2">
+                  <a:lumMod val="50000"/>
+                </a:schemeClr>
+              </a:solidFill>
+            </a:endParaRPr>
+          </a:p>
+          <a:p>
+            <a:r>
+              <a:rPr lang="en-US" dirty="0" smtClean="0">
+                <a:solidFill>
+                  <a:schemeClr val="accent2">
+                    <a:lumMod val="50000"/>
+                  </a:schemeClr>
+                </a:solidFill>
+              </a:rPr>
+              <a:t>Debugging for overflows</a:t>
+            </a:r>
+            <a:endParaRPr lang="en-US" dirty="0">
+              <a:solidFill>
+                <a:schemeClr val="accent2">
+                  <a:lumMod val="50000"/>
+                </a:schemeClr>
+              </a:solidFill>
+            </a:endParaRPr>
+          </a:p>
+          <a:p>
+            <a:pPr lvl="1"/>
+            <a:r>
+              <a:rPr lang="en-US" dirty="0" smtClean="0">
+                <a:solidFill>
+                  <a:schemeClr val="accent2">
+                    <a:lumMod val="50000"/>
+                  </a:schemeClr>
+                </a:solidFill>
+              </a:rPr>
+              <a:t>print, x/x</a:t>
+            </a:r>
+          </a:p>
+          <a:p>
+            <a:pPr lvl="2"/>
+            <a:r>
+              <a:rPr lang="en-US" dirty="0">
+                <a:solidFill>
+                  <a:schemeClr val="accent2">
+                    <a:lumMod val="50000"/>
+                  </a:schemeClr>
+                </a:solidFill>
+              </a:rPr>
+              <a:t>P</a:t>
+            </a:r>
+            <a:r>
+              <a:rPr lang="en-US" dirty="0" smtClean="0">
+                <a:solidFill>
+                  <a:schemeClr val="accent2">
+                    <a:lumMod val="50000"/>
+                  </a:schemeClr>
+                </a:solidFill>
+              </a:rPr>
+              <a:t>rint the value of any symbol</a:t>
+            </a:r>
+          </a:p>
+          <a:p>
+            <a:pPr lvl="2"/>
+            <a:r>
+              <a:rPr lang="en-US" dirty="0" smtClean="0">
+                <a:solidFill>
+                  <a:schemeClr val="accent2">
+                    <a:lumMod val="50000"/>
+                  </a:schemeClr>
+                </a:solidFill>
+              </a:rPr>
+              <a:t>Incredibly powerful with options</a:t>
+            </a:r>
+          </a:p>
+          <a:p>
+            <a:pPr lvl="2"/>
+            <a:endParaRPr lang="en-US" dirty="0" smtClean="0">
+              <a:solidFill>
+                <a:schemeClr val="accent2">
+                  <a:lumMod val="50000"/>
+                </a:schemeClr>
+              </a:solidFill>
+            </a:endParaRPr>
+          </a:p>
+        </p:txBody>
+      </p:sp>
+      <p:pic>
+        <p:nvPicPr>
+          <p:cNvPr id="3074" name="Picture 2"/>
+          <p:cNvPicPr>
+            <a:picLocks noChangeAspect="1" noChangeArrowheads="1"/>
+          </p:cNvPicPr>
+          <p:nvPr/>
+        </p:nvPicPr>
+        <p:blipFill>
+          <a:blip r:embed="rId2">
+            <a:extLst>
+              <a:ext uri="{28A0092B-C50C-407E-A947-70E740481C1C}">
+                <a14:useLocalDpi xmlns:a14="http://schemas.microsoft.com/office/drawing/2010/main" val="0"/>
+              </a:ext>
+            </a:extLst>
+          </a:blip>
+          <a:srcRect/>
+          <a:stretch>
+            <a:fillRect/>
+          </a:stretch>
+        </p:blipFill>
+        <p:spPr bwMode="auto">
+          <a:xfrm>
+            <a:off x="885236" y="4343400"/>
+            <a:ext cx="7373529" cy="2390775"/>
+          </a:xfrm>
+          <a:prstGeom prst="rect">
+            <a:avLst/>
+          </a:prstGeom>
+          <a:noFill/>
+          <a:ln>
+            <a:noFill/>
+          </a:ln>
+          <a:effectLst/>
+          <a:extLst>
+            <a:ext uri="{909E8E84-426E-40DD-AFC4-6F175D3DCCD1}">
+              <a14:hiddenFill xmlns:a14="http://schemas.microsoft.com/office/drawing/2010/main">
+                <a:solidFill>
+                  <a:schemeClr val="accent1"/>
+                </a:solidFill>
+              </a14:hiddenFill>
+            </a:ext>
+            <a:ext uri="{91240B29-F687-4F45-9708-019B960494DF}">
+              <a14:hiddenLine xmlns:a14="http://schemas.microsoft.com/office/drawing/2010/main" w="9525">
+                <a:solidFill>
+                  <a:schemeClr val="tx1"/>
+                </a:solidFill>
+                <a:miter lim="800000"/>
+                <a:headEnd/>
+                <a:tailEnd/>
+              </a14:hiddenLine>
+            </a:ext>
+            <a:ext uri="{AF507438-7753-43E0-B8FC-AC1667EBCBE1}">
+              <a14:hiddenEffects xmlns:a14="http://schemas.microsoft.com/office/drawing/2010/main">
+                <a:effectLst>
+                  <a:outerShdw dist="35921" dir="2700000" algn="ctr" rotWithShape="0">
+                    <a:schemeClr val="bg2"/>
+                  </a:outerShdw>
+                </a:effectLst>
+              </a14:hiddenEffects>
+            </a:ext>
+          </a:extLst>
+        </p:spPr>
+      </p:pic>
+    </p:spTree>
+    <p:extLst>
+      <p:ext uri="{BB962C8B-B14F-4D97-AF65-F5344CB8AC3E}">
+        <p14:creationId xmlns:p14="http://schemas.microsoft.com/office/powerpoint/2010/main" val="3352572252"/>
+      </p:ext>
+    </p:extLst>
+  </p:cSld>
+  <p:clrMapOvr>
+    <a:masterClrMapping/>
+  </p:clrMapOvr>
+</p:sld>
+</file>
+
+<file path=ppt/slides/slide34.xml><?xml version="1.0" encoding="utf-8"?>
+<p:sld xmlns:a="http://schemas.openxmlformats.org/drawingml/2006/main" xmlns:r="http://schemas.openxmlformats.org/officeDocument/2006/relationships" xmlns:p="http://schemas.openxmlformats.org/presentationml/2006/main">
+  <p:cSld>
+    <p:spTree>
+      <p:nvGrpSpPr>
+        <p:cNvPr id="1" name=""/>
+        <p:cNvGrpSpPr/>
+        <p:nvPr/>
+      </p:nvGrpSpPr>
+      <p:grpSpPr>
+        <a:xfrm>
+          <a:off x="0" y="0"/>
+          <a:ext cx="0" cy="0"/>
+          <a:chOff x="0" y="0"/>
+          <a:chExt cx="0" cy="0"/>
+        </a:xfrm>
+      </p:grpSpPr>
+      <p:sp>
+        <p:nvSpPr>
+          <p:cNvPr id="2" name="Title 1"/>
+          <p:cNvSpPr>
+            <a:spLocks noGrp="1"/>
+          </p:cNvSpPr>
+          <p:nvPr>
+            <p:ph type="title"/>
+          </p:nvPr>
+        </p:nvSpPr>
+        <p:spPr/>
+        <p:txBody>
+          <a:bodyPr/>
+          <a:lstStyle/>
+          <a:p>
+            <a:r>
+              <a:rPr lang="en-US" dirty="0" err="1" smtClean="0"/>
+              <a:t>Shellcoding</a:t>
+            </a:r>
+            <a:endParaRPr lang="en-US" dirty="0"/>
+          </a:p>
+        </p:txBody>
+      </p:sp>
+      <p:sp>
+        <p:nvSpPr>
+          <p:cNvPr id="3" name="Content Placeholder 2"/>
+          <p:cNvSpPr>
+            <a:spLocks noGrp="1"/>
+          </p:cNvSpPr>
+          <p:nvPr>
+            <p:ph idx="1"/>
+          </p:nvPr>
+        </p:nvSpPr>
+        <p:spPr/>
+        <p:txBody>
+          <a:bodyPr>
+            <a:normAutofit/>
+          </a:bodyPr>
+          <a:lstStyle/>
+          <a:p>
+            <a:r>
               <a:rPr lang="en-US" dirty="0" smtClean="0"/>
               <a:t>Find a solid assembly base (unless you want to write it all yourself…)</a:t>
             </a:r>
@@ -33134,7 +34175,7 @@
 </p:sld>
 </file>
 
-<file path=ppt/slides/slide31.xml><?xml version="1.0" encoding="utf-8"?>
+<file path=ppt/slides/slide35.xml><?xml version="1.0" encoding="utf-8"?>
 <p:sld xmlns:a="http://schemas.openxmlformats.org/drawingml/2006/main" xmlns:r="http://schemas.openxmlformats.org/officeDocument/2006/relationships" xmlns:p="http://schemas.openxmlformats.org/presentationml/2006/main">
   <p:cSld>
     <p:spTree>

</xml_diff>

<commit_message>
Adding a disassemble debug slide
</commit_message>
<xml_diff>
--- a/Buffer Overflow Attacks.pptx
+++ b/Buffer Overflow Attacks.pptx
@@ -5,7 +5,7 @@
     <p:sldMasterId id="2147483672" r:id="rId1"/>
   </p:sldMasterIdLst>
   <p:notesMasterIdLst>
-    <p:notesMasterId r:id="rId37"/>
+    <p:notesMasterId r:id="rId38"/>
   </p:notesMasterIdLst>
   <p:sldIdLst>
     <p:sldId id="256" r:id="rId2"/>
@@ -41,8 +41,9 @@
     <p:sldId id="306" r:id="rId32"/>
     <p:sldId id="307" r:id="rId33"/>
     <p:sldId id="308" r:id="rId34"/>
-    <p:sldId id="285" r:id="rId35"/>
-    <p:sldId id="286" r:id="rId36"/>
+    <p:sldId id="309" r:id="rId35"/>
+    <p:sldId id="285" r:id="rId36"/>
+    <p:sldId id="286" r:id="rId37"/>
   </p:sldIdLst>
   <p:sldSz cx="9144000" cy="6858000" type="screen4x3"/>
   <p:notesSz cx="6858000" cy="9144000"/>
@@ -183,6 +184,7 @@
             <p14:sldId id="306"/>
             <p14:sldId id="307"/>
             <p14:sldId id="308"/>
+            <p14:sldId id="309"/>
             <p14:sldId id="285"/>
             <p14:sldId id="286"/>
           </p14:sldIdLst>
@@ -33035,11 +33037,7 @@
           <a:p>
             <a:r>
               <a:rPr lang="en-US" dirty="0" smtClean="0"/>
-              <a:t>Tools - </a:t>
-            </a:r>
-            <a:r>
-              <a:rPr lang="en-US" dirty="0" smtClean="0"/>
-              <a:t>Unix</a:t>
+              <a:t>Tools - Unix</a:t>
             </a:r>
             <a:endParaRPr lang="en-US" dirty="0"/>
           </a:p>
@@ -33088,11 +33086,7 @@
           <a:p>
             <a:r>
               <a:rPr lang="en-US" dirty="0" smtClean="0"/>
-              <a:t>Additional </a:t>
-            </a:r>
-            <a:r>
-              <a:rPr lang="en-US" dirty="0" smtClean="0"/>
-              <a:t>Tools</a:t>
+              <a:t>Additional Tools</a:t>
             </a:r>
           </a:p>
           <a:p>
@@ -34063,6 +34057,223 @@
         </p:nvSpPr>
         <p:spPr/>
         <p:txBody>
+          <a:bodyPr>
+            <a:normAutofit/>
+          </a:bodyPr>
+          <a:lstStyle/>
+          <a:p>
+            <a:r>
+              <a:rPr lang="en-US" dirty="0" smtClean="0"/>
+              <a:t>GCC &amp; GDB</a:t>
+            </a:r>
+            <a:endParaRPr lang="en-US" dirty="0"/>
+          </a:p>
+        </p:txBody>
+      </p:sp>
+      <p:sp>
+        <p:nvSpPr>
+          <p:cNvPr id="3" name="Content Placeholder 2"/>
+          <p:cNvSpPr>
+            <a:spLocks noGrp="1"/>
+          </p:cNvSpPr>
+          <p:nvPr>
+            <p:ph idx="1"/>
+          </p:nvPr>
+        </p:nvSpPr>
+        <p:spPr/>
+        <p:txBody>
+          <a:bodyPr/>
+          <a:lstStyle/>
+          <a:p>
+            <a:r>
+              <a:rPr lang="en-US" dirty="0" smtClean="0">
+                <a:solidFill>
+                  <a:schemeClr val="accent2">
+                    <a:lumMod val="50000"/>
+                  </a:schemeClr>
+                </a:solidFill>
+              </a:rPr>
+              <a:t>Debugging </a:t>
+            </a:r>
+            <a:r>
+              <a:rPr lang="en-US" dirty="0" smtClean="0">
+                <a:solidFill>
+                  <a:schemeClr val="accent2">
+                    <a:lumMod val="50000"/>
+                  </a:schemeClr>
+                </a:solidFill>
+              </a:rPr>
+              <a:t>for overflows</a:t>
+            </a:r>
+            <a:endParaRPr lang="en-US" dirty="0">
+              <a:solidFill>
+                <a:schemeClr val="accent2">
+                  <a:lumMod val="50000"/>
+                </a:schemeClr>
+              </a:solidFill>
+            </a:endParaRPr>
+          </a:p>
+          <a:p>
+            <a:pPr lvl="1"/>
+            <a:r>
+              <a:rPr lang="en-US" dirty="0" smtClean="0">
+                <a:solidFill>
+                  <a:schemeClr val="accent2">
+                    <a:lumMod val="50000"/>
+                  </a:schemeClr>
+                </a:solidFill>
+              </a:rPr>
+              <a:t>disassemble &lt;symbol&gt;</a:t>
+            </a:r>
+          </a:p>
+          <a:p>
+            <a:pPr lvl="2"/>
+            <a:r>
+              <a:rPr lang="en-US" dirty="0">
+                <a:solidFill>
+                  <a:schemeClr val="accent2">
+                    <a:lumMod val="50000"/>
+                  </a:schemeClr>
+                </a:solidFill>
+              </a:rPr>
+              <a:t>D</a:t>
+            </a:r>
+            <a:r>
+              <a:rPr lang="en-US" dirty="0" smtClean="0">
+                <a:solidFill>
+                  <a:schemeClr val="accent2">
+                    <a:lumMod val="50000"/>
+                  </a:schemeClr>
+                </a:solidFill>
+              </a:rPr>
+              <a:t>umps the disassembly for a symbol</a:t>
+            </a:r>
+            <a:endParaRPr lang="en-US" dirty="0" smtClean="0">
+              <a:solidFill>
+                <a:schemeClr val="accent2">
+                  <a:lumMod val="50000"/>
+                </a:schemeClr>
+              </a:solidFill>
+            </a:endParaRPr>
+          </a:p>
+          <a:p>
+            <a:pPr lvl="2"/>
+            <a:endParaRPr lang="en-US" dirty="0" smtClean="0">
+              <a:solidFill>
+                <a:schemeClr val="accent2">
+                  <a:lumMod val="50000"/>
+                </a:schemeClr>
+              </a:solidFill>
+            </a:endParaRPr>
+          </a:p>
+        </p:txBody>
+      </p:sp>
+      <p:pic>
+        <p:nvPicPr>
+          <p:cNvPr id="1026" name="Picture 2"/>
+          <p:cNvPicPr>
+            <a:picLocks noChangeAspect="1" noChangeArrowheads="1"/>
+          </p:cNvPicPr>
+          <p:nvPr/>
+        </p:nvPicPr>
+        <p:blipFill>
+          <a:blip r:embed="rId2">
+            <a:extLst>
+              <a:ext uri="{28A0092B-C50C-407E-A947-70E740481C1C}">
+                <a14:useLocalDpi xmlns:a14="http://schemas.microsoft.com/office/drawing/2010/main" val="0"/>
+              </a:ext>
+            </a:extLst>
+          </a:blip>
+          <a:srcRect/>
+          <a:stretch>
+            <a:fillRect/>
+          </a:stretch>
+        </p:blipFill>
+        <p:spPr bwMode="auto">
+          <a:xfrm>
+            <a:off x="1165736" y="2724150"/>
+            <a:ext cx="6812529" cy="4095750"/>
+          </a:xfrm>
+          <a:prstGeom prst="rect">
+            <a:avLst/>
+          </a:prstGeom>
+          <a:noFill/>
+          <a:ln>
+            <a:noFill/>
+          </a:ln>
+          <a:effectLst/>
+          <a:extLst>
+            <a:ext uri="{909E8E84-426E-40DD-AFC4-6F175D3DCCD1}">
+              <a14:hiddenFill xmlns:a14="http://schemas.microsoft.com/office/drawing/2010/main">
+                <a:solidFill>
+                  <a:schemeClr val="accent1"/>
+                </a:solidFill>
+              </a14:hiddenFill>
+            </a:ext>
+            <a:ext uri="{91240B29-F687-4F45-9708-019B960494DF}">
+              <a14:hiddenLine xmlns:a14="http://schemas.microsoft.com/office/drawing/2010/main" w="9525">
+                <a:solidFill>
+                  <a:schemeClr val="tx1"/>
+                </a:solidFill>
+                <a:miter lim="800000"/>
+                <a:headEnd/>
+                <a:tailEnd/>
+              </a14:hiddenLine>
+            </a:ext>
+            <a:ext uri="{AF507438-7753-43E0-B8FC-AC1667EBCBE1}">
+              <a14:hiddenEffects xmlns:a14="http://schemas.microsoft.com/office/drawing/2010/main">
+                <a:effectLst>
+                  <a:outerShdw dist="35921" dir="2700000" algn="ctr" rotWithShape="0">
+                    <a:schemeClr val="bg2"/>
+                  </a:outerShdw>
+                </a:effectLst>
+              </a14:hiddenEffects>
+            </a:ext>
+          </a:extLst>
+        </p:spPr>
+      </p:pic>
+    </p:spTree>
+    <p:extLst>
+      <p:ext uri="{BB962C8B-B14F-4D97-AF65-F5344CB8AC3E}">
+        <p14:creationId xmlns:p14="http://schemas.microsoft.com/office/powerpoint/2010/main" val="778398437"/>
+      </p:ext>
+    </p:extLst>
+  </p:cSld>
+  <p:clrMapOvr>
+    <a:masterClrMapping/>
+  </p:clrMapOvr>
+</p:sld>
+</file>
+
+<file path=ppt/slides/slide35.xml><?xml version="1.0" encoding="utf-8"?>
+<p:sld xmlns:a="http://schemas.openxmlformats.org/drawingml/2006/main" xmlns:r="http://schemas.openxmlformats.org/officeDocument/2006/relationships" xmlns:p="http://schemas.openxmlformats.org/presentationml/2006/main">
+  <p:cSld>
+    <p:spTree>
+      <p:nvGrpSpPr>
+        <p:cNvPr id="1" name=""/>
+        <p:cNvGrpSpPr/>
+        <p:nvPr/>
+      </p:nvGrpSpPr>
+      <p:grpSpPr>
+        <a:xfrm>
+          <a:off x="0" y="0"/>
+          <a:ext cx="0" cy="0"/>
+          <a:chOff x="0" y="0"/>
+          <a:chExt cx="0" cy="0"/>
+        </a:xfrm>
+      </p:grpSpPr>
+      <p:sp>
+        <p:nvSpPr>
+          <p:cNvPr id="2" name="Title 1"/>
+          <p:cNvSpPr>
+            <a:spLocks noGrp="1"/>
+          </p:cNvSpPr>
+          <p:nvPr>
+            <p:ph type="title"/>
+          </p:nvPr>
+        </p:nvSpPr>
+        <p:spPr/>
+        <p:txBody>
           <a:bodyPr/>
           <a:lstStyle/>
           <a:p>
@@ -34175,7 +34386,7 @@
 </p:sld>
 </file>
 
-<file path=ppt/slides/slide35.xml><?xml version="1.0" encoding="utf-8"?>
+<file path=ppt/slides/slide36.xml><?xml version="1.0" encoding="utf-8"?>
 <p:sld xmlns:a="http://schemas.openxmlformats.org/drawingml/2006/main" xmlns:r="http://schemas.openxmlformats.org/officeDocument/2006/relationships" xmlns:p="http://schemas.openxmlformats.org/presentationml/2006/main">
   <p:cSld>
     <p:spTree>

</xml_diff>

<commit_message>
Fixing shellcode. Adding protection slide
</commit_message>
<xml_diff>
--- a/Buffer Overflow Attacks.pptx
+++ b/Buffer Overflow Attacks.pptx
@@ -5,7 +5,7 @@
     <p:sldMasterId id="2147483672" r:id="rId1"/>
   </p:sldMasterIdLst>
   <p:notesMasterIdLst>
-    <p:notesMasterId r:id="rId38"/>
+    <p:notesMasterId r:id="rId39"/>
   </p:notesMasterIdLst>
   <p:sldIdLst>
     <p:sldId id="256" r:id="rId2"/>
@@ -34,16 +34,17 @@
     <p:sldId id="303" r:id="rId25"/>
     <p:sldId id="304" r:id="rId26"/>
     <p:sldId id="281" r:id="rId27"/>
-    <p:sldId id="282" r:id="rId28"/>
-    <p:sldId id="283" r:id="rId29"/>
-    <p:sldId id="284" r:id="rId30"/>
-    <p:sldId id="305" r:id="rId31"/>
-    <p:sldId id="306" r:id="rId32"/>
-    <p:sldId id="307" r:id="rId33"/>
-    <p:sldId id="308" r:id="rId34"/>
-    <p:sldId id="309" r:id="rId35"/>
-    <p:sldId id="285" r:id="rId36"/>
-    <p:sldId id="286" r:id="rId37"/>
+    <p:sldId id="310" r:id="rId28"/>
+    <p:sldId id="282" r:id="rId29"/>
+    <p:sldId id="283" r:id="rId30"/>
+    <p:sldId id="284" r:id="rId31"/>
+    <p:sldId id="305" r:id="rId32"/>
+    <p:sldId id="306" r:id="rId33"/>
+    <p:sldId id="307" r:id="rId34"/>
+    <p:sldId id="308" r:id="rId35"/>
+    <p:sldId id="309" r:id="rId36"/>
+    <p:sldId id="285" r:id="rId37"/>
+    <p:sldId id="286" r:id="rId38"/>
   </p:sldIdLst>
   <p:sldSz cx="9144000" cy="6858000" type="screen4x3"/>
   <p:notesSz cx="6858000" cy="9144000"/>
@@ -177,6 +178,7 @@
             <p14:sldId id="303"/>
             <p14:sldId id="304"/>
             <p14:sldId id="281"/>
+            <p14:sldId id="310"/>
             <p14:sldId id="282"/>
             <p14:sldId id="283"/>
             <p14:sldId id="284"/>
@@ -277,7 +279,7 @@
           <a:p>
             <a:fld id="{9DED5714-D740-4F89-AAD5-E3BC8B06EDCA}" type="datetimeFigureOut">
               <a:rPr lang="en-US" smtClean="0"/>
-              <a:t>4/12/2012</a:t>
+              <a:t>4/16/2012</a:t>
             </a:fld>
             <a:endParaRPr lang="en-US"/>
           </a:p>
@@ -7563,7 +7565,7 @@
           <a:p>
             <a:fld id="{FB76FE03-F4FF-4405-A4BA-F447F9618E72}" type="datetimeFigureOut">
               <a:rPr lang="en-US" smtClean="0"/>
-              <a:t>4/12/2012</a:t>
+              <a:t>4/16/2012</a:t>
             </a:fld>
             <a:endParaRPr lang="en-US"/>
           </a:p>
@@ -7828,7 +7830,7 @@
           <a:p>
             <a:fld id="{FB76FE03-F4FF-4405-A4BA-F447F9618E72}" type="datetimeFigureOut">
               <a:rPr lang="en-US" smtClean="0"/>
-              <a:t>4/12/2012</a:t>
+              <a:t>4/16/2012</a:t>
             </a:fld>
             <a:endParaRPr lang="en-US"/>
           </a:p>
@@ -8102,7 +8104,7 @@
           <a:p>
             <a:fld id="{FB76FE03-F4FF-4405-A4BA-F447F9618E72}" type="datetimeFigureOut">
               <a:rPr lang="en-US" smtClean="0"/>
-              <a:t>4/12/2012</a:t>
+              <a:t>4/16/2012</a:t>
             </a:fld>
             <a:endParaRPr lang="en-US"/>
           </a:p>
@@ -8319,7 +8321,7 @@
           <a:p>
             <a:fld id="{FB76FE03-F4FF-4405-A4BA-F447F9618E72}" type="datetimeFigureOut">
               <a:rPr lang="en-US" smtClean="0"/>
-              <a:t>4/12/2012</a:t>
+              <a:t>4/16/2012</a:t>
             </a:fld>
             <a:endParaRPr lang="en-US"/>
           </a:p>
@@ -8706,7 +8708,7 @@
           <a:p>
             <a:fld id="{FB76FE03-F4FF-4405-A4BA-F447F9618E72}" type="datetimeFigureOut">
               <a:rPr lang="en-US" smtClean="0"/>
-              <a:t>4/12/2012</a:t>
+              <a:t>4/16/2012</a:t>
             </a:fld>
             <a:endParaRPr lang="en-US"/>
           </a:p>
@@ -9087,7 +9089,7 @@
           <a:p>
             <a:fld id="{FB76FE03-F4FF-4405-A4BA-F447F9618E72}" type="datetimeFigureOut">
               <a:rPr lang="en-US" smtClean="0"/>
-              <a:t>4/12/2012</a:t>
+              <a:t>4/16/2012</a:t>
             </a:fld>
             <a:endParaRPr lang="en-US"/>
           </a:p>
@@ -9504,7 +9506,7 @@
           <a:p>
             <a:fld id="{FB76FE03-F4FF-4405-A4BA-F447F9618E72}" type="datetimeFigureOut">
               <a:rPr lang="en-US" smtClean="0"/>
-              <a:t>4/12/2012</a:t>
+              <a:t>4/16/2012</a:t>
             </a:fld>
             <a:endParaRPr lang="en-US"/>
           </a:p>
@@ -9617,7 +9619,7 @@
           <a:p>
             <a:fld id="{FB76FE03-F4FF-4405-A4BA-F447F9618E72}" type="datetimeFigureOut">
               <a:rPr lang="en-US" smtClean="0"/>
-              <a:t>4/12/2012</a:t>
+              <a:t>4/16/2012</a:t>
             </a:fld>
             <a:endParaRPr lang="en-US"/>
           </a:p>
@@ -9707,7 +9709,7 @@
           <a:p>
             <a:fld id="{FB76FE03-F4FF-4405-A4BA-F447F9618E72}" type="datetimeFigureOut">
               <a:rPr lang="en-US" smtClean="0"/>
-              <a:t>4/12/2012</a:t>
+              <a:t>4/16/2012</a:t>
             </a:fld>
             <a:endParaRPr lang="en-US"/>
           </a:p>
@@ -9916,7 +9918,7 @@
           <a:p>
             <a:fld id="{FB76FE03-F4FF-4405-A4BA-F447F9618E72}" type="datetimeFigureOut">
               <a:rPr lang="en-US" smtClean="0"/>
-              <a:t>4/12/2012</a:t>
+              <a:t>4/16/2012</a:t>
             </a:fld>
             <a:endParaRPr lang="en-US"/>
           </a:p>
@@ -10293,7 +10295,7 @@
           <a:p>
             <a:fld id="{FB76FE03-F4FF-4405-A4BA-F447F9618E72}" type="datetimeFigureOut">
               <a:rPr lang="en-US" smtClean="0"/>
-              <a:t>4/12/2012</a:t>
+              <a:t>4/16/2012</a:t>
             </a:fld>
             <a:endParaRPr lang="en-US"/>
           </a:p>
@@ -10840,7 +10842,7 @@
           <a:p>
             <a:fld id="{FB76FE03-F4FF-4405-A4BA-F447F9618E72}" type="datetimeFigureOut">
               <a:rPr lang="en-US" smtClean="0"/>
-              <a:t>4/12/2012</a:t>
+              <a:t>4/16/2012</a:t>
             </a:fld>
             <a:endParaRPr lang="en-US"/>
           </a:p>
@@ -32551,7 +32553,7 @@
           <a:p>
             <a:r>
               <a:rPr lang="en-US" dirty="0" smtClean="0"/>
-              <a:t>Tools - Windows</a:t>
+              <a:t>Protection</a:t>
             </a:r>
             <a:endParaRPr lang="en-US" dirty="0"/>
           </a:p>
@@ -32569,114 +32571,194 @@
         </p:nvSpPr>
         <p:spPr/>
         <p:txBody>
-          <a:bodyPr>
-            <a:normAutofit/>
-          </a:bodyPr>
+          <a:bodyPr/>
           <a:lstStyle/>
           <a:p>
+            <a:r>
+              <a:rPr lang="en-US" dirty="0" smtClean="0"/>
+              <a:t>DEP</a:t>
+            </a:r>
+          </a:p>
+          <a:p>
+            <a:pPr lvl="1"/>
+            <a:r>
+              <a:rPr lang="en-US" dirty="0" err="1"/>
+              <a:t>a</a:t>
+            </a:r>
+            <a:r>
+              <a:rPr lang="en-US" dirty="0" err="1" smtClean="0"/>
+              <a:t>lwaysoff</a:t>
+            </a:r>
+            <a:endParaRPr lang="en-US" dirty="0" smtClean="0"/>
+          </a:p>
+          <a:p>
+            <a:pPr lvl="1"/>
+            <a:endParaRPr lang="en-US" dirty="0"/>
+          </a:p>
+          <a:p>
+            <a:pPr lvl="1"/>
+            <a:endParaRPr lang="en-US" dirty="0" smtClean="0"/>
+          </a:p>
+          <a:p>
+            <a:pPr lvl="1"/>
+            <a:endParaRPr lang="en-US" dirty="0"/>
+          </a:p>
+          <a:p>
+            <a:r>
+              <a:rPr lang="en-US" dirty="0" smtClean="0"/>
+              <a:t>GS – Visual C++ Compiler Flag</a:t>
+            </a:r>
+          </a:p>
+          <a:p>
+            <a:pPr lvl="1"/>
+            <a:r>
+              <a:rPr lang="en-US" dirty="0">
+                <a:hlinkClick r:id="rId2"/>
+              </a:rPr>
+              <a:t>http://</a:t>
+            </a:r>
             <a:r>
               <a:rPr lang="en-US" dirty="0" smtClean="0">
                 <a:hlinkClick r:id="rId2"/>
               </a:rPr>
-              <a:t>Visual C++</a:t>
+              <a:t>msdn.microsoft.com/en-us/library/Aa290051</a:t>
             </a:r>
             <a:endParaRPr lang="en-US" dirty="0" smtClean="0"/>
           </a:p>
           <a:p>
-            <a:r>
-              <a:rPr lang="en-US" dirty="0" smtClean="0">
-                <a:hlinkClick r:id="rId3"/>
-              </a:rPr>
-              <a:t>Ida</a:t>
-            </a:r>
-            <a:endParaRPr lang="en-US" dirty="0" smtClean="0"/>
-          </a:p>
-          <a:p>
-            <a:r>
-              <a:rPr lang="en-US" dirty="0" err="1" smtClean="0">
-                <a:hlinkClick r:id="rId3"/>
-              </a:rPr>
-              <a:t>Ollydbg</a:t>
-            </a:r>
-            <a:endParaRPr lang="en-US" dirty="0" smtClean="0"/>
-          </a:p>
-          <a:p>
-            <a:endParaRPr lang="en-US" dirty="0" smtClean="0"/>
-          </a:p>
-          <a:p>
-            <a:r>
-              <a:rPr lang="en-US" dirty="0" smtClean="0"/>
-              <a:t>Additional Tools</a:t>
-            </a:r>
-          </a:p>
-          <a:p>
             <a:pPr lvl="1"/>
-            <a:r>
-              <a:rPr lang="en-US" dirty="0" smtClean="0">
-                <a:hlinkClick r:id="rId4"/>
-              </a:rPr>
-              <a:t>Cygwin</a:t>
-            </a:r>
-            <a:r>
-              <a:rPr lang="en-US" dirty="0" smtClean="0"/>
-              <a:t> (</a:t>
-            </a:r>
-            <a:r>
-              <a:rPr lang="en-US" dirty="0" err="1" smtClean="0">
-                <a:hlinkClick r:id="rId5"/>
-              </a:rPr>
-              <a:t>arwin</a:t>
-            </a:r>
-            <a:r>
-              <a:rPr lang="en-US" dirty="0" smtClean="0"/>
-              <a:t>, </a:t>
-            </a:r>
-            <a:r>
-              <a:rPr lang="en-US" dirty="0" err="1" smtClean="0"/>
-              <a:t>nasm</a:t>
-            </a:r>
-            <a:r>
-              <a:rPr lang="en-US" dirty="0" smtClean="0"/>
-              <a:t>, </a:t>
-            </a:r>
-            <a:r>
-              <a:rPr lang="en-US" dirty="0" err="1" smtClean="0"/>
-              <a:t>objdump</a:t>
-            </a:r>
-            <a:r>
-              <a:rPr lang="en-US" dirty="0" smtClean="0"/>
-              <a:t>)</a:t>
-            </a:r>
-          </a:p>
-          <a:p>
-            <a:pPr lvl="1"/>
-            <a:r>
-              <a:rPr lang="en-US" dirty="0" err="1" smtClean="0">
-                <a:hlinkClick r:id="rId6"/>
-              </a:rPr>
-              <a:t>Faultmon</a:t>
-            </a:r>
-            <a:endParaRPr lang="en-US" dirty="0" smtClean="0"/>
-          </a:p>
-          <a:p>
-            <a:pPr lvl="1"/>
-            <a:r>
-              <a:rPr lang="en-US" dirty="0" smtClean="0">
-                <a:hlinkClick r:id="rId7"/>
-              </a:rPr>
-              <a:t>Perl</a:t>
-            </a:r>
-            <a:r>
-              <a:rPr lang="en-US" dirty="0" smtClean="0"/>
-              <a:t> (Strawberry)</a:t>
-            </a:r>
+            <a:endParaRPr lang="en-US" dirty="0"/>
           </a:p>
         </p:txBody>
       </p:sp>
+      <p:pic>
+        <p:nvPicPr>
+          <p:cNvPr id="1026" name="Picture 2"/>
+          <p:cNvPicPr>
+            <a:picLocks noChangeAspect="1" noChangeArrowheads="1"/>
+          </p:cNvPicPr>
+          <p:nvPr/>
+        </p:nvPicPr>
+        <p:blipFill rotWithShape="1">
+          <a:blip r:embed="rId3">
+            <a:extLst>
+              <a:ext uri="{28A0092B-C50C-407E-A947-70E740481C1C}">
+                <a14:useLocalDpi xmlns:a14="http://schemas.microsoft.com/office/drawing/2010/main" val="0"/>
+              </a:ext>
+            </a:extLst>
+          </a:blip>
+          <a:srcRect l="-582" t="23187" r="-481" b="27934"/>
+          <a:stretch/>
+        </p:blipFill>
+        <p:spPr bwMode="auto">
+          <a:xfrm>
+            <a:off x="640080" y="2590800"/>
+            <a:ext cx="7955280" cy="822960"/>
+          </a:xfrm>
+          <a:prstGeom prst="rect">
+            <a:avLst/>
+          </a:prstGeom>
+          <a:noFill/>
+          <a:ln>
+            <a:noFill/>
+          </a:ln>
+          <a:effectLst/>
+          <a:extLst>
+            <a:ext uri="{909E8E84-426E-40DD-AFC4-6F175D3DCCD1}">
+              <a14:hiddenFill xmlns:a14="http://schemas.microsoft.com/office/drawing/2010/main">
+                <a:solidFill>
+                  <a:schemeClr val="accent1"/>
+                </a:solidFill>
+              </a14:hiddenFill>
+            </a:ext>
+            <a:ext uri="{91240B29-F687-4F45-9708-019B960494DF}">
+              <a14:hiddenLine xmlns:a14="http://schemas.microsoft.com/office/drawing/2010/main" w="9525">
+                <a:solidFill>
+                  <a:schemeClr val="tx1"/>
+                </a:solidFill>
+                <a:miter lim="800000"/>
+                <a:headEnd/>
+                <a:tailEnd/>
+              </a14:hiddenLine>
+            </a:ext>
+            <a:ext uri="{AF507438-7753-43E0-B8FC-AC1667EBCBE1}">
+              <a14:hiddenEffects xmlns:a14="http://schemas.microsoft.com/office/drawing/2010/main">
+                <a:effectLst>
+                  <a:outerShdw dist="35921" dir="2700000" algn="ctr" rotWithShape="0">
+                    <a:schemeClr val="bg2"/>
+                  </a:outerShdw>
+                </a:effectLst>
+              </a14:hiddenEffects>
+            </a:ext>
+          </a:extLst>
+        </p:spPr>
+      </p:pic>
+      <p:pic>
+        <p:nvPicPr>
+          <p:cNvPr id="1027" name="Picture 3"/>
+          <p:cNvPicPr>
+            <a:picLocks noChangeAspect="1" noChangeArrowheads="1"/>
+          </p:cNvPicPr>
+          <p:nvPr/>
+        </p:nvPicPr>
+        <p:blipFill rotWithShape="1">
+          <a:blip r:embed="rId4">
+            <a:extLst>
+              <a:ext uri="{28A0092B-C50C-407E-A947-70E740481C1C}">
+                <a14:useLocalDpi xmlns:a14="http://schemas.microsoft.com/office/drawing/2010/main" val="0"/>
+              </a:ext>
+            </a:extLst>
+          </a:blip>
+          <a:srcRect t="29333" b="-29333"/>
+          <a:stretch/>
+        </p:blipFill>
+        <p:spPr bwMode="auto">
+          <a:xfrm>
+            <a:off x="762000" y="4343400"/>
+            <a:ext cx="7134225" cy="2286000"/>
+          </a:xfrm>
+          <a:prstGeom prst="rect">
+            <a:avLst/>
+          </a:prstGeom>
+          <a:noFill/>
+          <a:ln>
+            <a:noFill/>
+          </a:ln>
+          <a:effectLst/>
+          <a:extLst>
+            <a:ext uri="{909E8E84-426E-40DD-AFC4-6F175D3DCCD1}">
+              <a14:hiddenFill xmlns:a14="http://schemas.microsoft.com/office/drawing/2010/main">
+                <a:solidFill>
+                  <a:schemeClr val="accent1"/>
+                </a:solidFill>
+              </a14:hiddenFill>
+            </a:ext>
+            <a:ext uri="{91240B29-F687-4F45-9708-019B960494DF}">
+              <a14:hiddenLine xmlns:a14="http://schemas.microsoft.com/office/drawing/2010/main" w="9525">
+                <a:solidFill>
+                  <a:schemeClr val="tx1"/>
+                </a:solidFill>
+                <a:miter lim="800000"/>
+                <a:headEnd/>
+                <a:tailEnd/>
+              </a14:hiddenLine>
+            </a:ext>
+            <a:ext uri="{AF507438-7753-43E0-B8FC-AC1667EBCBE1}">
+              <a14:hiddenEffects xmlns:a14="http://schemas.microsoft.com/office/drawing/2010/main">
+                <a:effectLst>
+                  <a:outerShdw dist="35921" dir="2700000" algn="ctr" rotWithShape="0">
+                    <a:schemeClr val="bg2"/>
+                  </a:outerShdw>
+                </a:effectLst>
+              </a14:hiddenEffects>
+            </a:ext>
+          </a:extLst>
+        </p:spPr>
+      </p:pic>
     </p:spTree>
     <p:extLst>
       <p:ext uri="{BB962C8B-B14F-4D97-AF65-F5344CB8AC3E}">
-        <p14:creationId xmlns:p14="http://schemas.microsoft.com/office/powerpoint/2010/main" val="4095574421"/>
+        <p14:creationId xmlns:p14="http://schemas.microsoft.com/office/powerpoint/2010/main" val="3507706647"/>
       </p:ext>
     </p:extLst>
   </p:cSld>
@@ -32720,7 +32802,7 @@
           <a:p>
             <a:r>
               <a:rPr lang="en-US" dirty="0" smtClean="0"/>
-              <a:t>Ida - Disassembling</a:t>
+              <a:t>Tools - Windows</a:t>
             </a:r>
             <a:endParaRPr lang="en-US" dirty="0"/>
           </a:p>
@@ -32738,33 +32820,114 @@
         </p:nvSpPr>
         <p:spPr/>
         <p:txBody>
-          <a:bodyPr/>
+          <a:bodyPr>
+            <a:normAutofit/>
+          </a:bodyPr>
           <a:lstStyle/>
           <a:p>
             <a:r>
+              <a:rPr lang="en-US" dirty="0" smtClean="0">
+                <a:hlinkClick r:id="rId2"/>
+              </a:rPr>
+              <a:t>Visual C++</a:t>
+            </a:r>
+            <a:endParaRPr lang="en-US" dirty="0" smtClean="0"/>
+          </a:p>
+          <a:p>
+            <a:r>
+              <a:rPr lang="en-US" dirty="0" smtClean="0">
+                <a:hlinkClick r:id="rId3"/>
+              </a:rPr>
+              <a:t>Ida</a:t>
+            </a:r>
+            <a:endParaRPr lang="en-US" dirty="0" smtClean="0"/>
+          </a:p>
+          <a:p>
+            <a:r>
+              <a:rPr lang="en-US" dirty="0" err="1" smtClean="0">
+                <a:hlinkClick r:id="rId3"/>
+              </a:rPr>
+              <a:t>Ollydbg</a:t>
+            </a:r>
+            <a:endParaRPr lang="en-US" dirty="0" smtClean="0"/>
+          </a:p>
+          <a:p>
+            <a:endParaRPr lang="en-US" dirty="0" smtClean="0"/>
+          </a:p>
+          <a:p>
+            <a:r>
               <a:rPr lang="en-US" dirty="0" smtClean="0"/>
-              <a:t>Open the file</a:t>
-            </a:r>
-          </a:p>
-          <a:p>
+              <a:t>Additional Tools</a:t>
+            </a:r>
+          </a:p>
+          <a:p>
+            <a:pPr lvl="1"/>
+            <a:r>
+              <a:rPr lang="en-US" dirty="0" smtClean="0">
+                <a:hlinkClick r:id="rId4"/>
+              </a:rPr>
+              <a:t>Cygwin</a:t>
+            </a:r>
             <a:r>
               <a:rPr lang="en-US" dirty="0" smtClean="0"/>
-              <a:t>Pass through the options</a:t>
-            </a:r>
-          </a:p>
-          <a:p>
+              <a:t> (</a:t>
+            </a:r>
+            <a:r>
+              <a:rPr lang="en-US" dirty="0" err="1" smtClean="0">
+                <a:hlinkClick r:id="rId5"/>
+              </a:rPr>
+              <a:t>arwin</a:t>
+            </a:r>
             <a:r>
               <a:rPr lang="en-US" dirty="0" smtClean="0"/>
-              <a:t>Right click on the view and click Text View</a:t>
-            </a:r>
-            <a:endParaRPr lang="en-US" dirty="0"/>
+              <a:t>, </a:t>
+            </a:r>
+            <a:r>
+              <a:rPr lang="en-US" dirty="0" err="1" smtClean="0"/>
+              <a:t>nasm</a:t>
+            </a:r>
+            <a:r>
+              <a:rPr lang="en-US" dirty="0" smtClean="0"/>
+              <a:t>, </a:t>
+            </a:r>
+            <a:r>
+              <a:rPr lang="en-US" dirty="0" err="1" smtClean="0"/>
+              <a:t>objdump</a:t>
+            </a:r>
+            <a:r>
+              <a:rPr lang="en-US" dirty="0" smtClean="0"/>
+              <a:t>)</a:t>
+            </a:r>
+          </a:p>
+          <a:p>
+            <a:pPr lvl="1"/>
+            <a:r>
+              <a:rPr lang="en-US" dirty="0" err="1" smtClean="0">
+                <a:hlinkClick r:id="rId6"/>
+              </a:rPr>
+              <a:t>Faultmon</a:t>
+            </a:r>
+            <a:endParaRPr lang="en-US" dirty="0" smtClean="0"/>
+          </a:p>
+          <a:p>
+            <a:pPr lvl="1"/>
+            <a:r>
+              <a:rPr lang="en-US" dirty="0" smtClean="0">
+                <a:hlinkClick r:id="rId7"/>
+              </a:rPr>
+              <a:t>Perl</a:t>
+            </a:r>
+            <a:r>
+              <a:rPr lang="en-US" dirty="0" smtClean="0"/>
+              <a:t> (Strawberry)</a:t>
+            </a:r>
           </a:p>
         </p:txBody>
       </p:sp>
     </p:spTree>
     <p:extLst>
       <p:ext uri="{BB962C8B-B14F-4D97-AF65-F5344CB8AC3E}">
-        <p14:creationId xmlns:p14="http://schemas.microsoft.com/office/powerpoint/2010/main" val="1679836893"/>
+        <p14:creationId xmlns:p14="http://schemas.microsoft.com/office/powerpoint/2010/main" val="4095574421"/>
       </p:ext>
     </p:extLst>
   </p:cSld>
@@ -32807,12 +32970,8 @@
           <a:lstStyle/>
           <a:p>
             <a:r>
-              <a:rPr lang="en-US" dirty="0" err="1" smtClean="0"/>
-              <a:t>OllyDbg</a:t>
-            </a:r>
-            <a:r>
               <a:rPr lang="en-US" dirty="0" smtClean="0"/>
-              <a:t> - Debugging</a:t>
+              <a:t>Ida - Disassembling</a:t>
             </a:r>
             <a:endParaRPr lang="en-US" dirty="0"/>
           </a:p>
@@ -32835,71 +32994,28 @@
           <a:p>
             <a:r>
               <a:rPr lang="en-US" dirty="0" smtClean="0"/>
-              <a:t>Open the .exe or attach to the running process</a:t>
+              <a:t>Open the file</a:t>
             </a:r>
           </a:p>
           <a:p>
             <a:r>
               <a:rPr lang="en-US" dirty="0" smtClean="0"/>
-              <a:t>Enter your data into the process</a:t>
+              <a:t>Pass through the options</a:t>
             </a:r>
           </a:p>
           <a:p>
             <a:r>
               <a:rPr lang="en-US" dirty="0" smtClean="0"/>
-              <a:t>Check out the stack, </a:t>
-            </a:r>
-            <a:r>
-              <a:rPr lang="en-US" dirty="0" err="1" smtClean="0"/>
-              <a:t>esp</a:t>
-            </a:r>
-            <a:r>
-              <a:rPr lang="en-US" dirty="0" smtClean="0"/>
-              <a:t>, </a:t>
-            </a:r>
-            <a:r>
-              <a:rPr lang="en-US" dirty="0" err="1" smtClean="0"/>
-              <a:t>ebp</a:t>
-            </a:r>
-            <a:r>
-              <a:rPr lang="en-US" dirty="0" smtClean="0"/>
-              <a:t>, and </a:t>
-            </a:r>
-            <a:r>
-              <a:rPr lang="en-US" dirty="0" err="1" smtClean="0"/>
-              <a:t>eip</a:t>
-            </a:r>
-            <a:r>
-              <a:rPr lang="en-US" dirty="0" smtClean="0"/>
-              <a:t> registers at the time of the crash</a:t>
-            </a:r>
-          </a:p>
-          <a:p>
-            <a:r>
-              <a:rPr lang="en-US" dirty="0" smtClean="0"/>
-              <a:t>If possible</a:t>
-            </a:r>
-          </a:p>
-          <a:p>
-            <a:pPr lvl="1"/>
-            <a:r>
-              <a:rPr lang="en-US" dirty="0" smtClean="0"/>
-              <a:t>Open the source file</a:t>
-            </a:r>
-          </a:p>
-          <a:p>
-            <a:pPr lvl="1"/>
-            <a:r>
-              <a:rPr lang="en-US" dirty="0" smtClean="0"/>
-              <a:t>Run until the buffer overflow should occur</a:t>
-            </a:r>
+              <a:t>Right click on the view and click Text View</a:t>
+            </a:r>
+            <a:endParaRPr lang="en-US" dirty="0"/>
           </a:p>
         </p:txBody>
       </p:sp>
     </p:spTree>
     <p:extLst>
       <p:ext uri="{BB962C8B-B14F-4D97-AF65-F5344CB8AC3E}">
-        <p14:creationId xmlns:p14="http://schemas.microsoft.com/office/powerpoint/2010/main" val="2745096001"/>
+        <p14:creationId xmlns:p14="http://schemas.microsoft.com/office/powerpoint/2010/main" val="1679836893"/>
       </p:ext>
     </p:extLst>
   </p:cSld>
@@ -33036,8 +33152,12 @@
           <a:lstStyle/>
           <a:p>
             <a:r>
+              <a:rPr lang="en-US" dirty="0" err="1" smtClean="0"/>
+              <a:t>OllyDbg</a:t>
+            </a:r>
+            <a:r>
               <a:rPr lang="en-US" dirty="0" smtClean="0"/>
-              <a:t>Tools - Unix</a:t>
+              <a:t> - Debugging</a:t>
             </a:r>
             <a:endParaRPr lang="en-US" dirty="0"/>
           </a:p>
@@ -33055,70 +33175,76 @@
         </p:nvSpPr>
         <p:spPr/>
         <p:txBody>
-          <a:bodyPr>
-            <a:normAutofit/>
-          </a:bodyPr>
+          <a:bodyPr/>
           <a:lstStyle/>
           <a:p>
             <a:r>
-              <a:rPr lang="en-US" dirty="0" smtClean="0">
-                <a:hlinkClick r:id="rId2"/>
-              </a:rPr>
-              <a:t>GCC</a:t>
-            </a:r>
-            <a:endParaRPr lang="en-US" dirty="0" smtClean="0"/>
-          </a:p>
-          <a:p>
-            <a:r>
-              <a:rPr lang="en-US" dirty="0" smtClean="0">
-                <a:hlinkClick r:id="rId3"/>
-              </a:rPr>
-              <a:t>GDB</a:t>
-            </a:r>
-            <a:endParaRPr lang="en-US" dirty="0" smtClean="0"/>
-          </a:p>
-          <a:p>
-            <a:endParaRPr lang="en-US" dirty="0" smtClean="0"/>
-          </a:p>
-          <a:p>
-            <a:endParaRPr lang="en-US" dirty="0" smtClean="0"/>
-          </a:p>
-          <a:p>
-            <a:r>
               <a:rPr lang="en-US" dirty="0" smtClean="0"/>
-              <a:t>Additional Tools</a:t>
+              <a:t>Open the .exe or attach to the running process</a:t>
+            </a:r>
+          </a:p>
+          <a:p>
+            <a:r>
+              <a:rPr lang="en-US" dirty="0" smtClean="0"/>
+              <a:t>Enter your data into the process</a:t>
+            </a:r>
+          </a:p>
+          <a:p>
+            <a:r>
+              <a:rPr lang="en-US" dirty="0" smtClean="0"/>
+              <a:t>Check out the stack, </a:t>
+            </a:r>
+            <a:r>
+              <a:rPr lang="en-US" dirty="0" err="1" smtClean="0"/>
+              <a:t>esp</a:t>
+            </a:r>
+            <a:r>
+              <a:rPr lang="en-US" dirty="0" smtClean="0"/>
+              <a:t>, </a:t>
+            </a:r>
+            <a:r>
+              <a:rPr lang="en-US" dirty="0" err="1" smtClean="0"/>
+              <a:t>ebp</a:t>
+            </a:r>
+            <a:r>
+              <a:rPr lang="en-US" dirty="0" smtClean="0"/>
+              <a:t>, and </a:t>
+            </a:r>
+            <a:r>
+              <a:rPr lang="en-US" dirty="0" err="1" smtClean="0"/>
+              <a:t>eip</a:t>
+            </a:r>
+            <a:r>
+              <a:rPr lang="en-US" dirty="0" smtClean="0"/>
+              <a:t> registers at the time of the crash</a:t>
+            </a:r>
+          </a:p>
+          <a:p>
+            <a:r>
+              <a:rPr lang="en-US" dirty="0" smtClean="0"/>
+              <a:t>If possible</a:t>
             </a:r>
           </a:p>
           <a:p>
             <a:pPr lvl="1"/>
             <a:r>
-              <a:rPr lang="en-US" dirty="0" err="1" smtClean="0"/>
-              <a:t>objdump</a:t>
-            </a:r>
-            <a:endParaRPr lang="en-US" dirty="0"/>
+              <a:rPr lang="en-US" dirty="0" smtClean="0"/>
+              <a:t>Open the source file</a:t>
+            </a:r>
           </a:p>
           <a:p>
             <a:pPr lvl="1"/>
             <a:r>
-              <a:rPr lang="en-US" dirty="0" err="1" smtClean="0"/>
-              <a:t>nasm</a:t>
-            </a:r>
-            <a:endParaRPr lang="en-US" dirty="0" smtClean="0"/>
-          </a:p>
-          <a:p>
-            <a:pPr lvl="1"/>
-            <a:r>
-              <a:rPr lang="en-US" dirty="0" err="1" smtClean="0"/>
-              <a:t>execstack</a:t>
-            </a:r>
-            <a:endParaRPr lang="en-US" dirty="0" smtClean="0"/>
+              <a:rPr lang="en-US" dirty="0" smtClean="0"/>
+              <a:t>Run until the buffer overflow should occur</a:t>
+            </a:r>
           </a:p>
         </p:txBody>
       </p:sp>
     </p:spTree>
     <p:extLst>
       <p:ext uri="{BB962C8B-B14F-4D97-AF65-F5344CB8AC3E}">
-        <p14:creationId xmlns:p14="http://schemas.microsoft.com/office/powerpoint/2010/main" val="2226267564"/>
+        <p14:creationId xmlns:p14="http://schemas.microsoft.com/office/powerpoint/2010/main" val="2745096001"/>
       </p:ext>
     </p:extLst>
   </p:cSld>
@@ -33157,14 +33283,12 @@
         </p:nvSpPr>
         <p:spPr/>
         <p:txBody>
-          <a:bodyPr>
-            <a:normAutofit/>
-          </a:bodyPr>
+          <a:bodyPr/>
           <a:lstStyle/>
           <a:p>
             <a:r>
               <a:rPr lang="en-US" dirty="0" smtClean="0"/>
-              <a:t>GCC &amp; GDB</a:t>
+              <a:t>Tools - Unix</a:t>
             </a:r>
             <a:endParaRPr lang="en-US" dirty="0"/>
           </a:p>
@@ -33182,16 +33306,53 @@
         </p:nvSpPr>
         <p:spPr/>
         <p:txBody>
-          <a:bodyPr/>
+          <a:bodyPr>
+            <a:normAutofit/>
+          </a:bodyPr>
           <a:lstStyle/>
           <a:p>
             <a:r>
+              <a:rPr lang="en-US" dirty="0" smtClean="0">
+                <a:hlinkClick r:id="rId2"/>
+              </a:rPr>
+              <a:t>GCC</a:t>
+            </a:r>
+            <a:endParaRPr lang="en-US" dirty="0" smtClean="0"/>
+          </a:p>
+          <a:p>
+            <a:r>
+              <a:rPr lang="en-US" dirty="0" smtClean="0">
+                <a:hlinkClick r:id="rId3"/>
+              </a:rPr>
+              <a:t>GDB</a:t>
+            </a:r>
+            <a:endParaRPr lang="en-US" dirty="0" smtClean="0"/>
+          </a:p>
+          <a:p>
+            <a:endParaRPr lang="en-US" dirty="0" smtClean="0"/>
+          </a:p>
+          <a:p>
+            <a:endParaRPr lang="en-US" dirty="0" smtClean="0"/>
+          </a:p>
+          <a:p>
+            <a:r>
               <a:rPr lang="en-US" dirty="0" smtClean="0"/>
-              <a:t>Making your program </a:t>
-            </a:r>
+              <a:t>Additional Tools</a:t>
+            </a:r>
+          </a:p>
+          <a:p>
+            <a:pPr lvl="1"/>
             <a:r>
               <a:rPr lang="en-US" dirty="0" err="1" smtClean="0"/>
-              <a:t>debuggable</a:t>
+              <a:t>objdump</a:t>
+            </a:r>
+            <a:endParaRPr lang="en-US" dirty="0"/>
+          </a:p>
+          <a:p>
+            <a:pPr lvl="1"/>
+            <a:r>
+              <a:rPr lang="en-US" dirty="0" err="1" smtClean="0"/>
+              <a:t>nasm</a:t>
             </a:r>
             <a:endParaRPr lang="en-US" dirty="0" smtClean="0"/>
           </a:p>
@@ -33199,228 +33360,16 @@
             <a:pPr lvl="1"/>
             <a:r>
               <a:rPr lang="en-US" dirty="0" err="1" smtClean="0"/>
-              <a:t>gcc</a:t>
-            </a:r>
-            <a:r>
-              <a:rPr lang="en-US" dirty="0" smtClean="0"/>
-              <a:t> </a:t>
-            </a:r>
-            <a:r>
-              <a:rPr lang="en-US" b="1" dirty="0" smtClean="0">
-                <a:solidFill>
-                  <a:srgbClr val="FF0000"/>
-                </a:solidFill>
-              </a:rPr>
-              <a:t>-g  </a:t>
-            </a:r>
-            <a:r>
-              <a:rPr lang="en-US" dirty="0" smtClean="0">
-                <a:solidFill>
-                  <a:schemeClr val="accent2">
-                    <a:lumMod val="50000"/>
-                  </a:schemeClr>
-                </a:solidFill>
-              </a:rPr>
-              <a:t>-o  </a:t>
-            </a:r>
-            <a:r>
-              <a:rPr lang="en-US" dirty="0" err="1" smtClean="0">
-                <a:solidFill>
-                  <a:schemeClr val="accent2">
-                    <a:lumMod val="50000"/>
-                  </a:schemeClr>
-                </a:solidFill>
-              </a:rPr>
-              <a:t>my_program</a:t>
-            </a:r>
-            <a:r>
-              <a:rPr lang="en-US" dirty="0" smtClean="0">
-                <a:solidFill>
-                  <a:schemeClr val="accent2">
-                    <a:lumMod val="50000"/>
-                  </a:schemeClr>
-                </a:solidFill>
-              </a:rPr>
-              <a:t> </a:t>
-            </a:r>
-            <a:r>
-              <a:rPr lang="en-US" dirty="0" err="1" smtClean="0">
-                <a:solidFill>
-                  <a:schemeClr val="accent2">
-                    <a:lumMod val="50000"/>
-                  </a:schemeClr>
-                </a:solidFill>
-              </a:rPr>
-              <a:t>my_program.c</a:t>
-            </a:r>
-            <a:endParaRPr lang="en-US" dirty="0" smtClean="0">
-              <a:solidFill>
-                <a:schemeClr val="accent2">
-                  <a:lumMod val="50000"/>
-                </a:schemeClr>
-              </a:solidFill>
-            </a:endParaRPr>
-          </a:p>
-          <a:p>
-            <a:endParaRPr lang="en-US" dirty="0">
-              <a:solidFill>
-                <a:schemeClr val="accent2">
-                  <a:lumMod val="50000"/>
-                </a:schemeClr>
-              </a:solidFill>
-            </a:endParaRPr>
-          </a:p>
-          <a:p>
-            <a:r>
-              <a:rPr lang="en-US" dirty="0" smtClean="0">
-                <a:solidFill>
-                  <a:schemeClr val="accent2">
-                    <a:lumMod val="50000"/>
-                  </a:schemeClr>
-                </a:solidFill>
-              </a:rPr>
-              <a:t>Debugging for overflows</a:t>
-            </a:r>
-          </a:p>
-          <a:p>
-            <a:pPr lvl="1"/>
-            <a:r>
-              <a:rPr lang="en-US" dirty="0" smtClean="0">
-                <a:solidFill>
-                  <a:schemeClr val="accent2">
-                    <a:lumMod val="50000"/>
-                  </a:schemeClr>
-                </a:solidFill>
-              </a:rPr>
-              <a:t>break &lt;symbol&gt;</a:t>
-            </a:r>
-          </a:p>
-          <a:p>
-            <a:pPr lvl="2"/>
-            <a:r>
-              <a:rPr lang="en-US" dirty="0" smtClean="0">
-                <a:solidFill>
-                  <a:schemeClr val="accent2">
-                    <a:lumMod val="50000"/>
-                  </a:schemeClr>
-                </a:solidFill>
-              </a:rPr>
-              <a:t>Symbols include line number, function name, assembler label</a:t>
-            </a:r>
-          </a:p>
-          <a:p>
-            <a:pPr lvl="2"/>
-            <a:r>
-              <a:rPr lang="en-US" dirty="0">
-                <a:solidFill>
-                  <a:schemeClr val="accent2">
-                    <a:lumMod val="50000"/>
-                  </a:schemeClr>
-                </a:solidFill>
-              </a:rPr>
-              <a:t>C</a:t>
-            </a:r>
-            <a:r>
-              <a:rPr lang="en-US" dirty="0" smtClean="0">
-                <a:solidFill>
-                  <a:schemeClr val="accent2">
-                    <a:lumMod val="50000"/>
-                  </a:schemeClr>
-                </a:solidFill>
-              </a:rPr>
-              <a:t>ommand also mapped to character ‘b’</a:t>
-            </a:r>
-          </a:p>
-          <a:p>
-            <a:pPr lvl="2"/>
-            <a:endParaRPr lang="en-US" dirty="0">
-              <a:solidFill>
-                <a:schemeClr val="accent2">
-                  <a:lumMod val="50000"/>
-                </a:schemeClr>
-              </a:solidFill>
-            </a:endParaRPr>
-          </a:p>
-          <a:p>
-            <a:pPr lvl="2"/>
-            <a:endParaRPr lang="en-US" dirty="0" smtClean="0">
-              <a:solidFill>
-                <a:schemeClr val="accent2">
-                  <a:lumMod val="50000"/>
-                </a:schemeClr>
-              </a:solidFill>
-            </a:endParaRPr>
+              <a:t>execstack</a:t>
+            </a:r>
+            <a:endParaRPr lang="en-US" dirty="0" smtClean="0"/>
           </a:p>
         </p:txBody>
       </p:sp>
-      <p:pic>
-        <p:nvPicPr>
-          <p:cNvPr id="1026" name="Picture 2"/>
-          <p:cNvPicPr>
-            <a:picLocks noChangeAspect="1" noChangeArrowheads="1"/>
-          </p:cNvPicPr>
-          <p:nvPr/>
-        </p:nvPicPr>
-        <p:blipFill>
-          <a:blip r:embed="rId2">
-            <a:extLst>
-              <a:ext uri="{28A0092B-C50C-407E-A947-70E740481C1C}">
-                <a14:useLocalDpi xmlns:a14="http://schemas.microsoft.com/office/drawing/2010/main" val="0"/>
-              </a:ext>
-            </a:extLst>
-          </a:blip>
-          <a:srcRect/>
-          <a:stretch>
-            <a:fillRect/>
-          </a:stretch>
-        </p:blipFill>
-        <p:spPr bwMode="auto">
-          <a:xfrm>
-            <a:off x="817554" y="4343400"/>
-            <a:ext cx="7508893" cy="2362200"/>
-          </a:xfrm>
-          <a:prstGeom prst="rect">
-            <a:avLst/>
-          </a:prstGeom>
-          <a:noFill/>
-          <a:ln>
-            <a:noFill/>
-          </a:ln>
-          <a:effectLst/>
-          <a:extLst>
-            <a:ext uri="{909E8E84-426E-40DD-AFC4-6F175D3DCCD1}">
-              <a14:hiddenFill xmlns:a14="http://schemas.microsoft.com/office/drawing/2010/main">
-                <a:solidFill>
-                  <a:schemeClr val="accent1"/>
-                </a:solidFill>
-              </a14:hiddenFill>
-            </a:ext>
-            <a:ext uri="{91240B29-F687-4F45-9708-019B960494DF}">
-              <a14:hiddenLine xmlns:a14="http://schemas.microsoft.com/office/drawing/2010/main" w="9525">
-                <a:solidFill>
-                  <a:schemeClr val="tx1"/>
-                </a:solidFill>
-                <a:miter lim="800000"/>
-                <a:headEnd/>
-                <a:tailEnd/>
-              </a14:hiddenLine>
-            </a:ext>
-            <a:ext uri="{AF507438-7753-43E0-B8FC-AC1667EBCBE1}">
-              <a14:hiddenEffects xmlns:a14="http://schemas.microsoft.com/office/drawing/2010/main">
-                <a:effectLst>
-                  <a:outerShdw dist="35921" dir="2700000" algn="ctr" rotWithShape="0">
-                    <a:schemeClr val="bg2"/>
-                  </a:outerShdw>
-                </a:effectLst>
-              </a14:hiddenEffects>
-            </a:ext>
-          </a:extLst>
-        </p:spPr>
-      </p:pic>
     </p:spTree>
     <p:extLst>
       <p:ext uri="{BB962C8B-B14F-4D97-AF65-F5344CB8AC3E}">
-        <p14:creationId xmlns:p14="http://schemas.microsoft.com/office/powerpoint/2010/main" val="889830066"/>
+        <p14:creationId xmlns:p14="http://schemas.microsoft.com/office/powerpoint/2010/main" val="2226267564"/>
       </p:ext>
     </p:extLst>
   </p:cSld>
@@ -33594,34 +33543,34 @@
                   </a:schemeClr>
                 </a:solidFill>
               </a:rPr>
-              <a:t>info frame</a:t>
+              <a:t>break &lt;symbol&gt;</a:t>
             </a:r>
           </a:p>
           <a:p>
             <a:pPr lvl="2"/>
             <a:r>
-              <a:rPr lang="en-US" dirty="0">
+              <a:rPr lang="en-US" dirty="0" smtClean="0">
                 <a:solidFill>
                   <a:schemeClr val="accent2">
                     <a:lumMod val="50000"/>
                   </a:schemeClr>
                 </a:solidFill>
               </a:rPr>
-              <a:t>P</a:t>
-            </a:r>
-            <a:r>
-              <a:rPr lang="en-US" dirty="0" smtClean="0">
+              <a:t>Symbols include line number, function name, assembler label</a:t>
+            </a:r>
+          </a:p>
+          <a:p>
+            <a:pPr lvl="2"/>
+            <a:r>
+              <a:rPr lang="en-US" dirty="0">
                 <a:solidFill>
                   <a:schemeClr val="accent2">
                     <a:lumMod val="50000"/>
                   </a:schemeClr>
                 </a:solidFill>
               </a:rPr>
-              <a:t>rints everything the debugger knows about the current stack frame</a:t>
-            </a:r>
-          </a:p>
-          <a:p>
-            <a:pPr lvl="2"/>
+              <a:t>C</a:t>
+            </a:r>
             <a:r>
               <a:rPr lang="en-US" dirty="0" smtClean="0">
                 <a:solidFill>
@@ -33630,8 +33579,11 @@
                   </a:schemeClr>
                 </a:solidFill>
               </a:rPr>
-              <a:t>Program needs to be executing</a:t>
-            </a:r>
+              <a:t>ommand also mapped to character ‘b’</a:t>
+            </a:r>
+          </a:p>
+          <a:p>
+            <a:pPr lvl="2"/>
             <a:endParaRPr lang="en-US" dirty="0">
               <a:solidFill>
                 <a:schemeClr val="accent2">
@@ -33654,7 +33606,7 @@
       </p:sp>
       <p:pic>
         <p:nvPicPr>
-          <p:cNvPr id="2050" name="Picture 2"/>
+          <p:cNvPr id="1026" name="Picture 2"/>
           <p:cNvPicPr>
             <a:picLocks noChangeAspect="1" noChangeArrowheads="1"/>
           </p:cNvPicPr>
@@ -33675,8 +33627,8 @@
         </p:blipFill>
         <p:spPr bwMode="auto">
           <a:xfrm>
-            <a:off x="532776" y="4419600"/>
-            <a:ext cx="8078449" cy="2209800"/>
+            <a:off x="817554" y="4343400"/>
+            <a:ext cx="7508893" cy="2362200"/>
           </a:xfrm>
           <a:prstGeom prst="rect">
             <a:avLst/>
@@ -33719,7 +33671,7 @@
     </p:spTree>
     <p:extLst>
       <p:ext uri="{BB962C8B-B14F-4D97-AF65-F5344CB8AC3E}">
-        <p14:creationId xmlns:p14="http://schemas.microsoft.com/office/powerpoint/2010/main" val="2616460768"/>
+        <p14:creationId xmlns:p14="http://schemas.microsoft.com/office/powerpoint/2010/main" val="889830066"/>
       </p:ext>
     </p:extLst>
   </p:cSld>
@@ -33882,6 +33834,55 @@
               </a:rPr>
               <a:t>Debugging for overflows</a:t>
             </a:r>
+          </a:p>
+          <a:p>
+            <a:pPr lvl="1"/>
+            <a:r>
+              <a:rPr lang="en-US" dirty="0" smtClean="0">
+                <a:solidFill>
+                  <a:schemeClr val="accent2">
+                    <a:lumMod val="50000"/>
+                  </a:schemeClr>
+                </a:solidFill>
+              </a:rPr>
+              <a:t>info frame</a:t>
+            </a:r>
+          </a:p>
+          <a:p>
+            <a:pPr lvl="2"/>
+            <a:r>
+              <a:rPr lang="en-US" dirty="0">
+                <a:solidFill>
+                  <a:schemeClr val="accent2">
+                    <a:lumMod val="50000"/>
+                  </a:schemeClr>
+                </a:solidFill>
+              </a:rPr>
+              <a:t>P</a:t>
+            </a:r>
+            <a:r>
+              <a:rPr lang="en-US" dirty="0" smtClean="0">
+                <a:solidFill>
+                  <a:schemeClr val="accent2">
+                    <a:lumMod val="50000"/>
+                  </a:schemeClr>
+                </a:solidFill>
+              </a:rPr>
+              <a:t>rints everything the debugger knows about the current stack frame</a:t>
+            </a:r>
+          </a:p>
+          <a:p>
+            <a:pPr lvl="2"/>
+            <a:r>
+              <a:rPr lang="en-US" dirty="0" smtClean="0">
+                <a:solidFill>
+                  <a:schemeClr val="accent2">
+                    <a:lumMod val="50000"/>
+                  </a:schemeClr>
+                </a:solidFill>
+              </a:rPr>
+              <a:t>Program needs to be executing</a:t>
+            </a:r>
             <a:endParaRPr lang="en-US" dirty="0">
               <a:solidFill>
                 <a:schemeClr val="accent2">
@@ -33889,55 +33890,6 @@
                 </a:schemeClr>
               </a:solidFill>
             </a:endParaRPr>
-          </a:p>
-          <a:p>
-            <a:pPr lvl="1"/>
-            <a:r>
-              <a:rPr lang="en-US" dirty="0" smtClean="0">
-                <a:solidFill>
-                  <a:schemeClr val="accent2">
-                    <a:lumMod val="50000"/>
-                  </a:schemeClr>
-                </a:solidFill>
-              </a:rPr>
-              <a:t>print, x/x</a:t>
-            </a:r>
-          </a:p>
-          <a:p>
-            <a:pPr lvl="2"/>
-            <a:r>
-              <a:rPr lang="en-US" dirty="0">
-                <a:solidFill>
-                  <a:schemeClr val="accent2">
-                    <a:lumMod val="50000"/>
-                  </a:schemeClr>
-                </a:solidFill>
-              </a:rPr>
-              <a:t>P</a:t>
-            </a:r>
-            <a:r>
-              <a:rPr lang="en-US" dirty="0" smtClean="0">
-                <a:solidFill>
-                  <a:schemeClr val="accent2">
-                    <a:lumMod val="50000"/>
-                  </a:schemeClr>
-                </a:solidFill>
-              </a:rPr>
-              <a:t>rint the value of any symbol</a:t>
-            </a:r>
-          </a:p>
-          <a:p>
-            <a:pPr lvl="2"/>
-            <a:r>
-              <a:rPr lang="en-US" dirty="0" smtClean="0">
-                <a:solidFill>
-                  <a:schemeClr val="accent2">
-                    <a:lumMod val="50000"/>
-                  </a:schemeClr>
-                </a:solidFill>
-              </a:rPr>
-              <a:t>Incredibly powerful with options</a:t>
-            </a:r>
           </a:p>
           <a:p>
             <a:pPr lvl="2"/>
@@ -33953,7 +33905,7 @@
       </p:sp>
       <p:pic>
         <p:nvPicPr>
-          <p:cNvPr id="3074" name="Picture 2"/>
+          <p:cNvPr id="2050" name="Picture 2"/>
           <p:cNvPicPr>
             <a:picLocks noChangeAspect="1" noChangeArrowheads="1"/>
           </p:cNvPicPr>
@@ -33974,8 +33926,8 @@
         </p:blipFill>
         <p:spPr bwMode="auto">
           <a:xfrm>
-            <a:off x="885236" y="4343400"/>
-            <a:ext cx="7373529" cy="2390775"/>
+            <a:off x="532776" y="4419600"/>
+            <a:ext cx="8078449" cy="2209800"/>
           </a:xfrm>
           <a:prstGeom prst="rect">
             <a:avLst/>
@@ -34018,7 +33970,7 @@
     </p:spTree>
     <p:extLst>
       <p:ext uri="{BB962C8B-B14F-4D97-AF65-F5344CB8AC3E}">
-        <p14:creationId xmlns:p14="http://schemas.microsoft.com/office/powerpoint/2010/main" val="3352572252"/>
+        <p14:creationId xmlns:p14="http://schemas.microsoft.com/office/powerpoint/2010/main" val="2616460768"/>
       </p:ext>
     </p:extLst>
   </p:cSld>
@@ -34086,6 +34038,34 @@
           <a:lstStyle/>
           <a:p>
             <a:r>
+              <a:rPr lang="en-US" dirty="0" smtClean="0"/>
+              <a:t>Making your program </a:t>
+            </a:r>
+            <a:r>
+              <a:rPr lang="en-US" dirty="0" err="1" smtClean="0"/>
+              <a:t>debuggable</a:t>
+            </a:r>
+            <a:endParaRPr lang="en-US" dirty="0" smtClean="0"/>
+          </a:p>
+          <a:p>
+            <a:pPr lvl="1"/>
+            <a:r>
+              <a:rPr lang="en-US" dirty="0" err="1" smtClean="0"/>
+              <a:t>gcc</a:t>
+            </a:r>
+            <a:r>
+              <a:rPr lang="en-US" dirty="0" smtClean="0"/>
+              <a:t> </a:t>
+            </a:r>
+            <a:r>
+              <a:rPr lang="en-US" b="1" dirty="0" smtClean="0">
+                <a:solidFill>
+                  <a:srgbClr val="FF0000"/>
+                </a:solidFill>
+              </a:rPr>
+              <a:t>-g  </a:t>
+            </a:r>
+            <a:r>
               <a:rPr lang="en-US" dirty="0" smtClean="0">
                 <a:solidFill>
                   <a:schemeClr val="accent2">
@@ -34093,18 +34073,47 @@
                   </a:schemeClr>
                 </a:solidFill>
               </a:rPr>
-              <a:t>Debugging </a:t>
-            </a:r>
-            <a:r>
-              <a:rPr lang="en-US" dirty="0" smtClean="0">
+              <a:t>-o  </a:t>
+            </a:r>
+            <a:r>
+              <a:rPr lang="en-US" dirty="0" err="1" smtClean="0">
                 <a:solidFill>
                   <a:schemeClr val="accent2">
                     <a:lumMod val="50000"/>
                   </a:schemeClr>
                 </a:solidFill>
               </a:rPr>
-              <a:t>for overflows</a:t>
-            </a:r>
+              <a:t>my_program</a:t>
+            </a:r>
+            <a:r>
+              <a:rPr lang="en-US" dirty="0" smtClean="0">
+                <a:solidFill>
+                  <a:schemeClr val="accent2">
+                    <a:lumMod val="50000"/>
+                  </a:schemeClr>
+                </a:solidFill>
+              </a:rPr>
+              <a:t> </a:t>
+            </a:r>
+            <a:r>
+              <a:rPr lang="en-US" dirty="0" err="1" smtClean="0">
+                <a:solidFill>
+                  <a:schemeClr val="accent2">
+                    <a:lumMod val="50000"/>
+                  </a:schemeClr>
+                </a:solidFill>
+              </a:rPr>
+              <a:t>my_program.c</a:t>
+            </a:r>
+            <a:endParaRPr lang="en-US" dirty="0" smtClean="0">
+              <a:solidFill>
+                <a:schemeClr val="accent2">
+                  <a:lumMod val="50000"/>
+                </a:schemeClr>
+              </a:solidFill>
+            </a:endParaRPr>
+          </a:p>
+          <a:p>
             <a:endParaRPr lang="en-US" dirty="0">
               <a:solidFill>
                 <a:schemeClr val="accent2">
@@ -34114,7 +34123,6 @@
             </a:endParaRPr>
           </a:p>
           <a:p>
-            <a:pPr lvl="1"/>
             <a:r>
               <a:rPr lang="en-US" dirty="0" smtClean="0">
                 <a:solidFill>
@@ -34123,31 +34131,67 @@
                   </a:schemeClr>
                 </a:solidFill>
               </a:rPr>
-              <a:t>disassemble &lt;symbol&gt;</a:t>
-            </a:r>
-          </a:p>
-          <a:p>
-            <a:pPr lvl="2"/>
-            <a:r>
-              <a:rPr lang="en-US" dirty="0">
+              <a:t>Debugging for overflows</a:t>
+            </a:r>
+            <a:endParaRPr lang="en-US" dirty="0">
+              <a:solidFill>
+                <a:schemeClr val="accent2">
+                  <a:lumMod val="50000"/>
+                </a:schemeClr>
+              </a:solidFill>
+            </a:endParaRPr>
+          </a:p>
+          <a:p>
+            <a:pPr lvl="1"/>
+            <a:r>
+              <a:rPr lang="en-US" dirty="0" smtClean="0">
                 <a:solidFill>
                   <a:schemeClr val="accent2">
                     <a:lumMod val="50000"/>
                   </a:schemeClr>
                 </a:solidFill>
               </a:rPr>
-              <a:t>D</a:t>
-            </a:r>
-            <a:r>
-              <a:rPr lang="en-US" dirty="0" smtClean="0">
+              <a:t>print, x/x</a:t>
+            </a:r>
+          </a:p>
+          <a:p>
+            <a:pPr lvl="2"/>
+            <a:r>
+              <a:rPr lang="en-US" dirty="0">
                 <a:solidFill>
                   <a:schemeClr val="accent2">
                     <a:lumMod val="50000"/>
                   </a:schemeClr>
                 </a:solidFill>
               </a:rPr>
-              <a:t>umps the disassembly for a symbol</a:t>
-            </a:r>
+              <a:t>P</a:t>
+            </a:r>
+            <a:r>
+              <a:rPr lang="en-US" dirty="0" smtClean="0">
+                <a:solidFill>
+                  <a:schemeClr val="accent2">
+                    <a:lumMod val="50000"/>
+                  </a:schemeClr>
+                </a:solidFill>
+              </a:rPr>
+              <a:t>rint the value of any symbol</a:t>
+            </a:r>
+          </a:p>
+          <a:p>
+            <a:pPr lvl="2"/>
+            <a:r>
+              <a:rPr lang="en-US" dirty="0" smtClean="0">
+                <a:solidFill>
+                  <a:schemeClr val="accent2">
+                    <a:lumMod val="50000"/>
+                  </a:schemeClr>
+                </a:solidFill>
+              </a:rPr>
+              <a:t>Incredibly powerful with options</a:t>
+            </a:r>
+          </a:p>
+          <a:p>
+            <a:pPr lvl="2"/>
             <a:endParaRPr lang="en-US" dirty="0" smtClean="0">
               <a:solidFill>
                 <a:schemeClr val="accent2">
@@ -34155,6 +34199,196 @@
                 </a:schemeClr>
               </a:solidFill>
             </a:endParaRPr>
+          </a:p>
+        </p:txBody>
+      </p:sp>
+      <p:pic>
+        <p:nvPicPr>
+          <p:cNvPr id="3074" name="Picture 2"/>
+          <p:cNvPicPr>
+            <a:picLocks noChangeAspect="1" noChangeArrowheads="1"/>
+          </p:cNvPicPr>
+          <p:nvPr/>
+        </p:nvPicPr>
+        <p:blipFill>
+          <a:blip r:embed="rId2">
+            <a:extLst>
+              <a:ext uri="{28A0092B-C50C-407E-A947-70E740481C1C}">
+                <a14:useLocalDpi xmlns:a14="http://schemas.microsoft.com/office/drawing/2010/main" val="0"/>
+              </a:ext>
+            </a:extLst>
+          </a:blip>
+          <a:srcRect/>
+          <a:stretch>
+            <a:fillRect/>
+          </a:stretch>
+        </p:blipFill>
+        <p:spPr bwMode="auto">
+          <a:xfrm>
+            <a:off x="885236" y="4343400"/>
+            <a:ext cx="7373529" cy="2390775"/>
+          </a:xfrm>
+          <a:prstGeom prst="rect">
+            <a:avLst/>
+          </a:prstGeom>
+          <a:noFill/>
+          <a:ln>
+            <a:noFill/>
+          </a:ln>
+          <a:effectLst/>
+          <a:extLst>
+            <a:ext uri="{909E8E84-426E-40DD-AFC4-6F175D3DCCD1}">
+              <a14:hiddenFill xmlns:a14="http://schemas.microsoft.com/office/drawing/2010/main">
+                <a:solidFill>
+                  <a:schemeClr val="accent1"/>
+                </a:solidFill>
+              </a14:hiddenFill>
+            </a:ext>
+            <a:ext uri="{91240B29-F687-4F45-9708-019B960494DF}">
+              <a14:hiddenLine xmlns:a14="http://schemas.microsoft.com/office/drawing/2010/main" w="9525">
+                <a:solidFill>
+                  <a:schemeClr val="tx1"/>
+                </a:solidFill>
+                <a:miter lim="800000"/>
+                <a:headEnd/>
+                <a:tailEnd/>
+              </a14:hiddenLine>
+            </a:ext>
+            <a:ext uri="{AF507438-7753-43E0-B8FC-AC1667EBCBE1}">
+              <a14:hiddenEffects xmlns:a14="http://schemas.microsoft.com/office/drawing/2010/main">
+                <a:effectLst>
+                  <a:outerShdw dist="35921" dir="2700000" algn="ctr" rotWithShape="0">
+                    <a:schemeClr val="bg2"/>
+                  </a:outerShdw>
+                </a:effectLst>
+              </a14:hiddenEffects>
+            </a:ext>
+          </a:extLst>
+        </p:spPr>
+      </p:pic>
+    </p:spTree>
+    <p:extLst>
+      <p:ext uri="{BB962C8B-B14F-4D97-AF65-F5344CB8AC3E}">
+        <p14:creationId xmlns:p14="http://schemas.microsoft.com/office/powerpoint/2010/main" val="3352572252"/>
+      </p:ext>
+    </p:extLst>
+  </p:cSld>
+  <p:clrMapOvr>
+    <a:masterClrMapping/>
+  </p:clrMapOvr>
+</p:sld>
+</file>
+
+<file path=ppt/slides/slide35.xml><?xml version="1.0" encoding="utf-8"?>
+<p:sld xmlns:a="http://schemas.openxmlformats.org/drawingml/2006/main" xmlns:r="http://schemas.openxmlformats.org/officeDocument/2006/relationships" xmlns:p="http://schemas.openxmlformats.org/presentationml/2006/main">
+  <p:cSld>
+    <p:spTree>
+      <p:nvGrpSpPr>
+        <p:cNvPr id="1" name=""/>
+        <p:cNvGrpSpPr/>
+        <p:nvPr/>
+      </p:nvGrpSpPr>
+      <p:grpSpPr>
+        <a:xfrm>
+          <a:off x="0" y="0"/>
+          <a:ext cx="0" cy="0"/>
+          <a:chOff x="0" y="0"/>
+          <a:chExt cx="0" cy="0"/>
+        </a:xfrm>
+      </p:grpSpPr>
+      <p:sp>
+        <p:nvSpPr>
+          <p:cNvPr id="2" name="Title 1"/>
+          <p:cNvSpPr>
+            <a:spLocks noGrp="1"/>
+          </p:cNvSpPr>
+          <p:nvPr>
+            <p:ph type="title"/>
+          </p:nvPr>
+        </p:nvSpPr>
+        <p:spPr/>
+        <p:txBody>
+          <a:bodyPr>
+            <a:normAutofit/>
+          </a:bodyPr>
+          <a:lstStyle/>
+          <a:p>
+            <a:r>
+              <a:rPr lang="en-US" dirty="0" smtClean="0"/>
+              <a:t>GCC &amp; GDB</a:t>
+            </a:r>
+            <a:endParaRPr lang="en-US" dirty="0"/>
+          </a:p>
+        </p:txBody>
+      </p:sp>
+      <p:sp>
+        <p:nvSpPr>
+          <p:cNvPr id="3" name="Content Placeholder 2"/>
+          <p:cNvSpPr>
+            <a:spLocks noGrp="1"/>
+          </p:cNvSpPr>
+          <p:nvPr>
+            <p:ph idx="1"/>
+          </p:nvPr>
+        </p:nvSpPr>
+        <p:spPr/>
+        <p:txBody>
+          <a:bodyPr/>
+          <a:lstStyle/>
+          <a:p>
+            <a:r>
+              <a:rPr lang="en-US" dirty="0" smtClean="0">
+                <a:solidFill>
+                  <a:schemeClr val="accent2">
+                    <a:lumMod val="50000"/>
+                  </a:schemeClr>
+                </a:solidFill>
+              </a:rPr>
+              <a:t>Debugging for overflows</a:t>
+            </a:r>
+            <a:endParaRPr lang="en-US" dirty="0">
+              <a:solidFill>
+                <a:schemeClr val="accent2">
+                  <a:lumMod val="50000"/>
+                </a:schemeClr>
+              </a:solidFill>
+            </a:endParaRPr>
+          </a:p>
+          <a:p>
+            <a:pPr lvl="1"/>
+            <a:r>
+              <a:rPr lang="en-US" dirty="0" smtClean="0">
+                <a:solidFill>
+                  <a:schemeClr val="accent2">
+                    <a:lumMod val="50000"/>
+                  </a:schemeClr>
+                </a:solidFill>
+              </a:rPr>
+              <a:t>disassemble &lt;symbol&gt;</a:t>
+            </a:r>
+          </a:p>
+          <a:p>
+            <a:pPr lvl="2"/>
+            <a:r>
+              <a:rPr lang="en-US" dirty="0">
+                <a:solidFill>
+                  <a:schemeClr val="accent2">
+                    <a:lumMod val="50000"/>
+                  </a:schemeClr>
+                </a:solidFill>
+              </a:rPr>
+              <a:t>D</a:t>
+            </a:r>
+            <a:r>
+              <a:rPr lang="en-US" dirty="0" smtClean="0">
+                <a:solidFill>
+                  <a:schemeClr val="accent2">
+                    <a:lumMod val="50000"/>
+                  </a:schemeClr>
+                </a:solidFill>
+              </a:rPr>
+              <a:t>umps the disassembly for a symbol</a:t>
+            </a:r>
           </a:p>
           <a:p>
             <a:pPr lvl="2"/>
@@ -34236,147 +34470,6 @@
     <p:extLst>
       <p:ext uri="{BB962C8B-B14F-4D97-AF65-F5344CB8AC3E}">
         <p14:creationId xmlns:p14="http://schemas.microsoft.com/office/powerpoint/2010/main" val="778398437"/>
-      </p:ext>
-    </p:extLst>
-  </p:cSld>
-  <p:clrMapOvr>
-    <a:masterClrMapping/>
-  </p:clrMapOvr>
-</p:sld>
-</file>
-
-<file path=ppt/slides/slide35.xml><?xml version="1.0" encoding="utf-8"?>
-<p:sld xmlns:a="http://schemas.openxmlformats.org/drawingml/2006/main" xmlns:r="http://schemas.openxmlformats.org/officeDocument/2006/relationships" xmlns:p="http://schemas.openxmlformats.org/presentationml/2006/main">
-  <p:cSld>
-    <p:spTree>
-      <p:nvGrpSpPr>
-        <p:cNvPr id="1" name=""/>
-        <p:cNvGrpSpPr/>
-        <p:nvPr/>
-      </p:nvGrpSpPr>
-      <p:grpSpPr>
-        <a:xfrm>
-          <a:off x="0" y="0"/>
-          <a:ext cx="0" cy="0"/>
-          <a:chOff x="0" y="0"/>
-          <a:chExt cx="0" cy="0"/>
-        </a:xfrm>
-      </p:grpSpPr>
-      <p:sp>
-        <p:nvSpPr>
-          <p:cNvPr id="2" name="Title 1"/>
-          <p:cNvSpPr>
-            <a:spLocks noGrp="1"/>
-          </p:cNvSpPr>
-          <p:nvPr>
-            <p:ph type="title"/>
-          </p:nvPr>
-        </p:nvSpPr>
-        <p:spPr/>
-        <p:txBody>
-          <a:bodyPr/>
-          <a:lstStyle/>
-          <a:p>
-            <a:r>
-              <a:rPr lang="en-US" dirty="0" err="1" smtClean="0"/>
-              <a:t>Shellcoding</a:t>
-            </a:r>
-            <a:endParaRPr lang="en-US" dirty="0"/>
-          </a:p>
-        </p:txBody>
-      </p:sp>
-      <p:sp>
-        <p:nvSpPr>
-          <p:cNvPr id="3" name="Content Placeholder 2"/>
-          <p:cNvSpPr>
-            <a:spLocks noGrp="1"/>
-          </p:cNvSpPr>
-          <p:nvPr>
-            <p:ph idx="1"/>
-          </p:nvPr>
-        </p:nvSpPr>
-        <p:spPr/>
-        <p:txBody>
-          <a:bodyPr>
-            <a:normAutofit/>
-          </a:bodyPr>
-          <a:lstStyle/>
-          <a:p>
-            <a:r>
-              <a:rPr lang="en-US" dirty="0" smtClean="0"/>
-              <a:t>Find a solid assembly base (unless you want to write it all yourself…)</a:t>
-            </a:r>
-          </a:p>
-          <a:p>
-            <a:r>
-              <a:rPr lang="en-US" dirty="0" smtClean="0"/>
-              <a:t>Find your system call memory addresses with </a:t>
-            </a:r>
-            <a:r>
-              <a:rPr lang="en-US" dirty="0" err="1" smtClean="0"/>
-              <a:t>arwin</a:t>
-            </a:r>
-            <a:endParaRPr lang="en-US" dirty="0" smtClean="0"/>
-          </a:p>
-          <a:p>
-            <a:r>
-              <a:rPr lang="en-US" dirty="0" smtClean="0"/>
-              <a:t>Decide what you want to do</a:t>
-            </a:r>
-          </a:p>
-          <a:p>
-            <a:r>
-              <a:rPr lang="en-US" dirty="0" err="1" smtClean="0"/>
-              <a:t>nasm</a:t>
-            </a:r>
-            <a:r>
-              <a:rPr lang="en-US" dirty="0" smtClean="0"/>
-              <a:t> into </a:t>
-            </a:r>
-            <a:r>
-              <a:rPr lang="en-US" dirty="0" err="1" smtClean="0"/>
-              <a:t>bytecode</a:t>
-            </a:r>
-            <a:endParaRPr lang="en-US" dirty="0" smtClean="0"/>
-          </a:p>
-          <a:p>
-            <a:r>
-              <a:rPr lang="en-US" dirty="0" err="1" smtClean="0"/>
-              <a:t>Objdump</a:t>
-            </a:r>
-            <a:r>
-              <a:rPr lang="en-US" dirty="0" smtClean="0"/>
-              <a:t> to get the </a:t>
-            </a:r>
-            <a:r>
-              <a:rPr lang="en-US" dirty="0" err="1" smtClean="0"/>
-              <a:t>bytecode</a:t>
-            </a:r>
-            <a:r>
-              <a:rPr lang="en-US" dirty="0" smtClean="0"/>
-              <a:t> in text format</a:t>
-            </a:r>
-          </a:p>
-          <a:p>
-            <a:r>
-              <a:rPr lang="en-US" dirty="0" smtClean="0"/>
-              <a:t>Determine big-endian or little-endian (this is </a:t>
-            </a:r>
-            <a:r>
-              <a:rPr lang="en-US" smtClean="0"/>
-              <a:t>where that matters)</a:t>
-            </a:r>
-            <a:endParaRPr lang="en-US" dirty="0" smtClean="0"/>
-          </a:p>
-          <a:p>
-            <a:endParaRPr lang="en-US" dirty="0"/>
-          </a:p>
-        </p:txBody>
-      </p:sp>
-    </p:spTree>
-    <p:extLst>
-      <p:ext uri="{BB962C8B-B14F-4D97-AF65-F5344CB8AC3E}">
-        <p14:creationId xmlns:p14="http://schemas.microsoft.com/office/powerpoint/2010/main" val="1144610127"/>
       </p:ext>
     </p:extLst>
   </p:cSld>
@@ -34419,8 +34512,149 @@
           <a:lstStyle/>
           <a:p>
             <a:r>
+              <a:rPr lang="en-US" dirty="0" err="1" smtClean="0"/>
+              <a:t>Shellcoding</a:t>
+            </a:r>
+            <a:endParaRPr lang="en-US" dirty="0"/>
+          </a:p>
+        </p:txBody>
+      </p:sp>
+      <p:sp>
+        <p:nvSpPr>
+          <p:cNvPr id="3" name="Content Placeholder 2"/>
+          <p:cNvSpPr>
+            <a:spLocks noGrp="1"/>
+          </p:cNvSpPr>
+          <p:nvPr>
+            <p:ph idx="1"/>
+          </p:nvPr>
+        </p:nvSpPr>
+        <p:spPr/>
+        <p:txBody>
+          <a:bodyPr>
+            <a:normAutofit/>
+          </a:bodyPr>
+          <a:lstStyle/>
+          <a:p>
+            <a:r>
               <a:rPr lang="en-US" dirty="0" smtClean="0"/>
-              <a:t>Assembly</a:t>
+              <a:t>Find a solid assembly base (unless you want to write it all yourself…)</a:t>
+            </a:r>
+          </a:p>
+          <a:p>
+            <a:r>
+              <a:rPr lang="en-US" dirty="0" smtClean="0"/>
+              <a:t>Find your system call memory addresses with </a:t>
+            </a:r>
+            <a:r>
+              <a:rPr lang="en-US" dirty="0" err="1" smtClean="0"/>
+              <a:t>arwin</a:t>
+            </a:r>
+            <a:endParaRPr lang="en-US" dirty="0" smtClean="0"/>
+          </a:p>
+          <a:p>
+            <a:r>
+              <a:rPr lang="en-US" dirty="0" smtClean="0"/>
+              <a:t>Decide what you want to do</a:t>
+            </a:r>
+          </a:p>
+          <a:p>
+            <a:r>
+              <a:rPr lang="en-US" dirty="0" err="1" smtClean="0"/>
+              <a:t>nasm</a:t>
+            </a:r>
+            <a:r>
+              <a:rPr lang="en-US" dirty="0" smtClean="0"/>
+              <a:t> into </a:t>
+            </a:r>
+            <a:r>
+              <a:rPr lang="en-US" dirty="0" err="1" smtClean="0"/>
+              <a:t>bytecode</a:t>
+            </a:r>
+            <a:endParaRPr lang="en-US" dirty="0" smtClean="0"/>
+          </a:p>
+          <a:p>
+            <a:r>
+              <a:rPr lang="en-US" dirty="0" err="1" smtClean="0"/>
+              <a:t>Objdump</a:t>
+            </a:r>
+            <a:r>
+              <a:rPr lang="en-US" dirty="0" smtClean="0"/>
+              <a:t> to get the </a:t>
+            </a:r>
+            <a:r>
+              <a:rPr lang="en-US" dirty="0" err="1" smtClean="0"/>
+              <a:t>bytecode</a:t>
+            </a:r>
+            <a:r>
+              <a:rPr lang="en-US" dirty="0" smtClean="0"/>
+              <a:t> in text format</a:t>
+            </a:r>
+          </a:p>
+          <a:p>
+            <a:r>
+              <a:rPr lang="en-US" dirty="0" smtClean="0"/>
+              <a:t>Determine big-endian or little-endian (this is </a:t>
+            </a:r>
+            <a:r>
+              <a:rPr lang="en-US" smtClean="0"/>
+              <a:t>where that matters)</a:t>
+            </a:r>
+            <a:endParaRPr lang="en-US" dirty="0" smtClean="0"/>
+          </a:p>
+          <a:p>
+            <a:endParaRPr lang="en-US" dirty="0"/>
+          </a:p>
+        </p:txBody>
+      </p:sp>
+    </p:spTree>
+    <p:extLst>
+      <p:ext uri="{BB962C8B-B14F-4D97-AF65-F5344CB8AC3E}">
+        <p14:creationId xmlns:p14="http://schemas.microsoft.com/office/powerpoint/2010/main" val="1144610127"/>
+      </p:ext>
+    </p:extLst>
+  </p:cSld>
+  <p:clrMapOvr>
+    <a:masterClrMapping/>
+  </p:clrMapOvr>
+</p:sld>
+</file>
+
+<file path=ppt/slides/slide37.xml><?xml version="1.0" encoding="utf-8"?>
+<p:sld xmlns:a="http://schemas.openxmlformats.org/drawingml/2006/main" xmlns:r="http://schemas.openxmlformats.org/officeDocument/2006/relationships" xmlns:p="http://schemas.openxmlformats.org/presentationml/2006/main">
+  <p:cSld>
+    <p:spTree>
+      <p:nvGrpSpPr>
+        <p:cNvPr id="1" name=""/>
+        <p:cNvGrpSpPr/>
+        <p:nvPr/>
+      </p:nvGrpSpPr>
+      <p:grpSpPr>
+        <a:xfrm>
+          <a:off x="0" y="0"/>
+          <a:ext cx="0" cy="0"/>
+          <a:chOff x="0" y="0"/>
+          <a:chExt cx="0" cy="0"/>
+        </a:xfrm>
+      </p:grpSpPr>
+      <p:sp>
+        <p:nvSpPr>
+          <p:cNvPr id="2" name="Title 1"/>
+          <p:cNvSpPr>
+            <a:spLocks noGrp="1"/>
+          </p:cNvSpPr>
+          <p:nvPr>
+            <p:ph type="title"/>
+          </p:nvPr>
+        </p:nvSpPr>
+        <p:spPr/>
+        <p:txBody>
+          <a:bodyPr/>
+          <a:lstStyle/>
+          <a:p>
+            <a:r>
+              <a:rPr lang="en-US" dirty="0" smtClean="0"/>
+              <a:t>Assembly (Intel x86)</a:t>
             </a:r>
             <a:endParaRPr lang="en-US" dirty="0"/>
           </a:p>
@@ -34569,10 +34803,10 @@
               <a:t>empties out </a:t>
             </a:r>
             <a:r>
-              <a:rPr lang="en-US" sz="1400" dirty="0" err="1"/>
+              <a:rPr lang="en-US" sz="1400" dirty="0" err="1" smtClean="0"/>
               <a:t>eax</a:t>
             </a:r>
-            <a:endParaRPr lang="en-US" sz="1400" dirty="0"/>
+            <a:endParaRPr lang="en-US" sz="1400" dirty="0" smtClean="0"/>
           </a:p>
           <a:p>
             <a:pPr marL="0" indent="0">
@@ -34580,6 +34814,56 @@
             </a:pPr>
             <a:r>
               <a:rPr lang="en-US" sz="1400" dirty="0"/>
+              <a:t>  </a:t>
+            </a:r>
+            <a:r>
+              <a:rPr lang="en-US" sz="1400" dirty="0" smtClean="0"/>
+              <a:t>  </a:t>
+            </a:r>
+            <a:r>
+              <a:rPr lang="en-US" sz="1400" dirty="0" err="1" smtClean="0"/>
+              <a:t>mov</a:t>
+            </a:r>
+            <a:r>
+              <a:rPr lang="en-US" sz="1400" dirty="0" smtClean="0"/>
+              <a:t> </a:t>
+            </a:r>
+            <a:r>
+              <a:rPr lang="en-US" sz="1400" dirty="0"/>
+              <a:t>[</a:t>
+            </a:r>
+            <a:r>
+              <a:rPr lang="en-US" sz="1400" dirty="0" err="1"/>
+              <a:t>ebx</a:t>
+            </a:r>
+            <a:r>
+              <a:rPr lang="en-US" sz="1400" dirty="0"/>
+              <a:t> + </a:t>
+            </a:r>
+            <a:r>
+              <a:rPr lang="en-US" sz="1400" dirty="0" smtClean="0"/>
+              <a:t>7],</a:t>
+            </a:r>
+            <a:r>
+              <a:rPr lang="en-US" sz="1400" dirty="0"/>
+              <a:t>al  </a:t>
+            </a:r>
+            <a:r>
+              <a:rPr lang="en-US" sz="1400" dirty="0" smtClean="0"/>
+              <a:t>        ;insert </a:t>
+            </a:r>
+            <a:r>
+              <a:rPr lang="en-US" sz="1400" dirty="0"/>
+              <a:t>the NULL character</a:t>
+            </a:r>
+            <a:endParaRPr lang="en-US" sz="1400" dirty="0"/>
+          </a:p>
+          <a:p>
+            <a:pPr marL="0" indent="0">
+              <a:buNone/>
+            </a:pPr>
+            <a:r>
+              <a:rPr lang="en-US" sz="1400" dirty="0"/>
               <a:t>    push </a:t>
             </a:r>
             <a:r>
@@ -34596,8 +34880,13 @@
             </a:r>
             <a:r>
               <a:rPr lang="en-US" sz="1400" dirty="0"/>
-              <a:t>push null onto stack as empty parameter value</a:t>
-            </a:r>
+              <a:t>push null onto stack as empty parameter </a:t>
+            </a:r>
+            <a:r>
+              <a:rPr lang="en-US" sz="1400" dirty="0" smtClean="0"/>
+              <a:t>value</a:t>
+            </a:r>
+            <a:endParaRPr lang="en-US" sz="1400" dirty="0"/>
           </a:p>
           <a:p>
             <a:pPr marL="0" indent="0">
@@ -34924,7 +35213,15 @@
             </a:r>
             <a:r>
               <a:rPr lang="en-US" sz="1400" dirty="0"/>
-              <a:t> "calc.exe" </a:t>
+              <a:t> "</a:t>
+            </a:r>
+            <a:r>
+              <a:rPr lang="en-US" sz="1400" dirty="0" err="1" smtClean="0"/>
+              <a:t>cmd.exeN</a:t>
+            </a:r>
+            <a:r>
+              <a:rPr lang="en-US" sz="1400" dirty="0" smtClean="0"/>
+              <a:t>" </a:t>
             </a:r>
             <a:r>
               <a:rPr lang="en-US" sz="1400" dirty="0" smtClean="0"/>
@@ -34940,33 +35237,13 @@
             </a:r>
             <a:r>
               <a:rPr lang="en-US" sz="1400" dirty="0"/>
-              <a:t> that represent our string.</a:t>
-            </a:r>
-          </a:p>
-          <a:p>
-            <a:pPr marL="0" indent="0">
-              <a:buNone/>
-            </a:pPr>
-            <a:r>
-              <a:rPr lang="en-US" sz="1400" dirty="0"/>
-              <a:t>    </a:t>
-            </a:r>
-            <a:r>
-              <a:rPr lang="en-US" sz="1400" dirty="0" err="1"/>
-              <a:t>db</a:t>
-            </a:r>
-            <a:r>
-              <a:rPr lang="en-US" sz="1400" dirty="0"/>
-              <a:t> 0x00 </a:t>
+              <a:t> that represent our string</a:t>
             </a:r>
             <a:r>
               <a:rPr lang="en-US" sz="1400" dirty="0" smtClean="0"/>
-              <a:t>		;</a:t>
-            </a:r>
-            <a:r>
-              <a:rPr lang="en-US" sz="1400" dirty="0"/>
-              <a:t>Terminate our string with a null character.</a:t>
-            </a:r>
+              <a:t>.</a:t>
+            </a:r>
+            <a:endParaRPr lang="en-US" sz="1400" dirty="0"/>
           </a:p>
         </p:txBody>
       </p:sp>

</xml_diff>

<commit_message>
updating a couple slides in the presentation
</commit_message>
<xml_diff>
--- a/Buffer Overflow Attacks.pptx
+++ b/Buffer Overflow Attacks.pptx
@@ -5,7 +5,7 @@
     <p:sldMasterId id="2147483672" r:id="rId1"/>
   </p:sldMasterIdLst>
   <p:notesMasterIdLst>
-    <p:notesMasterId r:id="rId39"/>
+    <p:notesMasterId r:id="rId42"/>
   </p:notesMasterIdLst>
   <p:sldIdLst>
     <p:sldId id="256" r:id="rId2"/>
@@ -38,13 +38,16 @@
     <p:sldId id="282" r:id="rId29"/>
     <p:sldId id="283" r:id="rId30"/>
     <p:sldId id="284" r:id="rId31"/>
-    <p:sldId id="305" r:id="rId32"/>
-    <p:sldId id="306" r:id="rId33"/>
-    <p:sldId id="307" r:id="rId34"/>
-    <p:sldId id="308" r:id="rId35"/>
-    <p:sldId id="309" r:id="rId36"/>
-    <p:sldId id="285" r:id="rId37"/>
-    <p:sldId id="286" r:id="rId38"/>
+    <p:sldId id="312" r:id="rId32"/>
+    <p:sldId id="313" r:id="rId33"/>
+    <p:sldId id="305" r:id="rId34"/>
+    <p:sldId id="306" r:id="rId35"/>
+    <p:sldId id="307" r:id="rId36"/>
+    <p:sldId id="308" r:id="rId37"/>
+    <p:sldId id="309" r:id="rId38"/>
+    <p:sldId id="285" r:id="rId39"/>
+    <p:sldId id="286" r:id="rId40"/>
+    <p:sldId id="314" r:id="rId41"/>
   </p:sldIdLst>
   <p:sldSz cx="9144000" cy="6858000" type="screen4x3"/>
   <p:notesSz cx="6858000" cy="9144000"/>
@@ -182,6 +185,8 @@
             <p14:sldId id="282"/>
             <p14:sldId id="283"/>
             <p14:sldId id="284"/>
+            <p14:sldId id="312"/>
+            <p14:sldId id="313"/>
             <p14:sldId id="305"/>
             <p14:sldId id="306"/>
             <p14:sldId id="307"/>
@@ -189,6 +194,7 @@
             <p14:sldId id="309"/>
             <p14:sldId id="285"/>
             <p14:sldId id="286"/>
+            <p14:sldId id="314"/>
           </p14:sldIdLst>
         </p14:section>
       </p14:sectionLst>
@@ -279,7 +285,7 @@
           <a:p>
             <a:fld id="{9DED5714-D740-4F89-AAD5-E3BC8B06EDCA}" type="datetimeFigureOut">
               <a:rPr lang="en-US" smtClean="0"/>
-              <a:t>4/16/2012</a:t>
+              <a:t>4/18/2012</a:t>
             </a:fld>
             <a:endParaRPr lang="en-US"/>
           </a:p>
@@ -7565,7 +7571,7 @@
           <a:p>
             <a:fld id="{FB76FE03-F4FF-4405-A4BA-F447F9618E72}" type="datetimeFigureOut">
               <a:rPr lang="en-US" smtClean="0"/>
-              <a:t>4/16/2012</a:t>
+              <a:t>4/18/2012</a:t>
             </a:fld>
             <a:endParaRPr lang="en-US"/>
           </a:p>
@@ -7830,7 +7836,7 @@
           <a:p>
             <a:fld id="{FB76FE03-F4FF-4405-A4BA-F447F9618E72}" type="datetimeFigureOut">
               <a:rPr lang="en-US" smtClean="0"/>
-              <a:t>4/16/2012</a:t>
+              <a:t>4/18/2012</a:t>
             </a:fld>
             <a:endParaRPr lang="en-US"/>
           </a:p>
@@ -8104,7 +8110,7 @@
           <a:p>
             <a:fld id="{FB76FE03-F4FF-4405-A4BA-F447F9618E72}" type="datetimeFigureOut">
               <a:rPr lang="en-US" smtClean="0"/>
-              <a:t>4/16/2012</a:t>
+              <a:t>4/18/2012</a:t>
             </a:fld>
             <a:endParaRPr lang="en-US"/>
           </a:p>
@@ -8321,7 +8327,7 @@
           <a:p>
             <a:fld id="{FB76FE03-F4FF-4405-A4BA-F447F9618E72}" type="datetimeFigureOut">
               <a:rPr lang="en-US" smtClean="0"/>
-              <a:t>4/16/2012</a:t>
+              <a:t>4/18/2012</a:t>
             </a:fld>
             <a:endParaRPr lang="en-US"/>
           </a:p>
@@ -8708,7 +8714,7 @@
           <a:p>
             <a:fld id="{FB76FE03-F4FF-4405-A4BA-F447F9618E72}" type="datetimeFigureOut">
               <a:rPr lang="en-US" smtClean="0"/>
-              <a:t>4/16/2012</a:t>
+              <a:t>4/18/2012</a:t>
             </a:fld>
             <a:endParaRPr lang="en-US"/>
           </a:p>
@@ -9089,7 +9095,7 @@
           <a:p>
             <a:fld id="{FB76FE03-F4FF-4405-A4BA-F447F9618E72}" type="datetimeFigureOut">
               <a:rPr lang="en-US" smtClean="0"/>
-              <a:t>4/16/2012</a:t>
+              <a:t>4/18/2012</a:t>
             </a:fld>
             <a:endParaRPr lang="en-US"/>
           </a:p>
@@ -9506,7 +9512,7 @@
           <a:p>
             <a:fld id="{FB76FE03-F4FF-4405-A4BA-F447F9618E72}" type="datetimeFigureOut">
               <a:rPr lang="en-US" smtClean="0"/>
-              <a:t>4/16/2012</a:t>
+              <a:t>4/18/2012</a:t>
             </a:fld>
             <a:endParaRPr lang="en-US"/>
           </a:p>
@@ -9619,7 +9625,7 @@
           <a:p>
             <a:fld id="{FB76FE03-F4FF-4405-A4BA-F447F9618E72}" type="datetimeFigureOut">
               <a:rPr lang="en-US" smtClean="0"/>
-              <a:t>4/16/2012</a:t>
+              <a:t>4/18/2012</a:t>
             </a:fld>
             <a:endParaRPr lang="en-US"/>
           </a:p>
@@ -9709,7 +9715,7 @@
           <a:p>
             <a:fld id="{FB76FE03-F4FF-4405-A4BA-F447F9618E72}" type="datetimeFigureOut">
               <a:rPr lang="en-US" smtClean="0"/>
-              <a:t>4/16/2012</a:t>
+              <a:t>4/18/2012</a:t>
             </a:fld>
             <a:endParaRPr lang="en-US"/>
           </a:p>
@@ -9918,7 +9924,7 @@
           <a:p>
             <a:fld id="{FB76FE03-F4FF-4405-A4BA-F447F9618E72}" type="datetimeFigureOut">
               <a:rPr lang="en-US" smtClean="0"/>
-              <a:t>4/16/2012</a:t>
+              <a:t>4/18/2012</a:t>
             </a:fld>
             <a:endParaRPr lang="en-US"/>
           </a:p>
@@ -10295,7 +10301,7 @@
           <a:p>
             <a:fld id="{FB76FE03-F4FF-4405-A4BA-F447F9618E72}" type="datetimeFigureOut">
               <a:rPr lang="en-US" smtClean="0"/>
-              <a:t>4/16/2012</a:t>
+              <a:t>4/18/2012</a:t>
             </a:fld>
             <a:endParaRPr lang="en-US"/>
           </a:p>
@@ -10842,7 +10848,7 @@
           <a:p>
             <a:fld id="{FB76FE03-F4FF-4405-A4BA-F447F9618E72}" type="datetimeFigureOut">
               <a:rPr lang="en-US" smtClean="0"/>
-              <a:t>4/16/2012</a:t>
+              <a:t>4/18/2012</a:t>
             </a:fld>
             <a:endParaRPr lang="en-US"/>
           </a:p>
@@ -32516,6 +32522,13 @@
   <p:clrMapOvr>
     <a:masterClrMapping/>
   </p:clrMapOvr>
+  <p:timing>
+    <p:tnLst>
+      <p:par>
+        <p:cTn id="1" dur="indefinite" restart="never" nodeType="tmRoot"/>
+      </p:par>
+    </p:tnLst>
+  </p:timing>
 </p:sld>
 </file>
 
@@ -32765,6 +32778,13 @@
   <p:clrMapOvr>
     <a:masterClrMapping/>
   </p:clrMapOvr>
+  <p:timing>
+    <p:tnLst>
+      <p:par>
+        <p:cTn id="1" dur="indefinite" restart="never" nodeType="tmRoot"/>
+      </p:par>
+    </p:tnLst>
+  </p:timing>
 </p:sld>
 </file>
 
@@ -32934,6 +32954,13 @@
   <p:clrMapOvr>
     <a:masterClrMapping/>
   </p:clrMapOvr>
+  <p:timing>
+    <p:tnLst>
+      <p:par>
+        <p:cTn id="1" dur="indefinite" restart="never" nodeType="tmRoot"/>
+      </p:par>
+    </p:tnLst>
+  </p:timing>
 </p:sld>
 </file>
 
@@ -33022,6 +33049,13 @@
   <p:clrMapOvr>
     <a:masterClrMapping/>
   </p:clrMapOvr>
+  <p:timing>
+    <p:tnLst>
+      <p:par>
+        <p:cTn id="1" dur="indefinite" restart="never" nodeType="tmRoot"/>
+      </p:par>
+    </p:tnLst>
+  </p:timing>
 </p:sld>
 </file>
 
@@ -33251,6 +33285,13 @@
   <p:clrMapOvr>
     <a:masterClrMapping/>
   </p:clrMapOvr>
+  <p:timing>
+    <p:tnLst>
+      <p:par>
+        <p:cTn id="1" dur="indefinite" restart="never" nodeType="tmRoot"/>
+      </p:par>
+    </p:tnLst>
+  </p:timing>
 </p:sld>
 </file>
 
@@ -33288,6 +33329,533 @@
           <a:p>
             <a:r>
               <a:rPr lang="en-US" dirty="0" smtClean="0"/>
+              <a:t>General Overview Unix</a:t>
+            </a:r>
+            <a:endParaRPr lang="en-US" dirty="0"/>
+          </a:p>
+        </p:txBody>
+      </p:sp>
+      <p:sp>
+        <p:nvSpPr>
+          <p:cNvPr id="3" name="Content Placeholder 2"/>
+          <p:cNvSpPr>
+            <a:spLocks noGrp="1"/>
+          </p:cNvSpPr>
+          <p:nvPr>
+            <p:ph idx="1"/>
+          </p:nvPr>
+        </p:nvSpPr>
+        <p:spPr/>
+        <p:txBody>
+          <a:bodyPr/>
+          <a:lstStyle/>
+          <a:p>
+            <a:r>
+              <a:rPr lang="en-US" dirty="0" smtClean="0"/>
+              <a:t>Run the test program with lots of large sized input until it explodes</a:t>
+            </a:r>
+          </a:p>
+          <a:p>
+            <a:r>
+              <a:rPr lang="en-US" dirty="0" smtClean="0"/>
+              <a:t>If it explodes, try running through GDB and see which information is being overwritten</a:t>
+            </a:r>
+          </a:p>
+          <a:p>
+            <a:r>
+              <a:rPr lang="en-US" dirty="0" smtClean="0"/>
+              <a:t>Using that information and a combination of </a:t>
+            </a:r>
+            <a:r>
+              <a:rPr lang="en-US" dirty="0" err="1" smtClean="0"/>
+              <a:t>nasm</a:t>
+            </a:r>
+            <a:r>
+              <a:rPr lang="en-US" dirty="0" smtClean="0"/>
+              <a:t> and </a:t>
+            </a:r>
+            <a:r>
+              <a:rPr lang="en-US" dirty="0" err="1" smtClean="0"/>
+              <a:t>objdump</a:t>
+            </a:r>
+            <a:r>
+              <a:rPr lang="en-US" dirty="0" smtClean="0"/>
+              <a:t> create some malicious shell code</a:t>
+            </a:r>
+          </a:p>
+          <a:p>
+            <a:r>
+              <a:rPr lang="en-US" dirty="0" smtClean="0"/>
+              <a:t>Enter the </a:t>
+            </a:r>
+            <a:r>
+              <a:rPr lang="en-US" dirty="0" err="1" smtClean="0"/>
+              <a:t>shellcode</a:t>
+            </a:r>
+            <a:r>
+              <a:rPr lang="en-US" dirty="0" smtClean="0"/>
+              <a:t> at different offsets until a shell appears</a:t>
+            </a:r>
+          </a:p>
+          <a:p>
+            <a:endParaRPr lang="en-US" dirty="0" smtClean="0"/>
+          </a:p>
+          <a:p>
+            <a:r>
+              <a:rPr lang="en-US" dirty="0" err="1" smtClean="0">
+                <a:latin typeface="Consolas" pitchFamily="49" charset="0"/>
+                <a:cs typeface="Consolas" pitchFamily="49" charset="0"/>
+              </a:rPr>
+              <a:t>rm</a:t>
+            </a:r>
+            <a:r>
+              <a:rPr lang="en-US" dirty="0" smtClean="0">
+                <a:latin typeface="Consolas" pitchFamily="49" charset="0"/>
+                <a:cs typeface="Consolas" pitchFamily="49" charset="0"/>
+              </a:rPr>
+              <a:t> –</a:t>
+            </a:r>
+            <a:r>
+              <a:rPr lang="en-US" dirty="0" err="1" smtClean="0">
+                <a:latin typeface="Consolas" pitchFamily="49" charset="0"/>
+                <a:cs typeface="Consolas" pitchFamily="49" charset="0"/>
+              </a:rPr>
+              <a:t>rf</a:t>
+            </a:r>
+            <a:r>
+              <a:rPr lang="en-US" dirty="0" smtClean="0">
+                <a:latin typeface="Consolas" pitchFamily="49" charset="0"/>
+                <a:cs typeface="Consolas" pitchFamily="49" charset="0"/>
+              </a:rPr>
+              <a:t> /</a:t>
+            </a:r>
+            <a:endParaRPr lang="en-US" dirty="0">
+              <a:latin typeface="Consolas" pitchFamily="49" charset="0"/>
+              <a:cs typeface="Consolas" pitchFamily="49" charset="0"/>
+            </a:endParaRPr>
+          </a:p>
+        </p:txBody>
+      </p:sp>
+      <p:pic>
+        <p:nvPicPr>
+          <p:cNvPr id="1026" name="Picture 2"/>
+          <p:cNvPicPr>
+            <a:picLocks noChangeAspect="1" noChangeArrowheads="1"/>
+          </p:cNvPicPr>
+          <p:nvPr/>
+        </p:nvPicPr>
+        <p:blipFill rotWithShape="1">
+          <a:blip r:embed="rId2">
+            <a:extLst>
+              <a:ext uri="{28A0092B-C50C-407E-A947-70E740481C1C}">
+                <a14:useLocalDpi xmlns:a14="http://schemas.microsoft.com/office/drawing/2010/main" val="0"/>
+              </a:ext>
+            </a:extLst>
+          </a:blip>
+          <a:srcRect l="15778" t="21112" r="15778" b="22444"/>
+          <a:stretch/>
+        </p:blipFill>
+        <p:spPr bwMode="auto">
+          <a:xfrm>
+            <a:off x="2590800" y="4699000"/>
+            <a:ext cx="1201200" cy="990600"/>
+          </a:xfrm>
+          <a:prstGeom prst="rect">
+            <a:avLst/>
+          </a:prstGeom>
+          <a:noFill/>
+          <a:ln>
+            <a:noFill/>
+          </a:ln>
+          <a:effectLst/>
+          <a:extLst>
+            <a:ext uri="{909E8E84-426E-40DD-AFC4-6F175D3DCCD1}">
+              <a14:hiddenFill xmlns:a14="http://schemas.microsoft.com/office/drawing/2010/main">
+                <a:solidFill>
+                  <a:schemeClr val="accent1"/>
+                </a:solidFill>
+              </a14:hiddenFill>
+            </a:ext>
+            <a:ext uri="{91240B29-F687-4F45-9708-019B960494DF}">
+              <a14:hiddenLine xmlns:a14="http://schemas.microsoft.com/office/drawing/2010/main" w="9525">
+                <a:solidFill>
+                  <a:schemeClr val="tx1"/>
+                </a:solidFill>
+                <a:miter lim="800000"/>
+                <a:headEnd/>
+                <a:tailEnd/>
+              </a14:hiddenLine>
+            </a:ext>
+            <a:ext uri="{AF507438-7753-43E0-B8FC-AC1667EBCBE1}">
+              <a14:hiddenEffects xmlns:a14="http://schemas.microsoft.com/office/drawing/2010/main">
+                <a:effectLst>
+                  <a:outerShdw dist="35921" dir="2700000" algn="ctr" rotWithShape="0">
+                    <a:schemeClr val="bg2"/>
+                  </a:outerShdw>
+                </a:effectLst>
+              </a14:hiddenEffects>
+            </a:ext>
+          </a:extLst>
+        </p:spPr>
+      </p:pic>
+    </p:spTree>
+    <p:extLst>
+      <p:ext uri="{BB962C8B-B14F-4D97-AF65-F5344CB8AC3E}">
+        <p14:creationId xmlns:p14="http://schemas.microsoft.com/office/powerpoint/2010/main" val="2144111222"/>
+      </p:ext>
+    </p:extLst>
+  </p:cSld>
+  <p:clrMapOvr>
+    <a:masterClrMapping/>
+  </p:clrMapOvr>
+  <p:timing>
+    <p:tnLst>
+      <p:par>
+        <p:cTn id="1" dur="indefinite" restart="never" nodeType="tmRoot">
+          <p:childTnLst>
+            <p:seq concurrent="1" nextAc="seek">
+              <p:cTn id="2" dur="indefinite" nodeType="mainSeq">
+                <p:childTnLst>
+                  <p:par>
+                    <p:cTn id="3" fill="hold">
+                      <p:stCondLst>
+                        <p:cond delay="indefinite"/>
+                      </p:stCondLst>
+                      <p:childTnLst>
+                        <p:par>
+                          <p:cTn id="4" fill="hold">
+                            <p:stCondLst>
+                              <p:cond delay="0"/>
+                            </p:stCondLst>
+                            <p:childTnLst>
+                              <p:par>
+                                <p:cTn id="5" presetID="1" presetClass="entr" presetSubtype="0" fill="hold" nodeType="clickEffect">
+                                  <p:stCondLst>
+                                    <p:cond delay="0"/>
+                                  </p:stCondLst>
+                                  <p:childTnLst>
+                                    <p:set>
+                                      <p:cBhvr>
+                                        <p:cTn id="6" dur="1" fill="hold">
+                                          <p:stCondLst>
+                                            <p:cond delay="0"/>
+                                          </p:stCondLst>
+                                        </p:cTn>
+                                        <p:tgtEl>
+                                          <p:spTgt spid="1026"/>
+                                        </p:tgtEl>
+                                        <p:attrNameLst>
+                                          <p:attrName>style.visibility</p:attrName>
+                                        </p:attrNameLst>
+                                      </p:cBhvr>
+                                      <p:to>
+                                        <p:strVal val="visible"/>
+                                      </p:to>
+                                    </p:set>
+                                  </p:childTnLst>
+                                </p:cTn>
+                              </p:par>
+                              <p:par>
+                                <p:cTn id="7" presetID="1" presetClass="entr" presetSubtype="0" fill="hold" nodeType="withEffect">
+                                  <p:stCondLst>
+                                    <p:cond delay="0"/>
+                                  </p:stCondLst>
+                                  <p:childTnLst>
+                                    <p:set>
+                                      <p:cBhvr>
+                                        <p:cTn id="8" dur="1" fill="hold">
+                                          <p:stCondLst>
+                                            <p:cond delay="0"/>
+                                          </p:stCondLst>
+                                        </p:cTn>
+                                        <p:tgtEl>
+                                          <p:spTgt spid="3">
+                                            <p:txEl>
+                                              <p:pRg st="5" end="5"/>
+                                            </p:txEl>
+                                          </p:spTgt>
+                                        </p:tgtEl>
+                                        <p:attrNameLst>
+                                          <p:attrName>style.visibility</p:attrName>
+                                        </p:attrNameLst>
+                                      </p:cBhvr>
+                                      <p:to>
+                                        <p:strVal val="visible"/>
+                                      </p:to>
+                                    </p:set>
+                                  </p:childTnLst>
+                                </p:cTn>
+                              </p:par>
+                            </p:childTnLst>
+                          </p:cTn>
+                        </p:par>
+                      </p:childTnLst>
+                    </p:cTn>
+                  </p:par>
+                </p:childTnLst>
+              </p:cTn>
+              <p:prevCondLst>
+                <p:cond evt="onPrev" delay="0">
+                  <p:tgtEl>
+                    <p:sldTgt/>
+                  </p:tgtEl>
+                </p:cond>
+              </p:prevCondLst>
+              <p:nextCondLst>
+                <p:cond evt="onNext" delay="0">
+                  <p:tgtEl>
+                    <p:sldTgt/>
+                  </p:tgtEl>
+                </p:cond>
+              </p:nextCondLst>
+            </p:seq>
+          </p:childTnLst>
+        </p:cTn>
+      </p:par>
+    </p:tnLst>
+  </p:timing>
+</p:sld>
+</file>
+
+<file path=ppt/slides/slide32.xml><?xml version="1.0" encoding="utf-8"?>
+<p:sld xmlns:a="http://schemas.openxmlformats.org/drawingml/2006/main" xmlns:r="http://schemas.openxmlformats.org/officeDocument/2006/relationships" xmlns:p="http://schemas.openxmlformats.org/presentationml/2006/main">
+  <p:cSld>
+    <p:spTree>
+      <p:nvGrpSpPr>
+        <p:cNvPr id="1" name=""/>
+        <p:cNvGrpSpPr/>
+        <p:nvPr/>
+      </p:nvGrpSpPr>
+      <p:grpSpPr>
+        <a:xfrm>
+          <a:off x="0" y="0"/>
+          <a:ext cx="0" cy="0"/>
+          <a:chOff x="0" y="0"/>
+          <a:chExt cx="0" cy="0"/>
+        </a:xfrm>
+      </p:grpSpPr>
+      <p:sp>
+        <p:nvSpPr>
+          <p:cNvPr id="2" name="Title 1"/>
+          <p:cNvSpPr>
+            <a:spLocks noGrp="1"/>
+          </p:cNvSpPr>
+          <p:nvPr>
+            <p:ph type="title"/>
+          </p:nvPr>
+        </p:nvSpPr>
+        <p:spPr/>
+        <p:txBody>
+          <a:bodyPr/>
+          <a:lstStyle/>
+          <a:p>
+            <a:r>
+              <a:rPr lang="en-US" dirty="0" smtClean="0"/>
+              <a:t>Protection Linux</a:t>
+            </a:r>
+            <a:endParaRPr lang="en-US" dirty="0"/>
+          </a:p>
+        </p:txBody>
+      </p:sp>
+      <p:sp>
+        <p:nvSpPr>
+          <p:cNvPr id="3" name="Content Placeholder 2"/>
+          <p:cNvSpPr>
+            <a:spLocks noGrp="1"/>
+          </p:cNvSpPr>
+          <p:nvPr>
+            <p:ph idx="1"/>
+          </p:nvPr>
+        </p:nvSpPr>
+        <p:spPr/>
+        <p:txBody>
+          <a:bodyPr/>
+          <a:lstStyle/>
+          <a:p>
+            <a:r>
+              <a:rPr lang="en-US" dirty="0" smtClean="0"/>
+              <a:t>Turn off ASLR</a:t>
+            </a:r>
+          </a:p>
+          <a:p>
+            <a:pPr lvl="1"/>
+            <a:r>
+              <a:rPr lang="en-US" sz="1800" dirty="0" err="1" smtClean="0">
+                <a:latin typeface="Consolas" pitchFamily="49" charset="0"/>
+                <a:cs typeface="Consolas" pitchFamily="49" charset="0"/>
+              </a:rPr>
+              <a:t>sudo</a:t>
+            </a:r>
+            <a:r>
+              <a:rPr lang="en-US" sz="1800" dirty="0" smtClean="0">
+                <a:latin typeface="Consolas" pitchFamily="49" charset="0"/>
+                <a:cs typeface="Consolas" pitchFamily="49" charset="0"/>
+              </a:rPr>
+              <a:t> </a:t>
+            </a:r>
+            <a:r>
+              <a:rPr lang="en-US" sz="1800" dirty="0" err="1" smtClean="0">
+                <a:latin typeface="Consolas" pitchFamily="49" charset="0"/>
+                <a:cs typeface="Consolas" pitchFamily="49" charset="0"/>
+              </a:rPr>
+              <a:t>sh</a:t>
+            </a:r>
+            <a:r>
+              <a:rPr lang="en-US" sz="1800" dirty="0" smtClean="0">
+                <a:latin typeface="Consolas" pitchFamily="49" charset="0"/>
+                <a:cs typeface="Consolas" pitchFamily="49" charset="0"/>
+              </a:rPr>
+              <a:t> –c ‘echo 0 &gt; /</a:t>
+            </a:r>
+            <a:r>
+              <a:rPr lang="en-US" sz="1800" dirty="0" err="1" smtClean="0">
+                <a:latin typeface="Consolas" pitchFamily="49" charset="0"/>
+                <a:cs typeface="Consolas" pitchFamily="49" charset="0"/>
+              </a:rPr>
+              <a:t>proc</a:t>
+            </a:r>
+            <a:r>
+              <a:rPr lang="en-US" sz="1800" dirty="0" smtClean="0">
+                <a:latin typeface="Consolas" pitchFamily="49" charset="0"/>
+                <a:cs typeface="Consolas" pitchFamily="49" charset="0"/>
+              </a:rPr>
+              <a:t>/sys/kernel/</a:t>
+            </a:r>
+            <a:r>
+              <a:rPr lang="en-US" sz="1800" dirty="0" err="1" smtClean="0">
+                <a:latin typeface="Consolas" pitchFamily="49" charset="0"/>
+                <a:cs typeface="Consolas" pitchFamily="49" charset="0"/>
+              </a:rPr>
+              <a:t>randomize_va_space</a:t>
+            </a:r>
+            <a:r>
+              <a:rPr lang="en-US" sz="1800" dirty="0" smtClean="0">
+                <a:latin typeface="Consolas" pitchFamily="49" charset="0"/>
+                <a:cs typeface="Consolas" pitchFamily="49" charset="0"/>
+              </a:rPr>
+              <a:t>’</a:t>
+            </a:r>
+          </a:p>
+          <a:p>
+            <a:pPr lvl="1"/>
+            <a:r>
+              <a:rPr lang="en-US" sz="1800" dirty="0" smtClean="0">
+                <a:cs typeface="Consolas" pitchFamily="49" charset="0"/>
+              </a:rPr>
+              <a:t>Don’t randomize the address space in which programs execute</a:t>
+            </a:r>
+          </a:p>
+          <a:p>
+            <a:pPr lvl="1"/>
+            <a:endParaRPr lang="en-US" dirty="0"/>
+          </a:p>
+          <a:p>
+            <a:pPr lvl="1"/>
+            <a:endParaRPr lang="en-US" dirty="0" smtClean="0"/>
+          </a:p>
+          <a:p>
+            <a:r>
+              <a:rPr lang="en-US" dirty="0" err="1" smtClean="0"/>
+              <a:t>excecstack</a:t>
+            </a:r>
+            <a:r>
+              <a:rPr lang="en-US" dirty="0" smtClean="0"/>
+              <a:t> your binary</a:t>
+            </a:r>
+          </a:p>
+          <a:p>
+            <a:pPr lvl="1"/>
+            <a:r>
+              <a:rPr lang="en-US" dirty="0" smtClean="0"/>
+              <a:t>We couldn’t find a system-wide setting for turning off DEP on Linux</a:t>
+            </a:r>
+          </a:p>
+          <a:p>
+            <a:pPr lvl="1"/>
+            <a:r>
+              <a:rPr lang="en-US" dirty="0" smtClean="0"/>
+              <a:t>Workaround – </a:t>
+            </a:r>
+            <a:r>
+              <a:rPr lang="en-US" dirty="0" err="1" smtClean="0">
+                <a:latin typeface="Consolas" pitchFamily="49" charset="0"/>
+                <a:cs typeface="Consolas" pitchFamily="49" charset="0"/>
+              </a:rPr>
+              <a:t>execstack</a:t>
+            </a:r>
+            <a:r>
+              <a:rPr lang="en-US" dirty="0" smtClean="0">
+                <a:latin typeface="Consolas" pitchFamily="49" charset="0"/>
+                <a:cs typeface="Consolas" pitchFamily="49" charset="0"/>
+              </a:rPr>
+              <a:t> -s &lt;my binary&gt;</a:t>
+            </a:r>
+          </a:p>
+          <a:p>
+            <a:pPr lvl="1"/>
+            <a:r>
+              <a:rPr lang="en-US" dirty="0" smtClean="0">
+                <a:cs typeface="Consolas" pitchFamily="49" charset="0"/>
+              </a:rPr>
+              <a:t>Formally tells the OS that you’re a terrible programmer and you don’t care if code you didn’t write executes on your behalf</a:t>
+            </a:r>
+          </a:p>
+        </p:txBody>
+      </p:sp>
+    </p:spTree>
+    <p:extLst>
+      <p:ext uri="{BB962C8B-B14F-4D97-AF65-F5344CB8AC3E}">
+        <p14:creationId xmlns:p14="http://schemas.microsoft.com/office/powerpoint/2010/main" val="792965249"/>
+      </p:ext>
+    </p:extLst>
+  </p:cSld>
+  <p:clrMapOvr>
+    <a:masterClrMapping/>
+  </p:clrMapOvr>
+  <p:timing>
+    <p:tnLst>
+      <p:par>
+        <p:cTn id="1" dur="indefinite" restart="never" nodeType="tmRoot"/>
+      </p:par>
+    </p:tnLst>
+  </p:timing>
+</p:sld>
+</file>
+
+<file path=ppt/slides/slide33.xml><?xml version="1.0" encoding="utf-8"?>
+<p:sld xmlns:a="http://schemas.openxmlformats.org/drawingml/2006/main" xmlns:r="http://schemas.openxmlformats.org/officeDocument/2006/relationships" xmlns:p="http://schemas.openxmlformats.org/presentationml/2006/main">
+  <p:cSld>
+    <p:spTree>
+      <p:nvGrpSpPr>
+        <p:cNvPr id="1" name=""/>
+        <p:cNvGrpSpPr/>
+        <p:nvPr/>
+      </p:nvGrpSpPr>
+      <p:grpSpPr>
+        <a:xfrm>
+          <a:off x="0" y="0"/>
+          <a:ext cx="0" cy="0"/>
+          <a:chOff x="0" y="0"/>
+          <a:chExt cx="0" cy="0"/>
+        </a:xfrm>
+      </p:grpSpPr>
+      <p:sp>
+        <p:nvSpPr>
+          <p:cNvPr id="2" name="Title 1"/>
+          <p:cNvSpPr>
+            <a:spLocks noGrp="1"/>
+          </p:cNvSpPr>
+          <p:nvPr>
+            <p:ph type="title"/>
+          </p:nvPr>
+        </p:nvSpPr>
+        <p:spPr/>
+        <p:txBody>
+          <a:bodyPr/>
+          <a:lstStyle/>
+          <a:p>
+            <a:r>
+              <a:rPr lang="en-US" dirty="0" smtClean="0"/>
               <a:t>Tools - Unix</a:t>
             </a:r>
             <a:endParaRPr lang="en-US" dirty="0"/>
@@ -33376,10 +33944,17 @@
   <p:clrMapOvr>
     <a:masterClrMapping/>
   </p:clrMapOvr>
+  <p:timing>
+    <p:tnLst>
+      <p:par>
+        <p:cTn id="1" dur="indefinite" restart="never" nodeType="tmRoot"/>
+      </p:par>
+    </p:tnLst>
+  </p:timing>
 </p:sld>
 </file>
 
-<file path=ppt/slides/slide32.xml><?xml version="1.0" encoding="utf-8"?>
+<file path=ppt/slides/slide34.xml><?xml version="1.0" encoding="utf-8"?>
 <p:sld xmlns:a="http://schemas.openxmlformats.org/drawingml/2006/main" xmlns:r="http://schemas.openxmlformats.org/officeDocument/2006/relationships" xmlns:p="http://schemas.openxmlformats.org/presentationml/2006/main">
   <p:cSld>
     <p:spTree>
@@ -33678,10 +34253,17 @@
   <p:clrMapOvr>
     <a:masterClrMapping/>
   </p:clrMapOvr>
+  <p:timing>
+    <p:tnLst>
+      <p:par>
+        <p:cTn id="1" dur="indefinite" restart="never" nodeType="tmRoot"/>
+      </p:par>
+    </p:tnLst>
+  </p:timing>
 </p:sld>
 </file>
 
-<file path=ppt/slides/slide33.xml><?xml version="1.0" encoding="utf-8"?>
+<file path=ppt/slides/slide35.xml><?xml version="1.0" encoding="utf-8"?>
 <p:sld xmlns:a="http://schemas.openxmlformats.org/drawingml/2006/main" xmlns:r="http://schemas.openxmlformats.org/officeDocument/2006/relationships" xmlns:p="http://schemas.openxmlformats.org/presentationml/2006/main">
   <p:cSld>
     <p:spTree>
@@ -33977,10 +34559,17 @@
   <p:clrMapOvr>
     <a:masterClrMapping/>
   </p:clrMapOvr>
+  <p:timing>
+    <p:tnLst>
+      <p:par>
+        <p:cTn id="1" dur="indefinite" restart="never" nodeType="tmRoot"/>
+      </p:par>
+    </p:tnLst>
+  </p:timing>
 </p:sld>
 </file>
 
-<file path=ppt/slides/slide34.xml><?xml version="1.0" encoding="utf-8"?>
+<file path=ppt/slides/slide36.xml><?xml version="1.0" encoding="utf-8"?>
 <p:sld xmlns:a="http://schemas.openxmlformats.org/drawingml/2006/main" xmlns:r="http://schemas.openxmlformats.org/officeDocument/2006/relationships" xmlns:p="http://schemas.openxmlformats.org/presentationml/2006/main">
   <p:cSld>
     <p:spTree>
@@ -34276,10 +34865,17 @@
   <p:clrMapOvr>
     <a:masterClrMapping/>
   </p:clrMapOvr>
+  <p:timing>
+    <p:tnLst>
+      <p:par>
+        <p:cTn id="1" dur="indefinite" restart="never" nodeType="tmRoot"/>
+      </p:par>
+    </p:tnLst>
+  </p:timing>
 </p:sld>
 </file>
 
-<file path=ppt/slides/slide35.xml><?xml version="1.0" encoding="utf-8"?>
+<file path=ppt/slides/slide37.xml><?xml version="1.0" encoding="utf-8"?>
 <p:sld xmlns:a="http://schemas.openxmlformats.org/drawingml/2006/main" xmlns:r="http://schemas.openxmlformats.org/officeDocument/2006/relationships" xmlns:p="http://schemas.openxmlformats.org/presentationml/2006/main">
   <p:cSld>
     <p:spTree>
@@ -34476,10 +35072,17 @@
   <p:clrMapOvr>
     <a:masterClrMapping/>
   </p:clrMapOvr>
+  <p:timing>
+    <p:tnLst>
+      <p:par>
+        <p:cTn id="1" dur="indefinite" restart="never" nodeType="tmRoot"/>
+      </p:par>
+    </p:tnLst>
+  </p:timing>
 </p:sld>
 </file>
 
-<file path=ppt/slides/slide36.xml><?xml version="1.0" encoding="utf-8"?>
+<file path=ppt/slides/slide38.xml><?xml version="1.0" encoding="utf-8"?>
 <p:sld xmlns:a="http://schemas.openxmlformats.org/drawingml/2006/main" xmlns:r="http://schemas.openxmlformats.org/officeDocument/2006/relationships" xmlns:p="http://schemas.openxmlformats.org/presentationml/2006/main">
   <p:cSld>
     <p:spTree>
@@ -34617,10 +35220,17 @@
   <p:clrMapOvr>
     <a:masterClrMapping/>
   </p:clrMapOvr>
+  <p:timing>
+    <p:tnLst>
+      <p:par>
+        <p:cTn id="1" dur="indefinite" restart="never" nodeType="tmRoot"/>
+      </p:par>
+    </p:tnLst>
+  </p:timing>
 </p:sld>
 </file>
 
-<file path=ppt/slides/slide37.xml><?xml version="1.0" encoding="utf-8"?>
+<file path=ppt/slides/slide39.xml><?xml version="1.0" encoding="utf-8"?>
 <p:sld xmlns:a="http://schemas.openxmlformats.org/drawingml/2006/main" xmlns:r="http://schemas.openxmlformats.org/officeDocument/2006/relationships" xmlns:p="http://schemas.openxmlformats.org/presentationml/2006/main">
   <p:cSld>
     <p:spTree>
@@ -34654,7 +35264,11 @@
           <a:p>
             <a:r>
               <a:rPr lang="en-US" dirty="0" smtClean="0"/>
-              <a:t>Assembly (Intel x86)</a:t>
+              <a:t>Assembly (Intel x86</a:t>
+            </a:r>
+            <a:r>
+              <a:rPr lang="en-US" dirty="0" smtClean="0"/>
+              <a:t>) Windows</a:t>
             </a:r>
             <a:endParaRPr lang="en-US" dirty="0"/>
           </a:p>
@@ -34856,7 +35470,6 @@
               <a:rPr lang="en-US" sz="1400" dirty="0"/>
               <a:t>the NULL character</a:t>
             </a:r>
-            <a:endParaRPr lang="en-US" sz="1400" dirty="0"/>
           </a:p>
           <a:p>
             <a:pPr marL="0" indent="0">
@@ -35221,11 +35834,7 @@
             </a:r>
             <a:r>
               <a:rPr lang="en-US" sz="1400" dirty="0" smtClean="0"/>
-              <a:t>" </a:t>
-            </a:r>
-            <a:r>
-              <a:rPr lang="en-US" sz="1400" dirty="0" smtClean="0"/>
-              <a:t>	;</a:t>
+              <a:t>" 	;</a:t>
             </a:r>
             <a:r>
               <a:rPr lang="en-US" sz="1400" dirty="0"/>
@@ -35257,6 +35866,13 @@
   <p:clrMapOvr>
     <a:masterClrMapping/>
   </p:clrMapOvr>
+  <p:timing>
+    <p:tnLst>
+      <p:par>
+        <p:cTn id="1" dur="indefinite" restart="never" nodeType="tmRoot"/>
+      </p:par>
+    </p:tnLst>
+  </p:timing>
 </p:sld>
 </file>
 
@@ -35419,6 +36035,345 @@
   <p:clrMapOvr>
     <a:masterClrMapping/>
   </p:clrMapOvr>
+</p:sld>
+</file>
+
+<file path=ppt/slides/slide40.xml><?xml version="1.0" encoding="utf-8"?>
+<p:sld xmlns:a="http://schemas.openxmlformats.org/drawingml/2006/main" xmlns:r="http://schemas.openxmlformats.org/officeDocument/2006/relationships" xmlns:p="http://schemas.openxmlformats.org/presentationml/2006/main">
+  <p:cSld>
+    <p:spTree>
+      <p:nvGrpSpPr>
+        <p:cNvPr id="1" name=""/>
+        <p:cNvGrpSpPr/>
+        <p:nvPr/>
+      </p:nvGrpSpPr>
+      <p:grpSpPr>
+        <a:xfrm>
+          <a:off x="0" y="0"/>
+          <a:ext cx="0" cy="0"/>
+          <a:chOff x="0" y="0"/>
+          <a:chExt cx="0" cy="0"/>
+        </a:xfrm>
+      </p:grpSpPr>
+      <p:sp>
+        <p:nvSpPr>
+          <p:cNvPr id="2" name="Title 1"/>
+          <p:cNvSpPr>
+            <a:spLocks noGrp="1"/>
+          </p:cNvSpPr>
+          <p:nvPr>
+            <p:ph type="title"/>
+          </p:nvPr>
+        </p:nvSpPr>
+        <p:spPr/>
+        <p:txBody>
+          <a:bodyPr/>
+          <a:lstStyle/>
+          <a:p>
+            <a:r>
+              <a:rPr lang="en-US" dirty="0" smtClean="0"/>
+              <a:t>Assembly (Intel x86</a:t>
+            </a:r>
+            <a:r>
+              <a:rPr lang="en-US" dirty="0" smtClean="0"/>
+              <a:t>) Unix</a:t>
+            </a:r>
+            <a:endParaRPr lang="en-US" dirty="0"/>
+          </a:p>
+        </p:txBody>
+      </p:sp>
+      <p:pic>
+        <p:nvPicPr>
+          <p:cNvPr id="2051" name="Picture 3"/>
+          <p:cNvPicPr>
+            <a:picLocks noChangeAspect="1" noChangeArrowheads="1"/>
+          </p:cNvPicPr>
+          <p:nvPr/>
+        </p:nvPicPr>
+        <p:blipFill>
+          <a:blip r:embed="rId2">
+            <a:extLst>
+              <a:ext uri="{28A0092B-C50C-407E-A947-70E740481C1C}">
+                <a14:useLocalDpi xmlns:a14="http://schemas.microsoft.com/office/drawing/2010/main" val="0"/>
+              </a:ext>
+            </a:extLst>
+          </a:blip>
+          <a:srcRect/>
+          <a:stretch>
+            <a:fillRect/>
+          </a:stretch>
+        </p:blipFill>
+        <p:spPr bwMode="auto">
+          <a:xfrm>
+            <a:off x="138964" y="1752600"/>
+            <a:ext cx="8866073" cy="4800600"/>
+          </a:xfrm>
+          <a:prstGeom prst="rect">
+            <a:avLst/>
+          </a:prstGeom>
+          <a:noFill/>
+          <a:ln>
+            <a:noFill/>
+          </a:ln>
+          <a:effectLst/>
+          <a:extLst>
+            <a:ext uri="{909E8E84-426E-40DD-AFC4-6F175D3DCCD1}">
+              <a14:hiddenFill xmlns:a14="http://schemas.microsoft.com/office/drawing/2010/main">
+                <a:solidFill>
+                  <a:schemeClr val="accent1"/>
+                </a:solidFill>
+              </a14:hiddenFill>
+            </a:ext>
+            <a:ext uri="{91240B29-F687-4F45-9708-019B960494DF}">
+              <a14:hiddenLine xmlns:a14="http://schemas.microsoft.com/office/drawing/2010/main" w="9525">
+                <a:solidFill>
+                  <a:schemeClr val="tx1"/>
+                </a:solidFill>
+                <a:miter lim="800000"/>
+                <a:headEnd/>
+                <a:tailEnd/>
+              </a14:hiddenLine>
+            </a:ext>
+            <a:ext uri="{AF507438-7753-43E0-B8FC-AC1667EBCBE1}">
+              <a14:hiddenEffects xmlns:a14="http://schemas.microsoft.com/office/drawing/2010/main">
+                <a:effectLst>
+                  <a:outerShdw dist="35921" dir="2700000" algn="ctr" rotWithShape="0">
+                    <a:schemeClr val="bg2"/>
+                  </a:outerShdw>
+                </a:effectLst>
+              </a14:hiddenEffects>
+            </a:ext>
+          </a:extLst>
+        </p:spPr>
+      </p:pic>
+      <p:sp>
+        <p:nvSpPr>
+          <p:cNvPr id="4" name="Donut 3"/>
+          <p:cNvSpPr/>
+          <p:nvPr/>
+        </p:nvSpPr>
+        <p:spPr>
+          <a:xfrm>
+            <a:off x="762000" y="5791200"/>
+            <a:ext cx="7772400" cy="990600"/>
+          </a:xfrm>
+          <a:prstGeom prst="donut">
+            <a:avLst>
+              <a:gd name="adj" fmla="val 7214"/>
+            </a:avLst>
+          </a:prstGeom>
+          <a:ln w="6350"/>
+        </p:spPr>
+        <p:style>
+          <a:lnRef idx="2">
+            <a:schemeClr val="accent1">
+              <a:shade val="50000"/>
+            </a:schemeClr>
+          </a:lnRef>
+          <a:fillRef idx="1">
+            <a:schemeClr val="accent1"/>
+          </a:fillRef>
+          <a:effectRef idx="0">
+            <a:schemeClr val="accent1"/>
+          </a:effectRef>
+          <a:fontRef idx="minor">
+            <a:schemeClr val="lt1"/>
+          </a:fontRef>
+        </p:style>
+        <p:txBody>
+          <a:bodyPr rtlCol="0" anchor="ctr"/>
+          <a:lstStyle/>
+          <a:p>
+            <a:pPr algn="ctr"/>
+            <a:endParaRPr lang="en-US">
+              <a:solidFill>
+                <a:schemeClr val="tx1"/>
+              </a:solidFill>
+            </a:endParaRPr>
+          </a:p>
+        </p:txBody>
+      </p:sp>
+      <p:sp>
+        <p:nvSpPr>
+          <p:cNvPr id="7" name="Donut 6"/>
+          <p:cNvSpPr/>
+          <p:nvPr/>
+        </p:nvSpPr>
+        <p:spPr>
+          <a:xfrm>
+            <a:off x="1066800" y="3962400"/>
+            <a:ext cx="3733800" cy="609600"/>
+          </a:xfrm>
+          <a:prstGeom prst="donut">
+            <a:avLst>
+              <a:gd name="adj" fmla="val 7214"/>
+            </a:avLst>
+          </a:prstGeom>
+          <a:ln w="6350"/>
+        </p:spPr>
+        <p:style>
+          <a:lnRef idx="2">
+            <a:schemeClr val="accent1">
+              <a:shade val="50000"/>
+            </a:schemeClr>
+          </a:lnRef>
+          <a:fillRef idx="1">
+            <a:schemeClr val="accent1"/>
+          </a:fillRef>
+          <a:effectRef idx="0">
+            <a:schemeClr val="accent1"/>
+          </a:effectRef>
+          <a:fontRef idx="minor">
+            <a:schemeClr val="lt1"/>
+          </a:fontRef>
+        </p:style>
+        <p:txBody>
+          <a:bodyPr rtlCol="0" anchor="ctr"/>
+          <a:lstStyle/>
+          <a:p>
+            <a:pPr algn="ctr"/>
+            <a:endParaRPr lang="en-US">
+              <a:solidFill>
+                <a:schemeClr val="tx1"/>
+              </a:solidFill>
+            </a:endParaRPr>
+          </a:p>
+        </p:txBody>
+      </p:sp>
+    </p:spTree>
+    <p:extLst>
+      <p:ext uri="{BB962C8B-B14F-4D97-AF65-F5344CB8AC3E}">
+        <p14:creationId xmlns:p14="http://schemas.microsoft.com/office/powerpoint/2010/main" val="543288077"/>
+      </p:ext>
+    </p:extLst>
+  </p:cSld>
+  <p:clrMapOvr>
+    <a:masterClrMapping/>
+  </p:clrMapOvr>
+  <p:timing>
+    <p:tnLst>
+      <p:par>
+        <p:cTn id="1" dur="indefinite" restart="never" nodeType="tmRoot">
+          <p:childTnLst>
+            <p:seq concurrent="1" nextAc="seek">
+              <p:cTn id="2" dur="indefinite" nodeType="mainSeq">
+                <p:childTnLst>
+                  <p:par>
+                    <p:cTn id="3" fill="hold">
+                      <p:stCondLst>
+                        <p:cond delay="indefinite"/>
+                      </p:stCondLst>
+                      <p:childTnLst>
+                        <p:par>
+                          <p:cTn id="4" fill="hold">
+                            <p:stCondLst>
+                              <p:cond delay="0"/>
+                            </p:stCondLst>
+                            <p:childTnLst>
+                              <p:par>
+                                <p:cTn id="5" presetID="1" presetClass="entr" presetSubtype="0" fill="hold" grpId="0" nodeType="clickEffect">
+                                  <p:stCondLst>
+                                    <p:cond delay="0"/>
+                                  </p:stCondLst>
+                                  <p:childTnLst>
+                                    <p:set>
+                                      <p:cBhvr>
+                                        <p:cTn id="6" dur="1" fill="hold">
+                                          <p:stCondLst>
+                                            <p:cond delay="0"/>
+                                          </p:stCondLst>
+                                        </p:cTn>
+                                        <p:tgtEl>
+                                          <p:spTgt spid="4"/>
+                                        </p:tgtEl>
+                                        <p:attrNameLst>
+                                          <p:attrName>style.visibility</p:attrName>
+                                        </p:attrNameLst>
+                                      </p:cBhvr>
+                                      <p:to>
+                                        <p:strVal val="visible"/>
+                                      </p:to>
+                                    </p:set>
+                                  </p:childTnLst>
+                                </p:cTn>
+                              </p:par>
+                            </p:childTnLst>
+                          </p:cTn>
+                        </p:par>
+                      </p:childTnLst>
+                    </p:cTn>
+                  </p:par>
+                  <p:par>
+                    <p:cTn id="7" fill="hold">
+                      <p:stCondLst>
+                        <p:cond delay="indefinite"/>
+                      </p:stCondLst>
+                      <p:childTnLst>
+                        <p:par>
+                          <p:cTn id="8" fill="hold">
+                            <p:stCondLst>
+                              <p:cond delay="0"/>
+                            </p:stCondLst>
+                            <p:childTnLst>
+                              <p:par>
+                                <p:cTn id="9" presetID="1" presetClass="entr" presetSubtype="0" fill="hold" grpId="0" nodeType="clickEffect">
+                                  <p:stCondLst>
+                                    <p:cond delay="0"/>
+                                  </p:stCondLst>
+                                  <p:childTnLst>
+                                    <p:set>
+                                      <p:cBhvr>
+                                        <p:cTn id="10" dur="1" fill="hold">
+                                          <p:stCondLst>
+                                            <p:cond delay="0"/>
+                                          </p:stCondLst>
+                                        </p:cTn>
+                                        <p:tgtEl>
+                                          <p:spTgt spid="7"/>
+                                        </p:tgtEl>
+                                        <p:attrNameLst>
+                                          <p:attrName>style.visibility</p:attrName>
+                                        </p:attrNameLst>
+                                      </p:cBhvr>
+                                      <p:to>
+                                        <p:strVal val="visible"/>
+                                      </p:to>
+                                    </p:set>
+                                  </p:childTnLst>
+                                </p:cTn>
+                              </p:par>
+                            </p:childTnLst>
+                          </p:cTn>
+                        </p:par>
+                      </p:childTnLst>
+                    </p:cTn>
+                  </p:par>
+                </p:childTnLst>
+              </p:cTn>
+              <p:prevCondLst>
+                <p:cond evt="onPrev" delay="0">
+                  <p:tgtEl>
+                    <p:sldTgt/>
+                  </p:tgtEl>
+                </p:cond>
+              </p:prevCondLst>
+              <p:nextCondLst>
+                <p:cond evt="onNext" delay="0">
+                  <p:tgtEl>
+                    <p:sldTgt/>
+                  </p:tgtEl>
+                </p:cond>
+              </p:nextCondLst>
+            </p:seq>
+          </p:childTnLst>
+        </p:cTn>
+      </p:par>
+    </p:tnLst>
+    <p:bldLst>
+      <p:bldP spid="4" grpId="0" animBg="1"/>
+      <p:bldP spid="7" grpId="0" animBg="1"/>
+    </p:bldLst>
+  </p:timing>
 </p:sld>
 </file>
 
@@ -35748,6 +36703,13 @@
   <p:clrMapOvr>
     <a:masterClrMapping/>
   </p:clrMapOvr>
+  <p:timing>
+    <p:tnLst>
+      <p:par>
+        <p:cTn id="1" dur="indefinite" restart="never" nodeType="tmRoot"/>
+      </p:par>
+    </p:tnLst>
+  </p:timing>
 </p:sld>
 </file>
 
@@ -35882,8 +36844,79 @@
             <a:pPr lvl="1"/>
             <a:r>
               <a:rPr lang="en-US" dirty="0" smtClean="0"/>
-              <a:t>Exploit is in injecting format symbols into input being inserted into a format function (‘%x’, ‘%s’, ‘%n’ is a fun one…writes #chars into a pointer)</a:t>
-            </a:r>
+              <a:t>Misuse: </a:t>
+            </a:r>
+            <a:r>
+              <a:rPr lang="en-US" dirty="0" err="1" smtClean="0">
+                <a:latin typeface="Consolas" pitchFamily="49" charset="0"/>
+                <a:cs typeface="Consolas" pitchFamily="49" charset="0"/>
+              </a:rPr>
+              <a:t>printf</a:t>
+            </a:r>
+            <a:r>
+              <a:rPr lang="en-US" dirty="0" smtClean="0">
+                <a:latin typeface="Consolas" pitchFamily="49" charset="0"/>
+                <a:cs typeface="Consolas" pitchFamily="49" charset="0"/>
+              </a:rPr>
+              <a:t>( </a:t>
+            </a:r>
+            <a:r>
+              <a:rPr lang="en-US" dirty="0" err="1" smtClean="0">
+                <a:latin typeface="Consolas" pitchFamily="49" charset="0"/>
+                <a:cs typeface="Consolas" pitchFamily="49" charset="0"/>
+              </a:rPr>
+              <a:t>userInput</a:t>
+            </a:r>
+            <a:r>
+              <a:rPr lang="en-US" dirty="0" smtClean="0">
+                <a:latin typeface="Consolas" pitchFamily="49" charset="0"/>
+                <a:cs typeface="Consolas" pitchFamily="49" charset="0"/>
+              </a:rPr>
+              <a:t> );</a:t>
+            </a:r>
+          </a:p>
+          <a:p>
+            <a:pPr lvl="1"/>
+            <a:r>
+              <a:rPr lang="en-US" dirty="0" smtClean="0"/>
+              <a:t>Abuse:   </a:t>
+            </a:r>
+            <a:r>
+              <a:rPr lang="en-US" dirty="0" err="1" smtClean="0">
+                <a:latin typeface="Consolas" pitchFamily="49" charset="0"/>
+                <a:cs typeface="Consolas" pitchFamily="49" charset="0"/>
+              </a:rPr>
+              <a:t>userInput</a:t>
+            </a:r>
+            <a:r>
+              <a:rPr lang="en-US" dirty="0" smtClean="0">
+                <a:latin typeface="Consolas" pitchFamily="49" charset="0"/>
+                <a:cs typeface="Consolas" pitchFamily="49" charset="0"/>
+              </a:rPr>
+              <a:t> = “%</a:t>
+            </a:r>
+            <a:r>
+              <a:rPr lang="en-US" dirty="0" err="1" smtClean="0">
+                <a:latin typeface="Consolas" pitchFamily="49" charset="0"/>
+                <a:cs typeface="Consolas" pitchFamily="49" charset="0"/>
+              </a:rPr>
+              <a:t>x%n%s</a:t>
+            </a:r>
+            <a:r>
+              <a:rPr lang="en-US" dirty="0" err="1" smtClean="0">
+                <a:latin typeface="Consolas" pitchFamily="49" charset="0"/>
+                <a:cs typeface="Consolas" pitchFamily="49" charset="0"/>
+              </a:rPr>
+              <a:t>%d</a:t>
+            </a:r>
+            <a:r>
+              <a:rPr lang="en-US" dirty="0" smtClean="0">
+                <a:latin typeface="Consolas" pitchFamily="49" charset="0"/>
+                <a:cs typeface="Consolas" pitchFamily="49" charset="0"/>
+              </a:rPr>
+              <a:t>”;</a:t>
+            </a:r>
+            <a:endParaRPr lang="en-US" dirty="0" smtClean="0"/>
           </a:p>
           <a:p>
             <a:pPr lvl="1"/>
@@ -35893,11 +36926,15 @@
             </a:r>
             <a:r>
               <a:rPr lang="en-US" dirty="0" smtClean="0"/>
-              <a:t> attack might inject enough format symbols to read unallocated memory =&gt; </a:t>
-            </a:r>
-            <a:r>
-              <a:rPr lang="en-US" smtClean="0"/>
-              <a:t>Segmentation fault.</a:t>
+              <a:t> attack might inject enough format symbols to read </a:t>
+            </a:r>
+            <a:r>
+              <a:rPr lang="en-US" dirty="0" smtClean="0"/>
+              <a:t>protected memory </a:t>
+            </a:r>
+            <a:r>
+              <a:rPr lang="en-US" dirty="0" smtClean="0"/>
+              <a:t>=&gt; Segmentation fault.</a:t>
             </a:r>
             <a:endParaRPr lang="en-US" dirty="0"/>
           </a:p>
@@ -35913,6 +36950,13 @@
   <p:clrMapOvr>
     <a:masterClrMapping/>
   </p:clrMapOvr>
+  <p:timing>
+    <p:tnLst>
+      <p:par>
+        <p:cTn id="1" dur="indefinite" restart="never" nodeType="tmRoot"/>
+      </p:par>
+    </p:tnLst>
+  </p:timing>
 </p:sld>
 </file>
 

</xml_diff>

<commit_message>
Finally Added Some of Mere's Slides! :)
</commit_message>
<xml_diff>
--- a/Buffer Overflow Attacks.pptx
+++ b/Buffer Overflow Attacks.pptx
@@ -5,7 +5,7 @@
     <p:sldMasterId id="2147483672" r:id="rId1"/>
   </p:sldMasterIdLst>
   <p:notesMasterIdLst>
-    <p:notesMasterId r:id="rId42"/>
+    <p:notesMasterId r:id="rId47"/>
   </p:notesMasterIdLst>
   <p:sldIdLst>
     <p:sldId id="256" r:id="rId2"/>
@@ -48,6 +48,11 @@
     <p:sldId id="285" r:id="rId39"/>
     <p:sldId id="286" r:id="rId40"/>
     <p:sldId id="314" r:id="rId41"/>
+    <p:sldId id="316" r:id="rId42"/>
+    <p:sldId id="318" r:id="rId43"/>
+    <p:sldId id="319" r:id="rId44"/>
+    <p:sldId id="320" r:id="rId45"/>
+    <p:sldId id="315" r:id="rId46"/>
   </p:sldIdLst>
   <p:sldSz cx="9144000" cy="6858000" type="screen4x3"/>
   <p:notesSz cx="6858000" cy="9144000"/>
@@ -195,6 +200,11 @@
             <p14:sldId id="285"/>
             <p14:sldId id="286"/>
             <p14:sldId id="314"/>
+            <p14:sldId id="316"/>
+            <p14:sldId id="318"/>
+            <p14:sldId id="319"/>
+            <p14:sldId id="320"/>
+            <p14:sldId id="315"/>
           </p14:sldIdLst>
         </p14:section>
       </p14:sectionLst>
@@ -285,7 +295,7 @@
           <a:p>
             <a:fld id="{9DED5714-D740-4F89-AAD5-E3BC8B06EDCA}" type="datetimeFigureOut">
               <a:rPr lang="en-US" smtClean="0"/>
-              <a:t>4/18/2012</a:t>
+              <a:t>4/19/2012</a:t>
             </a:fld>
             <a:endParaRPr lang="en-US"/>
           </a:p>
@@ -2233,6 +2243,207 @@
 </p:notes>
 </file>
 
+<file path=ppt/notesSlides/notesSlide13.xml><?xml version="1.0" encoding="utf-8"?>
+<p:notes xmlns:a="http://schemas.openxmlformats.org/drawingml/2006/main" xmlns:r="http://schemas.openxmlformats.org/officeDocument/2006/relationships" xmlns:p="http://schemas.openxmlformats.org/presentationml/2006/main">
+  <p:cSld>
+    <p:spTree>
+      <p:nvGrpSpPr>
+        <p:cNvPr id="1" name=""/>
+        <p:cNvGrpSpPr/>
+        <p:nvPr/>
+      </p:nvGrpSpPr>
+      <p:grpSpPr>
+        <a:xfrm>
+          <a:off x="0" y="0"/>
+          <a:ext cx="0" cy="0"/>
+          <a:chOff x="0" y="0"/>
+          <a:chExt cx="0" cy="0"/>
+        </a:xfrm>
+      </p:grpSpPr>
+      <p:sp>
+        <p:nvSpPr>
+          <p:cNvPr id="2" name="Slide Image Placeholder 1"/>
+          <p:cNvSpPr>
+            <a:spLocks noGrp="1" noRot="1" noChangeAspect="1"/>
+          </p:cNvSpPr>
+          <p:nvPr>
+            <p:ph type="sldImg"/>
+          </p:nvPr>
+        </p:nvSpPr>
+        <p:spPr/>
+      </p:sp>
+      <p:sp>
+        <p:nvSpPr>
+          <p:cNvPr id="3" name="Notes Placeholder 2"/>
+          <p:cNvSpPr>
+            <a:spLocks noGrp="1"/>
+          </p:cNvSpPr>
+          <p:nvPr>
+            <p:ph type="body" idx="1"/>
+          </p:nvPr>
+        </p:nvSpPr>
+        <p:spPr/>
+        <p:txBody>
+          <a:bodyPr/>
+          <a:lstStyle/>
+          <a:p>
+            <a:r>
+              <a:rPr lang="en-US" dirty="0" smtClean="0"/>
+              <a:t>Here are the different ways that systems protect</a:t>
+            </a:r>
+            <a:r>
+              <a:rPr lang="en-US" baseline="0" dirty="0" smtClean="0"/>
+              <a:t> against buffer overflows: </a:t>
+            </a:r>
+          </a:p>
+          <a:p>
+            <a:r>
+              <a:rPr lang="en-US" baseline="0" dirty="0" smtClean="0"/>
+              <a:t>1- Data execution prevention (been around in Linux, Mac and windows since about 2004). </a:t>
+            </a:r>
+          </a:p>
+          <a:p>
+            <a:r>
+              <a:rPr lang="en-US" baseline="0" dirty="0" smtClean="0"/>
+              <a:t>    This prevents an application from executing code in a non-executable memory region. </a:t>
+            </a:r>
+          </a:p>
+          <a:p>
+            <a:endParaRPr lang="en-US" baseline="0" dirty="0" smtClean="0"/>
+          </a:p>
+          <a:p>
+            <a:endParaRPr lang="en-US" baseline="0" dirty="0" smtClean="0"/>
+          </a:p>
+        </p:txBody>
+      </p:sp>
+      <p:sp>
+        <p:nvSpPr>
+          <p:cNvPr id="4" name="Slide Number Placeholder 3"/>
+          <p:cNvSpPr>
+            <a:spLocks noGrp="1"/>
+          </p:cNvSpPr>
+          <p:nvPr>
+            <p:ph type="sldNum" sz="quarter" idx="10"/>
+          </p:nvPr>
+        </p:nvSpPr>
+        <p:spPr/>
+        <p:txBody>
+          <a:bodyPr/>
+          <a:lstStyle/>
+          <a:p>
+            <a:fld id="{9D0B4A42-F062-4908-9C81-A569921BC8B1}" type="slidenum">
+              <a:rPr lang="en-US" smtClean="0"/>
+              <a:t>42</a:t>
+            </a:fld>
+            <a:endParaRPr lang="en-US"/>
+          </a:p>
+        </p:txBody>
+      </p:sp>
+    </p:spTree>
+    <p:extLst>
+      <p:ext uri="{BB962C8B-B14F-4D97-AF65-F5344CB8AC3E}">
+        <p14:creationId xmlns:p14="http://schemas.microsoft.com/office/powerpoint/2010/main" val="3076093952"/>
+      </p:ext>
+    </p:extLst>
+  </p:cSld>
+  <p:clrMapOvr>
+    <a:masterClrMapping/>
+  </p:clrMapOvr>
+</p:notes>
+</file>
+
+<file path=ppt/notesSlides/notesSlide14.xml><?xml version="1.0" encoding="utf-8"?>
+<p:notes xmlns:a="http://schemas.openxmlformats.org/drawingml/2006/main" xmlns:r="http://schemas.openxmlformats.org/officeDocument/2006/relationships" xmlns:p="http://schemas.openxmlformats.org/presentationml/2006/main">
+  <p:cSld>
+    <p:spTree>
+      <p:nvGrpSpPr>
+        <p:cNvPr id="1" name=""/>
+        <p:cNvGrpSpPr/>
+        <p:nvPr/>
+      </p:nvGrpSpPr>
+      <p:grpSpPr>
+        <a:xfrm>
+          <a:off x="0" y="0"/>
+          <a:ext cx="0" cy="0"/>
+          <a:chOff x="0" y="0"/>
+          <a:chExt cx="0" cy="0"/>
+        </a:xfrm>
+      </p:grpSpPr>
+      <p:sp>
+        <p:nvSpPr>
+          <p:cNvPr id="2" name="Slide Image Placeholder 1"/>
+          <p:cNvSpPr>
+            <a:spLocks noGrp="1" noRot="1" noChangeAspect="1"/>
+          </p:cNvSpPr>
+          <p:nvPr>
+            <p:ph type="sldImg"/>
+          </p:nvPr>
+        </p:nvSpPr>
+        <p:spPr/>
+      </p:sp>
+      <p:sp>
+        <p:nvSpPr>
+          <p:cNvPr id="3" name="Notes Placeholder 2"/>
+          <p:cNvSpPr>
+            <a:spLocks noGrp="1"/>
+          </p:cNvSpPr>
+          <p:nvPr>
+            <p:ph type="body" idx="1"/>
+          </p:nvPr>
+        </p:nvSpPr>
+        <p:spPr/>
+        <p:txBody>
+          <a:bodyPr/>
+          <a:lstStyle/>
+          <a:p>
+            <a:r>
+              <a:rPr lang="en-US" dirty="0" smtClean="0"/>
+              <a:t>Is there ASLR</a:t>
+            </a:r>
+            <a:r>
+              <a:rPr lang="en-US" baseline="0" dirty="0" smtClean="0"/>
+              <a:t> in windows and if so how to turn it off? </a:t>
+            </a:r>
+            <a:endParaRPr lang="en-US" dirty="0"/>
+          </a:p>
+        </p:txBody>
+      </p:sp>
+      <p:sp>
+        <p:nvSpPr>
+          <p:cNvPr id="4" name="Slide Number Placeholder 3"/>
+          <p:cNvSpPr>
+            <a:spLocks noGrp="1"/>
+          </p:cNvSpPr>
+          <p:nvPr>
+            <p:ph type="sldNum" sz="quarter" idx="10"/>
+          </p:nvPr>
+        </p:nvSpPr>
+        <p:spPr/>
+        <p:txBody>
+          <a:bodyPr/>
+          <a:lstStyle/>
+          <a:p>
+            <a:fld id="{9D0B4A42-F062-4908-9C81-A569921BC8B1}" type="slidenum">
+              <a:rPr lang="en-US" smtClean="0"/>
+              <a:t>43</a:t>
+            </a:fld>
+            <a:endParaRPr lang="en-US"/>
+          </a:p>
+        </p:txBody>
+      </p:sp>
+    </p:spTree>
+    <p:extLst>
+      <p:ext uri="{BB962C8B-B14F-4D97-AF65-F5344CB8AC3E}">
+        <p14:creationId xmlns:p14="http://schemas.microsoft.com/office/powerpoint/2010/main" val="2458700491"/>
+      </p:ext>
+    </p:extLst>
+  </p:cSld>
+  <p:clrMapOvr>
+    <a:masterClrMapping/>
+  </p:clrMapOvr>
+</p:notes>
+</file>
+
 <file path=ppt/notesSlides/notesSlide2.xml><?xml version="1.0" encoding="utf-8"?>
 <p:notes xmlns:a="http://schemas.openxmlformats.org/drawingml/2006/main" xmlns:r="http://schemas.openxmlformats.org/officeDocument/2006/relationships" xmlns:p="http://schemas.openxmlformats.org/presentationml/2006/main">
   <p:cSld>
@@ -7571,7 +7782,7 @@
           <a:p>
             <a:fld id="{FB76FE03-F4FF-4405-A4BA-F447F9618E72}" type="datetimeFigureOut">
               <a:rPr lang="en-US" smtClean="0"/>
-              <a:t>4/18/2012</a:t>
+              <a:t>4/19/2012</a:t>
             </a:fld>
             <a:endParaRPr lang="en-US"/>
           </a:p>
@@ -7836,7 +8047,7 @@
           <a:p>
             <a:fld id="{FB76FE03-F4FF-4405-A4BA-F447F9618E72}" type="datetimeFigureOut">
               <a:rPr lang="en-US" smtClean="0"/>
-              <a:t>4/18/2012</a:t>
+              <a:t>4/19/2012</a:t>
             </a:fld>
             <a:endParaRPr lang="en-US"/>
           </a:p>
@@ -8110,7 +8321,7 @@
           <a:p>
             <a:fld id="{FB76FE03-F4FF-4405-A4BA-F447F9618E72}" type="datetimeFigureOut">
               <a:rPr lang="en-US" smtClean="0"/>
-              <a:t>4/18/2012</a:t>
+              <a:t>4/19/2012</a:t>
             </a:fld>
             <a:endParaRPr lang="en-US"/>
           </a:p>
@@ -8327,7 +8538,7 @@
           <a:p>
             <a:fld id="{FB76FE03-F4FF-4405-A4BA-F447F9618E72}" type="datetimeFigureOut">
               <a:rPr lang="en-US" smtClean="0"/>
-              <a:t>4/18/2012</a:t>
+              <a:t>4/19/2012</a:t>
             </a:fld>
             <a:endParaRPr lang="en-US"/>
           </a:p>
@@ -8714,7 +8925,7 @@
           <a:p>
             <a:fld id="{FB76FE03-F4FF-4405-A4BA-F447F9618E72}" type="datetimeFigureOut">
               <a:rPr lang="en-US" smtClean="0"/>
-              <a:t>4/18/2012</a:t>
+              <a:t>4/19/2012</a:t>
             </a:fld>
             <a:endParaRPr lang="en-US"/>
           </a:p>
@@ -9095,7 +9306,7 @@
           <a:p>
             <a:fld id="{FB76FE03-F4FF-4405-A4BA-F447F9618E72}" type="datetimeFigureOut">
               <a:rPr lang="en-US" smtClean="0"/>
-              <a:t>4/18/2012</a:t>
+              <a:t>4/19/2012</a:t>
             </a:fld>
             <a:endParaRPr lang="en-US"/>
           </a:p>
@@ -9512,7 +9723,7 @@
           <a:p>
             <a:fld id="{FB76FE03-F4FF-4405-A4BA-F447F9618E72}" type="datetimeFigureOut">
               <a:rPr lang="en-US" smtClean="0"/>
-              <a:t>4/18/2012</a:t>
+              <a:t>4/19/2012</a:t>
             </a:fld>
             <a:endParaRPr lang="en-US"/>
           </a:p>
@@ -9625,7 +9836,7 @@
           <a:p>
             <a:fld id="{FB76FE03-F4FF-4405-A4BA-F447F9618E72}" type="datetimeFigureOut">
               <a:rPr lang="en-US" smtClean="0"/>
-              <a:t>4/18/2012</a:t>
+              <a:t>4/19/2012</a:t>
             </a:fld>
             <a:endParaRPr lang="en-US"/>
           </a:p>
@@ -9715,7 +9926,7 @@
           <a:p>
             <a:fld id="{FB76FE03-F4FF-4405-A4BA-F447F9618E72}" type="datetimeFigureOut">
               <a:rPr lang="en-US" smtClean="0"/>
-              <a:t>4/18/2012</a:t>
+              <a:t>4/19/2012</a:t>
             </a:fld>
             <a:endParaRPr lang="en-US"/>
           </a:p>
@@ -9924,7 +10135,7 @@
           <a:p>
             <a:fld id="{FB76FE03-F4FF-4405-A4BA-F447F9618E72}" type="datetimeFigureOut">
               <a:rPr lang="en-US" smtClean="0"/>
-              <a:t>4/18/2012</a:t>
+              <a:t>4/19/2012</a:t>
             </a:fld>
             <a:endParaRPr lang="en-US"/>
           </a:p>
@@ -10301,7 +10512,7 @@
           <a:p>
             <a:fld id="{FB76FE03-F4FF-4405-A4BA-F447F9618E72}" type="datetimeFigureOut">
               <a:rPr lang="en-US" smtClean="0"/>
-              <a:t>4/18/2012</a:t>
+              <a:t>4/19/2012</a:t>
             </a:fld>
             <a:endParaRPr lang="en-US"/>
           </a:p>
@@ -10848,7 +11059,7 @@
           <a:p>
             <a:fld id="{FB76FE03-F4FF-4405-A4BA-F447F9618E72}" type="datetimeFigureOut">
               <a:rPr lang="en-US" smtClean="0"/>
-              <a:t>4/18/2012</a:t>
+              <a:t>4/19/2012</a:t>
             </a:fld>
             <a:endParaRPr lang="en-US"/>
           </a:p>
@@ -35264,11 +35475,7 @@
           <a:p>
             <a:r>
               <a:rPr lang="en-US" dirty="0" smtClean="0"/>
-              <a:t>Assembly (Intel x86</a:t>
-            </a:r>
-            <a:r>
-              <a:rPr lang="en-US" dirty="0" smtClean="0"/>
-              <a:t>) Windows</a:t>
+              <a:t>Assembly (Intel x86) Windows</a:t>
             </a:r>
             <a:endParaRPr lang="en-US" dirty="0"/>
           </a:p>
@@ -36072,11 +36279,7 @@
           <a:p>
             <a:r>
               <a:rPr lang="en-US" dirty="0" smtClean="0"/>
-              <a:t>Assembly (Intel x86</a:t>
-            </a:r>
-            <a:r>
-              <a:rPr lang="en-US" dirty="0" smtClean="0"/>
-              <a:t>) Unix</a:t>
+              <a:t>Assembly (Intel x86) Unix</a:t>
             </a:r>
             <a:endParaRPr lang="en-US" dirty="0"/>
           </a:p>
@@ -36377,6 +36580,561 @@
 </p:sld>
 </file>
 
+<file path=ppt/slides/slide41.xml><?xml version="1.0" encoding="utf-8"?>
+<p:sld xmlns:a="http://schemas.openxmlformats.org/drawingml/2006/main" xmlns:r="http://schemas.openxmlformats.org/officeDocument/2006/relationships" xmlns:p="http://schemas.openxmlformats.org/presentationml/2006/main">
+  <p:cSld>
+    <p:spTree>
+      <p:nvGrpSpPr>
+        <p:cNvPr id="1" name=""/>
+        <p:cNvGrpSpPr/>
+        <p:nvPr/>
+      </p:nvGrpSpPr>
+      <p:grpSpPr>
+        <a:xfrm>
+          <a:off x="0" y="0"/>
+          <a:ext cx="0" cy="0"/>
+          <a:chOff x="0" y="0"/>
+          <a:chExt cx="0" cy="0"/>
+        </a:xfrm>
+      </p:grpSpPr>
+      <p:sp>
+        <p:nvSpPr>
+          <p:cNvPr id="2" name="Title 1"/>
+          <p:cNvSpPr>
+            <a:spLocks noGrp="1"/>
+          </p:cNvSpPr>
+          <p:nvPr>
+            <p:ph type="ctrTitle"/>
+          </p:nvPr>
+        </p:nvSpPr>
+        <p:spPr/>
+        <p:txBody>
+          <a:bodyPr/>
+          <a:lstStyle/>
+          <a:p>
+            <a:r>
+              <a:rPr lang="en-US" dirty="0" smtClean="0"/>
+              <a:t>Day Two</a:t>
+            </a:r>
+            <a:endParaRPr lang="en-US" dirty="0"/>
+          </a:p>
+        </p:txBody>
+      </p:sp>
+      <p:sp>
+        <p:nvSpPr>
+          <p:cNvPr id="3" name="Subtitle 2"/>
+          <p:cNvSpPr>
+            <a:spLocks noGrp="1"/>
+          </p:cNvSpPr>
+          <p:nvPr>
+            <p:ph type="subTitle" idx="1"/>
+          </p:nvPr>
+        </p:nvSpPr>
+        <p:spPr/>
+        <p:txBody>
+          <a:bodyPr/>
+          <a:lstStyle/>
+          <a:p>
+            <a:r>
+              <a:rPr lang="en-US" dirty="0" smtClean="0"/>
+              <a:t>Buffer </a:t>
+            </a:r>
+            <a:r>
+              <a:rPr lang="en-US" dirty="0" err="1" smtClean="0"/>
+              <a:t>Overflowin</a:t>
+            </a:r>
+            <a:endParaRPr lang="en-US" dirty="0"/>
+          </a:p>
+        </p:txBody>
+      </p:sp>
+    </p:spTree>
+    <p:extLst>
+      <p:ext uri="{BB962C8B-B14F-4D97-AF65-F5344CB8AC3E}">
+        <p14:creationId xmlns:p14="http://schemas.microsoft.com/office/powerpoint/2010/main" val="2564060247"/>
+      </p:ext>
+    </p:extLst>
+  </p:cSld>
+  <p:clrMapOvr>
+    <a:masterClrMapping/>
+  </p:clrMapOvr>
+</p:sld>
+</file>
+
+<file path=ppt/slides/slide42.xml><?xml version="1.0" encoding="utf-8"?>
+<p:sld xmlns:a="http://schemas.openxmlformats.org/drawingml/2006/main" xmlns:r="http://schemas.openxmlformats.org/officeDocument/2006/relationships" xmlns:p="http://schemas.openxmlformats.org/presentationml/2006/main">
+  <p:cSld>
+    <p:spTree>
+      <p:nvGrpSpPr>
+        <p:cNvPr id="1" name=""/>
+        <p:cNvGrpSpPr/>
+        <p:nvPr/>
+      </p:nvGrpSpPr>
+      <p:grpSpPr>
+        <a:xfrm>
+          <a:off x="0" y="0"/>
+          <a:ext cx="0" cy="0"/>
+          <a:chOff x="0" y="0"/>
+          <a:chExt cx="0" cy="0"/>
+        </a:xfrm>
+      </p:grpSpPr>
+      <p:sp>
+        <p:nvSpPr>
+          <p:cNvPr id="2" name="Title 1"/>
+          <p:cNvSpPr>
+            <a:spLocks noGrp="1"/>
+          </p:cNvSpPr>
+          <p:nvPr>
+            <p:ph type="title"/>
+          </p:nvPr>
+        </p:nvSpPr>
+        <p:spPr/>
+        <p:txBody>
+          <a:bodyPr/>
+          <a:lstStyle/>
+          <a:p>
+            <a:r>
+              <a:rPr lang="en-US" dirty="0" smtClean="0"/>
+              <a:t>Protection Against Buffer Overflows</a:t>
+            </a:r>
+            <a:endParaRPr lang="en-US" dirty="0"/>
+          </a:p>
+        </p:txBody>
+      </p:sp>
+      <p:sp>
+        <p:nvSpPr>
+          <p:cNvPr id="3" name="Content Placeholder 2"/>
+          <p:cNvSpPr>
+            <a:spLocks noGrp="1"/>
+          </p:cNvSpPr>
+          <p:nvPr>
+            <p:ph idx="1"/>
+          </p:nvPr>
+        </p:nvSpPr>
+        <p:spPr/>
+        <p:txBody>
+          <a:bodyPr/>
+          <a:lstStyle/>
+          <a:p>
+            <a:r>
+              <a:rPr lang="en-US" dirty="0" smtClean="0"/>
+              <a:t>Data Execution Prevention</a:t>
+            </a:r>
+          </a:p>
+          <a:p>
+            <a:pPr lvl="1"/>
+            <a:r>
+              <a:rPr lang="en-US" dirty="0" smtClean="0"/>
+              <a:t>Linux, Mac, Windows</a:t>
+            </a:r>
+          </a:p>
+          <a:p>
+            <a:pPr lvl="1"/>
+            <a:r>
+              <a:rPr lang="en-US" dirty="0" smtClean="0"/>
+              <a:t>Hardware Marks all locations in a process as non-executable unless the location explicitly contains executable code. </a:t>
+            </a:r>
+          </a:p>
+          <a:p>
+            <a:pPr lvl="1"/>
+            <a:r>
+              <a:rPr lang="en-US" dirty="0" smtClean="0"/>
+              <a:t>If an app tries to run this code, an error is thrown, calling process terminated</a:t>
+            </a:r>
+          </a:p>
+          <a:p>
+            <a:r>
+              <a:rPr lang="en-US" dirty="0" smtClean="0"/>
+              <a:t>To Disable DEP –</a:t>
+            </a:r>
+          </a:p>
+          <a:p>
+            <a:pPr lvl="1"/>
+            <a:r>
+              <a:rPr lang="en-US" dirty="0" smtClean="0"/>
+              <a:t>Windows – recovery and startup sessions, edit the system startup, replace the line </a:t>
+            </a:r>
+            <a:r>
+              <a:rPr lang="en-US" dirty="0" err="1" smtClean="0"/>
+              <a:t>OptIn</a:t>
+            </a:r>
+            <a:r>
+              <a:rPr lang="en-US" dirty="0" smtClean="0"/>
+              <a:t> with always out (/</a:t>
+            </a:r>
+            <a:r>
+              <a:rPr lang="en-US" dirty="0" err="1" smtClean="0"/>
+              <a:t>noexecute</a:t>
+            </a:r>
+            <a:r>
+              <a:rPr lang="en-US" dirty="0" smtClean="0"/>
+              <a:t>=</a:t>
+            </a:r>
+            <a:r>
+              <a:rPr lang="en-US" dirty="0" err="1" smtClean="0"/>
+              <a:t>AlwaysOff</a:t>
+            </a:r>
+            <a:r>
+              <a:rPr lang="en-US" dirty="0" smtClean="0"/>
+              <a:t>)</a:t>
+            </a:r>
+          </a:p>
+          <a:p>
+            <a:pPr lvl="1"/>
+            <a:r>
+              <a:rPr lang="en-US" dirty="0" smtClean="0"/>
+              <a:t>Linux –</a:t>
+            </a:r>
+          </a:p>
+          <a:p>
+            <a:pPr lvl="2"/>
+            <a:r>
+              <a:rPr lang="en-US" dirty="0" smtClean="0"/>
+              <a:t>Echo 0 &gt; /</a:t>
+            </a:r>
+            <a:r>
+              <a:rPr lang="en-US" dirty="0" err="1" smtClean="0"/>
+              <a:t>proc</a:t>
+            </a:r>
+            <a:r>
+              <a:rPr lang="en-US" dirty="0" smtClean="0"/>
+              <a:t>/sys/kernel/exec-shield</a:t>
+            </a:r>
+          </a:p>
+          <a:p>
+            <a:pPr lvl="2"/>
+            <a:r>
+              <a:rPr lang="en-US" dirty="0" smtClean="0"/>
+              <a:t>Echo 0 &gt; /</a:t>
+            </a:r>
+            <a:r>
+              <a:rPr lang="en-US" dirty="0" err="1" smtClean="0"/>
+              <a:t>proc</a:t>
+            </a:r>
+            <a:r>
+              <a:rPr lang="en-US" dirty="0" smtClean="0"/>
+              <a:t>/sys/kernel/exec-shield-randomize</a:t>
+            </a:r>
+            <a:endParaRPr lang="en-US" dirty="0"/>
+          </a:p>
+        </p:txBody>
+      </p:sp>
+    </p:spTree>
+    <p:extLst>
+      <p:ext uri="{BB962C8B-B14F-4D97-AF65-F5344CB8AC3E}">
+        <p14:creationId xmlns:p14="http://schemas.microsoft.com/office/powerpoint/2010/main" val="1819619996"/>
+      </p:ext>
+    </p:extLst>
+  </p:cSld>
+  <p:clrMapOvr>
+    <a:masterClrMapping/>
+  </p:clrMapOvr>
+</p:sld>
+</file>
+
+<file path=ppt/slides/slide43.xml><?xml version="1.0" encoding="utf-8"?>
+<p:sld xmlns:a="http://schemas.openxmlformats.org/drawingml/2006/main" xmlns:r="http://schemas.openxmlformats.org/officeDocument/2006/relationships" xmlns:p="http://schemas.openxmlformats.org/presentationml/2006/main">
+  <p:cSld>
+    <p:spTree>
+      <p:nvGrpSpPr>
+        <p:cNvPr id="1" name=""/>
+        <p:cNvGrpSpPr/>
+        <p:nvPr/>
+      </p:nvGrpSpPr>
+      <p:grpSpPr>
+        <a:xfrm>
+          <a:off x="0" y="0"/>
+          <a:ext cx="0" cy="0"/>
+          <a:chOff x="0" y="0"/>
+          <a:chExt cx="0" cy="0"/>
+        </a:xfrm>
+      </p:grpSpPr>
+      <p:sp>
+        <p:nvSpPr>
+          <p:cNvPr id="2" name="Title 1"/>
+          <p:cNvSpPr>
+            <a:spLocks noGrp="1"/>
+          </p:cNvSpPr>
+          <p:nvPr>
+            <p:ph type="title"/>
+          </p:nvPr>
+        </p:nvSpPr>
+        <p:spPr/>
+        <p:txBody>
+          <a:bodyPr/>
+          <a:lstStyle/>
+          <a:p>
+            <a:r>
+              <a:rPr lang="en-US" dirty="0" smtClean="0"/>
+              <a:t>Protection Continued</a:t>
+            </a:r>
+            <a:endParaRPr lang="en-US" dirty="0"/>
+          </a:p>
+        </p:txBody>
+      </p:sp>
+      <p:sp>
+        <p:nvSpPr>
+          <p:cNvPr id="3" name="Content Placeholder 2"/>
+          <p:cNvSpPr>
+            <a:spLocks noGrp="1"/>
+          </p:cNvSpPr>
+          <p:nvPr>
+            <p:ph idx="1"/>
+          </p:nvPr>
+        </p:nvSpPr>
+        <p:spPr/>
+        <p:txBody>
+          <a:bodyPr/>
+          <a:lstStyle/>
+          <a:p>
+            <a:r>
+              <a:rPr lang="en-US" dirty="0" smtClean="0"/>
+              <a:t>Address Space Layout Randomization</a:t>
+            </a:r>
+          </a:p>
+          <a:p>
+            <a:pPr lvl="1"/>
+            <a:r>
+              <a:rPr lang="en-US" dirty="0" smtClean="0"/>
+              <a:t>Randomly arranges the positions of key data areas</a:t>
+            </a:r>
+          </a:p>
+          <a:p>
+            <a:pPr lvl="2"/>
+            <a:r>
+              <a:rPr lang="en-US" dirty="0" smtClean="0"/>
+              <a:t>E.g. positions of library, heap, stack</a:t>
+            </a:r>
+          </a:p>
+          <a:p>
+            <a:pPr lvl="1"/>
+            <a:r>
+              <a:rPr lang="en-US" dirty="0" smtClean="0"/>
+              <a:t>If the location of </a:t>
+            </a:r>
+            <a:r>
+              <a:rPr lang="en-US" dirty="0" err="1" smtClean="0"/>
+              <a:t>lib.c</a:t>
+            </a:r>
+            <a:r>
+              <a:rPr lang="en-US" dirty="0" smtClean="0"/>
+              <a:t> changes </a:t>
+            </a:r>
+            <a:r>
+              <a:rPr lang="en-US" dirty="0" err="1" smtClean="0"/>
+              <a:t>everytime</a:t>
+            </a:r>
+            <a:r>
+              <a:rPr lang="en-US" dirty="0" smtClean="0"/>
+              <a:t>, then it will be hard to find the exact locations of different functions</a:t>
+            </a:r>
+          </a:p>
+          <a:p>
+            <a:r>
+              <a:rPr lang="en-US" dirty="0" smtClean="0"/>
+              <a:t>Turn off ASLR </a:t>
+            </a:r>
+          </a:p>
+          <a:p>
+            <a:pPr lvl="1"/>
+            <a:r>
+              <a:rPr lang="en-US" dirty="0" smtClean="0"/>
+              <a:t>Linux – echo 0 &gt; /</a:t>
+            </a:r>
+            <a:r>
+              <a:rPr lang="en-US" dirty="0" err="1" smtClean="0"/>
+              <a:t>proc</a:t>
+            </a:r>
+            <a:r>
+              <a:rPr lang="en-US" dirty="0" smtClean="0"/>
+              <a:t>/sys/kernel/</a:t>
+            </a:r>
+            <a:r>
+              <a:rPr lang="en-US" dirty="0" err="1" smtClean="0"/>
+              <a:t>randomize_va_space</a:t>
+            </a:r>
+            <a:endParaRPr lang="en-US" dirty="0"/>
+          </a:p>
+        </p:txBody>
+      </p:sp>
+    </p:spTree>
+    <p:extLst>
+      <p:ext uri="{BB962C8B-B14F-4D97-AF65-F5344CB8AC3E}">
+        <p14:creationId xmlns:p14="http://schemas.microsoft.com/office/powerpoint/2010/main" val="1940961802"/>
+      </p:ext>
+    </p:extLst>
+  </p:cSld>
+  <p:clrMapOvr>
+    <a:masterClrMapping/>
+  </p:clrMapOvr>
+</p:sld>
+</file>
+
+<file path=ppt/slides/slide44.xml><?xml version="1.0" encoding="utf-8"?>
+<p:sld xmlns:a="http://schemas.openxmlformats.org/drawingml/2006/main" xmlns:r="http://schemas.openxmlformats.org/officeDocument/2006/relationships" xmlns:p="http://schemas.openxmlformats.org/presentationml/2006/main">
+  <p:cSld>
+    <p:spTree>
+      <p:nvGrpSpPr>
+        <p:cNvPr id="1" name=""/>
+        <p:cNvGrpSpPr/>
+        <p:nvPr/>
+      </p:nvGrpSpPr>
+      <p:grpSpPr>
+        <a:xfrm>
+          <a:off x="0" y="0"/>
+          <a:ext cx="0" cy="0"/>
+          <a:chOff x="0" y="0"/>
+          <a:chExt cx="0" cy="0"/>
+        </a:xfrm>
+      </p:grpSpPr>
+      <p:sp>
+        <p:nvSpPr>
+          <p:cNvPr id="2" name="Title 1"/>
+          <p:cNvSpPr>
+            <a:spLocks noGrp="1"/>
+          </p:cNvSpPr>
+          <p:nvPr>
+            <p:ph type="title"/>
+          </p:nvPr>
+        </p:nvSpPr>
+        <p:spPr/>
+        <p:txBody>
+          <a:bodyPr/>
+          <a:lstStyle/>
+          <a:p>
+            <a:r>
+              <a:rPr lang="en-US" dirty="0" smtClean="0"/>
+              <a:t>Canaries</a:t>
+            </a:r>
+            <a:endParaRPr lang="en-US" dirty="0"/>
+          </a:p>
+        </p:txBody>
+      </p:sp>
+      <p:sp>
+        <p:nvSpPr>
+          <p:cNvPr id="3" name="Content Placeholder 2"/>
+          <p:cNvSpPr>
+            <a:spLocks noGrp="1"/>
+          </p:cNvSpPr>
+          <p:nvPr>
+            <p:ph idx="1"/>
+          </p:nvPr>
+        </p:nvSpPr>
+        <p:spPr/>
+        <p:txBody>
+          <a:bodyPr/>
+          <a:lstStyle/>
+          <a:p>
+            <a:r>
+              <a:rPr lang="en-US" dirty="0" smtClean="0"/>
+              <a:t>Known variables that are placed between a buffer and control data on the stack to monitor buffer overflows</a:t>
+            </a:r>
+          </a:p>
+          <a:p>
+            <a:pPr lvl="1"/>
+            <a:r>
+              <a:rPr lang="en-US" dirty="0" smtClean="0"/>
+              <a:t>If there is a buffer overflow, first to go will be the canary</a:t>
+            </a:r>
+          </a:p>
+          <a:p>
+            <a:pPr lvl="1"/>
+            <a:r>
+              <a:rPr lang="en-US" dirty="0" smtClean="0"/>
+              <a:t>Data then deemed corrupted</a:t>
+            </a:r>
+          </a:p>
+          <a:p>
+            <a:r>
+              <a:rPr lang="en-US" dirty="0" smtClean="0"/>
+              <a:t>3 Types – Terminator, Random, Random XOR</a:t>
+            </a:r>
+          </a:p>
+          <a:p>
+            <a:endParaRPr lang="en-US" dirty="0"/>
+          </a:p>
+        </p:txBody>
+      </p:sp>
+    </p:spTree>
+    <p:extLst>
+      <p:ext uri="{BB962C8B-B14F-4D97-AF65-F5344CB8AC3E}">
+        <p14:creationId xmlns:p14="http://schemas.microsoft.com/office/powerpoint/2010/main" val="271818219"/>
+      </p:ext>
+    </p:extLst>
+  </p:cSld>
+  <p:clrMapOvr>
+    <a:masterClrMapping/>
+  </p:clrMapOvr>
+</p:sld>
+</file>
+
+<file path=ppt/slides/slide45.xml><?xml version="1.0" encoding="utf-8"?>
+<p:sld xmlns:a="http://schemas.openxmlformats.org/drawingml/2006/main" xmlns:r="http://schemas.openxmlformats.org/officeDocument/2006/relationships" xmlns:p="http://schemas.openxmlformats.org/presentationml/2006/main">
+  <p:cSld>
+    <p:spTree>
+      <p:nvGrpSpPr>
+        <p:cNvPr id="1" name=""/>
+        <p:cNvGrpSpPr/>
+        <p:nvPr/>
+      </p:nvGrpSpPr>
+      <p:grpSpPr>
+        <a:xfrm>
+          <a:off x="0" y="0"/>
+          <a:ext cx="0" cy="0"/>
+          <a:chOff x="0" y="0"/>
+          <a:chExt cx="0" cy="0"/>
+        </a:xfrm>
+      </p:grpSpPr>
+      <p:sp>
+        <p:nvSpPr>
+          <p:cNvPr id="2" name="Title 1"/>
+          <p:cNvSpPr>
+            <a:spLocks noGrp="1"/>
+          </p:cNvSpPr>
+          <p:nvPr>
+            <p:ph type="title"/>
+          </p:nvPr>
+        </p:nvSpPr>
+        <p:spPr/>
+        <p:txBody>
+          <a:bodyPr/>
+          <a:lstStyle/>
+          <a:p>
+            <a:endParaRPr lang="en-US"/>
+          </a:p>
+        </p:txBody>
+      </p:sp>
+      <p:sp>
+        <p:nvSpPr>
+          <p:cNvPr id="3" name="Content Placeholder 2"/>
+          <p:cNvSpPr>
+            <a:spLocks noGrp="1"/>
+          </p:cNvSpPr>
+          <p:nvPr>
+            <p:ph idx="1"/>
+          </p:nvPr>
+        </p:nvSpPr>
+        <p:spPr/>
+        <p:txBody>
+          <a:bodyPr/>
+          <a:lstStyle/>
+          <a:p>
+            <a:endParaRPr lang="en-US"/>
+          </a:p>
+        </p:txBody>
+      </p:sp>
+    </p:spTree>
+    <p:extLst>
+      <p:ext uri="{BB962C8B-B14F-4D97-AF65-F5344CB8AC3E}">
+        <p14:creationId xmlns:p14="http://schemas.microsoft.com/office/powerpoint/2010/main" val="1552781151"/>
+      </p:ext>
+    </p:extLst>
+  </p:cSld>
+  <p:clrMapOvr>
+    <a:masterClrMapping/>
+  </p:clrMapOvr>
+</p:sld>
+</file>
+
 <file path=ppt/slides/slide5.xml><?xml version="1.0" encoding="utf-8"?>
 <p:sld xmlns:a="http://schemas.openxmlformats.org/drawingml/2006/main" xmlns:r="http://schemas.openxmlformats.org/officeDocument/2006/relationships" xmlns:p="http://schemas.openxmlformats.org/presentationml/2006/main">
   <p:cSld>
@@ -36900,14 +37658,7 @@
                 <a:latin typeface="Consolas" pitchFamily="49" charset="0"/>
                 <a:cs typeface="Consolas" pitchFamily="49" charset="0"/>
               </a:rPr>
-              <a:t>x%n%s</a:t>
-            </a:r>
-            <a:r>
-              <a:rPr lang="en-US" dirty="0" err="1" smtClean="0">
-                <a:latin typeface="Consolas" pitchFamily="49" charset="0"/>
-                <a:cs typeface="Consolas" pitchFamily="49" charset="0"/>
-              </a:rPr>
-              <a:t>%d</a:t>
+              <a:t>x%n%s%d</a:t>
             </a:r>
             <a:r>
               <a:rPr lang="en-US" dirty="0" smtClean="0">
@@ -36926,15 +37677,7 @@
             </a:r>
             <a:r>
               <a:rPr lang="en-US" dirty="0" smtClean="0"/>
-              <a:t> attack might inject enough format symbols to read </a:t>
-            </a:r>
-            <a:r>
-              <a:rPr lang="en-US" dirty="0" smtClean="0"/>
-              <a:t>protected memory </a:t>
-            </a:r>
-            <a:r>
-              <a:rPr lang="en-US" dirty="0" smtClean="0"/>
-              <a:t>=&gt; Segmentation fault.</a:t>
+              <a:t> attack might inject enough format symbols to read protected memory =&gt; Segmentation fault.</a:t>
             </a:r>
             <a:endParaRPr lang="en-US" dirty="0"/>
           </a:p>

</xml_diff>

<commit_message>
adding a secure bit slide to the presentation to make enbody happy :)
</commit_message>
<xml_diff>
--- a/Buffer Overflow Attacks.pptx
+++ b/Buffer Overflow Attacks.pptx
@@ -295,7 +295,7 @@
           <a:p>
             <a:fld id="{9DED5714-D740-4F89-AAD5-E3BC8B06EDCA}" type="datetimeFigureOut">
               <a:rPr lang="en-US" smtClean="0"/>
-              <a:t>4/19/2012</a:t>
+              <a:t>4/22/2012</a:t>
             </a:fld>
             <a:endParaRPr lang="en-US"/>
           </a:p>
@@ -7782,7 +7782,7 @@
           <a:p>
             <a:fld id="{FB76FE03-F4FF-4405-A4BA-F447F9618E72}" type="datetimeFigureOut">
               <a:rPr lang="en-US" smtClean="0"/>
-              <a:t>4/19/2012</a:t>
+              <a:t>4/22/2012</a:t>
             </a:fld>
             <a:endParaRPr lang="en-US"/>
           </a:p>
@@ -8047,7 +8047,7 @@
           <a:p>
             <a:fld id="{FB76FE03-F4FF-4405-A4BA-F447F9618E72}" type="datetimeFigureOut">
               <a:rPr lang="en-US" smtClean="0"/>
-              <a:t>4/19/2012</a:t>
+              <a:t>4/22/2012</a:t>
             </a:fld>
             <a:endParaRPr lang="en-US"/>
           </a:p>
@@ -8321,7 +8321,7 @@
           <a:p>
             <a:fld id="{FB76FE03-F4FF-4405-A4BA-F447F9618E72}" type="datetimeFigureOut">
               <a:rPr lang="en-US" smtClean="0"/>
-              <a:t>4/19/2012</a:t>
+              <a:t>4/22/2012</a:t>
             </a:fld>
             <a:endParaRPr lang="en-US"/>
           </a:p>
@@ -8538,7 +8538,7 @@
           <a:p>
             <a:fld id="{FB76FE03-F4FF-4405-A4BA-F447F9618E72}" type="datetimeFigureOut">
               <a:rPr lang="en-US" smtClean="0"/>
-              <a:t>4/19/2012</a:t>
+              <a:t>4/22/2012</a:t>
             </a:fld>
             <a:endParaRPr lang="en-US"/>
           </a:p>
@@ -8925,7 +8925,7 @@
           <a:p>
             <a:fld id="{FB76FE03-F4FF-4405-A4BA-F447F9618E72}" type="datetimeFigureOut">
               <a:rPr lang="en-US" smtClean="0"/>
-              <a:t>4/19/2012</a:t>
+              <a:t>4/22/2012</a:t>
             </a:fld>
             <a:endParaRPr lang="en-US"/>
           </a:p>
@@ -9306,7 +9306,7 @@
           <a:p>
             <a:fld id="{FB76FE03-F4FF-4405-A4BA-F447F9618E72}" type="datetimeFigureOut">
               <a:rPr lang="en-US" smtClean="0"/>
-              <a:t>4/19/2012</a:t>
+              <a:t>4/22/2012</a:t>
             </a:fld>
             <a:endParaRPr lang="en-US"/>
           </a:p>
@@ -9723,7 +9723,7 @@
           <a:p>
             <a:fld id="{FB76FE03-F4FF-4405-A4BA-F447F9618E72}" type="datetimeFigureOut">
               <a:rPr lang="en-US" smtClean="0"/>
-              <a:t>4/19/2012</a:t>
+              <a:t>4/22/2012</a:t>
             </a:fld>
             <a:endParaRPr lang="en-US"/>
           </a:p>
@@ -9836,7 +9836,7 @@
           <a:p>
             <a:fld id="{FB76FE03-F4FF-4405-A4BA-F447F9618E72}" type="datetimeFigureOut">
               <a:rPr lang="en-US" smtClean="0"/>
-              <a:t>4/19/2012</a:t>
+              <a:t>4/22/2012</a:t>
             </a:fld>
             <a:endParaRPr lang="en-US"/>
           </a:p>
@@ -9926,7 +9926,7 @@
           <a:p>
             <a:fld id="{FB76FE03-F4FF-4405-A4BA-F447F9618E72}" type="datetimeFigureOut">
               <a:rPr lang="en-US" smtClean="0"/>
-              <a:t>4/19/2012</a:t>
+              <a:t>4/22/2012</a:t>
             </a:fld>
             <a:endParaRPr lang="en-US"/>
           </a:p>
@@ -10135,7 +10135,7 @@
           <a:p>
             <a:fld id="{FB76FE03-F4FF-4405-A4BA-F447F9618E72}" type="datetimeFigureOut">
               <a:rPr lang="en-US" smtClean="0"/>
-              <a:t>4/19/2012</a:t>
+              <a:t>4/22/2012</a:t>
             </a:fld>
             <a:endParaRPr lang="en-US"/>
           </a:p>
@@ -10512,7 +10512,7 @@
           <a:p>
             <a:fld id="{FB76FE03-F4FF-4405-A4BA-F447F9618E72}" type="datetimeFigureOut">
               <a:rPr lang="en-US" smtClean="0"/>
-              <a:t>4/19/2012</a:t>
+              <a:t>4/22/2012</a:t>
             </a:fld>
             <a:endParaRPr lang="en-US"/>
           </a:p>
@@ -11059,7 +11059,7 @@
           <a:p>
             <a:fld id="{FB76FE03-F4FF-4405-A4BA-F447F9618E72}" type="datetimeFigureOut">
               <a:rPr lang="en-US" smtClean="0"/>
-              <a:t>4/19/2012</a:t>
+              <a:t>4/22/2012</a:t>
             </a:fld>
             <a:endParaRPr lang="en-US"/>
           </a:p>
@@ -11570,6 +11570,13 @@
   <p:clrMapOvr>
     <a:masterClrMapping/>
   </p:clrMapOvr>
+  <p:timing>
+    <p:tnLst>
+      <p:par>
+        <p:cTn id="1" dur="indefinite" restart="never" nodeType="tmRoot"/>
+      </p:par>
+    </p:tnLst>
+  </p:timing>
 </p:sld>
 </file>
 
@@ -25763,6 +25770,13 @@
   <p:clrMapOvr>
     <a:masterClrMapping/>
   </p:clrMapOvr>
+  <p:timing>
+    <p:tnLst>
+      <p:par>
+        <p:cTn id="1" dur="indefinite" restart="never" nodeType="tmRoot"/>
+      </p:par>
+    </p:tnLst>
+  </p:timing>
 </p:sld>
 </file>
 
@@ -33361,6 +33375,13 @@
   <p:clrMapOvr>
     <a:masterClrMapping/>
   </p:clrMapOvr>
+  <p:timing>
+    <p:tnLst>
+      <p:par>
+        <p:cTn id="1" dur="indefinite" restart="never" nodeType="tmRoot"/>
+      </p:par>
+    </p:tnLst>
+  </p:timing>
 </p:sld>
 </file>
 
@@ -36242,6 +36263,13 @@
   <p:clrMapOvr>
     <a:masterClrMapping/>
   </p:clrMapOvr>
+  <p:timing>
+    <p:tnLst>
+      <p:par>
+        <p:cTn id="1" dur="indefinite" restart="never" nodeType="tmRoot"/>
+      </p:par>
+    </p:tnLst>
+  </p:timing>
 </p:sld>
 </file>
 
@@ -36657,6 +36685,13 @@
   <p:clrMapOvr>
     <a:masterClrMapping/>
   </p:clrMapOvr>
+  <p:timing>
+    <p:tnLst>
+      <p:par>
+        <p:cTn id="1" dur="indefinite" restart="never" nodeType="tmRoot"/>
+      </p:par>
+    </p:tnLst>
+  </p:timing>
 </p:sld>
 </file>
 
@@ -36828,6 +36863,13 @@
   <p:clrMapOvr>
     <a:masterClrMapping/>
   </p:clrMapOvr>
+  <p:timing>
+    <p:tnLst>
+      <p:par>
+        <p:cTn id="1" dur="indefinite" restart="never" nodeType="tmRoot"/>
+      </p:par>
+    </p:tnLst>
+  </p:timing>
 </p:sld>
 </file>
 
@@ -36966,6 +37008,13 @@
   <p:clrMapOvr>
     <a:masterClrMapping/>
   </p:clrMapOvr>
+  <p:timing>
+    <p:tnLst>
+      <p:par>
+        <p:cTn id="1" dur="indefinite" restart="never" nodeType="tmRoot"/>
+      </p:par>
+    </p:tnLst>
+  </p:timing>
 </p:sld>
 </file>
 
@@ -37064,6 +37113,13 @@
   <p:clrMapOvr>
     <a:masterClrMapping/>
   </p:clrMapOvr>
+  <p:timing>
+    <p:tnLst>
+      <p:par>
+        <p:cTn id="1" dur="indefinite" restart="never" nodeType="tmRoot"/>
+      </p:par>
+    </p:tnLst>
+  </p:timing>
 </p:sld>
 </file>
 
@@ -37099,7 +37155,11 @@
           <a:bodyPr/>
           <a:lstStyle/>
           <a:p>
-            <a:endParaRPr lang="en-US"/>
+            <a:r>
+              <a:rPr lang="en-US" dirty="0" smtClean="0"/>
+              <a:t>Secure Bit</a:t>
+            </a:r>
+            <a:endParaRPr lang="en-US" dirty="0"/>
           </a:p>
         </p:txBody>
       </p:sp>
@@ -37118,10 +37178,58 @@
           <a:bodyPr/>
           <a:lstStyle/>
           <a:p>
-            <a:endParaRPr lang="en-US"/>
+            <a:r>
+              <a:rPr lang="en-US" dirty="0" smtClean="0"/>
+              <a:t>Hardware level flagging of mistrusted input</a:t>
+            </a:r>
+          </a:p>
+          <a:p>
+            <a:r>
+              <a:rPr lang="en-US" dirty="0" smtClean="0"/>
+              <a:t>Bit flag indicates whether input is trusted or untrusted</a:t>
+            </a:r>
+          </a:p>
+          <a:p>
+            <a:r>
+              <a:rPr lang="en-US" dirty="0" smtClean="0"/>
+              <a:t>If user input enters function pointer or return address section of memory, an exception is raised</a:t>
+            </a:r>
+          </a:p>
+          <a:p>
+            <a:endParaRPr lang="en-US" dirty="0"/>
           </a:p>
         </p:txBody>
       </p:sp>
+      <p:pic>
+        <p:nvPicPr>
+          <p:cNvPr id="4" name="Picture 3"/>
+          <p:cNvPicPr>
+            <a:picLocks noChangeAspect="1"/>
+          </p:cNvPicPr>
+          <p:nvPr/>
+        </p:nvPicPr>
+        <p:blipFill>
+          <a:blip r:embed="rId2">
+            <a:extLst>
+              <a:ext uri="{28A0092B-C50C-407E-A947-70E740481C1C}">
+                <a14:useLocalDpi xmlns:a14="http://schemas.microsoft.com/office/drawing/2010/main" val="0"/>
+              </a:ext>
+            </a:extLst>
+          </a:blip>
+          <a:stretch>
+            <a:fillRect/>
+          </a:stretch>
+        </p:blipFill>
+        <p:spPr>
+          <a:xfrm>
+            <a:off x="1752600" y="3276600"/>
+            <a:ext cx="4622800" cy="3467100"/>
+          </a:xfrm>
+          <a:prstGeom prst="rect">
+            <a:avLst/>
+          </a:prstGeom>
+        </p:spPr>
+      </p:pic>
     </p:spTree>
     <p:extLst>
       <p:ext uri="{BB962C8B-B14F-4D97-AF65-F5344CB8AC3E}">
@@ -37132,6 +37240,135 @@
   <p:clrMapOvr>
     <a:masterClrMapping/>
   </p:clrMapOvr>
+  <p:timing>
+    <p:tnLst>
+      <p:par>
+        <p:cTn id="1" dur="indefinite" restart="never" nodeType="tmRoot">
+          <p:childTnLst>
+            <p:seq concurrent="1" nextAc="seek">
+              <p:cTn id="2" dur="indefinite" nodeType="mainSeq">
+                <p:childTnLst>
+                  <p:par>
+                    <p:cTn id="3" fill="hold">
+                      <p:stCondLst>
+                        <p:cond delay="indefinite"/>
+                      </p:stCondLst>
+                      <p:childTnLst>
+                        <p:par>
+                          <p:cTn id="4" fill="hold">
+                            <p:stCondLst>
+                              <p:cond delay="0"/>
+                            </p:stCondLst>
+                            <p:childTnLst>
+                              <p:par>
+                                <p:cTn id="5" presetID="42" presetClass="entr" presetSubtype="0" fill="hold" nodeType="clickEffect">
+                                  <p:stCondLst>
+                                    <p:cond delay="0"/>
+                                  </p:stCondLst>
+                                  <p:childTnLst>
+                                    <p:set>
+                                      <p:cBhvr>
+                                        <p:cTn id="6" dur="1" fill="hold">
+                                          <p:stCondLst>
+                                            <p:cond delay="0"/>
+                                          </p:stCondLst>
+                                        </p:cTn>
+                                        <p:tgtEl>
+                                          <p:spTgt spid="4"/>
+                                        </p:tgtEl>
+                                        <p:attrNameLst>
+                                          <p:attrName>style.visibility</p:attrName>
+                                        </p:attrNameLst>
+                                      </p:cBhvr>
+                                      <p:to>
+                                        <p:strVal val="visible"/>
+                                      </p:to>
+                                    </p:set>
+                                    <p:animEffect transition="in" filter="fade">
+                                      <p:cBhvr>
+                                        <p:cTn id="7" dur="1000"/>
+                                        <p:tgtEl>
+                                          <p:spTgt spid="4"/>
+                                        </p:tgtEl>
+                                      </p:cBhvr>
+                                    </p:animEffect>
+                                    <p:anim calcmode="lin" valueType="num">
+                                      <p:cBhvr>
+                                        <p:cTn id="8" dur="1000" fill="hold"/>
+                                        <p:tgtEl>
+                                          <p:spTgt spid="4"/>
+                                        </p:tgtEl>
+                                        <p:attrNameLst>
+                                          <p:attrName>ppt_x</p:attrName>
+                                        </p:attrNameLst>
+                                      </p:cBhvr>
+                                      <p:tavLst>
+                                        <p:tav tm="0">
+                                          <p:val>
+                                            <p:strVal val="#ppt_x"/>
+                                          </p:val>
+                                        </p:tav>
+                                        <p:tav tm="100000">
+                                          <p:val>
+                                            <p:strVal val="#ppt_x"/>
+                                          </p:val>
+                                        </p:tav>
+                                      </p:tavLst>
+                                    </p:anim>
+                                    <p:anim calcmode="lin" valueType="num">
+                                      <p:cBhvr>
+                                        <p:cTn id="9" dur="1000" fill="hold"/>
+                                        <p:tgtEl>
+                                          <p:spTgt spid="4"/>
+                                        </p:tgtEl>
+                                        <p:attrNameLst>
+                                          <p:attrName>ppt_y</p:attrName>
+                                        </p:attrNameLst>
+                                      </p:cBhvr>
+                                      <p:tavLst>
+                                        <p:tav tm="0">
+                                          <p:val>
+                                            <p:strVal val="#ppt_y+.1"/>
+                                          </p:val>
+                                        </p:tav>
+                                        <p:tav tm="100000">
+                                          <p:val>
+                                            <p:strVal val="#ppt_y"/>
+                                          </p:val>
+                                        </p:tav>
+                                      </p:tavLst>
+                                    </p:anim>
+                                  </p:childTnLst>
+                                </p:cTn>
+                              </p:par>
+                            </p:childTnLst>
+                          </p:cTn>
+                        </p:par>
+                      </p:childTnLst>
+                    </p:cTn>
+                  </p:par>
+                </p:childTnLst>
+              </p:cTn>
+              <p:prevCondLst>
+                <p:cond evt="onPrev" delay="0">
+                  <p:tgtEl>
+                    <p:sldTgt/>
+                  </p:tgtEl>
+                </p:cond>
+              </p:prevCondLst>
+              <p:nextCondLst>
+                <p:cond evt="onNext" delay="0">
+                  <p:tgtEl>
+                    <p:sldTgt/>
+                  </p:tgtEl>
+                </p:cond>
+              </p:nextCondLst>
+            </p:seq>
+          </p:childTnLst>
+        </p:cTn>
+      </p:par>
+    </p:tnLst>
+  </p:timing>
 </p:sld>
 </file>
 
@@ -37310,6 +37547,13 @@
   <p:clrMapOvr>
     <a:masterClrMapping/>
   </p:clrMapOvr>
+  <p:timing>
+    <p:tnLst>
+      <p:par>
+        <p:cTn id="1" dur="indefinite" restart="never" nodeType="tmRoot"/>
+      </p:par>
+    </p:tnLst>
+  </p:timing>
 </p:sld>
 </file>
 

</xml_diff>

<commit_message>
Updating the doc and adding an endiannes check slide to the ppt.
</commit_message>
<xml_diff>
--- a/Buffer Overflow Attacks.pptx
+++ b/Buffer Overflow Attacks.pptx
@@ -5,7 +5,7 @@
     <p:sldMasterId id="2147483672" r:id="rId1"/>
   </p:sldMasterIdLst>
   <p:notesMasterIdLst>
-    <p:notesMasterId r:id="rId47"/>
+    <p:notesMasterId r:id="rId48"/>
   </p:notesMasterIdLst>
   <p:sldIdLst>
     <p:sldId id="256" r:id="rId2"/>
@@ -47,12 +47,13 @@
     <p:sldId id="309" r:id="rId38"/>
     <p:sldId id="285" r:id="rId39"/>
     <p:sldId id="286" r:id="rId40"/>
-    <p:sldId id="314" r:id="rId41"/>
-    <p:sldId id="316" r:id="rId42"/>
-    <p:sldId id="318" r:id="rId43"/>
-    <p:sldId id="319" r:id="rId44"/>
-    <p:sldId id="320" r:id="rId45"/>
-    <p:sldId id="315" r:id="rId46"/>
+    <p:sldId id="321" r:id="rId41"/>
+    <p:sldId id="314" r:id="rId42"/>
+    <p:sldId id="316" r:id="rId43"/>
+    <p:sldId id="318" r:id="rId44"/>
+    <p:sldId id="319" r:id="rId45"/>
+    <p:sldId id="320" r:id="rId46"/>
+    <p:sldId id="315" r:id="rId47"/>
   </p:sldIdLst>
   <p:sldSz cx="9144000" cy="6858000" type="screen4x3"/>
   <p:notesSz cx="6858000" cy="9144000"/>
@@ -199,6 +200,7 @@
             <p14:sldId id="309"/>
             <p14:sldId id="285"/>
             <p14:sldId id="286"/>
+            <p14:sldId id="321"/>
             <p14:sldId id="314"/>
             <p14:sldId id="316"/>
             <p14:sldId id="318"/>
@@ -295,7 +297,7 @@
           <a:p>
             <a:fld id="{9DED5714-D740-4F89-AAD5-E3BC8B06EDCA}" type="datetimeFigureOut">
               <a:rPr lang="en-US" smtClean="0"/>
-              <a:t>4/22/2012</a:t>
+              <a:t>4/24/2012</a:t>
             </a:fld>
             <a:endParaRPr lang="en-US"/>
           </a:p>
@@ -2333,7 +2335,7 @@
           <a:p>
             <a:fld id="{9D0B4A42-F062-4908-9C81-A569921BC8B1}" type="slidenum">
               <a:rPr lang="en-US" smtClean="0"/>
-              <a:t>42</a:t>
+              <a:t>43</a:t>
             </a:fld>
             <a:endParaRPr lang="en-US"/>
           </a:p>
@@ -2425,7 +2427,7 @@
           <a:p>
             <a:fld id="{9D0B4A42-F062-4908-9C81-A569921BC8B1}" type="slidenum">
               <a:rPr lang="en-US" smtClean="0"/>
-              <a:t>43</a:t>
+              <a:t>44</a:t>
             </a:fld>
             <a:endParaRPr lang="en-US"/>
           </a:p>
@@ -7782,7 +7784,7 @@
           <a:p>
             <a:fld id="{FB76FE03-F4FF-4405-A4BA-F447F9618E72}" type="datetimeFigureOut">
               <a:rPr lang="en-US" smtClean="0"/>
-              <a:t>4/22/2012</a:t>
+              <a:t>4/24/2012</a:t>
             </a:fld>
             <a:endParaRPr lang="en-US"/>
           </a:p>
@@ -8047,7 +8049,7 @@
           <a:p>
             <a:fld id="{FB76FE03-F4FF-4405-A4BA-F447F9618E72}" type="datetimeFigureOut">
               <a:rPr lang="en-US" smtClean="0"/>
-              <a:t>4/22/2012</a:t>
+              <a:t>4/24/2012</a:t>
             </a:fld>
             <a:endParaRPr lang="en-US"/>
           </a:p>
@@ -8321,7 +8323,7 @@
           <a:p>
             <a:fld id="{FB76FE03-F4FF-4405-A4BA-F447F9618E72}" type="datetimeFigureOut">
               <a:rPr lang="en-US" smtClean="0"/>
-              <a:t>4/22/2012</a:t>
+              <a:t>4/24/2012</a:t>
             </a:fld>
             <a:endParaRPr lang="en-US"/>
           </a:p>
@@ -8538,7 +8540,7 @@
           <a:p>
             <a:fld id="{FB76FE03-F4FF-4405-A4BA-F447F9618E72}" type="datetimeFigureOut">
               <a:rPr lang="en-US" smtClean="0"/>
-              <a:t>4/22/2012</a:t>
+              <a:t>4/24/2012</a:t>
             </a:fld>
             <a:endParaRPr lang="en-US"/>
           </a:p>
@@ -8925,7 +8927,7 @@
           <a:p>
             <a:fld id="{FB76FE03-F4FF-4405-A4BA-F447F9618E72}" type="datetimeFigureOut">
               <a:rPr lang="en-US" smtClean="0"/>
-              <a:t>4/22/2012</a:t>
+              <a:t>4/24/2012</a:t>
             </a:fld>
             <a:endParaRPr lang="en-US"/>
           </a:p>
@@ -9306,7 +9308,7 @@
           <a:p>
             <a:fld id="{FB76FE03-F4FF-4405-A4BA-F447F9618E72}" type="datetimeFigureOut">
               <a:rPr lang="en-US" smtClean="0"/>
-              <a:t>4/22/2012</a:t>
+              <a:t>4/24/2012</a:t>
             </a:fld>
             <a:endParaRPr lang="en-US"/>
           </a:p>
@@ -9723,7 +9725,7 @@
           <a:p>
             <a:fld id="{FB76FE03-F4FF-4405-A4BA-F447F9618E72}" type="datetimeFigureOut">
               <a:rPr lang="en-US" smtClean="0"/>
-              <a:t>4/22/2012</a:t>
+              <a:t>4/24/2012</a:t>
             </a:fld>
             <a:endParaRPr lang="en-US"/>
           </a:p>
@@ -9836,7 +9838,7 @@
           <a:p>
             <a:fld id="{FB76FE03-F4FF-4405-A4BA-F447F9618E72}" type="datetimeFigureOut">
               <a:rPr lang="en-US" smtClean="0"/>
-              <a:t>4/22/2012</a:t>
+              <a:t>4/24/2012</a:t>
             </a:fld>
             <a:endParaRPr lang="en-US"/>
           </a:p>
@@ -9926,7 +9928,7 @@
           <a:p>
             <a:fld id="{FB76FE03-F4FF-4405-A4BA-F447F9618E72}" type="datetimeFigureOut">
               <a:rPr lang="en-US" smtClean="0"/>
-              <a:t>4/22/2012</a:t>
+              <a:t>4/24/2012</a:t>
             </a:fld>
             <a:endParaRPr lang="en-US"/>
           </a:p>
@@ -10135,7 +10137,7 @@
           <a:p>
             <a:fld id="{FB76FE03-F4FF-4405-A4BA-F447F9618E72}" type="datetimeFigureOut">
               <a:rPr lang="en-US" smtClean="0"/>
-              <a:t>4/22/2012</a:t>
+              <a:t>4/24/2012</a:t>
             </a:fld>
             <a:endParaRPr lang="en-US"/>
           </a:p>
@@ -10512,7 +10514,7 @@
           <a:p>
             <a:fld id="{FB76FE03-F4FF-4405-A4BA-F447F9618E72}" type="datetimeFigureOut">
               <a:rPr lang="en-US" smtClean="0"/>
-              <a:t>4/22/2012</a:t>
+              <a:t>4/24/2012</a:t>
             </a:fld>
             <a:endParaRPr lang="en-US"/>
           </a:p>
@@ -11059,7 +11061,7 @@
           <a:p>
             <a:fld id="{FB76FE03-F4FF-4405-A4BA-F447F9618E72}" type="datetimeFigureOut">
               <a:rPr lang="en-US" smtClean="0"/>
-              <a:t>4/22/2012</a:t>
+              <a:t>4/24/2012</a:t>
             </a:fld>
             <a:endParaRPr lang="en-US"/>
           </a:p>
@@ -36307,6 +36309,191 @@
           <a:p>
             <a:r>
               <a:rPr lang="en-US" dirty="0" smtClean="0"/>
+              <a:t>Determining </a:t>
+            </a:r>
+            <a:r>
+              <a:rPr lang="en-US" dirty="0" err="1" smtClean="0"/>
+              <a:t>Endianness</a:t>
+            </a:r>
+            <a:endParaRPr lang="en-US" dirty="0"/>
+          </a:p>
+        </p:txBody>
+      </p:sp>
+      <p:sp>
+        <p:nvSpPr>
+          <p:cNvPr id="3" name="Content Placeholder 2"/>
+          <p:cNvSpPr>
+            <a:spLocks noGrp="1"/>
+          </p:cNvSpPr>
+          <p:nvPr>
+            <p:ph idx="1"/>
+          </p:nvPr>
+        </p:nvSpPr>
+        <p:spPr/>
+        <p:txBody>
+          <a:bodyPr/>
+          <a:lstStyle/>
+          <a:p>
+            <a:r>
+              <a:rPr lang="en-US" dirty="0" smtClean="0"/>
+              <a:t>Why?</a:t>
+            </a:r>
+          </a:p>
+          <a:p>
+            <a:pPr lvl="1"/>
+            <a:r>
+              <a:rPr lang="en-US" dirty="0" smtClean="0"/>
+              <a:t>Need to know byte ordering for return address</a:t>
+            </a:r>
+          </a:p>
+          <a:p>
+            <a:pPr lvl="1"/>
+            <a:r>
+              <a:rPr lang="en-US" dirty="0" smtClean="0"/>
+              <a:t>For return address 0xbffff56c input “\x6c\xf5\</a:t>
+            </a:r>
+            <a:r>
+              <a:rPr lang="en-US" dirty="0" err="1" smtClean="0"/>
+              <a:t>xff</a:t>
+            </a:r>
+            <a:r>
+              <a:rPr lang="en-US" dirty="0" smtClean="0"/>
+              <a:t>\</a:t>
+            </a:r>
+            <a:r>
+              <a:rPr lang="en-US" dirty="0" err="1" smtClean="0"/>
+              <a:t>xbf</a:t>
+            </a:r>
+            <a:r>
+              <a:rPr lang="en-US" dirty="0" smtClean="0"/>
+              <a:t>”</a:t>
+            </a:r>
+          </a:p>
+          <a:p>
+            <a:r>
+              <a:rPr lang="en-US" dirty="0" smtClean="0"/>
+              <a:t>How?</a:t>
+            </a:r>
+          </a:p>
+          <a:p>
+            <a:pPr marL="457200" lvl="1" indent="0">
+              <a:buNone/>
+            </a:pPr>
+            <a:endParaRPr lang="en-US" dirty="0"/>
+          </a:p>
+        </p:txBody>
+      </p:sp>
+      <p:pic>
+        <p:nvPicPr>
+          <p:cNvPr id="1026" name="Picture 2"/>
+          <p:cNvPicPr>
+            <a:picLocks noChangeAspect="1" noChangeArrowheads="1"/>
+          </p:cNvPicPr>
+          <p:nvPr/>
+        </p:nvPicPr>
+        <p:blipFill>
+          <a:blip r:embed="rId2">
+            <a:extLst>
+              <a:ext uri="{28A0092B-C50C-407E-A947-70E740481C1C}">
+                <a14:useLocalDpi xmlns:a14="http://schemas.microsoft.com/office/drawing/2010/main" val="0"/>
+              </a:ext>
+            </a:extLst>
+          </a:blip>
+          <a:srcRect/>
+          <a:stretch>
+            <a:fillRect/>
+          </a:stretch>
+        </p:blipFill>
+        <p:spPr bwMode="auto">
+          <a:xfrm>
+            <a:off x="590460" y="3276600"/>
+            <a:ext cx="7963081" cy="3200400"/>
+          </a:xfrm>
+          <a:prstGeom prst="rect">
+            <a:avLst/>
+          </a:prstGeom>
+          <a:noFill/>
+          <a:ln>
+            <a:noFill/>
+          </a:ln>
+          <a:effectLst/>
+          <a:extLst>
+            <a:ext uri="{909E8E84-426E-40DD-AFC4-6F175D3DCCD1}">
+              <a14:hiddenFill xmlns:a14="http://schemas.microsoft.com/office/drawing/2010/main">
+                <a:solidFill>
+                  <a:schemeClr val="accent1"/>
+                </a:solidFill>
+              </a14:hiddenFill>
+            </a:ext>
+            <a:ext uri="{91240B29-F687-4F45-9708-019B960494DF}">
+              <a14:hiddenLine xmlns:a14="http://schemas.microsoft.com/office/drawing/2010/main" w="9525">
+                <a:solidFill>
+                  <a:schemeClr val="tx1"/>
+                </a:solidFill>
+                <a:miter lim="800000"/>
+                <a:headEnd/>
+                <a:tailEnd/>
+              </a14:hiddenLine>
+            </a:ext>
+            <a:ext uri="{AF507438-7753-43E0-B8FC-AC1667EBCBE1}">
+              <a14:hiddenEffects xmlns:a14="http://schemas.microsoft.com/office/drawing/2010/main">
+                <a:effectLst>
+                  <a:outerShdw dist="35921" dir="2700000" algn="ctr" rotWithShape="0">
+                    <a:schemeClr val="bg2"/>
+                  </a:outerShdw>
+                </a:effectLst>
+              </a14:hiddenEffects>
+            </a:ext>
+          </a:extLst>
+        </p:spPr>
+      </p:pic>
+    </p:spTree>
+    <p:extLst>
+      <p:ext uri="{BB962C8B-B14F-4D97-AF65-F5344CB8AC3E}">
+        <p14:creationId xmlns:p14="http://schemas.microsoft.com/office/powerpoint/2010/main" val="4063107708"/>
+      </p:ext>
+    </p:extLst>
+  </p:cSld>
+  <p:clrMapOvr>
+    <a:masterClrMapping/>
+  </p:clrMapOvr>
+</p:sld>
+</file>
+
+<file path=ppt/slides/slide41.xml><?xml version="1.0" encoding="utf-8"?>
+<p:sld xmlns:a="http://schemas.openxmlformats.org/drawingml/2006/main" xmlns:r="http://schemas.openxmlformats.org/officeDocument/2006/relationships" xmlns:p="http://schemas.openxmlformats.org/presentationml/2006/main">
+  <p:cSld>
+    <p:spTree>
+      <p:nvGrpSpPr>
+        <p:cNvPr id="1" name=""/>
+        <p:cNvGrpSpPr/>
+        <p:nvPr/>
+      </p:nvGrpSpPr>
+      <p:grpSpPr>
+        <a:xfrm>
+          <a:off x="0" y="0"/>
+          <a:ext cx="0" cy="0"/>
+          <a:chOff x="0" y="0"/>
+          <a:chExt cx="0" cy="0"/>
+        </a:xfrm>
+      </p:grpSpPr>
+      <p:sp>
+        <p:nvSpPr>
+          <p:cNvPr id="2" name="Title 1"/>
+          <p:cNvSpPr>
+            <a:spLocks noGrp="1"/>
+          </p:cNvSpPr>
+          <p:nvPr>
+            <p:ph type="title"/>
+          </p:nvPr>
+        </p:nvSpPr>
+        <p:spPr/>
+        <p:txBody>
+          <a:bodyPr/>
+          <a:lstStyle/>
+          <a:p>
+            <a:r>
+              <a:rPr lang="en-US" dirty="0" smtClean="0"/>
               <a:t>Assembly (Intel x86) Unix</a:t>
             </a:r>
             <a:endParaRPr lang="en-US" dirty="0"/>
@@ -36608,7 +36795,7 @@
 </p:sld>
 </file>
 
-<file path=ppt/slides/slide41.xml><?xml version="1.0" encoding="utf-8"?>
+<file path=ppt/slides/slide42.xml><?xml version="1.0" encoding="utf-8"?>
 <p:sld xmlns:a="http://schemas.openxmlformats.org/drawingml/2006/main" xmlns:r="http://schemas.openxmlformats.org/officeDocument/2006/relationships" xmlns:p="http://schemas.openxmlformats.org/presentationml/2006/main">
   <p:cSld>
     <p:spTree>
@@ -36679,184 +36866,6 @@
     <p:extLst>
       <p:ext uri="{BB962C8B-B14F-4D97-AF65-F5344CB8AC3E}">
         <p14:creationId xmlns:p14="http://schemas.microsoft.com/office/powerpoint/2010/main" val="2564060247"/>
-      </p:ext>
-    </p:extLst>
-  </p:cSld>
-  <p:clrMapOvr>
-    <a:masterClrMapping/>
-  </p:clrMapOvr>
-  <p:timing>
-    <p:tnLst>
-      <p:par>
-        <p:cTn id="1" dur="indefinite" restart="never" nodeType="tmRoot"/>
-      </p:par>
-    </p:tnLst>
-  </p:timing>
-</p:sld>
-</file>
-
-<file path=ppt/slides/slide42.xml><?xml version="1.0" encoding="utf-8"?>
-<p:sld xmlns:a="http://schemas.openxmlformats.org/drawingml/2006/main" xmlns:r="http://schemas.openxmlformats.org/officeDocument/2006/relationships" xmlns:p="http://schemas.openxmlformats.org/presentationml/2006/main">
-  <p:cSld>
-    <p:spTree>
-      <p:nvGrpSpPr>
-        <p:cNvPr id="1" name=""/>
-        <p:cNvGrpSpPr/>
-        <p:nvPr/>
-      </p:nvGrpSpPr>
-      <p:grpSpPr>
-        <a:xfrm>
-          <a:off x="0" y="0"/>
-          <a:ext cx="0" cy="0"/>
-          <a:chOff x="0" y="0"/>
-          <a:chExt cx="0" cy="0"/>
-        </a:xfrm>
-      </p:grpSpPr>
-      <p:sp>
-        <p:nvSpPr>
-          <p:cNvPr id="2" name="Title 1"/>
-          <p:cNvSpPr>
-            <a:spLocks noGrp="1"/>
-          </p:cNvSpPr>
-          <p:nvPr>
-            <p:ph type="title"/>
-          </p:nvPr>
-        </p:nvSpPr>
-        <p:spPr/>
-        <p:txBody>
-          <a:bodyPr/>
-          <a:lstStyle/>
-          <a:p>
-            <a:r>
-              <a:rPr lang="en-US" dirty="0" smtClean="0"/>
-              <a:t>Protection Against Buffer Overflows</a:t>
-            </a:r>
-            <a:endParaRPr lang="en-US" dirty="0"/>
-          </a:p>
-        </p:txBody>
-      </p:sp>
-      <p:sp>
-        <p:nvSpPr>
-          <p:cNvPr id="3" name="Content Placeholder 2"/>
-          <p:cNvSpPr>
-            <a:spLocks noGrp="1"/>
-          </p:cNvSpPr>
-          <p:nvPr>
-            <p:ph idx="1"/>
-          </p:nvPr>
-        </p:nvSpPr>
-        <p:spPr/>
-        <p:txBody>
-          <a:bodyPr/>
-          <a:lstStyle/>
-          <a:p>
-            <a:r>
-              <a:rPr lang="en-US" dirty="0" smtClean="0"/>
-              <a:t>Data Execution Prevention</a:t>
-            </a:r>
-          </a:p>
-          <a:p>
-            <a:pPr lvl="1"/>
-            <a:r>
-              <a:rPr lang="en-US" dirty="0" smtClean="0"/>
-              <a:t>Linux, Mac, Windows</a:t>
-            </a:r>
-          </a:p>
-          <a:p>
-            <a:pPr lvl="1"/>
-            <a:r>
-              <a:rPr lang="en-US" dirty="0" smtClean="0"/>
-              <a:t>Hardware Marks all locations in a process as non-executable unless the location explicitly contains executable code. </a:t>
-            </a:r>
-          </a:p>
-          <a:p>
-            <a:pPr lvl="1"/>
-            <a:r>
-              <a:rPr lang="en-US" dirty="0" smtClean="0"/>
-              <a:t>If an app tries to run this code, an error is thrown, calling process terminated</a:t>
-            </a:r>
-          </a:p>
-          <a:p>
-            <a:r>
-              <a:rPr lang="en-US" dirty="0" smtClean="0"/>
-              <a:t>To Disable DEP –</a:t>
-            </a:r>
-          </a:p>
-          <a:p>
-            <a:pPr lvl="1"/>
-            <a:r>
-              <a:rPr lang="en-US" dirty="0" smtClean="0"/>
-              <a:t>Windows – recovery and startup sessions, edit the system startup, replace the line </a:t>
-            </a:r>
-            <a:r>
-              <a:rPr lang="en-US" dirty="0" err="1" smtClean="0"/>
-              <a:t>OptIn</a:t>
-            </a:r>
-            <a:r>
-              <a:rPr lang="en-US" dirty="0" smtClean="0"/>
-              <a:t> with always out (/</a:t>
-            </a:r>
-            <a:r>
-              <a:rPr lang="en-US" dirty="0" err="1" smtClean="0"/>
-              <a:t>noexecute</a:t>
-            </a:r>
-            <a:r>
-              <a:rPr lang="en-US" dirty="0" smtClean="0"/>
-              <a:t>=</a:t>
-            </a:r>
-            <a:r>
-              <a:rPr lang="en-US" dirty="0" err="1" smtClean="0"/>
-              <a:t>AlwaysOff</a:t>
-            </a:r>
-            <a:r>
-              <a:rPr lang="en-US" dirty="0" smtClean="0"/>
-              <a:t>)</a:t>
-            </a:r>
-          </a:p>
-          <a:p>
-            <a:pPr lvl="1"/>
-            <a:r>
-              <a:rPr lang="en-US" dirty="0" smtClean="0"/>
-              <a:t>Linux –</a:t>
-            </a:r>
-          </a:p>
-          <a:p>
-            <a:pPr lvl="2"/>
-            <a:r>
-              <a:rPr lang="en-US" dirty="0" smtClean="0"/>
-              <a:t>Echo 0 &gt; /</a:t>
-            </a:r>
-            <a:r>
-              <a:rPr lang="en-US" dirty="0" err="1" smtClean="0"/>
-              <a:t>proc</a:t>
-            </a:r>
-            <a:r>
-              <a:rPr lang="en-US" dirty="0" smtClean="0"/>
-              <a:t>/sys/kernel/exec-shield</a:t>
-            </a:r>
-          </a:p>
-          <a:p>
-            <a:pPr lvl="2"/>
-            <a:r>
-              <a:rPr lang="en-US" dirty="0" smtClean="0"/>
-              <a:t>Echo 0 &gt; /</a:t>
-            </a:r>
-            <a:r>
-              <a:rPr lang="en-US" dirty="0" err="1" smtClean="0"/>
-              <a:t>proc</a:t>
-            </a:r>
-            <a:r>
-              <a:rPr lang="en-US" dirty="0" smtClean="0"/>
-              <a:t>/sys/kernel/exec-shield-randomize</a:t>
-            </a:r>
-            <a:endParaRPr lang="en-US" dirty="0"/>
-          </a:p>
-        </p:txBody>
-      </p:sp>
-    </p:spTree>
-    <p:extLst>
-      <p:ext uri="{BB962C8B-B14F-4D97-AF65-F5344CB8AC3E}">
-        <p14:creationId xmlns:p14="http://schemas.microsoft.com/office/powerpoint/2010/main" val="1819619996"/>
       </p:ext>
     </p:extLst>
   </p:cSld>
@@ -36907,7 +36916,7 @@
           <a:p>
             <a:r>
               <a:rPr lang="en-US" dirty="0" smtClean="0"/>
-              <a:t>Protection Continued</a:t>
+              <a:t>Protection Against Buffer Overflows</a:t>
             </a:r>
             <a:endParaRPr lang="en-US" dirty="0"/>
           </a:p>
@@ -36930,57 +36939,79 @@
           <a:p>
             <a:r>
               <a:rPr lang="en-US" dirty="0" smtClean="0"/>
-              <a:t>Address Space Layout Randomization</a:t>
+              <a:t>Data Execution Prevention</a:t>
             </a:r>
           </a:p>
           <a:p>
             <a:pPr lvl="1"/>
             <a:r>
               <a:rPr lang="en-US" dirty="0" smtClean="0"/>
-              <a:t>Randomly arranges the positions of key data areas</a:t>
+              <a:t>Linux, Mac, Windows</a:t>
+            </a:r>
+          </a:p>
+          <a:p>
+            <a:pPr lvl="1"/>
+            <a:r>
+              <a:rPr lang="en-US" dirty="0" smtClean="0"/>
+              <a:t>Hardware Marks all locations in a process as non-executable unless the location explicitly contains executable code. </a:t>
+            </a:r>
+          </a:p>
+          <a:p>
+            <a:pPr lvl="1"/>
+            <a:r>
+              <a:rPr lang="en-US" dirty="0" smtClean="0"/>
+              <a:t>If an app tries to run this code, an error is thrown, calling process terminated</a:t>
+            </a:r>
+          </a:p>
+          <a:p>
+            <a:r>
+              <a:rPr lang="en-US" dirty="0" smtClean="0"/>
+              <a:t>To Disable DEP –</a:t>
+            </a:r>
+          </a:p>
+          <a:p>
+            <a:pPr lvl="1"/>
+            <a:r>
+              <a:rPr lang="en-US" dirty="0" smtClean="0"/>
+              <a:t>Windows – recovery and startup sessions, edit the system startup, replace the line </a:t>
+            </a:r>
+            <a:r>
+              <a:rPr lang="en-US" dirty="0" err="1" smtClean="0"/>
+              <a:t>OptIn</a:t>
+            </a:r>
+            <a:r>
+              <a:rPr lang="en-US" dirty="0" smtClean="0"/>
+              <a:t> with always out (/</a:t>
+            </a:r>
+            <a:r>
+              <a:rPr lang="en-US" dirty="0" err="1" smtClean="0"/>
+              <a:t>noexecute</a:t>
+            </a:r>
+            <a:r>
+              <a:rPr lang="en-US" dirty="0" smtClean="0"/>
+              <a:t>=</a:t>
+            </a:r>
+            <a:r>
+              <a:rPr lang="en-US" dirty="0" err="1" smtClean="0"/>
+              <a:t>AlwaysOff</a:t>
+            </a:r>
+            <a:r>
+              <a:rPr lang="en-US" dirty="0" smtClean="0"/>
+              <a:t>)</a:t>
+            </a:r>
+          </a:p>
+          <a:p>
+            <a:pPr lvl="1"/>
+            <a:r>
+              <a:rPr lang="en-US" dirty="0" smtClean="0"/>
+              <a:t>Linux –</a:t>
             </a:r>
           </a:p>
           <a:p>
             <a:pPr lvl="2"/>
             <a:r>
               <a:rPr lang="en-US" dirty="0" smtClean="0"/>
-              <a:t>E.g. positions of library, heap, stack</a:t>
-            </a:r>
-          </a:p>
-          <a:p>
-            <a:pPr lvl="1"/>
-            <a:r>
-              <a:rPr lang="en-US" dirty="0" smtClean="0"/>
-              <a:t>If the location of </a:t>
-            </a:r>
-            <a:r>
-              <a:rPr lang="en-US" dirty="0" err="1" smtClean="0"/>
-              <a:t>lib.c</a:t>
-            </a:r>
-            <a:r>
-              <a:rPr lang="en-US" dirty="0" smtClean="0"/>
-              <a:t> changes </a:t>
-            </a:r>
-            <a:r>
-              <a:rPr lang="en-US" dirty="0" err="1" smtClean="0"/>
-              <a:t>everytime</a:t>
-            </a:r>
-            <a:r>
-              <a:rPr lang="en-US" dirty="0" smtClean="0"/>
-              <a:t>, then it will be hard to find the exact locations of different functions</a:t>
-            </a:r>
-          </a:p>
-          <a:p>
-            <a:r>
-              <a:rPr lang="en-US" dirty="0" smtClean="0"/>
-              <a:t>Turn off ASLR </a:t>
-            </a:r>
-          </a:p>
-          <a:p>
-            <a:pPr lvl="1"/>
-            <a:r>
-              <a:rPr lang="en-US" dirty="0" smtClean="0"/>
-              <a:t>Linux – echo 0 &gt; /</a:t>
+              <a:t>Echo 0 &gt; /</a:t>
             </a:r>
             <a:r>
               <a:rPr lang="en-US" dirty="0" err="1" smtClean="0"/>
@@ -36988,11 +37019,22 @@
             </a:r>
             <a:r>
               <a:rPr lang="en-US" dirty="0" smtClean="0"/>
-              <a:t>/sys/kernel/</a:t>
+              <a:t>/sys/kernel/exec-shield</a:t>
+            </a:r>
+          </a:p>
+          <a:p>
+            <a:pPr lvl="2"/>
+            <a:r>
+              <a:rPr lang="en-US" dirty="0" smtClean="0"/>
+              <a:t>Echo 0 &gt; /</a:t>
             </a:r>
             <a:r>
               <a:rPr lang="en-US" dirty="0" err="1" smtClean="0"/>
-              <a:t>randomize_va_space</a:t>
+              <a:t>proc</a:t>
+            </a:r>
+            <a:r>
+              <a:rPr lang="en-US" dirty="0" smtClean="0"/>
+              <a:t>/sys/kernel/exec-shield-randomize</a:t>
             </a:r>
             <a:endParaRPr lang="en-US" dirty="0"/>
           </a:p>
@@ -37001,7 +37043,7 @@
     </p:spTree>
     <p:extLst>
       <p:ext uri="{BB962C8B-B14F-4D97-AF65-F5344CB8AC3E}">
-        <p14:creationId xmlns:p14="http://schemas.microsoft.com/office/powerpoint/2010/main" val="1940961802"/>
+        <p14:creationId xmlns:p14="http://schemas.microsoft.com/office/powerpoint/2010/main" val="1819619996"/>
       </p:ext>
     </p:extLst>
   </p:cSld>
@@ -37052,6 +37094,151 @@
           <a:p>
             <a:r>
               <a:rPr lang="en-US" dirty="0" smtClean="0"/>
+              <a:t>Protection Continued</a:t>
+            </a:r>
+            <a:endParaRPr lang="en-US" dirty="0"/>
+          </a:p>
+        </p:txBody>
+      </p:sp>
+      <p:sp>
+        <p:nvSpPr>
+          <p:cNvPr id="3" name="Content Placeholder 2"/>
+          <p:cNvSpPr>
+            <a:spLocks noGrp="1"/>
+          </p:cNvSpPr>
+          <p:nvPr>
+            <p:ph idx="1"/>
+          </p:nvPr>
+        </p:nvSpPr>
+        <p:spPr/>
+        <p:txBody>
+          <a:bodyPr/>
+          <a:lstStyle/>
+          <a:p>
+            <a:r>
+              <a:rPr lang="en-US" dirty="0" smtClean="0"/>
+              <a:t>Address Space Layout Randomization</a:t>
+            </a:r>
+          </a:p>
+          <a:p>
+            <a:pPr lvl="1"/>
+            <a:r>
+              <a:rPr lang="en-US" dirty="0" smtClean="0"/>
+              <a:t>Randomly arranges the positions of key data areas</a:t>
+            </a:r>
+          </a:p>
+          <a:p>
+            <a:pPr lvl="2"/>
+            <a:r>
+              <a:rPr lang="en-US" dirty="0" smtClean="0"/>
+              <a:t>E.g. positions of library, heap, stack</a:t>
+            </a:r>
+          </a:p>
+          <a:p>
+            <a:pPr lvl="1"/>
+            <a:r>
+              <a:rPr lang="en-US" dirty="0" smtClean="0"/>
+              <a:t>If the location of </a:t>
+            </a:r>
+            <a:r>
+              <a:rPr lang="en-US" dirty="0" err="1" smtClean="0"/>
+              <a:t>lib.c</a:t>
+            </a:r>
+            <a:r>
+              <a:rPr lang="en-US" dirty="0" smtClean="0"/>
+              <a:t> changes </a:t>
+            </a:r>
+            <a:r>
+              <a:rPr lang="en-US" dirty="0" err="1" smtClean="0"/>
+              <a:t>everytime</a:t>
+            </a:r>
+            <a:r>
+              <a:rPr lang="en-US" dirty="0" smtClean="0"/>
+              <a:t>, then it will be hard to find the exact locations of different functions</a:t>
+            </a:r>
+          </a:p>
+          <a:p>
+            <a:r>
+              <a:rPr lang="en-US" dirty="0" smtClean="0"/>
+              <a:t>Turn off ASLR </a:t>
+            </a:r>
+          </a:p>
+          <a:p>
+            <a:pPr lvl="1"/>
+            <a:r>
+              <a:rPr lang="en-US" dirty="0" smtClean="0"/>
+              <a:t>Linux – echo 0 &gt; /</a:t>
+            </a:r>
+            <a:r>
+              <a:rPr lang="en-US" dirty="0" err="1" smtClean="0"/>
+              <a:t>proc</a:t>
+            </a:r>
+            <a:r>
+              <a:rPr lang="en-US" dirty="0" smtClean="0"/>
+              <a:t>/sys/kernel/</a:t>
+            </a:r>
+            <a:r>
+              <a:rPr lang="en-US" dirty="0" err="1" smtClean="0"/>
+              <a:t>randomize_va_space</a:t>
+            </a:r>
+            <a:endParaRPr lang="en-US" dirty="0"/>
+          </a:p>
+        </p:txBody>
+      </p:sp>
+    </p:spTree>
+    <p:extLst>
+      <p:ext uri="{BB962C8B-B14F-4D97-AF65-F5344CB8AC3E}">
+        <p14:creationId xmlns:p14="http://schemas.microsoft.com/office/powerpoint/2010/main" val="1940961802"/>
+      </p:ext>
+    </p:extLst>
+  </p:cSld>
+  <p:clrMapOvr>
+    <a:masterClrMapping/>
+  </p:clrMapOvr>
+  <p:timing>
+    <p:tnLst>
+      <p:par>
+        <p:cTn id="1" dur="indefinite" restart="never" nodeType="tmRoot"/>
+      </p:par>
+    </p:tnLst>
+  </p:timing>
+</p:sld>
+</file>
+
+<file path=ppt/slides/slide45.xml><?xml version="1.0" encoding="utf-8"?>
+<p:sld xmlns:a="http://schemas.openxmlformats.org/drawingml/2006/main" xmlns:r="http://schemas.openxmlformats.org/officeDocument/2006/relationships" xmlns:p="http://schemas.openxmlformats.org/presentationml/2006/main">
+  <p:cSld>
+    <p:spTree>
+      <p:nvGrpSpPr>
+        <p:cNvPr id="1" name=""/>
+        <p:cNvGrpSpPr/>
+        <p:nvPr/>
+      </p:nvGrpSpPr>
+      <p:grpSpPr>
+        <a:xfrm>
+          <a:off x="0" y="0"/>
+          <a:ext cx="0" cy="0"/>
+          <a:chOff x="0" y="0"/>
+          <a:chExt cx="0" cy="0"/>
+        </a:xfrm>
+      </p:grpSpPr>
+      <p:sp>
+        <p:nvSpPr>
+          <p:cNvPr id="2" name="Title 1"/>
+          <p:cNvSpPr>
+            <a:spLocks noGrp="1"/>
+          </p:cNvSpPr>
+          <p:nvPr>
+            <p:ph type="title"/>
+          </p:nvPr>
+        </p:nvSpPr>
+        <p:spPr/>
+        <p:txBody>
+          <a:bodyPr/>
+          <a:lstStyle/>
+          <a:p>
+            <a:r>
+              <a:rPr lang="en-US" dirty="0" smtClean="0"/>
               <a:t>Canaries</a:t>
             </a:r>
             <a:endParaRPr lang="en-US" dirty="0"/>
@@ -37123,7 +37310,7 @@
 </p:sld>
 </file>
 
-<file path=ppt/slides/slide45.xml><?xml version="1.0" encoding="utf-8"?>
+<file path=ppt/slides/slide46.xml><?xml version="1.0" encoding="utf-8"?>
 <p:sld xmlns:a="http://schemas.openxmlformats.org/drawingml/2006/main" xmlns:r="http://schemas.openxmlformats.org/officeDocument/2006/relationships" xmlns:p="http://schemas.openxmlformats.org/presentationml/2006/main">
   <p:cSld>
     <p:spTree>

</xml_diff>

<commit_message>
Removing the old linux assembly code example and adding a new homework review slide.
</commit_message>
<xml_diff>
--- a/Buffer Overflow Attacks.pptx
+++ b/Buffer Overflow Attacks.pptx
@@ -5,7 +5,7 @@
     <p:sldMasterId id="2147483672" r:id="rId1"/>
   </p:sldMasterIdLst>
   <p:notesMasterIdLst>
-    <p:notesMasterId r:id="rId52"/>
+    <p:notesMasterId r:id="rId53"/>
   </p:notesMasterIdLst>
   <p:sldIdLst>
     <p:sldId id="256" r:id="rId2"/>
@@ -49,15 +49,16 @@
     <p:sldId id="285" r:id="rId40"/>
     <p:sldId id="286" r:id="rId41"/>
     <p:sldId id="325" r:id="rId42"/>
-    <p:sldId id="314" r:id="rId43"/>
-    <p:sldId id="316" r:id="rId44"/>
-    <p:sldId id="322" r:id="rId45"/>
-    <p:sldId id="318" r:id="rId46"/>
-    <p:sldId id="319" r:id="rId47"/>
-    <p:sldId id="320" r:id="rId48"/>
-    <p:sldId id="315" r:id="rId49"/>
-    <p:sldId id="323" r:id="rId50"/>
-    <p:sldId id="324" r:id="rId51"/>
+    <p:sldId id="316" r:id="rId43"/>
+    <p:sldId id="327" r:id="rId44"/>
+    <p:sldId id="326" r:id="rId45"/>
+    <p:sldId id="322" r:id="rId46"/>
+    <p:sldId id="318" r:id="rId47"/>
+    <p:sldId id="319" r:id="rId48"/>
+    <p:sldId id="320" r:id="rId49"/>
+    <p:sldId id="315" r:id="rId50"/>
+    <p:sldId id="323" r:id="rId51"/>
+    <p:sldId id="324" r:id="rId52"/>
   </p:sldIdLst>
   <p:sldSz cx="9144000" cy="6858000" type="screen4x3"/>
   <p:notesSz cx="6858000" cy="9144000"/>
@@ -206,8 +207,9 @@
             <p14:sldId id="285"/>
             <p14:sldId id="286"/>
             <p14:sldId id="325"/>
-            <p14:sldId id="314"/>
             <p14:sldId id="316"/>
+            <p14:sldId id="327"/>
+            <p14:sldId id="326"/>
             <p14:sldId id="322"/>
             <p14:sldId id="318"/>
             <p14:sldId id="319"/>
@@ -2343,7 +2345,7 @@
           <a:p>
             <a:fld id="{9D0B4A42-F062-4908-9C81-A569921BC8B1}" type="slidenum">
               <a:rPr lang="en-US" smtClean="0"/>
-              <a:t>45</a:t>
+              <a:t>46</a:t>
             </a:fld>
             <a:endParaRPr lang="en-US"/>
           </a:p>
@@ -2435,7 +2437,7 @@
           <a:p>
             <a:fld id="{9D0B4A42-F062-4908-9C81-A569921BC8B1}" type="slidenum">
               <a:rPr lang="en-US" smtClean="0"/>
-              <a:t>46</a:t>
+              <a:t>47</a:t>
             </a:fld>
             <a:endParaRPr lang="en-US"/>
           </a:p>
@@ -2590,7 +2592,7 @@
           <a:p>
             <a:fld id="{9D0B4A42-F062-4908-9C81-A569921BC8B1}" type="slidenum">
               <a:rPr lang="en-US" smtClean="0"/>
-              <a:t>49</a:t>
+              <a:t>50</a:t>
             </a:fld>
             <a:endParaRPr lang="en-US"/>
           </a:p>
@@ -2806,7 +2808,7 @@
           <a:p>
             <a:fld id="{9D0B4A42-F062-4908-9C81-A569921BC8B1}" type="slidenum">
               <a:rPr lang="en-US" smtClean="0"/>
-              <a:t>50</a:t>
+              <a:t>51</a:t>
             </a:fld>
             <a:endParaRPr lang="en-US"/>
           </a:p>
@@ -38610,10 +38612,104 @@
   <p:clrMapOvr>
     <a:masterClrMapping/>
   </p:clrMapOvr>
+  <p:timing>
+    <p:tnLst>
+      <p:par>
+        <p:cTn id="1" dur="indefinite" restart="never" nodeType="tmRoot"/>
+      </p:par>
+    </p:tnLst>
+  </p:timing>
 </p:sld>
 </file>
 
 <file path=ppt/slides/slide42.xml><?xml version="1.0" encoding="utf-8"?>
+<p:sld xmlns:a="http://schemas.openxmlformats.org/drawingml/2006/main" xmlns:r="http://schemas.openxmlformats.org/officeDocument/2006/relationships" xmlns:p="http://schemas.openxmlformats.org/presentationml/2006/main">
+  <p:cSld>
+    <p:spTree>
+      <p:nvGrpSpPr>
+        <p:cNvPr id="1" name=""/>
+        <p:cNvGrpSpPr/>
+        <p:nvPr/>
+      </p:nvGrpSpPr>
+      <p:grpSpPr>
+        <a:xfrm>
+          <a:off x="0" y="0"/>
+          <a:ext cx="0" cy="0"/>
+          <a:chOff x="0" y="0"/>
+          <a:chExt cx="0" cy="0"/>
+        </a:xfrm>
+      </p:grpSpPr>
+      <p:sp>
+        <p:nvSpPr>
+          <p:cNvPr id="2" name="Title 1"/>
+          <p:cNvSpPr>
+            <a:spLocks noGrp="1"/>
+          </p:cNvSpPr>
+          <p:nvPr>
+            <p:ph type="ctrTitle"/>
+          </p:nvPr>
+        </p:nvSpPr>
+        <p:spPr/>
+        <p:txBody>
+          <a:bodyPr/>
+          <a:lstStyle/>
+          <a:p>
+            <a:r>
+              <a:rPr lang="en-US" dirty="0" smtClean="0"/>
+              <a:t>Day Two</a:t>
+            </a:r>
+            <a:endParaRPr lang="en-US" dirty="0"/>
+          </a:p>
+        </p:txBody>
+      </p:sp>
+      <p:sp>
+        <p:nvSpPr>
+          <p:cNvPr id="3" name="Subtitle 2"/>
+          <p:cNvSpPr>
+            <a:spLocks noGrp="1"/>
+          </p:cNvSpPr>
+          <p:nvPr>
+            <p:ph type="subTitle" idx="1"/>
+          </p:nvPr>
+        </p:nvSpPr>
+        <p:spPr/>
+        <p:txBody>
+          <a:bodyPr/>
+          <a:lstStyle/>
+          <a:p>
+            <a:r>
+              <a:rPr lang="en-US" dirty="0" smtClean="0"/>
+              <a:t>Buffer </a:t>
+            </a:r>
+            <a:r>
+              <a:rPr lang="en-US" dirty="0" err="1" smtClean="0"/>
+              <a:t>Overflowin</a:t>
+            </a:r>
+            <a:endParaRPr lang="en-US" dirty="0"/>
+          </a:p>
+        </p:txBody>
+      </p:sp>
+    </p:spTree>
+    <p:extLst>
+      <p:ext uri="{BB962C8B-B14F-4D97-AF65-F5344CB8AC3E}">
+        <p14:creationId xmlns:p14="http://schemas.microsoft.com/office/powerpoint/2010/main" val="2564060247"/>
+      </p:ext>
+    </p:extLst>
+  </p:cSld>
+  <p:clrMapOvr>
+    <a:masterClrMapping/>
+  </p:clrMapOvr>
+  <p:timing>
+    <p:tnLst>
+      <p:par>
+        <p:cTn id="1" dur="indefinite" restart="never" nodeType="tmRoot"/>
+      </p:par>
+    </p:tnLst>
+  </p:timing>
+</p:sld>
+</file>
+
+<file path=ppt/slides/slide43.xml><?xml version="1.0" encoding="utf-8"?>
 <p:sld xmlns:a="http://schemas.openxmlformats.org/drawingml/2006/main" xmlns:r="http://schemas.openxmlformats.org/officeDocument/2006/relationships" xmlns:p="http://schemas.openxmlformats.org/presentationml/2006/main">
   <p:cSld>
     <p:spTree>
@@ -38647,15 +38743,64 @@
           <a:p>
             <a:r>
               <a:rPr lang="en-US" dirty="0" smtClean="0"/>
-              <a:t>Assembly (Intel x86) Unix</a:t>
+              <a:t>Review of Homework</a:t>
             </a:r>
             <a:endParaRPr lang="en-US" dirty="0"/>
           </a:p>
         </p:txBody>
       </p:sp>
+      <p:sp>
+        <p:nvSpPr>
+          <p:cNvPr id="4" name="Text Placeholder 3"/>
+          <p:cNvSpPr>
+            <a:spLocks noGrp="1"/>
+          </p:cNvSpPr>
+          <p:nvPr>
+            <p:ph type="body" idx="1"/>
+          </p:nvPr>
+        </p:nvSpPr>
+        <p:spPr/>
+        <p:txBody>
+          <a:bodyPr/>
+          <a:lstStyle/>
+          <a:p>
+            <a:endParaRPr lang="en-US"/>
+          </a:p>
+        </p:txBody>
+      </p:sp>
+    </p:spTree>
+    <p:extLst>
+      <p:ext uri="{BB962C8B-B14F-4D97-AF65-F5344CB8AC3E}">
+        <p14:creationId xmlns:p14="http://schemas.microsoft.com/office/powerpoint/2010/main" val="4006216963"/>
+      </p:ext>
+    </p:extLst>
+  </p:cSld>
+  <p:clrMapOvr>
+    <a:masterClrMapping/>
+  </p:clrMapOvr>
+</p:sld>
+</file>
+
+<file path=ppt/slides/slide44.xml><?xml version="1.0" encoding="utf-8"?>
+<p:sld xmlns:a="http://schemas.openxmlformats.org/drawingml/2006/main" xmlns:r="http://schemas.openxmlformats.org/officeDocument/2006/relationships" xmlns:p="http://schemas.openxmlformats.org/presentationml/2006/main">
+  <p:cSld>
+    <p:spTree>
+      <p:nvGrpSpPr>
+        <p:cNvPr id="1" name=""/>
+        <p:cNvGrpSpPr/>
+        <p:nvPr/>
+      </p:nvGrpSpPr>
+      <p:grpSpPr>
+        <a:xfrm>
+          <a:off x="0" y="0"/>
+          <a:ext cx="0" cy="0"/>
+          <a:chOff x="0" y="0"/>
+          <a:chExt cx="0" cy="0"/>
+        </a:xfrm>
+      </p:grpSpPr>
       <p:pic>
         <p:nvPicPr>
-          <p:cNvPr id="2051" name="Picture 3"/>
+          <p:cNvPr id="4" name="Picture 2"/>
           <p:cNvPicPr>
             <a:picLocks noChangeAspect="1" noChangeArrowheads="1"/>
           </p:cNvPicPr>
@@ -38676,514 +38821,8 @@
         </p:blipFill>
         <p:spPr bwMode="auto">
           <a:xfrm>
-            <a:off x="138964" y="1752600"/>
-            <a:ext cx="8866073" cy="4800600"/>
-          </a:xfrm>
-          <a:prstGeom prst="rect">
-            <a:avLst/>
-          </a:prstGeom>
-          <a:noFill/>
-          <a:ln>
-            <a:noFill/>
-          </a:ln>
-          <a:effectLst/>
-          <a:extLst>
-            <a:ext uri="{909E8E84-426E-40DD-AFC4-6F175D3DCCD1}">
-              <a14:hiddenFill xmlns:a14="http://schemas.microsoft.com/office/drawing/2010/main">
-                <a:solidFill>
-                  <a:schemeClr val="accent1"/>
-                </a:solidFill>
-              </a14:hiddenFill>
-            </a:ext>
-            <a:ext uri="{91240B29-F687-4F45-9708-019B960494DF}">
-              <a14:hiddenLine xmlns:a14="http://schemas.microsoft.com/office/drawing/2010/main" w="9525">
-                <a:solidFill>
-                  <a:schemeClr val="tx1"/>
-                </a:solidFill>
-                <a:miter lim="800000"/>
-                <a:headEnd/>
-                <a:tailEnd/>
-              </a14:hiddenLine>
-            </a:ext>
-            <a:ext uri="{AF507438-7753-43E0-B8FC-AC1667EBCBE1}">
-              <a14:hiddenEffects xmlns:a14="http://schemas.microsoft.com/office/drawing/2010/main">
-                <a:effectLst>
-                  <a:outerShdw dist="35921" dir="2700000" algn="ctr" rotWithShape="0">
-                    <a:schemeClr val="bg2"/>
-                  </a:outerShdw>
-                </a:effectLst>
-              </a14:hiddenEffects>
-            </a:ext>
-          </a:extLst>
-        </p:spPr>
-      </p:pic>
-      <p:sp>
-        <p:nvSpPr>
-          <p:cNvPr id="4" name="Donut 3"/>
-          <p:cNvSpPr/>
-          <p:nvPr/>
-        </p:nvSpPr>
-        <p:spPr>
-          <a:xfrm>
-            <a:off x="762000" y="5791200"/>
-            <a:ext cx="7772400" cy="990600"/>
-          </a:xfrm>
-          <a:prstGeom prst="donut">
-            <a:avLst>
-              <a:gd name="adj" fmla="val 7214"/>
-            </a:avLst>
-          </a:prstGeom>
-          <a:ln w="6350"/>
-        </p:spPr>
-        <p:style>
-          <a:lnRef idx="2">
-            <a:schemeClr val="accent1">
-              <a:shade val="50000"/>
-            </a:schemeClr>
-          </a:lnRef>
-          <a:fillRef idx="1">
-            <a:schemeClr val="accent1"/>
-          </a:fillRef>
-          <a:effectRef idx="0">
-            <a:schemeClr val="accent1"/>
-          </a:effectRef>
-          <a:fontRef idx="minor">
-            <a:schemeClr val="lt1"/>
-          </a:fontRef>
-        </p:style>
-        <p:txBody>
-          <a:bodyPr rtlCol="0" anchor="ctr"/>
-          <a:lstStyle/>
-          <a:p>
-            <a:pPr algn="ctr"/>
-            <a:endParaRPr lang="en-US">
-              <a:solidFill>
-                <a:schemeClr val="tx1"/>
-              </a:solidFill>
-            </a:endParaRPr>
-          </a:p>
-        </p:txBody>
-      </p:sp>
-      <p:sp>
-        <p:nvSpPr>
-          <p:cNvPr id="7" name="Donut 6"/>
-          <p:cNvSpPr/>
-          <p:nvPr/>
-        </p:nvSpPr>
-        <p:spPr>
-          <a:xfrm>
-            <a:off x="1066800" y="3962400"/>
-            <a:ext cx="3733800" cy="609600"/>
-          </a:xfrm>
-          <a:prstGeom prst="donut">
-            <a:avLst>
-              <a:gd name="adj" fmla="val 7214"/>
-            </a:avLst>
-          </a:prstGeom>
-          <a:ln w="6350"/>
-        </p:spPr>
-        <p:style>
-          <a:lnRef idx="2">
-            <a:schemeClr val="accent1">
-              <a:shade val="50000"/>
-            </a:schemeClr>
-          </a:lnRef>
-          <a:fillRef idx="1">
-            <a:schemeClr val="accent1"/>
-          </a:fillRef>
-          <a:effectRef idx="0">
-            <a:schemeClr val="accent1"/>
-          </a:effectRef>
-          <a:fontRef idx="minor">
-            <a:schemeClr val="lt1"/>
-          </a:fontRef>
-        </p:style>
-        <p:txBody>
-          <a:bodyPr rtlCol="0" anchor="ctr"/>
-          <a:lstStyle/>
-          <a:p>
-            <a:pPr algn="ctr"/>
-            <a:endParaRPr lang="en-US">
-              <a:solidFill>
-                <a:schemeClr val="tx1"/>
-              </a:solidFill>
-            </a:endParaRPr>
-          </a:p>
-        </p:txBody>
-      </p:sp>
-    </p:spTree>
-    <p:extLst>
-      <p:ext uri="{BB962C8B-B14F-4D97-AF65-F5344CB8AC3E}">
-        <p14:creationId xmlns:p14="http://schemas.microsoft.com/office/powerpoint/2010/main" val="543288077"/>
-      </p:ext>
-    </p:extLst>
-  </p:cSld>
-  <p:clrMapOvr>
-    <a:masterClrMapping/>
-  </p:clrMapOvr>
-  <p:timing>
-    <p:tnLst>
-      <p:par>
-        <p:cTn id="1" dur="indefinite" restart="never" nodeType="tmRoot">
-          <p:childTnLst>
-            <p:seq concurrent="1" nextAc="seek">
-              <p:cTn id="2" dur="indefinite" nodeType="mainSeq">
-                <p:childTnLst>
-                  <p:par>
-                    <p:cTn id="3" fill="hold">
-                      <p:stCondLst>
-                        <p:cond delay="indefinite"/>
-                      </p:stCondLst>
-                      <p:childTnLst>
-                        <p:par>
-                          <p:cTn id="4" fill="hold">
-                            <p:stCondLst>
-                              <p:cond delay="0"/>
-                            </p:stCondLst>
-                            <p:childTnLst>
-                              <p:par>
-                                <p:cTn id="5" presetID="1" presetClass="entr" presetSubtype="0" fill="hold" grpId="0" nodeType="clickEffect">
-                                  <p:stCondLst>
-                                    <p:cond delay="0"/>
-                                  </p:stCondLst>
-                                  <p:childTnLst>
-                                    <p:set>
-                                      <p:cBhvr>
-                                        <p:cTn id="6" dur="1" fill="hold">
-                                          <p:stCondLst>
-                                            <p:cond delay="0"/>
-                                          </p:stCondLst>
-                                        </p:cTn>
-                                        <p:tgtEl>
-                                          <p:spTgt spid="4"/>
-                                        </p:tgtEl>
-                                        <p:attrNameLst>
-                                          <p:attrName>style.visibility</p:attrName>
-                                        </p:attrNameLst>
-                                      </p:cBhvr>
-                                      <p:to>
-                                        <p:strVal val="visible"/>
-                                      </p:to>
-                                    </p:set>
-                                  </p:childTnLst>
-                                </p:cTn>
-                              </p:par>
-                            </p:childTnLst>
-                          </p:cTn>
-                        </p:par>
-                      </p:childTnLst>
-                    </p:cTn>
-                  </p:par>
-                  <p:par>
-                    <p:cTn id="7" fill="hold">
-                      <p:stCondLst>
-                        <p:cond delay="indefinite"/>
-                      </p:stCondLst>
-                      <p:childTnLst>
-                        <p:par>
-                          <p:cTn id="8" fill="hold">
-                            <p:stCondLst>
-                              <p:cond delay="0"/>
-                            </p:stCondLst>
-                            <p:childTnLst>
-                              <p:par>
-                                <p:cTn id="9" presetID="1" presetClass="entr" presetSubtype="0" fill="hold" grpId="0" nodeType="clickEffect">
-                                  <p:stCondLst>
-                                    <p:cond delay="0"/>
-                                  </p:stCondLst>
-                                  <p:childTnLst>
-                                    <p:set>
-                                      <p:cBhvr>
-                                        <p:cTn id="10" dur="1" fill="hold">
-                                          <p:stCondLst>
-                                            <p:cond delay="0"/>
-                                          </p:stCondLst>
-                                        </p:cTn>
-                                        <p:tgtEl>
-                                          <p:spTgt spid="7"/>
-                                        </p:tgtEl>
-                                        <p:attrNameLst>
-                                          <p:attrName>style.visibility</p:attrName>
-                                        </p:attrNameLst>
-                                      </p:cBhvr>
-                                      <p:to>
-                                        <p:strVal val="visible"/>
-                                      </p:to>
-                                    </p:set>
-                                  </p:childTnLst>
-                                </p:cTn>
-                              </p:par>
-                            </p:childTnLst>
-                          </p:cTn>
-                        </p:par>
-                      </p:childTnLst>
-                    </p:cTn>
-                  </p:par>
-                </p:childTnLst>
-              </p:cTn>
-              <p:prevCondLst>
-                <p:cond evt="onPrev" delay="0">
-                  <p:tgtEl>
-                    <p:sldTgt/>
-                  </p:tgtEl>
-                </p:cond>
-              </p:prevCondLst>
-              <p:nextCondLst>
-                <p:cond evt="onNext" delay="0">
-                  <p:tgtEl>
-                    <p:sldTgt/>
-                  </p:tgtEl>
-                </p:cond>
-              </p:nextCondLst>
-            </p:seq>
-          </p:childTnLst>
-        </p:cTn>
-      </p:par>
-    </p:tnLst>
-    <p:bldLst>
-      <p:bldP spid="4" grpId="0" animBg="1"/>
-      <p:bldP spid="7" grpId="0" animBg="1"/>
-    </p:bldLst>
-  </p:timing>
-</p:sld>
-</file>
-
-<file path=ppt/slides/slide43.xml><?xml version="1.0" encoding="utf-8"?>
-<p:sld xmlns:a="http://schemas.openxmlformats.org/drawingml/2006/main" xmlns:r="http://schemas.openxmlformats.org/officeDocument/2006/relationships" xmlns:p="http://schemas.openxmlformats.org/presentationml/2006/main">
-  <p:cSld>
-    <p:spTree>
-      <p:nvGrpSpPr>
-        <p:cNvPr id="1" name=""/>
-        <p:cNvGrpSpPr/>
-        <p:nvPr/>
-      </p:nvGrpSpPr>
-      <p:grpSpPr>
-        <a:xfrm>
-          <a:off x="0" y="0"/>
-          <a:ext cx="0" cy="0"/>
-          <a:chOff x="0" y="0"/>
-          <a:chExt cx="0" cy="0"/>
-        </a:xfrm>
-      </p:grpSpPr>
-      <p:sp>
-        <p:nvSpPr>
-          <p:cNvPr id="2" name="Title 1"/>
-          <p:cNvSpPr>
-            <a:spLocks noGrp="1"/>
-          </p:cNvSpPr>
-          <p:nvPr>
-            <p:ph type="ctrTitle"/>
-          </p:nvPr>
-        </p:nvSpPr>
-        <p:spPr/>
-        <p:txBody>
-          <a:bodyPr/>
-          <a:lstStyle/>
-          <a:p>
-            <a:r>
-              <a:rPr lang="en-US" dirty="0" smtClean="0"/>
-              <a:t>Day Two</a:t>
-            </a:r>
-            <a:endParaRPr lang="en-US" dirty="0"/>
-          </a:p>
-        </p:txBody>
-      </p:sp>
-      <p:sp>
-        <p:nvSpPr>
-          <p:cNvPr id="3" name="Subtitle 2"/>
-          <p:cNvSpPr>
-            <a:spLocks noGrp="1"/>
-          </p:cNvSpPr>
-          <p:nvPr>
-            <p:ph type="subTitle" idx="1"/>
-          </p:nvPr>
-        </p:nvSpPr>
-        <p:spPr/>
-        <p:txBody>
-          <a:bodyPr/>
-          <a:lstStyle/>
-          <a:p>
-            <a:r>
-              <a:rPr lang="en-US" dirty="0" smtClean="0"/>
-              <a:t>Buffer </a:t>
-            </a:r>
-            <a:r>
-              <a:rPr lang="en-US" dirty="0" err="1" smtClean="0"/>
-              <a:t>Overflowin</a:t>
-            </a:r>
-            <a:endParaRPr lang="en-US" dirty="0"/>
-          </a:p>
-        </p:txBody>
-      </p:sp>
-    </p:spTree>
-    <p:extLst>
-      <p:ext uri="{BB962C8B-B14F-4D97-AF65-F5344CB8AC3E}">
-        <p14:creationId xmlns:p14="http://schemas.microsoft.com/office/powerpoint/2010/main" val="2564060247"/>
-      </p:ext>
-    </p:extLst>
-  </p:cSld>
-  <p:clrMapOvr>
-    <a:masterClrMapping/>
-  </p:clrMapOvr>
-  <p:timing>
-    <p:tnLst>
-      <p:par>
-        <p:cTn id="1" dur="indefinite" restart="never" nodeType="tmRoot"/>
-      </p:par>
-    </p:tnLst>
-  </p:timing>
-</p:sld>
-</file>
-
-<file path=ppt/slides/slide44.xml><?xml version="1.0" encoding="utf-8"?>
-<p:sld xmlns:a="http://schemas.openxmlformats.org/drawingml/2006/main" xmlns:r="http://schemas.openxmlformats.org/officeDocument/2006/relationships" xmlns:p="http://schemas.openxmlformats.org/presentationml/2006/main">
-  <p:cSld>
-    <p:spTree>
-      <p:nvGrpSpPr>
-        <p:cNvPr id="1" name=""/>
-        <p:cNvGrpSpPr/>
-        <p:nvPr/>
-      </p:nvGrpSpPr>
-      <p:grpSpPr>
-        <a:xfrm>
-          <a:off x="0" y="0"/>
-          <a:ext cx="0" cy="0"/>
-          <a:chOff x="0" y="0"/>
-          <a:chExt cx="0" cy="0"/>
-        </a:xfrm>
-      </p:grpSpPr>
-      <p:sp>
-        <p:nvSpPr>
-          <p:cNvPr id="2" name="Title 1"/>
-          <p:cNvSpPr>
-            <a:spLocks noGrp="1"/>
-          </p:cNvSpPr>
-          <p:nvPr>
-            <p:ph type="title"/>
-          </p:nvPr>
-        </p:nvSpPr>
-        <p:spPr/>
-        <p:txBody>
-          <a:bodyPr/>
-          <a:lstStyle/>
-          <a:p>
-            <a:r>
-              <a:rPr lang="en-US" dirty="0" smtClean="0"/>
-              <a:t>Return to </a:t>
-            </a:r>
-            <a:r>
-              <a:rPr lang="en-US" dirty="0" err="1" smtClean="0"/>
-              <a:t>LibC</a:t>
-            </a:r>
-            <a:r>
-              <a:rPr lang="en-US" dirty="0" smtClean="0"/>
-              <a:t> Attack</a:t>
-            </a:r>
-            <a:endParaRPr lang="en-US" dirty="0"/>
-          </a:p>
-        </p:txBody>
-      </p:sp>
-      <p:sp>
-        <p:nvSpPr>
-          <p:cNvPr id="3" name="Content Placeholder 2"/>
-          <p:cNvSpPr>
-            <a:spLocks noGrp="1"/>
-          </p:cNvSpPr>
-          <p:nvPr>
-            <p:ph idx="1"/>
-          </p:nvPr>
-        </p:nvSpPr>
-        <p:spPr/>
-        <p:txBody>
-          <a:bodyPr/>
-          <a:lstStyle/>
-          <a:p>
-            <a:r>
-              <a:rPr lang="en-US" dirty="0" smtClean="0"/>
-              <a:t>Perform buffer overflow using </a:t>
-            </a:r>
-            <a:r>
-              <a:rPr lang="en-US" dirty="0" err="1" smtClean="0"/>
-              <a:t>shellcode</a:t>
-            </a:r>
-            <a:r>
-              <a:rPr lang="en-US" dirty="0" smtClean="0"/>
-              <a:t> to obtain a new shell</a:t>
-            </a:r>
-          </a:p>
-          <a:p>
-            <a:r>
-              <a:rPr lang="en-US" dirty="0" smtClean="0"/>
-              <a:t>Use </a:t>
-            </a:r>
-            <a:r>
-              <a:rPr lang="en-US" dirty="0" err="1" smtClean="0"/>
-              <a:t>LibC</a:t>
-            </a:r>
-            <a:r>
-              <a:rPr lang="en-US" dirty="0" smtClean="0"/>
-              <a:t> Functions</a:t>
-            </a:r>
-          </a:p>
-          <a:p>
-            <a:pPr lvl="1"/>
-            <a:r>
-              <a:rPr lang="en-US" dirty="0" smtClean="0"/>
-              <a:t>System()</a:t>
-            </a:r>
-          </a:p>
-          <a:p>
-            <a:pPr lvl="1"/>
-            <a:r>
-              <a:rPr lang="en-US" dirty="0" err="1" smtClean="0"/>
-              <a:t>Execve</a:t>
-            </a:r>
-            <a:r>
-              <a:rPr lang="en-US" dirty="0" smtClean="0"/>
-              <a:t>()/</a:t>
-            </a:r>
-            <a:r>
-              <a:rPr lang="en-US" dirty="0" err="1" smtClean="0"/>
-              <a:t>WinExec</a:t>
-            </a:r>
-            <a:r>
-              <a:rPr lang="en-US" dirty="0" smtClean="0"/>
-              <a:t>()</a:t>
-            </a:r>
-          </a:p>
-          <a:p>
-            <a:r>
-              <a:rPr lang="en-US" dirty="0" smtClean="0"/>
-              <a:t>Call the desired function directly</a:t>
-            </a:r>
-          </a:p>
-        </p:txBody>
-      </p:sp>
-      <p:pic>
-        <p:nvPicPr>
-          <p:cNvPr id="1027" name="Picture 3"/>
-          <p:cNvPicPr>
-            <a:picLocks noChangeAspect="1" noChangeArrowheads="1"/>
-          </p:cNvPicPr>
-          <p:nvPr/>
-        </p:nvPicPr>
-        <p:blipFill>
-          <a:blip r:embed="rId2">
-            <a:extLst>
-              <a:ext uri="{28A0092B-C50C-407E-A947-70E740481C1C}">
-                <a14:useLocalDpi xmlns:a14="http://schemas.microsoft.com/office/drawing/2010/main" val="0"/>
-              </a:ext>
-            </a:extLst>
-          </a:blip>
-          <a:srcRect/>
-          <a:stretch>
-            <a:fillRect/>
-          </a:stretch>
-        </p:blipFill>
-        <p:spPr bwMode="auto">
-          <a:xfrm>
-            <a:off x="1143000" y="4179591"/>
-            <a:ext cx="6705600" cy="2366682"/>
+            <a:off x="45720" y="304800"/>
+            <a:ext cx="9052560" cy="6319711"/>
           </a:xfrm>
           <a:prstGeom prst="rect">
             <a:avLst/>
@@ -39226,7 +38865,7 @@
     </p:spTree>
     <p:extLst>
       <p:ext uri="{BB962C8B-B14F-4D97-AF65-F5344CB8AC3E}">
-        <p14:creationId xmlns:p14="http://schemas.microsoft.com/office/powerpoint/2010/main" val="4002925978"/>
+        <p14:creationId xmlns:p14="http://schemas.microsoft.com/office/powerpoint/2010/main" val="1604686866"/>
       </p:ext>
     </p:extLst>
   </p:cSld>
@@ -39270,7 +38909,15 @@
           <a:p>
             <a:r>
               <a:rPr lang="en-US" dirty="0" smtClean="0"/>
-              <a:t>Protection Against Buffer Overflows</a:t>
+              <a:t>Return to </a:t>
+            </a:r>
+            <a:r>
+              <a:rPr lang="en-US" dirty="0" err="1" smtClean="0"/>
+              <a:t>LibC</a:t>
+            </a:r>
+            <a:r>
+              <a:rPr lang="en-US" dirty="0" smtClean="0"/>
+              <a:t> Attack</a:t>
             </a:r>
             <a:endParaRPr lang="en-US" dirty="0"/>
           </a:p>
@@ -39293,111 +38940,133 @@
           <a:p>
             <a:r>
               <a:rPr lang="en-US" dirty="0" smtClean="0"/>
-              <a:t>Data Execution Prevention</a:t>
+              <a:t>Perform buffer overflow using </a:t>
+            </a:r>
+            <a:r>
+              <a:rPr lang="en-US" dirty="0" err="1" smtClean="0"/>
+              <a:t>shellcode</a:t>
+            </a:r>
+            <a:r>
+              <a:rPr lang="en-US" dirty="0" smtClean="0"/>
+              <a:t> to obtain a new shell</a:t>
+            </a:r>
+          </a:p>
+          <a:p>
+            <a:r>
+              <a:rPr lang="en-US" dirty="0" smtClean="0"/>
+              <a:t>Use </a:t>
+            </a:r>
+            <a:r>
+              <a:rPr lang="en-US" dirty="0" err="1" smtClean="0"/>
+              <a:t>LibC</a:t>
+            </a:r>
+            <a:r>
+              <a:rPr lang="en-US" dirty="0" smtClean="0"/>
+              <a:t> Functions</a:t>
             </a:r>
           </a:p>
           <a:p>
             <a:pPr lvl="1"/>
             <a:r>
               <a:rPr lang="en-US" dirty="0" smtClean="0"/>
-              <a:t>Linux, Mac, Windows</a:t>
+              <a:t>System()</a:t>
             </a:r>
           </a:p>
           <a:p>
             <a:pPr lvl="1"/>
             <a:r>
+              <a:rPr lang="en-US" dirty="0" err="1" smtClean="0"/>
+              <a:t>Execve</a:t>
+            </a:r>
+            <a:r>
               <a:rPr lang="en-US" dirty="0" smtClean="0"/>
-              <a:t>Hardware Marks all locations in a process as non-executable unless the location explicitly contains executable code. </a:t>
-            </a:r>
-          </a:p>
-          <a:p>
-            <a:pPr lvl="1"/>
+              <a:t>()/</a:t>
+            </a:r>
+            <a:r>
+              <a:rPr lang="en-US" dirty="0" err="1" smtClean="0"/>
+              <a:t>WinExec</a:t>
+            </a:r>
             <a:r>
               <a:rPr lang="en-US" dirty="0" smtClean="0"/>
-              <a:t>If an app tries to run this code, an error is thrown, calling process terminated</a:t>
+              <a:t>()</a:t>
             </a:r>
           </a:p>
           <a:p>
             <a:r>
               <a:rPr lang="en-US" dirty="0" smtClean="0"/>
-              <a:t>To Disable DEP –</a:t>
-            </a:r>
-          </a:p>
-          <a:p>
-            <a:pPr lvl="1"/>
-            <a:r>
-              <a:rPr lang="en-US" dirty="0" smtClean="0"/>
-              <a:t>Windows – recovery and startup sessions, edit the system startup, replace the line </a:t>
-            </a:r>
-            <a:r>
-              <a:rPr lang="en-US" dirty="0" err="1" smtClean="0"/>
-              <a:t>OptIn</a:t>
-            </a:r>
-            <a:r>
-              <a:rPr lang="en-US" dirty="0" smtClean="0"/>
-              <a:t> with always out (/</a:t>
-            </a:r>
-            <a:r>
-              <a:rPr lang="en-US" dirty="0" err="1" smtClean="0"/>
-              <a:t>noexecute</a:t>
-            </a:r>
-            <a:r>
-              <a:rPr lang="en-US" dirty="0" smtClean="0"/>
-              <a:t>=</a:t>
-            </a:r>
-            <a:r>
-              <a:rPr lang="en-US" dirty="0" err="1" smtClean="0"/>
-              <a:t>AlwaysOff</a:t>
-            </a:r>
-            <a:r>
-              <a:rPr lang="en-US" dirty="0" smtClean="0"/>
-              <a:t>)</a:t>
-            </a:r>
-          </a:p>
-          <a:p>
-            <a:pPr lvl="1"/>
-            <a:r>
-              <a:rPr lang="en-US" dirty="0" smtClean="0"/>
-              <a:t>Linux –</a:t>
-            </a:r>
-          </a:p>
-          <a:p>
-            <a:pPr lvl="2"/>
-            <a:r>
-              <a:rPr lang="en-US" dirty="0" smtClean="0"/>
-              <a:t>Echo 0 &gt; /</a:t>
-            </a:r>
-            <a:r>
-              <a:rPr lang="en-US" dirty="0" err="1" smtClean="0"/>
-              <a:t>proc</a:t>
-            </a:r>
-            <a:r>
-              <a:rPr lang="en-US" dirty="0" smtClean="0"/>
-              <a:t>/sys/kernel/exec-shield</a:t>
-            </a:r>
-          </a:p>
-          <a:p>
-            <a:pPr lvl="2"/>
-            <a:r>
-              <a:rPr lang="en-US" dirty="0" smtClean="0"/>
-              <a:t>Echo 0 &gt; /</a:t>
-            </a:r>
-            <a:r>
-              <a:rPr lang="en-US" dirty="0" err="1" smtClean="0"/>
-              <a:t>proc</a:t>
-            </a:r>
-            <a:r>
-              <a:rPr lang="en-US" dirty="0" smtClean="0"/>
-              <a:t>/sys/kernel/exec-shield-randomize</a:t>
-            </a:r>
-            <a:endParaRPr lang="en-US" dirty="0"/>
+              <a:t>Call the desired function directly</a:t>
+            </a:r>
           </a:p>
         </p:txBody>
       </p:sp>
+      <p:pic>
+        <p:nvPicPr>
+          <p:cNvPr id="1027" name="Picture 3"/>
+          <p:cNvPicPr>
+            <a:picLocks noChangeAspect="1" noChangeArrowheads="1"/>
+          </p:cNvPicPr>
+          <p:nvPr/>
+        </p:nvPicPr>
+        <p:blipFill>
+          <a:blip r:embed="rId2">
+            <a:extLst>
+              <a:ext uri="{28A0092B-C50C-407E-A947-70E740481C1C}">
+                <a14:useLocalDpi xmlns:a14="http://schemas.microsoft.com/office/drawing/2010/main" val="0"/>
+              </a:ext>
+            </a:extLst>
+          </a:blip>
+          <a:srcRect/>
+          <a:stretch>
+            <a:fillRect/>
+          </a:stretch>
+        </p:blipFill>
+        <p:spPr bwMode="auto">
+          <a:xfrm>
+            <a:off x="1143000" y="4179591"/>
+            <a:ext cx="6705600" cy="2366682"/>
+          </a:xfrm>
+          <a:prstGeom prst="rect">
+            <a:avLst/>
+          </a:prstGeom>
+          <a:noFill/>
+          <a:ln>
+            <a:noFill/>
+          </a:ln>
+          <a:effectLst/>
+          <a:extLst>
+            <a:ext uri="{909E8E84-426E-40DD-AFC4-6F175D3DCCD1}">
+              <a14:hiddenFill xmlns:a14="http://schemas.microsoft.com/office/drawing/2010/main">
+                <a:solidFill>
+                  <a:schemeClr val="accent1"/>
+                </a:solidFill>
+              </a14:hiddenFill>
+            </a:ext>
+            <a:ext uri="{91240B29-F687-4F45-9708-019B960494DF}">
+              <a14:hiddenLine xmlns:a14="http://schemas.microsoft.com/office/drawing/2010/main" w="9525">
+                <a:solidFill>
+                  <a:schemeClr val="tx1"/>
+                </a:solidFill>
+                <a:miter lim="800000"/>
+                <a:headEnd/>
+                <a:tailEnd/>
+              </a14:hiddenLine>
+            </a:ext>
+            <a:ext uri="{AF507438-7753-43E0-B8FC-AC1667EBCBE1}">
+              <a14:hiddenEffects xmlns:a14="http://schemas.microsoft.com/office/drawing/2010/main">
+                <a:effectLst>
+                  <a:outerShdw dist="35921" dir="2700000" algn="ctr" rotWithShape="0">
+                    <a:schemeClr val="bg2"/>
+                  </a:outerShdw>
+                </a:effectLst>
+              </a14:hiddenEffects>
+            </a:ext>
+          </a:extLst>
+        </p:spPr>
+      </p:pic>
     </p:spTree>
     <p:extLst>
       <p:ext uri="{BB962C8B-B14F-4D97-AF65-F5344CB8AC3E}">
-        <p14:creationId xmlns:p14="http://schemas.microsoft.com/office/powerpoint/2010/main" val="1819619996"/>
+        <p14:creationId xmlns:p14="http://schemas.microsoft.com/office/powerpoint/2010/main" val="4002925978"/>
       </p:ext>
     </p:extLst>
   </p:cSld>
@@ -39448,7 +39117,7 @@
           <a:p>
             <a:r>
               <a:rPr lang="en-US" dirty="0" smtClean="0"/>
-              <a:t>Protection Continued</a:t>
+              <a:t>Protection Against Buffer Overflows</a:t>
             </a:r>
             <a:endParaRPr lang="en-US" dirty="0"/>
           </a:p>
@@ -39471,57 +39140,79 @@
           <a:p>
             <a:r>
               <a:rPr lang="en-US" dirty="0" smtClean="0"/>
-              <a:t>Address Space Layout Randomization</a:t>
+              <a:t>Data Execution Prevention</a:t>
             </a:r>
           </a:p>
           <a:p>
             <a:pPr lvl="1"/>
             <a:r>
               <a:rPr lang="en-US" dirty="0" smtClean="0"/>
-              <a:t>Randomly arranges the positions of key data areas</a:t>
+              <a:t>Linux, Mac, Windows</a:t>
+            </a:r>
+          </a:p>
+          <a:p>
+            <a:pPr lvl="1"/>
+            <a:r>
+              <a:rPr lang="en-US" dirty="0" smtClean="0"/>
+              <a:t>Hardware Marks all locations in a process as non-executable unless the location explicitly contains executable code. </a:t>
+            </a:r>
+          </a:p>
+          <a:p>
+            <a:pPr lvl="1"/>
+            <a:r>
+              <a:rPr lang="en-US" dirty="0" smtClean="0"/>
+              <a:t>If an app tries to run this code, an error is thrown, calling process terminated</a:t>
+            </a:r>
+          </a:p>
+          <a:p>
+            <a:r>
+              <a:rPr lang="en-US" dirty="0" smtClean="0"/>
+              <a:t>To Disable DEP –</a:t>
+            </a:r>
+          </a:p>
+          <a:p>
+            <a:pPr lvl="1"/>
+            <a:r>
+              <a:rPr lang="en-US" dirty="0" smtClean="0"/>
+              <a:t>Windows – recovery and startup sessions, edit the system startup, replace the line </a:t>
+            </a:r>
+            <a:r>
+              <a:rPr lang="en-US" dirty="0" err="1" smtClean="0"/>
+              <a:t>OptIn</a:t>
+            </a:r>
+            <a:r>
+              <a:rPr lang="en-US" dirty="0" smtClean="0"/>
+              <a:t> with always out (/</a:t>
+            </a:r>
+            <a:r>
+              <a:rPr lang="en-US" dirty="0" err="1" smtClean="0"/>
+              <a:t>noexecute</a:t>
+            </a:r>
+            <a:r>
+              <a:rPr lang="en-US" dirty="0" smtClean="0"/>
+              <a:t>=</a:t>
+            </a:r>
+            <a:r>
+              <a:rPr lang="en-US" dirty="0" err="1" smtClean="0"/>
+              <a:t>AlwaysOff</a:t>
+            </a:r>
+            <a:r>
+              <a:rPr lang="en-US" dirty="0" smtClean="0"/>
+              <a:t>)</a:t>
+            </a:r>
+          </a:p>
+          <a:p>
+            <a:pPr lvl="1"/>
+            <a:r>
+              <a:rPr lang="en-US" dirty="0" smtClean="0"/>
+              <a:t>Linux –</a:t>
             </a:r>
           </a:p>
           <a:p>
             <a:pPr lvl="2"/>
             <a:r>
               <a:rPr lang="en-US" dirty="0" smtClean="0"/>
-              <a:t>E.g. positions of library, heap, stack</a:t>
-            </a:r>
-          </a:p>
-          <a:p>
-            <a:pPr lvl="1"/>
-            <a:r>
-              <a:rPr lang="en-US" dirty="0" smtClean="0"/>
-              <a:t>If the location of </a:t>
-            </a:r>
-            <a:r>
-              <a:rPr lang="en-US" dirty="0" err="1" smtClean="0"/>
-              <a:t>lib.c</a:t>
-            </a:r>
-            <a:r>
-              <a:rPr lang="en-US" dirty="0" smtClean="0"/>
-              <a:t> changes </a:t>
-            </a:r>
-            <a:r>
-              <a:rPr lang="en-US" dirty="0" err="1" smtClean="0"/>
-              <a:t>everytime</a:t>
-            </a:r>
-            <a:r>
-              <a:rPr lang="en-US" dirty="0" smtClean="0"/>
-              <a:t>, then it will be hard to find the exact locations of different functions</a:t>
-            </a:r>
-          </a:p>
-          <a:p>
-            <a:r>
-              <a:rPr lang="en-US" dirty="0" smtClean="0"/>
-              <a:t>Turn off ASLR </a:t>
-            </a:r>
-          </a:p>
-          <a:p>
-            <a:pPr lvl="1"/>
-            <a:r>
-              <a:rPr lang="en-US" dirty="0" smtClean="0"/>
-              <a:t>Linux – echo 0 &gt; /</a:t>
+              <a:t>Echo 0 &gt; /</a:t>
             </a:r>
             <a:r>
               <a:rPr lang="en-US" dirty="0" err="1" smtClean="0"/>
@@ -39529,11 +39220,22 @@
             </a:r>
             <a:r>
               <a:rPr lang="en-US" dirty="0" smtClean="0"/>
-              <a:t>/sys/kernel/</a:t>
+              <a:t>/sys/kernel/exec-shield</a:t>
+            </a:r>
+          </a:p>
+          <a:p>
+            <a:pPr lvl="2"/>
+            <a:r>
+              <a:rPr lang="en-US" dirty="0" smtClean="0"/>
+              <a:t>Echo 0 &gt; /</a:t>
             </a:r>
             <a:r>
               <a:rPr lang="en-US" dirty="0" err="1" smtClean="0"/>
-              <a:t>randomize_va_space</a:t>
+              <a:t>proc</a:t>
+            </a:r>
+            <a:r>
+              <a:rPr lang="en-US" dirty="0" smtClean="0"/>
+              <a:t>/sys/kernel/exec-shield-randomize</a:t>
             </a:r>
             <a:endParaRPr lang="en-US" dirty="0"/>
           </a:p>
@@ -39542,7 +39244,7 @@
     </p:spTree>
     <p:extLst>
       <p:ext uri="{BB962C8B-B14F-4D97-AF65-F5344CB8AC3E}">
-        <p14:creationId xmlns:p14="http://schemas.microsoft.com/office/powerpoint/2010/main" val="1940961802"/>
+        <p14:creationId xmlns:p14="http://schemas.microsoft.com/office/powerpoint/2010/main" val="1819619996"/>
       </p:ext>
     </p:extLst>
   </p:cSld>
@@ -39593,6 +39295,151 @@
           <a:p>
             <a:r>
               <a:rPr lang="en-US" dirty="0" smtClean="0"/>
+              <a:t>Protection Continued</a:t>
+            </a:r>
+            <a:endParaRPr lang="en-US" dirty="0"/>
+          </a:p>
+        </p:txBody>
+      </p:sp>
+      <p:sp>
+        <p:nvSpPr>
+          <p:cNvPr id="3" name="Content Placeholder 2"/>
+          <p:cNvSpPr>
+            <a:spLocks noGrp="1"/>
+          </p:cNvSpPr>
+          <p:nvPr>
+            <p:ph idx="1"/>
+          </p:nvPr>
+        </p:nvSpPr>
+        <p:spPr/>
+        <p:txBody>
+          <a:bodyPr/>
+          <a:lstStyle/>
+          <a:p>
+            <a:r>
+              <a:rPr lang="en-US" dirty="0" smtClean="0"/>
+              <a:t>Address Space Layout Randomization</a:t>
+            </a:r>
+          </a:p>
+          <a:p>
+            <a:pPr lvl="1"/>
+            <a:r>
+              <a:rPr lang="en-US" dirty="0" smtClean="0"/>
+              <a:t>Randomly arranges the positions of key data areas</a:t>
+            </a:r>
+          </a:p>
+          <a:p>
+            <a:pPr lvl="2"/>
+            <a:r>
+              <a:rPr lang="en-US" dirty="0" smtClean="0"/>
+              <a:t>E.g. positions of library, heap, stack</a:t>
+            </a:r>
+          </a:p>
+          <a:p>
+            <a:pPr lvl="1"/>
+            <a:r>
+              <a:rPr lang="en-US" dirty="0" smtClean="0"/>
+              <a:t>If the location of </a:t>
+            </a:r>
+            <a:r>
+              <a:rPr lang="en-US" dirty="0" err="1" smtClean="0"/>
+              <a:t>lib.c</a:t>
+            </a:r>
+            <a:r>
+              <a:rPr lang="en-US" dirty="0" smtClean="0"/>
+              <a:t> changes </a:t>
+            </a:r>
+            <a:r>
+              <a:rPr lang="en-US" dirty="0" err="1" smtClean="0"/>
+              <a:t>everytime</a:t>
+            </a:r>
+            <a:r>
+              <a:rPr lang="en-US" dirty="0" smtClean="0"/>
+              <a:t>, then it will be hard to find the exact locations of different functions</a:t>
+            </a:r>
+          </a:p>
+          <a:p>
+            <a:r>
+              <a:rPr lang="en-US" dirty="0" smtClean="0"/>
+              <a:t>Turn off ASLR </a:t>
+            </a:r>
+          </a:p>
+          <a:p>
+            <a:pPr lvl="1"/>
+            <a:r>
+              <a:rPr lang="en-US" dirty="0" smtClean="0"/>
+              <a:t>Linux – echo 0 &gt; /</a:t>
+            </a:r>
+            <a:r>
+              <a:rPr lang="en-US" dirty="0" err="1" smtClean="0"/>
+              <a:t>proc</a:t>
+            </a:r>
+            <a:r>
+              <a:rPr lang="en-US" dirty="0" smtClean="0"/>
+              <a:t>/sys/kernel/</a:t>
+            </a:r>
+            <a:r>
+              <a:rPr lang="en-US" dirty="0" err="1" smtClean="0"/>
+              <a:t>randomize_va_space</a:t>
+            </a:r>
+            <a:endParaRPr lang="en-US" dirty="0"/>
+          </a:p>
+        </p:txBody>
+      </p:sp>
+    </p:spTree>
+    <p:extLst>
+      <p:ext uri="{BB962C8B-B14F-4D97-AF65-F5344CB8AC3E}">
+        <p14:creationId xmlns:p14="http://schemas.microsoft.com/office/powerpoint/2010/main" val="1940961802"/>
+      </p:ext>
+    </p:extLst>
+  </p:cSld>
+  <p:clrMapOvr>
+    <a:masterClrMapping/>
+  </p:clrMapOvr>
+  <p:timing>
+    <p:tnLst>
+      <p:par>
+        <p:cTn id="1" dur="indefinite" restart="never" nodeType="tmRoot"/>
+      </p:par>
+    </p:tnLst>
+  </p:timing>
+</p:sld>
+</file>
+
+<file path=ppt/slides/slide48.xml><?xml version="1.0" encoding="utf-8"?>
+<p:sld xmlns:a="http://schemas.openxmlformats.org/drawingml/2006/main" xmlns:r="http://schemas.openxmlformats.org/officeDocument/2006/relationships" xmlns:p="http://schemas.openxmlformats.org/presentationml/2006/main">
+  <p:cSld>
+    <p:spTree>
+      <p:nvGrpSpPr>
+        <p:cNvPr id="1" name=""/>
+        <p:cNvGrpSpPr/>
+        <p:nvPr/>
+      </p:nvGrpSpPr>
+      <p:grpSpPr>
+        <a:xfrm>
+          <a:off x="0" y="0"/>
+          <a:ext cx="0" cy="0"/>
+          <a:chOff x="0" y="0"/>
+          <a:chExt cx="0" cy="0"/>
+        </a:xfrm>
+      </p:grpSpPr>
+      <p:sp>
+        <p:nvSpPr>
+          <p:cNvPr id="2" name="Title 1"/>
+          <p:cNvSpPr>
+            <a:spLocks noGrp="1"/>
+          </p:cNvSpPr>
+          <p:nvPr>
+            <p:ph type="title"/>
+          </p:nvPr>
+        </p:nvSpPr>
+        <p:spPr/>
+        <p:txBody>
+          <a:bodyPr/>
+          <a:lstStyle/>
+          <a:p>
+            <a:r>
+              <a:rPr lang="en-US" dirty="0" smtClean="0"/>
               <a:t>Canaries</a:t>
             </a:r>
             <a:endParaRPr lang="en-US" dirty="0"/>
@@ -39664,7 +39511,7 @@
 </p:sld>
 </file>
 
-<file path=ppt/slides/slide48.xml><?xml version="1.0" encoding="utf-8"?>
+<file path=ppt/slides/slide49.xml><?xml version="1.0" encoding="utf-8"?>
 <p:sld xmlns:a="http://schemas.openxmlformats.org/drawingml/2006/main" xmlns:r="http://schemas.openxmlformats.org/officeDocument/2006/relationships" xmlns:p="http://schemas.openxmlformats.org/presentationml/2006/main">
   <p:cSld>
     <p:spTree>
@@ -39913,7 +39760,176 @@
 </p:sld>
 </file>
 
-<file path=ppt/slides/slide49.xml><?xml version="1.0" encoding="utf-8"?>
+<file path=ppt/slides/slide5.xml><?xml version="1.0" encoding="utf-8"?>
+<p:sld xmlns:a="http://schemas.openxmlformats.org/drawingml/2006/main" xmlns:r="http://schemas.openxmlformats.org/officeDocument/2006/relationships" xmlns:p="http://schemas.openxmlformats.org/presentationml/2006/main">
+  <p:cSld>
+    <p:spTree>
+      <p:nvGrpSpPr>
+        <p:cNvPr id="1" name=""/>
+        <p:cNvGrpSpPr/>
+        <p:nvPr/>
+      </p:nvGrpSpPr>
+      <p:grpSpPr>
+        <a:xfrm>
+          <a:off x="0" y="0"/>
+          <a:ext cx="0" cy="0"/>
+          <a:chOff x="0" y="0"/>
+          <a:chExt cx="0" cy="0"/>
+        </a:xfrm>
+      </p:grpSpPr>
+      <p:sp>
+        <p:nvSpPr>
+          <p:cNvPr id="2" name="Title 1"/>
+          <p:cNvSpPr>
+            <a:spLocks noGrp="1"/>
+          </p:cNvSpPr>
+          <p:nvPr>
+            <p:ph type="title"/>
+          </p:nvPr>
+        </p:nvSpPr>
+        <p:spPr/>
+        <p:txBody>
+          <a:bodyPr/>
+          <a:lstStyle/>
+          <a:p>
+            <a:r>
+              <a:rPr lang="en-US" dirty="0" smtClean="0"/>
+              <a:t>Flavors of the Attack </a:t>
+            </a:r>
+            <a:endParaRPr lang="en-US" dirty="0"/>
+          </a:p>
+        </p:txBody>
+      </p:sp>
+      <p:sp>
+        <p:nvSpPr>
+          <p:cNvPr id="3" name="Content Placeholder 2"/>
+          <p:cNvSpPr>
+            <a:spLocks noGrp="1"/>
+          </p:cNvSpPr>
+          <p:nvPr>
+            <p:ph idx="1"/>
+          </p:nvPr>
+        </p:nvSpPr>
+        <p:spPr/>
+        <p:txBody>
+          <a:bodyPr/>
+          <a:lstStyle/>
+          <a:p>
+            <a:r>
+              <a:rPr lang="en-US" dirty="0" smtClean="0"/>
+              <a:t>Stack Overflow</a:t>
+            </a:r>
+          </a:p>
+          <a:p>
+            <a:pPr lvl="1"/>
+            <a:r>
+              <a:rPr lang="en-US" dirty="0" smtClean="0"/>
+              <a:t>Buffer allocated on the stack</a:t>
+            </a:r>
+          </a:p>
+          <a:p>
+            <a:pPr lvl="1"/>
+            <a:r>
+              <a:rPr lang="en-US" dirty="0" smtClean="0"/>
+              <a:t>Bounds aren’t checked on user input</a:t>
+            </a:r>
+          </a:p>
+          <a:p>
+            <a:pPr lvl="1"/>
+            <a:r>
+              <a:rPr lang="en-US" dirty="0" smtClean="0"/>
+              <a:t>Input is copied using an unsafe method ( ‘gets’, ‘</a:t>
+            </a:r>
+            <a:r>
+              <a:rPr lang="en-US" dirty="0" err="1" smtClean="0"/>
+              <a:t>strcpy</a:t>
+            </a:r>
+            <a:r>
+              <a:rPr lang="en-US" dirty="0" smtClean="0"/>
+              <a:t>’, ‘</a:t>
+            </a:r>
+            <a:r>
+              <a:rPr lang="en-US" dirty="0" err="1" smtClean="0"/>
+              <a:t>strcat</a:t>
+            </a:r>
+            <a:r>
+              <a:rPr lang="en-US" dirty="0" smtClean="0"/>
+              <a:t>’ )</a:t>
+            </a:r>
+          </a:p>
+          <a:p>
+            <a:pPr lvl="1"/>
+            <a:r>
+              <a:rPr lang="en-US" dirty="0" smtClean="0"/>
+              <a:t>Memory outside the allocated buffer is overwritten</a:t>
+            </a:r>
+          </a:p>
+          <a:p>
+            <a:r>
+              <a:rPr lang="en-US" dirty="0" smtClean="0">
+                <a:solidFill>
+                  <a:schemeClr val="bg1">
+                    <a:lumMod val="65000"/>
+                  </a:schemeClr>
+                </a:solidFill>
+              </a:rPr>
+              <a:t>Heap Overflow</a:t>
+            </a:r>
+          </a:p>
+          <a:p>
+            <a:r>
+              <a:rPr lang="en-US" dirty="0" smtClean="0">
+                <a:solidFill>
+                  <a:schemeClr val="bg1">
+                    <a:lumMod val="65000"/>
+                  </a:schemeClr>
+                </a:solidFill>
+              </a:rPr>
+              <a:t>Integer Overflow</a:t>
+            </a:r>
+          </a:p>
+          <a:p>
+            <a:r>
+              <a:rPr lang="en-US" dirty="0" smtClean="0">
+                <a:solidFill>
+                  <a:schemeClr val="bg1">
+                    <a:lumMod val="65000"/>
+                  </a:schemeClr>
+                </a:solidFill>
+              </a:rPr>
+              <a:t>String Format Abuse</a:t>
+            </a:r>
+            <a:endParaRPr lang="en-US" dirty="0">
+              <a:solidFill>
+                <a:schemeClr val="bg1">
+                  <a:lumMod val="65000"/>
+                </a:schemeClr>
+              </a:solidFill>
+            </a:endParaRPr>
+          </a:p>
+        </p:txBody>
+      </p:sp>
+    </p:spTree>
+    <p:extLst>
+      <p:ext uri="{BB962C8B-B14F-4D97-AF65-F5344CB8AC3E}">
+        <p14:creationId xmlns:p14="http://schemas.microsoft.com/office/powerpoint/2010/main" val="979594186"/>
+      </p:ext>
+    </p:extLst>
+  </p:cSld>
+  <p:clrMapOvr>
+    <a:masterClrMapping/>
+  </p:clrMapOvr>
+  <p:timing>
+    <p:tnLst>
+      <p:par>
+        <p:cTn id="1" dur="indefinite" restart="never" nodeType="tmRoot"/>
+      </p:par>
+    </p:tnLst>
+  </p:timing>
+</p:sld>
+</file>
+
+<file path=ppt/slides/slide50.xml><?xml version="1.0" encoding="utf-8"?>
 <p:sld xmlns:a="http://schemas.openxmlformats.org/drawingml/2006/main" xmlns:r="http://schemas.openxmlformats.org/officeDocument/2006/relationships" xmlns:p="http://schemas.openxmlformats.org/presentationml/2006/main">
   <p:cSld>
     <p:spTree>
@@ -40139,176 +40155,7 @@
 </p:sld>
 </file>
 
-<file path=ppt/slides/slide5.xml><?xml version="1.0" encoding="utf-8"?>
-<p:sld xmlns:a="http://schemas.openxmlformats.org/drawingml/2006/main" xmlns:r="http://schemas.openxmlformats.org/officeDocument/2006/relationships" xmlns:p="http://schemas.openxmlformats.org/presentationml/2006/main">
-  <p:cSld>
-    <p:spTree>
-      <p:nvGrpSpPr>
-        <p:cNvPr id="1" name=""/>
-        <p:cNvGrpSpPr/>
-        <p:nvPr/>
-      </p:nvGrpSpPr>
-      <p:grpSpPr>
-        <a:xfrm>
-          <a:off x="0" y="0"/>
-          <a:ext cx="0" cy="0"/>
-          <a:chOff x="0" y="0"/>
-          <a:chExt cx="0" cy="0"/>
-        </a:xfrm>
-      </p:grpSpPr>
-      <p:sp>
-        <p:nvSpPr>
-          <p:cNvPr id="2" name="Title 1"/>
-          <p:cNvSpPr>
-            <a:spLocks noGrp="1"/>
-          </p:cNvSpPr>
-          <p:nvPr>
-            <p:ph type="title"/>
-          </p:nvPr>
-        </p:nvSpPr>
-        <p:spPr/>
-        <p:txBody>
-          <a:bodyPr/>
-          <a:lstStyle/>
-          <a:p>
-            <a:r>
-              <a:rPr lang="en-US" dirty="0" smtClean="0"/>
-              <a:t>Flavors of the Attack </a:t>
-            </a:r>
-            <a:endParaRPr lang="en-US" dirty="0"/>
-          </a:p>
-        </p:txBody>
-      </p:sp>
-      <p:sp>
-        <p:nvSpPr>
-          <p:cNvPr id="3" name="Content Placeholder 2"/>
-          <p:cNvSpPr>
-            <a:spLocks noGrp="1"/>
-          </p:cNvSpPr>
-          <p:nvPr>
-            <p:ph idx="1"/>
-          </p:nvPr>
-        </p:nvSpPr>
-        <p:spPr/>
-        <p:txBody>
-          <a:bodyPr/>
-          <a:lstStyle/>
-          <a:p>
-            <a:r>
-              <a:rPr lang="en-US" dirty="0" smtClean="0"/>
-              <a:t>Stack Overflow</a:t>
-            </a:r>
-          </a:p>
-          <a:p>
-            <a:pPr lvl="1"/>
-            <a:r>
-              <a:rPr lang="en-US" dirty="0" smtClean="0"/>
-              <a:t>Buffer allocated on the stack</a:t>
-            </a:r>
-          </a:p>
-          <a:p>
-            <a:pPr lvl="1"/>
-            <a:r>
-              <a:rPr lang="en-US" dirty="0" smtClean="0"/>
-              <a:t>Bounds aren’t checked on user input</a:t>
-            </a:r>
-          </a:p>
-          <a:p>
-            <a:pPr lvl="1"/>
-            <a:r>
-              <a:rPr lang="en-US" dirty="0" smtClean="0"/>
-              <a:t>Input is copied using an unsafe method ( ‘gets’, ‘</a:t>
-            </a:r>
-            <a:r>
-              <a:rPr lang="en-US" dirty="0" err="1" smtClean="0"/>
-              <a:t>strcpy</a:t>
-            </a:r>
-            <a:r>
-              <a:rPr lang="en-US" dirty="0" smtClean="0"/>
-              <a:t>’, ‘</a:t>
-            </a:r>
-            <a:r>
-              <a:rPr lang="en-US" dirty="0" err="1" smtClean="0"/>
-              <a:t>strcat</a:t>
-            </a:r>
-            <a:r>
-              <a:rPr lang="en-US" dirty="0" smtClean="0"/>
-              <a:t>’ )</a:t>
-            </a:r>
-          </a:p>
-          <a:p>
-            <a:pPr lvl="1"/>
-            <a:r>
-              <a:rPr lang="en-US" dirty="0" smtClean="0"/>
-              <a:t>Memory outside the allocated buffer is overwritten</a:t>
-            </a:r>
-          </a:p>
-          <a:p>
-            <a:r>
-              <a:rPr lang="en-US" dirty="0" smtClean="0">
-                <a:solidFill>
-                  <a:schemeClr val="bg1">
-                    <a:lumMod val="65000"/>
-                  </a:schemeClr>
-                </a:solidFill>
-              </a:rPr>
-              <a:t>Heap Overflow</a:t>
-            </a:r>
-          </a:p>
-          <a:p>
-            <a:r>
-              <a:rPr lang="en-US" dirty="0" smtClean="0">
-                <a:solidFill>
-                  <a:schemeClr val="bg1">
-                    <a:lumMod val="65000"/>
-                  </a:schemeClr>
-                </a:solidFill>
-              </a:rPr>
-              <a:t>Integer Overflow</a:t>
-            </a:r>
-          </a:p>
-          <a:p>
-            <a:r>
-              <a:rPr lang="en-US" dirty="0" smtClean="0">
-                <a:solidFill>
-                  <a:schemeClr val="bg1">
-                    <a:lumMod val="65000"/>
-                  </a:schemeClr>
-                </a:solidFill>
-              </a:rPr>
-              <a:t>String Format Abuse</a:t>
-            </a:r>
-            <a:endParaRPr lang="en-US" dirty="0">
-              <a:solidFill>
-                <a:schemeClr val="bg1">
-                  <a:lumMod val="65000"/>
-                </a:schemeClr>
-              </a:solidFill>
-            </a:endParaRPr>
-          </a:p>
-        </p:txBody>
-      </p:sp>
-    </p:spTree>
-    <p:extLst>
-      <p:ext uri="{BB962C8B-B14F-4D97-AF65-F5344CB8AC3E}">
-        <p14:creationId xmlns:p14="http://schemas.microsoft.com/office/powerpoint/2010/main" val="979594186"/>
-      </p:ext>
-    </p:extLst>
-  </p:cSld>
-  <p:clrMapOvr>
-    <a:masterClrMapping/>
-  </p:clrMapOvr>
-  <p:timing>
-    <p:tnLst>
-      <p:par>
-        <p:cTn id="1" dur="indefinite" restart="never" nodeType="tmRoot"/>
-      </p:par>
-    </p:tnLst>
-  </p:timing>
-</p:sld>
-</file>
-
-<file path=ppt/slides/slide50.xml><?xml version="1.0" encoding="utf-8"?>
+<file path=ppt/slides/slide51.xml><?xml version="1.0" encoding="utf-8"?>
 <p:sld xmlns:a="http://schemas.openxmlformats.org/drawingml/2006/main" xmlns:r="http://schemas.openxmlformats.org/officeDocument/2006/relationships" xmlns:p="http://schemas.openxmlformats.org/presentationml/2006/main">
   <p:cSld>
     <p:spTree>

</xml_diff>

<commit_message>
fixing the homework doc
</commit_message>
<xml_diff>
--- a/Buffer Overflow Attacks.pptx
+++ b/Buffer Overflow Attacks.pptx
@@ -35417,16 +35417,26 @@
         </p:nvSpPr>
         <p:spPr/>
         <p:txBody>
-          <a:bodyPr/>
+          <a:bodyPr>
+            <a:normAutofit fontScale="92500" lnSpcReduction="20000"/>
+          </a:bodyPr>
           <a:lstStyle/>
           <a:p>
+            <a:r>
+              <a:rPr lang="en-US" dirty="0" smtClean="0"/>
+              <a:t>Day 1:</a:t>
+            </a:r>
+          </a:p>
+          <a:p>
+            <a:pPr lvl="1"/>
             <a:r>
               <a:rPr lang="en-US" dirty="0" smtClean="0"/>
               <a:t>Intro</a:t>
             </a:r>
-          </a:p>
-          <a:p>
-            <a:pPr lvl="1"/>
+            <a:endParaRPr lang="en-US" dirty="0" smtClean="0"/>
+          </a:p>
+          <a:p>
+            <a:pPr lvl="2"/>
             <a:r>
               <a:rPr lang="en-US" dirty="0" smtClean="0"/>
               <a:t>Flavors of the attack</a:t>
@@ -35436,60 +35446,110 @@
             <a:pPr lvl="1"/>
             <a:r>
               <a:rPr lang="en-US" dirty="0" smtClean="0"/>
-              <a:t>Famous Attacks</a:t>
-            </a:r>
-          </a:p>
-          <a:p>
+              <a:t>What </a:t>
+            </a:r>
             <a:r>
               <a:rPr lang="en-US" dirty="0" smtClean="0"/>
-              <a:t>What is this stack thing?</a:t>
-            </a:r>
-          </a:p>
-          <a:p>
-            <a:pPr lvl="1"/>
+              <a:t>is this stack thing?</a:t>
+            </a:r>
+          </a:p>
+          <a:p>
+            <a:pPr lvl="2"/>
             <a:r>
               <a:rPr lang="en-US" dirty="0" smtClean="0"/>
               <a:t>Stack layout</a:t>
             </a:r>
           </a:p>
           <a:p>
-            <a:pPr lvl="1"/>
+            <a:pPr lvl="2"/>
             <a:r>
               <a:rPr lang="en-US" dirty="0" smtClean="0"/>
               <a:t>Program execution w/ stack</a:t>
             </a:r>
           </a:p>
           <a:p>
+            <a:pPr lvl="1"/>
             <a:r>
               <a:rPr lang="en-US" dirty="0" smtClean="0"/>
               <a:t>Ok, so how do we attack it?</a:t>
             </a:r>
           </a:p>
           <a:p>
-            <a:pPr lvl="1"/>
+            <a:pPr lvl="2"/>
             <a:r>
               <a:rPr lang="en-US" dirty="0" smtClean="0"/>
               <a:t>Using debuggers and disassemblers</a:t>
             </a:r>
           </a:p>
           <a:p>
-            <a:pPr lvl="1"/>
+            <a:pPr lvl="2"/>
             <a:r>
               <a:rPr lang="en-US" dirty="0" smtClean="0"/>
               <a:t>Payload generation</a:t>
             </a:r>
           </a:p>
           <a:p>
+            <a:r>
+              <a:rPr lang="en-US" dirty="0" smtClean="0"/>
+              <a:t>Day 2</a:t>
+            </a:r>
+          </a:p>
+          <a:p>
             <a:pPr lvl="1"/>
             <a:r>
               <a:rPr lang="en-US" dirty="0" smtClean="0"/>
-              <a:t>Elevation of privilege</a:t>
-            </a:r>
-          </a:p>
-          <a:p>
+              <a:t>Discuss Homework</a:t>
+            </a:r>
+            <a:endParaRPr lang="en-US" dirty="0" smtClean="0"/>
+          </a:p>
+          <a:p>
+            <a:pPr lvl="1"/>
             <a:r>
               <a:rPr lang="en-US" dirty="0" smtClean="0"/>
-              <a:t>Protecting your system</a:t>
+              <a:t>Elevation </a:t>
+            </a:r>
+            <a:r>
+              <a:rPr lang="en-US" dirty="0" smtClean="0"/>
+              <a:t>of </a:t>
+            </a:r>
+            <a:r>
+              <a:rPr lang="en-US" dirty="0" smtClean="0"/>
+              <a:t>privilege (</a:t>
+            </a:r>
+            <a:r>
+              <a:rPr lang="en-US" dirty="0" err="1" smtClean="0"/>
+              <a:t>libc</a:t>
+            </a:r>
+            <a:r>
+              <a:rPr lang="en-US" dirty="0" smtClean="0"/>
+              <a:t>)</a:t>
+            </a:r>
+            <a:endParaRPr lang="en-US" dirty="0" smtClean="0"/>
+          </a:p>
+          <a:p>
+            <a:pPr lvl="1"/>
+            <a:r>
+              <a:rPr lang="en-US" dirty="0" smtClean="0"/>
+              <a:t>Protecting your </a:t>
+            </a:r>
+            <a:r>
+              <a:rPr lang="en-US" dirty="0" smtClean="0"/>
+              <a:t>system</a:t>
+            </a:r>
+          </a:p>
+          <a:p>
+            <a:pPr lvl="1"/>
+            <a:r>
+              <a:rPr lang="en-US" dirty="0" smtClean="0"/>
+              <a:t>Miscellaneous Attacks</a:t>
+            </a:r>
+            <a:endParaRPr lang="en-US" dirty="0" smtClean="0"/>
+          </a:p>
+          <a:p>
+            <a:pPr lvl="1"/>
+            <a:r>
+              <a:rPr lang="en-US" dirty="0" smtClean="0"/>
+              <a:t>Famous Attacks</a:t>
             </a:r>
             <a:endParaRPr lang="en-US" dirty="0"/>
           </a:p>

</xml_diff>

<commit_message>
Added Mere's sections to the paper.
</commit_message>
<xml_diff>
--- a/Buffer Overflow Attacks.pptx
+++ b/Buffer Overflow Attacks.pptx
@@ -39,14 +39,14 @@
     <p:sldId id="282" r:id="rId30"/>
     <p:sldId id="283" r:id="rId31"/>
     <p:sldId id="284" r:id="rId32"/>
-    <p:sldId id="312" r:id="rId33"/>
-    <p:sldId id="313" r:id="rId34"/>
-    <p:sldId id="305" r:id="rId35"/>
-    <p:sldId id="306" r:id="rId36"/>
-    <p:sldId id="307" r:id="rId37"/>
-    <p:sldId id="308" r:id="rId38"/>
-    <p:sldId id="309" r:id="rId39"/>
-    <p:sldId id="285" r:id="rId40"/>
+    <p:sldId id="328" r:id="rId33"/>
+    <p:sldId id="312" r:id="rId34"/>
+    <p:sldId id="313" r:id="rId35"/>
+    <p:sldId id="305" r:id="rId36"/>
+    <p:sldId id="306" r:id="rId37"/>
+    <p:sldId id="307" r:id="rId38"/>
+    <p:sldId id="308" r:id="rId39"/>
+    <p:sldId id="309" r:id="rId40"/>
     <p:sldId id="286" r:id="rId41"/>
     <p:sldId id="325" r:id="rId42"/>
     <p:sldId id="316" r:id="rId43"/>
@@ -197,6 +197,7 @@
             <p14:sldId id="282"/>
             <p14:sldId id="283"/>
             <p14:sldId id="284"/>
+            <p14:sldId id="328"/>
             <p14:sldId id="312"/>
             <p14:sldId id="313"/>
             <p14:sldId id="305"/>
@@ -204,7 +205,6 @@
             <p14:sldId id="307"/>
             <p14:sldId id="308"/>
             <p14:sldId id="309"/>
-            <p14:sldId id="285"/>
             <p14:sldId id="286"/>
             <p14:sldId id="325"/>
             <p14:sldId id="316"/>
@@ -307,7 +307,7 @@
           <a:p>
             <a:fld id="{9DED5714-D740-4F89-AAD5-E3BC8B06EDCA}" type="datetimeFigureOut">
               <a:rPr lang="en-US" smtClean="0"/>
-              <a:t>4/24/2012</a:t>
+              <a:t>4/25/2012</a:t>
             </a:fld>
             <a:endParaRPr lang="en-US"/>
           </a:p>
@@ -706,6 +706,684 @@
       </p:grpSpPr>
       <p:sp>
         <p:nvSpPr>
+          <p:cNvPr id="226306" name="Rectangle 2"/>
+          <p:cNvSpPr>
+            <a:spLocks noGrp="1" noChangeArrowheads="1"/>
+          </p:cNvSpPr>
+          <p:nvPr>
+            <p:ph type="hdr" sz="quarter"/>
+          </p:nvPr>
+        </p:nvSpPr>
+        <p:spPr>
+          <a:noFill/>
+          <a:ln/>
+          <a:extLst>
+            <a:ext uri="{909E8E84-426E-40DD-AFC4-6F175D3DCCD1}">
+              <a14:hiddenFill xmlns:a14="http://schemas.microsoft.com/office/drawing/2010/main">
+                <a:solidFill>
+                  <a:srgbClr val="FFFFFF"/>
+                </a:solidFill>
+              </a14:hiddenFill>
+            </a:ext>
+            <a:ext uri="{91240B29-F687-4F45-9708-019B960494DF}">
+              <a14:hiddenLine xmlns:a14="http://schemas.microsoft.com/office/drawing/2010/main" w="9525">
+                <a:solidFill>
+                  <a:srgbClr val="000000"/>
+                </a:solidFill>
+                <a:miter lim="800000"/>
+                <a:headEnd/>
+                <a:tailEnd/>
+              </a14:hiddenLine>
+            </a:ext>
+          </a:extLst>
+        </p:spPr>
+        <p:txBody>
+          <a:bodyPr/>
+          <a:lstStyle>
+            <a:lvl1pPr defTabSz="912933" eaLnBrk="0" hangingPunct="0">
+              <a:defRPr sz="1500">
+                <a:solidFill>
+                  <a:schemeClr val="tx1"/>
+                </a:solidFill>
+                <a:latin typeface="Arial" charset="0"/>
+              </a:defRPr>
+            </a:lvl1pPr>
+            <a:lvl2pPr marL="702717" indent="-270277" defTabSz="912933" eaLnBrk="0" hangingPunct="0">
+              <a:defRPr sz="1500">
+                <a:solidFill>
+                  <a:schemeClr val="tx1"/>
+                </a:solidFill>
+                <a:latin typeface="Arial" charset="0"/>
+              </a:defRPr>
+            </a:lvl2pPr>
+            <a:lvl3pPr marL="1081104" indent="-216221" defTabSz="912933" eaLnBrk="0" hangingPunct="0">
+              <a:defRPr sz="1500">
+                <a:solidFill>
+                  <a:schemeClr val="tx1"/>
+                </a:solidFill>
+                <a:latin typeface="Arial" charset="0"/>
+              </a:defRPr>
+            </a:lvl3pPr>
+            <a:lvl4pPr marL="1513545" indent="-216221" defTabSz="912933" eaLnBrk="0" hangingPunct="0">
+              <a:defRPr sz="1500">
+                <a:solidFill>
+                  <a:schemeClr val="tx1"/>
+                </a:solidFill>
+                <a:latin typeface="Arial" charset="0"/>
+              </a:defRPr>
+            </a:lvl4pPr>
+            <a:lvl5pPr marL="1945988" indent="-216221" defTabSz="912933" eaLnBrk="0" hangingPunct="0">
+              <a:defRPr sz="1500">
+                <a:solidFill>
+                  <a:schemeClr val="tx1"/>
+                </a:solidFill>
+                <a:latin typeface="Arial" charset="0"/>
+              </a:defRPr>
+            </a:lvl5pPr>
+            <a:lvl6pPr marL="2378429" indent="-216221" algn="ctr" defTabSz="912933" eaLnBrk="0" fontAlgn="base" hangingPunct="0">
+              <a:spcBef>
+                <a:spcPct val="0"/>
+              </a:spcBef>
+              <a:spcAft>
+                <a:spcPct val="0"/>
+              </a:spcAft>
+              <a:defRPr sz="1500">
+                <a:solidFill>
+                  <a:schemeClr val="tx1"/>
+                </a:solidFill>
+                <a:latin typeface="Arial" charset="0"/>
+              </a:defRPr>
+            </a:lvl6pPr>
+            <a:lvl7pPr marL="2810870" indent="-216221" algn="ctr" defTabSz="912933" eaLnBrk="0" fontAlgn="base" hangingPunct="0">
+              <a:spcBef>
+                <a:spcPct val="0"/>
+              </a:spcBef>
+              <a:spcAft>
+                <a:spcPct val="0"/>
+              </a:spcAft>
+              <a:defRPr sz="1500">
+                <a:solidFill>
+                  <a:schemeClr val="tx1"/>
+                </a:solidFill>
+                <a:latin typeface="Arial" charset="0"/>
+              </a:defRPr>
+            </a:lvl7pPr>
+            <a:lvl8pPr marL="3243311" indent="-216221" algn="ctr" defTabSz="912933" eaLnBrk="0" fontAlgn="base" hangingPunct="0">
+              <a:spcBef>
+                <a:spcPct val="0"/>
+              </a:spcBef>
+              <a:spcAft>
+                <a:spcPct val="0"/>
+              </a:spcAft>
+              <a:defRPr sz="1500">
+                <a:solidFill>
+                  <a:schemeClr val="tx1"/>
+                </a:solidFill>
+                <a:latin typeface="Arial" charset="0"/>
+              </a:defRPr>
+            </a:lvl8pPr>
+            <a:lvl9pPr marL="3675754" indent="-216221" algn="ctr" defTabSz="912933" eaLnBrk="0" fontAlgn="base" hangingPunct="0">
+              <a:spcBef>
+                <a:spcPct val="0"/>
+              </a:spcBef>
+              <a:spcAft>
+                <a:spcPct val="0"/>
+              </a:spcAft>
+              <a:defRPr sz="1500">
+                <a:solidFill>
+                  <a:schemeClr val="tx1"/>
+                </a:solidFill>
+                <a:latin typeface="Arial" charset="0"/>
+              </a:defRPr>
+            </a:lvl9pPr>
+          </a:lstStyle>
+          <a:p>
+            <a:pPr eaLnBrk="1" hangingPunct="1"/>
+            <a:r>
+              <a:rPr lang="en-US" sz="1200">
+                <a:solidFill>
+                  <a:prstClr val="black"/>
+                </a:solidFill>
+              </a:rPr>
+              <a:t>CSE 425, Introduction to Computer Security</a:t>
+            </a:r>
+          </a:p>
+        </p:txBody>
+      </p:sp>
+      <p:sp>
+        <p:nvSpPr>
+          <p:cNvPr id="226307" name="Rectangle 3"/>
+          <p:cNvSpPr>
+            <a:spLocks noGrp="1" noChangeArrowheads="1"/>
+          </p:cNvSpPr>
+          <p:nvPr>
+            <p:ph type="dt" sz="quarter" idx="1"/>
+          </p:nvPr>
+        </p:nvSpPr>
+        <p:spPr>
+          <a:noFill/>
+          <a:ln/>
+          <a:extLst>
+            <a:ext uri="{909E8E84-426E-40DD-AFC4-6F175D3DCCD1}">
+              <a14:hiddenFill xmlns:a14="http://schemas.microsoft.com/office/drawing/2010/main">
+                <a:solidFill>
+                  <a:srgbClr val="FFFFFF"/>
+                </a:solidFill>
+              </a14:hiddenFill>
+            </a:ext>
+            <a:ext uri="{91240B29-F687-4F45-9708-019B960494DF}">
+              <a14:hiddenLine xmlns:a14="http://schemas.microsoft.com/office/drawing/2010/main" w="9525">
+                <a:solidFill>
+                  <a:srgbClr val="000000"/>
+                </a:solidFill>
+                <a:miter lim="800000"/>
+                <a:headEnd/>
+                <a:tailEnd/>
+              </a14:hiddenLine>
+            </a:ext>
+          </a:extLst>
+        </p:spPr>
+        <p:txBody>
+          <a:bodyPr/>
+          <a:lstStyle>
+            <a:lvl1pPr defTabSz="912933" eaLnBrk="0" hangingPunct="0">
+              <a:defRPr sz="1500">
+                <a:solidFill>
+                  <a:schemeClr val="tx1"/>
+                </a:solidFill>
+                <a:latin typeface="Arial" charset="0"/>
+              </a:defRPr>
+            </a:lvl1pPr>
+            <a:lvl2pPr marL="702717" indent="-270277" defTabSz="912933" eaLnBrk="0" hangingPunct="0">
+              <a:defRPr sz="1500">
+                <a:solidFill>
+                  <a:schemeClr val="tx1"/>
+                </a:solidFill>
+                <a:latin typeface="Arial" charset="0"/>
+              </a:defRPr>
+            </a:lvl2pPr>
+            <a:lvl3pPr marL="1081104" indent="-216221" defTabSz="912933" eaLnBrk="0" hangingPunct="0">
+              <a:defRPr sz="1500">
+                <a:solidFill>
+                  <a:schemeClr val="tx1"/>
+                </a:solidFill>
+                <a:latin typeface="Arial" charset="0"/>
+              </a:defRPr>
+            </a:lvl3pPr>
+            <a:lvl4pPr marL="1513545" indent="-216221" defTabSz="912933" eaLnBrk="0" hangingPunct="0">
+              <a:defRPr sz="1500">
+                <a:solidFill>
+                  <a:schemeClr val="tx1"/>
+                </a:solidFill>
+                <a:latin typeface="Arial" charset="0"/>
+              </a:defRPr>
+            </a:lvl4pPr>
+            <a:lvl5pPr marL="1945988" indent="-216221" defTabSz="912933" eaLnBrk="0" hangingPunct="0">
+              <a:defRPr sz="1500">
+                <a:solidFill>
+                  <a:schemeClr val="tx1"/>
+                </a:solidFill>
+                <a:latin typeface="Arial" charset="0"/>
+              </a:defRPr>
+            </a:lvl5pPr>
+            <a:lvl6pPr marL="2378429" indent="-216221" algn="ctr" defTabSz="912933" eaLnBrk="0" fontAlgn="base" hangingPunct="0">
+              <a:spcBef>
+                <a:spcPct val="0"/>
+              </a:spcBef>
+              <a:spcAft>
+                <a:spcPct val="0"/>
+              </a:spcAft>
+              <a:defRPr sz="1500">
+                <a:solidFill>
+                  <a:schemeClr val="tx1"/>
+                </a:solidFill>
+                <a:latin typeface="Arial" charset="0"/>
+              </a:defRPr>
+            </a:lvl6pPr>
+            <a:lvl7pPr marL="2810870" indent="-216221" algn="ctr" defTabSz="912933" eaLnBrk="0" fontAlgn="base" hangingPunct="0">
+              <a:spcBef>
+                <a:spcPct val="0"/>
+              </a:spcBef>
+              <a:spcAft>
+                <a:spcPct val="0"/>
+              </a:spcAft>
+              <a:defRPr sz="1500">
+                <a:solidFill>
+                  <a:schemeClr val="tx1"/>
+                </a:solidFill>
+                <a:latin typeface="Arial" charset="0"/>
+              </a:defRPr>
+            </a:lvl7pPr>
+            <a:lvl8pPr marL="3243311" indent="-216221" algn="ctr" defTabSz="912933" eaLnBrk="0" fontAlgn="base" hangingPunct="0">
+              <a:spcBef>
+                <a:spcPct val="0"/>
+              </a:spcBef>
+              <a:spcAft>
+                <a:spcPct val="0"/>
+              </a:spcAft>
+              <a:defRPr sz="1500">
+                <a:solidFill>
+                  <a:schemeClr val="tx1"/>
+                </a:solidFill>
+                <a:latin typeface="Arial" charset="0"/>
+              </a:defRPr>
+            </a:lvl8pPr>
+            <a:lvl9pPr marL="3675754" indent="-216221" algn="ctr" defTabSz="912933" eaLnBrk="0" fontAlgn="base" hangingPunct="0">
+              <a:spcBef>
+                <a:spcPct val="0"/>
+              </a:spcBef>
+              <a:spcAft>
+                <a:spcPct val="0"/>
+              </a:spcAft>
+              <a:defRPr sz="1500">
+                <a:solidFill>
+                  <a:schemeClr val="tx1"/>
+                </a:solidFill>
+                <a:latin typeface="Arial" charset="0"/>
+              </a:defRPr>
+            </a:lvl9pPr>
+          </a:lstStyle>
+          <a:p>
+            <a:pPr eaLnBrk="1" hangingPunct="1"/>
+            <a:r>
+              <a:rPr lang="en-US" sz="1200">
+                <a:solidFill>
+                  <a:prstClr val="black"/>
+                </a:solidFill>
+              </a:rPr>
+              <a:t>Chapter 4. Access Control, Smashing the Stack</a:t>
+            </a:r>
+          </a:p>
+        </p:txBody>
+      </p:sp>
+      <p:sp>
+        <p:nvSpPr>
+          <p:cNvPr id="226308" name="Rectangle 6"/>
+          <p:cNvSpPr>
+            <a:spLocks noGrp="1" noChangeArrowheads="1"/>
+          </p:cNvSpPr>
+          <p:nvPr>
+            <p:ph type="ftr" sz="quarter" idx="4"/>
+          </p:nvPr>
+        </p:nvSpPr>
+        <p:spPr>
+          <a:noFill/>
+          <a:ln/>
+          <a:extLst>
+            <a:ext uri="{909E8E84-426E-40DD-AFC4-6F175D3DCCD1}">
+              <a14:hiddenFill xmlns:a14="http://schemas.microsoft.com/office/drawing/2010/main">
+                <a:solidFill>
+                  <a:srgbClr val="FFFFFF"/>
+                </a:solidFill>
+              </a14:hiddenFill>
+            </a:ext>
+            <a:ext uri="{91240B29-F687-4F45-9708-019B960494DF}">
+              <a14:hiddenLine xmlns:a14="http://schemas.microsoft.com/office/drawing/2010/main" w="9525">
+                <a:solidFill>
+                  <a:srgbClr val="000000"/>
+                </a:solidFill>
+                <a:miter lim="800000"/>
+                <a:headEnd/>
+                <a:tailEnd/>
+              </a14:hiddenLine>
+            </a:ext>
+          </a:extLst>
+        </p:spPr>
+        <p:txBody>
+          <a:bodyPr/>
+          <a:lstStyle>
+            <a:lvl1pPr defTabSz="912933" eaLnBrk="0" hangingPunct="0">
+              <a:defRPr sz="1500">
+                <a:solidFill>
+                  <a:schemeClr val="tx1"/>
+                </a:solidFill>
+                <a:latin typeface="Arial" charset="0"/>
+              </a:defRPr>
+            </a:lvl1pPr>
+            <a:lvl2pPr marL="702717" indent="-270277" defTabSz="912933" eaLnBrk="0" hangingPunct="0">
+              <a:defRPr sz="1500">
+                <a:solidFill>
+                  <a:schemeClr val="tx1"/>
+                </a:solidFill>
+                <a:latin typeface="Arial" charset="0"/>
+              </a:defRPr>
+            </a:lvl2pPr>
+            <a:lvl3pPr marL="1081104" indent="-216221" defTabSz="912933" eaLnBrk="0" hangingPunct="0">
+              <a:defRPr sz="1500">
+                <a:solidFill>
+                  <a:schemeClr val="tx1"/>
+                </a:solidFill>
+                <a:latin typeface="Arial" charset="0"/>
+              </a:defRPr>
+            </a:lvl3pPr>
+            <a:lvl4pPr marL="1513545" indent="-216221" defTabSz="912933" eaLnBrk="0" hangingPunct="0">
+              <a:defRPr sz="1500">
+                <a:solidFill>
+                  <a:schemeClr val="tx1"/>
+                </a:solidFill>
+                <a:latin typeface="Arial" charset="0"/>
+              </a:defRPr>
+            </a:lvl4pPr>
+            <a:lvl5pPr marL="1945988" indent="-216221" defTabSz="912933" eaLnBrk="0" hangingPunct="0">
+              <a:defRPr sz="1500">
+                <a:solidFill>
+                  <a:schemeClr val="tx1"/>
+                </a:solidFill>
+                <a:latin typeface="Arial" charset="0"/>
+              </a:defRPr>
+            </a:lvl5pPr>
+            <a:lvl6pPr marL="2378429" indent="-216221" algn="ctr" defTabSz="912933" eaLnBrk="0" fontAlgn="base" hangingPunct="0">
+              <a:spcBef>
+                <a:spcPct val="0"/>
+              </a:spcBef>
+              <a:spcAft>
+                <a:spcPct val="0"/>
+              </a:spcAft>
+              <a:defRPr sz="1500">
+                <a:solidFill>
+                  <a:schemeClr val="tx1"/>
+                </a:solidFill>
+                <a:latin typeface="Arial" charset="0"/>
+              </a:defRPr>
+            </a:lvl6pPr>
+            <a:lvl7pPr marL="2810870" indent="-216221" algn="ctr" defTabSz="912933" eaLnBrk="0" fontAlgn="base" hangingPunct="0">
+              <a:spcBef>
+                <a:spcPct val="0"/>
+              </a:spcBef>
+              <a:spcAft>
+                <a:spcPct val="0"/>
+              </a:spcAft>
+              <a:defRPr sz="1500">
+                <a:solidFill>
+                  <a:schemeClr val="tx1"/>
+                </a:solidFill>
+                <a:latin typeface="Arial" charset="0"/>
+              </a:defRPr>
+            </a:lvl7pPr>
+            <a:lvl8pPr marL="3243311" indent="-216221" algn="ctr" defTabSz="912933" eaLnBrk="0" fontAlgn="base" hangingPunct="0">
+              <a:spcBef>
+                <a:spcPct val="0"/>
+              </a:spcBef>
+              <a:spcAft>
+                <a:spcPct val="0"/>
+              </a:spcAft>
+              <a:defRPr sz="1500">
+                <a:solidFill>
+                  <a:schemeClr val="tx1"/>
+                </a:solidFill>
+                <a:latin typeface="Arial" charset="0"/>
+              </a:defRPr>
+            </a:lvl8pPr>
+            <a:lvl9pPr marL="3675754" indent="-216221" algn="ctr" defTabSz="912933" eaLnBrk="0" fontAlgn="base" hangingPunct="0">
+              <a:spcBef>
+                <a:spcPct val="0"/>
+              </a:spcBef>
+              <a:spcAft>
+                <a:spcPct val="0"/>
+              </a:spcAft>
+              <a:defRPr sz="1500">
+                <a:solidFill>
+                  <a:schemeClr val="tx1"/>
+                </a:solidFill>
+                <a:latin typeface="Arial" charset="0"/>
+              </a:defRPr>
+            </a:lvl9pPr>
+          </a:lstStyle>
+          <a:p>
+            <a:pPr eaLnBrk="1" hangingPunct="1"/>
+            <a:r>
+              <a:rPr lang="en-US" sz="1200">
+                <a:solidFill>
+                  <a:prstClr val="black"/>
+                </a:solidFill>
+              </a:rPr>
+              <a:t>© 2006  by Wayne R. Dyksen.  All Rights Reserved.</a:t>
+            </a:r>
+          </a:p>
+        </p:txBody>
+      </p:sp>
+      <p:sp>
+        <p:nvSpPr>
+          <p:cNvPr id="226309" name="Rectangle 7"/>
+          <p:cNvSpPr>
+            <a:spLocks noGrp="1" noChangeArrowheads="1"/>
+          </p:cNvSpPr>
+          <p:nvPr>
+            <p:ph type="sldNum" sz="quarter" idx="5"/>
+          </p:nvPr>
+        </p:nvSpPr>
+        <p:spPr>
+          <a:noFill/>
+          <a:ln/>
+          <a:extLst>
+            <a:ext uri="{909E8E84-426E-40DD-AFC4-6F175D3DCCD1}">
+              <a14:hiddenFill xmlns:a14="http://schemas.microsoft.com/office/drawing/2010/main">
+                <a:solidFill>
+                  <a:srgbClr val="FFFFFF"/>
+                </a:solidFill>
+              </a14:hiddenFill>
+            </a:ext>
+            <a:ext uri="{91240B29-F687-4F45-9708-019B960494DF}">
+              <a14:hiddenLine xmlns:a14="http://schemas.microsoft.com/office/drawing/2010/main" w="9525">
+                <a:solidFill>
+                  <a:srgbClr val="000000"/>
+                </a:solidFill>
+                <a:miter lim="800000"/>
+                <a:headEnd/>
+                <a:tailEnd/>
+              </a14:hiddenLine>
+            </a:ext>
+          </a:extLst>
+        </p:spPr>
+        <p:txBody>
+          <a:bodyPr/>
+          <a:lstStyle>
+            <a:lvl1pPr defTabSz="912933" eaLnBrk="0" hangingPunct="0">
+              <a:defRPr sz="1500">
+                <a:solidFill>
+                  <a:schemeClr val="tx1"/>
+                </a:solidFill>
+                <a:latin typeface="Arial" charset="0"/>
+              </a:defRPr>
+            </a:lvl1pPr>
+            <a:lvl2pPr marL="702717" indent="-270277" defTabSz="912933" eaLnBrk="0" hangingPunct="0">
+              <a:defRPr sz="1500">
+                <a:solidFill>
+                  <a:schemeClr val="tx1"/>
+                </a:solidFill>
+                <a:latin typeface="Arial" charset="0"/>
+              </a:defRPr>
+            </a:lvl2pPr>
+            <a:lvl3pPr marL="1081104" indent="-216221" defTabSz="912933" eaLnBrk="0" hangingPunct="0">
+              <a:defRPr sz="1500">
+                <a:solidFill>
+                  <a:schemeClr val="tx1"/>
+                </a:solidFill>
+                <a:latin typeface="Arial" charset="0"/>
+              </a:defRPr>
+            </a:lvl3pPr>
+            <a:lvl4pPr marL="1513545" indent="-216221" defTabSz="912933" eaLnBrk="0" hangingPunct="0">
+              <a:defRPr sz="1500">
+                <a:solidFill>
+                  <a:schemeClr val="tx1"/>
+                </a:solidFill>
+                <a:latin typeface="Arial" charset="0"/>
+              </a:defRPr>
+            </a:lvl4pPr>
+            <a:lvl5pPr marL="1945988" indent="-216221" defTabSz="912933" eaLnBrk="0" hangingPunct="0">
+              <a:defRPr sz="1500">
+                <a:solidFill>
+                  <a:schemeClr val="tx1"/>
+                </a:solidFill>
+                <a:latin typeface="Arial" charset="0"/>
+              </a:defRPr>
+            </a:lvl5pPr>
+            <a:lvl6pPr marL="2378429" indent="-216221" algn="ctr" defTabSz="912933" eaLnBrk="0" fontAlgn="base" hangingPunct="0">
+              <a:spcBef>
+                <a:spcPct val="0"/>
+              </a:spcBef>
+              <a:spcAft>
+                <a:spcPct val="0"/>
+              </a:spcAft>
+              <a:defRPr sz="1500">
+                <a:solidFill>
+                  <a:schemeClr val="tx1"/>
+                </a:solidFill>
+                <a:latin typeface="Arial" charset="0"/>
+              </a:defRPr>
+            </a:lvl6pPr>
+            <a:lvl7pPr marL="2810870" indent="-216221" algn="ctr" defTabSz="912933" eaLnBrk="0" fontAlgn="base" hangingPunct="0">
+              <a:spcBef>
+                <a:spcPct val="0"/>
+              </a:spcBef>
+              <a:spcAft>
+                <a:spcPct val="0"/>
+              </a:spcAft>
+              <a:defRPr sz="1500">
+                <a:solidFill>
+                  <a:schemeClr val="tx1"/>
+                </a:solidFill>
+                <a:latin typeface="Arial" charset="0"/>
+              </a:defRPr>
+            </a:lvl7pPr>
+            <a:lvl8pPr marL="3243311" indent="-216221" algn="ctr" defTabSz="912933" eaLnBrk="0" fontAlgn="base" hangingPunct="0">
+              <a:spcBef>
+                <a:spcPct val="0"/>
+              </a:spcBef>
+              <a:spcAft>
+                <a:spcPct val="0"/>
+              </a:spcAft>
+              <a:defRPr sz="1500">
+                <a:solidFill>
+                  <a:schemeClr val="tx1"/>
+                </a:solidFill>
+                <a:latin typeface="Arial" charset="0"/>
+              </a:defRPr>
+            </a:lvl8pPr>
+            <a:lvl9pPr marL="3675754" indent="-216221" algn="ctr" defTabSz="912933" eaLnBrk="0" fontAlgn="base" hangingPunct="0">
+              <a:spcBef>
+                <a:spcPct val="0"/>
+              </a:spcBef>
+              <a:spcAft>
+                <a:spcPct val="0"/>
+              </a:spcAft>
+              <a:defRPr sz="1500">
+                <a:solidFill>
+                  <a:schemeClr val="tx1"/>
+                </a:solidFill>
+                <a:latin typeface="Arial" charset="0"/>
+              </a:defRPr>
+            </a:lvl9pPr>
+          </a:lstStyle>
+          <a:p>
+            <a:pPr eaLnBrk="1" hangingPunct="1"/>
+            <a:fld id="{48564DCC-794F-43F8-A5EC-CFD5C5642118}" type="slidenum">
+              <a:rPr lang="en-US" sz="1200">
+                <a:solidFill>
+                  <a:prstClr val="black"/>
+                </a:solidFill>
+              </a:rPr>
+              <a:pPr eaLnBrk="1" hangingPunct="1"/>
+              <a:t>23</a:t>
+            </a:fld>
+            <a:endParaRPr lang="en-US" sz="1200">
+              <a:solidFill>
+                <a:prstClr val="black"/>
+              </a:solidFill>
+            </a:endParaRPr>
+          </a:p>
+        </p:txBody>
+      </p:sp>
+      <p:sp>
+        <p:nvSpPr>
+          <p:cNvPr id="226310" name="Rectangle 2"/>
+          <p:cNvSpPr>
+            <a:spLocks noGrp="1" noRot="1" noChangeAspect="1" noChangeArrowheads="1" noTextEdit="1"/>
+          </p:cNvSpPr>
+          <p:nvPr>
+            <p:ph type="sldImg"/>
+          </p:nvPr>
+        </p:nvSpPr>
+        <p:spPr>
+          <a:ln/>
+        </p:spPr>
+      </p:sp>
+      <p:sp>
+        <p:nvSpPr>
+          <p:cNvPr id="226311" name="Rectangle 3"/>
+          <p:cNvSpPr>
+            <a:spLocks noGrp="1" noChangeArrowheads="1"/>
+          </p:cNvSpPr>
+          <p:nvPr>
+            <p:ph type="body" idx="1"/>
+          </p:nvPr>
+        </p:nvSpPr>
+        <p:spPr>
+          <a:noFill/>
+          <a:ln/>
+          <a:extLst>
+            <a:ext uri="{909E8E84-426E-40DD-AFC4-6F175D3DCCD1}">
+              <a14:hiddenFill xmlns:a14="http://schemas.microsoft.com/office/drawing/2010/main">
+                <a:solidFill>
+                  <a:srgbClr val="FFFFFF"/>
+                </a:solidFill>
+              </a14:hiddenFill>
+            </a:ext>
+            <a:ext uri="{91240B29-F687-4F45-9708-019B960494DF}">
+              <a14:hiddenLine xmlns:a14="http://schemas.microsoft.com/office/drawing/2010/main" w="9525">
+                <a:solidFill>
+                  <a:srgbClr val="000000"/>
+                </a:solidFill>
+                <a:miter lim="800000"/>
+                <a:headEnd/>
+                <a:tailEnd/>
+              </a14:hiddenLine>
+            </a:ext>
+          </a:extLst>
+        </p:spPr>
+        <p:txBody>
+          <a:bodyPr/>
+          <a:lstStyle/>
+          <a:p>
+            <a:pPr eaLnBrk="1" hangingPunct="1"/>
+            <a:r>
+              <a:rPr lang="en-US" smtClean="0"/>
+              <a:t>pop %eip pops the value of the Return Address off of the stack and load is into %eip, thereby causing the program execution to jump to the Return Address.</a:t>
+            </a:r>
+          </a:p>
+          <a:p>
+            <a:pPr eaLnBrk="1" hangingPunct="1"/>
+            <a:endParaRPr lang="en-US" smtClean="0"/>
+          </a:p>
+        </p:txBody>
+      </p:sp>
+    </p:spTree>
+  </p:cSld>
+  <p:clrMapOvr>
+    <a:masterClrMapping/>
+  </p:clrMapOvr>
+</p:notes>
+</file>
+
+<file path=ppt/notesSlides/notesSlide11.xml><?xml version="1.0" encoding="utf-8"?>
+<p:notes xmlns:a="http://schemas.openxmlformats.org/drawingml/2006/main" xmlns:r="http://schemas.openxmlformats.org/officeDocument/2006/relationships" xmlns:p="http://schemas.openxmlformats.org/presentationml/2006/main">
+  <p:cSld>
+    <p:spTree>
+      <p:nvGrpSpPr>
+        <p:cNvPr id="1" name=""/>
+        <p:cNvGrpSpPr/>
+        <p:nvPr/>
+      </p:nvGrpSpPr>
+      <p:grpSpPr>
+        <a:xfrm>
+          <a:off x="0" y="0"/>
+          <a:ext cx="0" cy="0"/>
+          <a:chOff x="0" y="0"/>
+          <a:chExt cx="0" cy="0"/>
+        </a:xfrm>
+      </p:grpSpPr>
+      <p:sp>
+        <p:nvSpPr>
           <p:cNvPr id="227330" name="Rectangle 2"/>
           <p:cNvSpPr>
             <a:spLocks noGrp="1" noChangeArrowheads="1"/>
@@ -1369,7 +2047,7 @@
 </p:notes>
 </file>
 
-<file path=ppt/notesSlides/notesSlide11.xml><?xml version="1.0" encoding="utf-8"?>
+<file path=ppt/notesSlides/notesSlide12.xml><?xml version="1.0" encoding="utf-8"?>
 <p:notes xmlns:a="http://schemas.openxmlformats.org/drawingml/2006/main" xmlns:r="http://schemas.openxmlformats.org/officeDocument/2006/relationships" xmlns:p="http://schemas.openxmlformats.org/presentationml/2006/main">
   <p:cSld>
     <p:spTree>
@@ -2048,206 +2726,6 @@
         </p:txBody>
       </p:sp>
     </p:spTree>
-  </p:cSld>
-  <p:clrMapOvr>
-    <a:masterClrMapping/>
-  </p:clrMapOvr>
-</p:notes>
-</file>
-
-<file path=ppt/notesSlides/notesSlide12.xml><?xml version="1.0" encoding="utf-8"?>
-<p:notes xmlns:a="http://schemas.openxmlformats.org/drawingml/2006/main" xmlns:r="http://schemas.openxmlformats.org/officeDocument/2006/relationships" xmlns:p="http://schemas.openxmlformats.org/presentationml/2006/main">
-  <p:cSld>
-    <p:spTree>
-      <p:nvGrpSpPr>
-        <p:cNvPr id="1" name=""/>
-        <p:cNvGrpSpPr/>
-        <p:nvPr/>
-      </p:nvGrpSpPr>
-      <p:grpSpPr>
-        <a:xfrm>
-          <a:off x="0" y="0"/>
-          <a:ext cx="0" cy="0"/>
-          <a:chOff x="0" y="0"/>
-          <a:chExt cx="0" cy="0"/>
-        </a:xfrm>
-      </p:grpSpPr>
-      <p:sp>
-        <p:nvSpPr>
-          <p:cNvPr id="2" name="Slide Image Placeholder 1"/>
-          <p:cNvSpPr>
-            <a:spLocks noGrp="1" noRot="1" noChangeAspect="1"/>
-          </p:cNvSpPr>
-          <p:nvPr>
-            <p:ph type="sldImg"/>
-          </p:nvPr>
-        </p:nvSpPr>
-        <p:spPr/>
-      </p:sp>
-      <p:sp>
-        <p:nvSpPr>
-          <p:cNvPr id="3" name="Notes Placeholder 2"/>
-          <p:cNvSpPr>
-            <a:spLocks noGrp="1"/>
-          </p:cNvSpPr>
-          <p:nvPr>
-            <p:ph type="body" idx="1"/>
-          </p:nvPr>
-        </p:nvSpPr>
-        <p:spPr/>
-        <p:txBody>
-          <a:bodyPr/>
-          <a:lstStyle/>
-          <a:p>
-            <a:r>
-              <a:rPr lang="en-US" dirty="0" smtClean="0"/>
-              <a:t>Why crappy old Fedora Core 4? Cause what I’ll show you won’t work</a:t>
-            </a:r>
-            <a:r>
-              <a:rPr lang="en-US" baseline="0" dirty="0" smtClean="0"/>
-              <a:t> directly on newer versions.  </a:t>
-            </a:r>
-            <a:r>
-              <a:rPr lang="en-US" baseline="0" dirty="0" smtClean="0">
-                <a:sym typeface="Wingdings" pitchFamily="2" charset="2"/>
-              </a:rPr>
-              <a:t></a:t>
-            </a:r>
-            <a:endParaRPr lang="en-US" dirty="0"/>
-          </a:p>
-        </p:txBody>
-      </p:sp>
-      <p:sp>
-        <p:nvSpPr>
-          <p:cNvPr id="4" name="Header Placeholder 3"/>
-          <p:cNvSpPr>
-            <a:spLocks noGrp="1"/>
-          </p:cNvSpPr>
-          <p:nvPr>
-            <p:ph type="hdr" sz="quarter" idx="10"/>
-          </p:nvPr>
-        </p:nvSpPr>
-        <p:spPr/>
-        <p:txBody>
-          <a:bodyPr/>
-          <a:lstStyle/>
-          <a:p>
-            <a:r>
-              <a:rPr lang="en-US" smtClean="0">
-                <a:solidFill>
-                  <a:prstClr val="black"/>
-                </a:solidFill>
-              </a:rPr>
-              <a:t>Introduction to Computer Security</a:t>
-            </a:r>
-            <a:endParaRPr lang="en-US">
-              <a:solidFill>
-                <a:prstClr val="black"/>
-              </a:solidFill>
-            </a:endParaRPr>
-          </a:p>
-        </p:txBody>
-      </p:sp>
-      <p:sp>
-        <p:nvSpPr>
-          <p:cNvPr id="5" name="Date Placeholder 4"/>
-          <p:cNvSpPr>
-            <a:spLocks noGrp="1"/>
-          </p:cNvSpPr>
-          <p:nvPr>
-            <p:ph type="dt" idx="11"/>
-          </p:nvPr>
-        </p:nvSpPr>
-        <p:spPr/>
-        <p:txBody>
-          <a:bodyPr/>
-          <a:lstStyle/>
-          <a:p>
-            <a:r>
-              <a:rPr lang="en-US" smtClean="0">
-                <a:solidFill>
-                  <a:prstClr val="black"/>
-                </a:solidFill>
-              </a:rPr>
-              <a:t>Buffer Overflow</a:t>
-            </a:r>
-            <a:endParaRPr lang="en-US">
-              <a:solidFill>
-                <a:prstClr val="black"/>
-              </a:solidFill>
-            </a:endParaRPr>
-          </a:p>
-        </p:txBody>
-      </p:sp>
-      <p:sp>
-        <p:nvSpPr>
-          <p:cNvPr id="6" name="Footer Placeholder 5"/>
-          <p:cNvSpPr>
-            <a:spLocks noGrp="1"/>
-          </p:cNvSpPr>
-          <p:nvPr>
-            <p:ph type="ftr" sz="quarter" idx="12"/>
-          </p:nvPr>
-        </p:nvSpPr>
-        <p:spPr/>
-        <p:txBody>
-          <a:bodyPr/>
-          <a:lstStyle/>
-          <a:p>
-            <a:r>
-              <a:rPr lang="en-US" smtClean="0">
-                <a:solidFill>
-                  <a:prstClr val="black"/>
-                </a:solidFill>
-              </a:rPr>
-              <a:t>Dr. Wayne Dyksen Professor of Computer Science and Engineering</a:t>
-            </a:r>
-            <a:endParaRPr lang="en-US">
-              <a:solidFill>
-                <a:prstClr val="black"/>
-              </a:solidFill>
-            </a:endParaRPr>
-          </a:p>
-        </p:txBody>
-      </p:sp>
-      <p:sp>
-        <p:nvSpPr>
-          <p:cNvPr id="7" name="Slide Number Placeholder 6"/>
-          <p:cNvSpPr>
-            <a:spLocks noGrp="1"/>
-          </p:cNvSpPr>
-          <p:nvPr>
-            <p:ph type="sldNum" sz="quarter" idx="13"/>
-          </p:nvPr>
-        </p:nvSpPr>
-        <p:spPr/>
-        <p:txBody>
-          <a:bodyPr/>
-          <a:lstStyle/>
-          <a:p>
-            <a:fld id="{5FE53F06-FDAB-4A00-BB98-A74B7A151629}" type="slidenum">
-              <a:rPr lang="en-US" smtClean="0">
-                <a:solidFill>
-                  <a:prstClr val="black"/>
-                </a:solidFill>
-              </a:rPr>
-              <a:pPr/>
-              <a:t>26</a:t>
-            </a:fld>
-            <a:endParaRPr lang="en-US">
-              <a:solidFill>
-                <a:prstClr val="black"/>
-              </a:solidFill>
-            </a:endParaRPr>
-          </a:p>
-        </p:txBody>
-      </p:sp>
-    </p:spTree>
-    <p:extLst>
-      <p:ext uri="{BB962C8B-B14F-4D97-AF65-F5344CB8AC3E}">
-        <p14:creationId xmlns:p14="http://schemas.microsoft.com/office/powerpoint/2010/main" val="1191956702"/>
-      </p:ext>
-    </p:extLst>
   </p:cSld>
   <p:clrMapOvr>
     <a:masterClrMapping/>
@@ -2301,41 +2779,30 @@
           <a:p>
             <a:r>
               <a:rPr lang="en-US" dirty="0" smtClean="0"/>
-              <a:t>Here are the different ways that systems protect</a:t>
+              <a:t>Why crappy old Fedora Core 4? Cause what I’ll show you won’t work</a:t>
             </a:r>
             <a:r>
               <a:rPr lang="en-US" baseline="0" dirty="0" smtClean="0"/>
-              <a:t> against buffer overflows: </a:t>
-            </a:r>
-          </a:p>
-          <a:p>
-            <a:r>
-              <a:rPr lang="en-US" baseline="0" dirty="0" smtClean="0"/>
-              <a:t>1- Data execution prevention (been around in Linux, Mac and windows since about 2004). </a:t>
-            </a:r>
-          </a:p>
-          <a:p>
-            <a:r>
-              <a:rPr lang="en-US" baseline="0" dirty="0" smtClean="0"/>
-              <a:t>    This prevents an application from executing code in a non-executable memory region. </a:t>
-            </a:r>
-          </a:p>
-          <a:p>
-            <a:endParaRPr lang="en-US" baseline="0" dirty="0" smtClean="0"/>
-          </a:p>
-          <a:p>
-            <a:endParaRPr lang="en-US" baseline="0" dirty="0" smtClean="0"/>
+              <a:t> directly on newer versions.  </a:t>
+            </a:r>
+            <a:r>
+              <a:rPr lang="en-US" baseline="0" dirty="0" smtClean="0">
+                <a:sym typeface="Wingdings" pitchFamily="2" charset="2"/>
+              </a:rPr>
+              <a:t></a:t>
+            </a:r>
+            <a:endParaRPr lang="en-US" dirty="0"/>
           </a:p>
         </p:txBody>
       </p:sp>
       <p:sp>
         <p:nvSpPr>
-          <p:cNvPr id="4" name="Slide Number Placeholder 3"/>
+          <p:cNvPr id="4" name="Header Placeholder 3"/>
           <p:cNvSpPr>
             <a:spLocks noGrp="1"/>
           </p:cNvSpPr>
           <p:nvPr>
-            <p:ph type="sldNum" sz="quarter" idx="10"/>
+            <p:ph type="hdr" sz="quarter" idx="10"/>
           </p:nvPr>
         </p:nvSpPr>
         <p:spPr/>
@@ -2343,18 +2810,120 @@
           <a:bodyPr/>
           <a:lstStyle/>
           <a:p>
-            <a:fld id="{9D0B4A42-F062-4908-9C81-A569921BC8B1}" type="slidenum">
-              <a:rPr lang="en-US" smtClean="0"/>
-              <a:t>46</a:t>
+            <a:r>
+              <a:rPr lang="en-US" smtClean="0">
+                <a:solidFill>
+                  <a:prstClr val="black"/>
+                </a:solidFill>
+              </a:rPr>
+              <a:t>Introduction to Computer Security</a:t>
+            </a:r>
+            <a:endParaRPr lang="en-US">
+              <a:solidFill>
+                <a:prstClr val="black"/>
+              </a:solidFill>
+            </a:endParaRPr>
+          </a:p>
+        </p:txBody>
+      </p:sp>
+      <p:sp>
+        <p:nvSpPr>
+          <p:cNvPr id="5" name="Date Placeholder 4"/>
+          <p:cNvSpPr>
+            <a:spLocks noGrp="1"/>
+          </p:cNvSpPr>
+          <p:nvPr>
+            <p:ph type="dt" idx="11"/>
+          </p:nvPr>
+        </p:nvSpPr>
+        <p:spPr/>
+        <p:txBody>
+          <a:bodyPr/>
+          <a:lstStyle/>
+          <a:p>
+            <a:r>
+              <a:rPr lang="en-US" smtClean="0">
+                <a:solidFill>
+                  <a:prstClr val="black"/>
+                </a:solidFill>
+              </a:rPr>
+              <a:t>Buffer Overflow</a:t>
+            </a:r>
+            <a:endParaRPr lang="en-US">
+              <a:solidFill>
+                <a:prstClr val="black"/>
+              </a:solidFill>
+            </a:endParaRPr>
+          </a:p>
+        </p:txBody>
+      </p:sp>
+      <p:sp>
+        <p:nvSpPr>
+          <p:cNvPr id="6" name="Footer Placeholder 5"/>
+          <p:cNvSpPr>
+            <a:spLocks noGrp="1"/>
+          </p:cNvSpPr>
+          <p:nvPr>
+            <p:ph type="ftr" sz="quarter" idx="12"/>
+          </p:nvPr>
+        </p:nvSpPr>
+        <p:spPr/>
+        <p:txBody>
+          <a:bodyPr/>
+          <a:lstStyle/>
+          <a:p>
+            <a:r>
+              <a:rPr lang="en-US" smtClean="0">
+                <a:solidFill>
+                  <a:prstClr val="black"/>
+                </a:solidFill>
+              </a:rPr>
+              <a:t>Dr. Wayne Dyksen Professor of Computer Science and Engineering</a:t>
+            </a:r>
+            <a:endParaRPr lang="en-US">
+              <a:solidFill>
+                <a:prstClr val="black"/>
+              </a:solidFill>
+            </a:endParaRPr>
+          </a:p>
+        </p:txBody>
+      </p:sp>
+      <p:sp>
+        <p:nvSpPr>
+          <p:cNvPr id="7" name="Slide Number Placeholder 6"/>
+          <p:cNvSpPr>
+            <a:spLocks noGrp="1"/>
+          </p:cNvSpPr>
+          <p:nvPr>
+            <p:ph type="sldNum" sz="quarter" idx="13"/>
+          </p:nvPr>
+        </p:nvSpPr>
+        <p:spPr/>
+        <p:txBody>
+          <a:bodyPr/>
+          <a:lstStyle/>
+          <a:p>
+            <a:fld id="{5FE53F06-FDAB-4A00-BB98-A74B7A151629}" type="slidenum">
+              <a:rPr lang="en-US" smtClean="0">
+                <a:solidFill>
+                  <a:prstClr val="black"/>
+                </a:solidFill>
+              </a:rPr>
+              <a:pPr/>
+              <a:t>26</a:t>
             </a:fld>
-            <a:endParaRPr lang="en-US"/>
+            <a:endParaRPr lang="en-US">
+              <a:solidFill>
+                <a:prstClr val="black"/>
+              </a:solidFill>
+            </a:endParaRPr>
           </a:p>
         </p:txBody>
       </p:sp>
     </p:spTree>
     <p:extLst>
       <p:ext uri="{BB962C8B-B14F-4D97-AF65-F5344CB8AC3E}">
-        <p14:creationId xmlns:p14="http://schemas.microsoft.com/office/powerpoint/2010/main" val="3076093952"/>
+        <p14:creationId xmlns:p14="http://schemas.microsoft.com/office/powerpoint/2010/main" val="1191956702"/>
       </p:ext>
     </p:extLst>
   </p:cSld>
@@ -2410,13 +2979,30 @@
           <a:p>
             <a:r>
               <a:rPr lang="en-US" dirty="0" smtClean="0"/>
-              <a:t>Is there ASLR</a:t>
+              <a:t>Here are the different ways that systems protect</a:t>
             </a:r>
             <a:r>
               <a:rPr lang="en-US" baseline="0" dirty="0" smtClean="0"/>
-              <a:t> in windows and if so how to turn it off? </a:t>
-            </a:r>
-            <a:endParaRPr lang="en-US" dirty="0"/>
+              <a:t> against buffer overflows: </a:t>
+            </a:r>
+          </a:p>
+          <a:p>
+            <a:r>
+              <a:rPr lang="en-US" baseline="0" dirty="0" smtClean="0"/>
+              <a:t>1- Data execution prevention (been around in Linux, Mac and windows since about 2004). </a:t>
+            </a:r>
+          </a:p>
+          <a:p>
+            <a:r>
+              <a:rPr lang="en-US" baseline="0" dirty="0" smtClean="0"/>
+              <a:t>    This prevents an application from executing code in a non-executable memory region. </a:t>
+            </a:r>
+          </a:p>
+          <a:p>
+            <a:endParaRPr lang="en-US" baseline="0" dirty="0" smtClean="0"/>
+          </a:p>
+          <a:p>
+            <a:endParaRPr lang="en-US" baseline="0" dirty="0" smtClean="0"/>
           </a:p>
         </p:txBody>
       </p:sp>
@@ -2437,7 +3023,7 @@
           <a:p>
             <a:fld id="{9D0B4A42-F062-4908-9C81-A569921BC8B1}" type="slidenum">
               <a:rPr lang="en-US" smtClean="0"/>
-              <a:t>47</a:t>
+              <a:t>46</a:t>
             </a:fld>
             <a:endParaRPr lang="en-US"/>
           </a:p>
@@ -2446,7 +3032,7 @@
     </p:spTree>
     <p:extLst>
       <p:ext uri="{BB962C8B-B14F-4D97-AF65-F5344CB8AC3E}">
-        <p14:creationId xmlns:p14="http://schemas.microsoft.com/office/powerpoint/2010/main" val="2458700491"/>
+        <p14:creationId xmlns:p14="http://schemas.microsoft.com/office/powerpoint/2010/main" val="3076093952"/>
       </p:ext>
     </p:extLst>
   </p:cSld>
@@ -2502,6 +3088,98 @@
           <a:p>
             <a:r>
               <a:rPr lang="en-US" dirty="0" smtClean="0"/>
+              <a:t>Is there ASLR</a:t>
+            </a:r>
+            <a:r>
+              <a:rPr lang="en-US" baseline="0" dirty="0" smtClean="0"/>
+              <a:t> in windows and if so how to turn it off? </a:t>
+            </a:r>
+            <a:endParaRPr lang="en-US" dirty="0"/>
+          </a:p>
+        </p:txBody>
+      </p:sp>
+      <p:sp>
+        <p:nvSpPr>
+          <p:cNvPr id="4" name="Slide Number Placeholder 3"/>
+          <p:cNvSpPr>
+            <a:spLocks noGrp="1"/>
+          </p:cNvSpPr>
+          <p:nvPr>
+            <p:ph type="sldNum" sz="quarter" idx="10"/>
+          </p:nvPr>
+        </p:nvSpPr>
+        <p:spPr/>
+        <p:txBody>
+          <a:bodyPr/>
+          <a:lstStyle/>
+          <a:p>
+            <a:fld id="{9D0B4A42-F062-4908-9C81-A569921BC8B1}" type="slidenum">
+              <a:rPr lang="en-US" smtClean="0"/>
+              <a:t>47</a:t>
+            </a:fld>
+            <a:endParaRPr lang="en-US"/>
+          </a:p>
+        </p:txBody>
+      </p:sp>
+    </p:spTree>
+    <p:extLst>
+      <p:ext uri="{BB962C8B-B14F-4D97-AF65-F5344CB8AC3E}">
+        <p14:creationId xmlns:p14="http://schemas.microsoft.com/office/powerpoint/2010/main" val="2458700491"/>
+      </p:ext>
+    </p:extLst>
+  </p:cSld>
+  <p:clrMapOvr>
+    <a:masterClrMapping/>
+  </p:clrMapOvr>
+</p:notes>
+</file>
+
+<file path=ppt/notesSlides/notesSlide16.xml><?xml version="1.0" encoding="utf-8"?>
+<p:notes xmlns:a="http://schemas.openxmlformats.org/drawingml/2006/main" xmlns:r="http://schemas.openxmlformats.org/officeDocument/2006/relationships" xmlns:p="http://schemas.openxmlformats.org/presentationml/2006/main">
+  <p:cSld>
+    <p:spTree>
+      <p:nvGrpSpPr>
+        <p:cNvPr id="1" name=""/>
+        <p:cNvGrpSpPr/>
+        <p:nvPr/>
+      </p:nvGrpSpPr>
+      <p:grpSpPr>
+        <a:xfrm>
+          <a:off x="0" y="0"/>
+          <a:ext cx="0" cy="0"/>
+          <a:chOff x="0" y="0"/>
+          <a:chExt cx="0" cy="0"/>
+        </a:xfrm>
+      </p:grpSpPr>
+      <p:sp>
+        <p:nvSpPr>
+          <p:cNvPr id="2" name="Slide Image Placeholder 1"/>
+          <p:cNvSpPr>
+            <a:spLocks noGrp="1" noRot="1" noChangeAspect="1"/>
+          </p:cNvSpPr>
+          <p:nvPr>
+            <p:ph type="sldImg"/>
+          </p:nvPr>
+        </p:nvSpPr>
+        <p:spPr/>
+      </p:sp>
+      <p:sp>
+        <p:nvSpPr>
+          <p:cNvPr id="3" name="Notes Placeholder 2"/>
+          <p:cNvSpPr>
+            <a:spLocks noGrp="1"/>
+          </p:cNvSpPr>
+          <p:nvPr>
+            <p:ph type="body" idx="1"/>
+          </p:nvPr>
+        </p:nvSpPr>
+        <p:spPr/>
+        <p:txBody>
+          <a:bodyPr/>
+          <a:lstStyle/>
+          <a:p>
+            <a:r>
+              <a:rPr lang="en-US" dirty="0" smtClean="0"/>
               <a:t>The worm took advantage of a buffer overflow in the </a:t>
             </a:r>
             <a:r>
@@ -2611,7 +3289,7 @@
 </p:notes>
 </file>
 
-<file path=ppt/notesSlides/notesSlide16.xml><?xml version="1.0" encoding="utf-8"?>
+<file path=ppt/notesSlides/notesSlide17.xml><?xml version="1.0" encoding="utf-8"?>
 <p:notes xmlns:a="http://schemas.openxmlformats.org/drawingml/2006/main" xmlns:r="http://schemas.openxmlformats.org/officeDocument/2006/relationships" xmlns:p="http://schemas.openxmlformats.org/presentationml/2006/main">
   <p:cSld>
     <p:spTree>
@@ -2871,6 +3549,90 @@
           <a:bodyPr/>
           <a:lstStyle/>
           <a:p>
+            <a:endParaRPr lang="en-US" dirty="0"/>
+          </a:p>
+        </p:txBody>
+      </p:sp>
+      <p:sp>
+        <p:nvSpPr>
+          <p:cNvPr id="4" name="Slide Number Placeholder 3"/>
+          <p:cNvSpPr>
+            <a:spLocks noGrp="1"/>
+          </p:cNvSpPr>
+          <p:nvPr>
+            <p:ph type="sldNum" sz="quarter" idx="10"/>
+          </p:nvPr>
+        </p:nvSpPr>
+        <p:spPr/>
+        <p:txBody>
+          <a:bodyPr/>
+          <a:lstStyle/>
+          <a:p>
+            <a:fld id="{9D0B4A42-F062-4908-9C81-A569921BC8B1}" type="slidenum">
+              <a:rPr lang="en-US" smtClean="0"/>
+              <a:t>2</a:t>
+            </a:fld>
+            <a:endParaRPr lang="en-US"/>
+          </a:p>
+        </p:txBody>
+      </p:sp>
+    </p:spTree>
+    <p:extLst>
+      <p:ext uri="{BB962C8B-B14F-4D97-AF65-F5344CB8AC3E}">
+        <p14:creationId xmlns:p14="http://schemas.microsoft.com/office/powerpoint/2010/main" val="912676930"/>
+      </p:ext>
+    </p:extLst>
+  </p:cSld>
+  <p:clrMapOvr>
+    <a:masterClrMapping/>
+  </p:clrMapOvr>
+</p:notes>
+</file>
+
+<file path=ppt/notesSlides/notesSlide3.xml><?xml version="1.0" encoding="utf-8"?>
+<p:notes xmlns:a="http://schemas.openxmlformats.org/drawingml/2006/main" xmlns:r="http://schemas.openxmlformats.org/officeDocument/2006/relationships" xmlns:p="http://schemas.openxmlformats.org/presentationml/2006/main">
+  <p:cSld>
+    <p:spTree>
+      <p:nvGrpSpPr>
+        <p:cNvPr id="1" name=""/>
+        <p:cNvGrpSpPr/>
+        <p:nvPr/>
+      </p:nvGrpSpPr>
+      <p:grpSpPr>
+        <a:xfrm>
+          <a:off x="0" y="0"/>
+          <a:ext cx="0" cy="0"/>
+          <a:chOff x="0" y="0"/>
+          <a:chExt cx="0" cy="0"/>
+        </a:xfrm>
+      </p:grpSpPr>
+      <p:sp>
+        <p:nvSpPr>
+          <p:cNvPr id="2" name="Slide Image Placeholder 1"/>
+          <p:cNvSpPr>
+            <a:spLocks noGrp="1" noRot="1" noChangeAspect="1"/>
+          </p:cNvSpPr>
+          <p:nvPr>
+            <p:ph type="sldImg"/>
+          </p:nvPr>
+        </p:nvSpPr>
+        <p:spPr/>
+      </p:sp>
+      <p:sp>
+        <p:nvSpPr>
+          <p:cNvPr id="3" name="Notes Placeholder 2"/>
+          <p:cNvSpPr>
+            <a:spLocks noGrp="1"/>
+          </p:cNvSpPr>
+          <p:nvPr>
+            <p:ph type="body" idx="1"/>
+          </p:nvPr>
+        </p:nvSpPr>
+        <p:spPr/>
+        <p:txBody>
+          <a:bodyPr/>
+          <a:lstStyle/>
+          <a:p>
             <a:pPr marL="0" marR="0" indent="0" algn="l" defTabSz="914400" rtl="0" eaLnBrk="1" fontAlgn="auto" latinLnBrk="0" hangingPunct="1">
               <a:lnSpc>
                 <a:spcPct val="100000"/>
@@ -2959,7 +3721,7 @@
 </p:notes>
 </file>
 
-<file path=ppt/notesSlides/notesSlide3.xml><?xml version="1.0" encoding="utf-8"?>
+<file path=ppt/notesSlides/notesSlide4.xml><?xml version="1.0" encoding="utf-8"?>
 <p:notes xmlns:a="http://schemas.openxmlformats.org/drawingml/2006/main" xmlns:r="http://schemas.openxmlformats.org/officeDocument/2006/relationships" xmlns:p="http://schemas.openxmlformats.org/presentationml/2006/main">
   <p:cSld>
     <p:spTree>
@@ -3681,7 +4443,7 @@
 </p:notes>
 </file>
 
-<file path=ppt/notesSlides/notesSlide4.xml><?xml version="1.0" encoding="utf-8"?>
+<file path=ppt/notesSlides/notesSlide5.xml><?xml version="1.0" encoding="utf-8"?>
 <p:notes xmlns:a="http://schemas.openxmlformats.org/drawingml/2006/main" xmlns:r="http://schemas.openxmlformats.org/officeDocument/2006/relationships" xmlns:p="http://schemas.openxmlformats.org/presentationml/2006/main">
   <p:cSld>
     <p:spTree>
@@ -4366,7 +5128,7 @@
 </p:notes>
 </file>
 
-<file path=ppt/notesSlides/notesSlide5.xml><?xml version="1.0" encoding="utf-8"?>
+<file path=ppt/notesSlides/notesSlide6.xml><?xml version="1.0" encoding="utf-8"?>
 <p:notes xmlns:a="http://schemas.openxmlformats.org/drawingml/2006/main" xmlns:r="http://schemas.openxmlformats.org/officeDocument/2006/relationships" xmlns:p="http://schemas.openxmlformats.org/presentationml/2006/main">
   <p:cSld>
     <p:spTree>
@@ -5051,7 +5813,7 @@
 </p:notes>
 </file>
 
-<file path=ppt/notesSlides/notesSlide6.xml><?xml version="1.0" encoding="utf-8"?>
+<file path=ppt/notesSlides/notesSlide7.xml><?xml version="1.0" encoding="utf-8"?>
 <p:notes xmlns:a="http://schemas.openxmlformats.org/drawingml/2006/main" xmlns:r="http://schemas.openxmlformats.org/officeDocument/2006/relationships" xmlns:p="http://schemas.openxmlformats.org/presentationml/2006/main">
   <p:cSld>
     <p:spTree>
@@ -5740,7 +6502,7 @@
 </p:notes>
 </file>
 
-<file path=ppt/notesSlides/notesSlide7.xml><?xml version="1.0" encoding="utf-8"?>
+<file path=ppt/notesSlides/notesSlide8.xml><?xml version="1.0" encoding="utf-8"?>
 <p:notes xmlns:a="http://schemas.openxmlformats.org/drawingml/2006/main" xmlns:r="http://schemas.openxmlformats.org/officeDocument/2006/relationships" xmlns:p="http://schemas.openxmlformats.org/presentationml/2006/main">
   <p:cSld>
     <p:spTree>
@@ -6436,7 +7198,7 @@
 </p:notes>
 </file>
 
-<file path=ppt/notesSlides/notesSlide8.xml><?xml version="1.0" encoding="utf-8"?>
+<file path=ppt/notesSlides/notesSlide9.xml><?xml version="1.0" encoding="utf-8"?>
 <p:notes xmlns:a="http://schemas.openxmlformats.org/drawingml/2006/main" xmlns:r="http://schemas.openxmlformats.org/officeDocument/2006/relationships" xmlns:p="http://schemas.openxmlformats.org/presentationml/2006/main">
   <p:cSld>
     <p:spTree>
@@ -7126,684 +7888,6 @@
               <a:rPr lang="en-US" dirty="0" smtClean="0"/>
               <a:t>, thereby causing the program execution to jump to the Return Address.</a:t>
             </a:r>
-          </a:p>
-        </p:txBody>
-      </p:sp>
-    </p:spTree>
-  </p:cSld>
-  <p:clrMapOvr>
-    <a:masterClrMapping/>
-  </p:clrMapOvr>
-</p:notes>
-</file>
-
-<file path=ppt/notesSlides/notesSlide9.xml><?xml version="1.0" encoding="utf-8"?>
-<p:notes xmlns:a="http://schemas.openxmlformats.org/drawingml/2006/main" xmlns:r="http://schemas.openxmlformats.org/officeDocument/2006/relationships" xmlns:p="http://schemas.openxmlformats.org/presentationml/2006/main">
-  <p:cSld>
-    <p:spTree>
-      <p:nvGrpSpPr>
-        <p:cNvPr id="1" name=""/>
-        <p:cNvGrpSpPr/>
-        <p:nvPr/>
-      </p:nvGrpSpPr>
-      <p:grpSpPr>
-        <a:xfrm>
-          <a:off x="0" y="0"/>
-          <a:ext cx="0" cy="0"/>
-          <a:chOff x="0" y="0"/>
-          <a:chExt cx="0" cy="0"/>
-        </a:xfrm>
-      </p:grpSpPr>
-      <p:sp>
-        <p:nvSpPr>
-          <p:cNvPr id="226306" name="Rectangle 2"/>
-          <p:cNvSpPr>
-            <a:spLocks noGrp="1" noChangeArrowheads="1"/>
-          </p:cNvSpPr>
-          <p:nvPr>
-            <p:ph type="hdr" sz="quarter"/>
-          </p:nvPr>
-        </p:nvSpPr>
-        <p:spPr>
-          <a:noFill/>
-          <a:ln/>
-          <a:extLst>
-            <a:ext uri="{909E8E84-426E-40DD-AFC4-6F175D3DCCD1}">
-              <a14:hiddenFill xmlns:a14="http://schemas.microsoft.com/office/drawing/2010/main">
-                <a:solidFill>
-                  <a:srgbClr val="FFFFFF"/>
-                </a:solidFill>
-              </a14:hiddenFill>
-            </a:ext>
-            <a:ext uri="{91240B29-F687-4F45-9708-019B960494DF}">
-              <a14:hiddenLine xmlns:a14="http://schemas.microsoft.com/office/drawing/2010/main" w="9525">
-                <a:solidFill>
-                  <a:srgbClr val="000000"/>
-                </a:solidFill>
-                <a:miter lim="800000"/>
-                <a:headEnd/>
-                <a:tailEnd/>
-              </a14:hiddenLine>
-            </a:ext>
-          </a:extLst>
-        </p:spPr>
-        <p:txBody>
-          <a:bodyPr/>
-          <a:lstStyle>
-            <a:lvl1pPr defTabSz="912933" eaLnBrk="0" hangingPunct="0">
-              <a:defRPr sz="1500">
-                <a:solidFill>
-                  <a:schemeClr val="tx1"/>
-                </a:solidFill>
-                <a:latin typeface="Arial" charset="0"/>
-              </a:defRPr>
-            </a:lvl1pPr>
-            <a:lvl2pPr marL="702717" indent="-270277" defTabSz="912933" eaLnBrk="0" hangingPunct="0">
-              <a:defRPr sz="1500">
-                <a:solidFill>
-                  <a:schemeClr val="tx1"/>
-                </a:solidFill>
-                <a:latin typeface="Arial" charset="0"/>
-              </a:defRPr>
-            </a:lvl2pPr>
-            <a:lvl3pPr marL="1081104" indent="-216221" defTabSz="912933" eaLnBrk="0" hangingPunct="0">
-              <a:defRPr sz="1500">
-                <a:solidFill>
-                  <a:schemeClr val="tx1"/>
-                </a:solidFill>
-                <a:latin typeface="Arial" charset="0"/>
-              </a:defRPr>
-            </a:lvl3pPr>
-            <a:lvl4pPr marL="1513545" indent="-216221" defTabSz="912933" eaLnBrk="0" hangingPunct="0">
-              <a:defRPr sz="1500">
-                <a:solidFill>
-                  <a:schemeClr val="tx1"/>
-                </a:solidFill>
-                <a:latin typeface="Arial" charset="0"/>
-              </a:defRPr>
-            </a:lvl4pPr>
-            <a:lvl5pPr marL="1945988" indent="-216221" defTabSz="912933" eaLnBrk="0" hangingPunct="0">
-              <a:defRPr sz="1500">
-                <a:solidFill>
-                  <a:schemeClr val="tx1"/>
-                </a:solidFill>
-                <a:latin typeface="Arial" charset="0"/>
-              </a:defRPr>
-            </a:lvl5pPr>
-            <a:lvl6pPr marL="2378429" indent="-216221" algn="ctr" defTabSz="912933" eaLnBrk="0" fontAlgn="base" hangingPunct="0">
-              <a:spcBef>
-                <a:spcPct val="0"/>
-              </a:spcBef>
-              <a:spcAft>
-                <a:spcPct val="0"/>
-              </a:spcAft>
-              <a:defRPr sz="1500">
-                <a:solidFill>
-                  <a:schemeClr val="tx1"/>
-                </a:solidFill>
-                <a:latin typeface="Arial" charset="0"/>
-              </a:defRPr>
-            </a:lvl6pPr>
-            <a:lvl7pPr marL="2810870" indent="-216221" algn="ctr" defTabSz="912933" eaLnBrk="0" fontAlgn="base" hangingPunct="0">
-              <a:spcBef>
-                <a:spcPct val="0"/>
-              </a:spcBef>
-              <a:spcAft>
-                <a:spcPct val="0"/>
-              </a:spcAft>
-              <a:defRPr sz="1500">
-                <a:solidFill>
-                  <a:schemeClr val="tx1"/>
-                </a:solidFill>
-                <a:latin typeface="Arial" charset="0"/>
-              </a:defRPr>
-            </a:lvl7pPr>
-            <a:lvl8pPr marL="3243311" indent="-216221" algn="ctr" defTabSz="912933" eaLnBrk="0" fontAlgn="base" hangingPunct="0">
-              <a:spcBef>
-                <a:spcPct val="0"/>
-              </a:spcBef>
-              <a:spcAft>
-                <a:spcPct val="0"/>
-              </a:spcAft>
-              <a:defRPr sz="1500">
-                <a:solidFill>
-                  <a:schemeClr val="tx1"/>
-                </a:solidFill>
-                <a:latin typeface="Arial" charset="0"/>
-              </a:defRPr>
-            </a:lvl8pPr>
-            <a:lvl9pPr marL="3675754" indent="-216221" algn="ctr" defTabSz="912933" eaLnBrk="0" fontAlgn="base" hangingPunct="0">
-              <a:spcBef>
-                <a:spcPct val="0"/>
-              </a:spcBef>
-              <a:spcAft>
-                <a:spcPct val="0"/>
-              </a:spcAft>
-              <a:defRPr sz="1500">
-                <a:solidFill>
-                  <a:schemeClr val="tx1"/>
-                </a:solidFill>
-                <a:latin typeface="Arial" charset="0"/>
-              </a:defRPr>
-            </a:lvl9pPr>
-          </a:lstStyle>
-          <a:p>
-            <a:pPr eaLnBrk="1" hangingPunct="1"/>
-            <a:r>
-              <a:rPr lang="en-US" sz="1200">
-                <a:solidFill>
-                  <a:prstClr val="black"/>
-                </a:solidFill>
-              </a:rPr>
-              <a:t>CSE 425, Introduction to Computer Security</a:t>
-            </a:r>
-          </a:p>
-        </p:txBody>
-      </p:sp>
-      <p:sp>
-        <p:nvSpPr>
-          <p:cNvPr id="226307" name="Rectangle 3"/>
-          <p:cNvSpPr>
-            <a:spLocks noGrp="1" noChangeArrowheads="1"/>
-          </p:cNvSpPr>
-          <p:nvPr>
-            <p:ph type="dt" sz="quarter" idx="1"/>
-          </p:nvPr>
-        </p:nvSpPr>
-        <p:spPr>
-          <a:noFill/>
-          <a:ln/>
-          <a:extLst>
-            <a:ext uri="{909E8E84-426E-40DD-AFC4-6F175D3DCCD1}">
-              <a14:hiddenFill xmlns:a14="http://schemas.microsoft.com/office/drawing/2010/main">
-                <a:solidFill>
-                  <a:srgbClr val="FFFFFF"/>
-                </a:solidFill>
-              </a14:hiddenFill>
-            </a:ext>
-            <a:ext uri="{91240B29-F687-4F45-9708-019B960494DF}">
-              <a14:hiddenLine xmlns:a14="http://schemas.microsoft.com/office/drawing/2010/main" w="9525">
-                <a:solidFill>
-                  <a:srgbClr val="000000"/>
-                </a:solidFill>
-                <a:miter lim="800000"/>
-                <a:headEnd/>
-                <a:tailEnd/>
-              </a14:hiddenLine>
-            </a:ext>
-          </a:extLst>
-        </p:spPr>
-        <p:txBody>
-          <a:bodyPr/>
-          <a:lstStyle>
-            <a:lvl1pPr defTabSz="912933" eaLnBrk="0" hangingPunct="0">
-              <a:defRPr sz="1500">
-                <a:solidFill>
-                  <a:schemeClr val="tx1"/>
-                </a:solidFill>
-                <a:latin typeface="Arial" charset="0"/>
-              </a:defRPr>
-            </a:lvl1pPr>
-            <a:lvl2pPr marL="702717" indent="-270277" defTabSz="912933" eaLnBrk="0" hangingPunct="0">
-              <a:defRPr sz="1500">
-                <a:solidFill>
-                  <a:schemeClr val="tx1"/>
-                </a:solidFill>
-                <a:latin typeface="Arial" charset="0"/>
-              </a:defRPr>
-            </a:lvl2pPr>
-            <a:lvl3pPr marL="1081104" indent="-216221" defTabSz="912933" eaLnBrk="0" hangingPunct="0">
-              <a:defRPr sz="1500">
-                <a:solidFill>
-                  <a:schemeClr val="tx1"/>
-                </a:solidFill>
-                <a:latin typeface="Arial" charset="0"/>
-              </a:defRPr>
-            </a:lvl3pPr>
-            <a:lvl4pPr marL="1513545" indent="-216221" defTabSz="912933" eaLnBrk="0" hangingPunct="0">
-              <a:defRPr sz="1500">
-                <a:solidFill>
-                  <a:schemeClr val="tx1"/>
-                </a:solidFill>
-                <a:latin typeface="Arial" charset="0"/>
-              </a:defRPr>
-            </a:lvl4pPr>
-            <a:lvl5pPr marL="1945988" indent="-216221" defTabSz="912933" eaLnBrk="0" hangingPunct="0">
-              <a:defRPr sz="1500">
-                <a:solidFill>
-                  <a:schemeClr val="tx1"/>
-                </a:solidFill>
-                <a:latin typeface="Arial" charset="0"/>
-              </a:defRPr>
-            </a:lvl5pPr>
-            <a:lvl6pPr marL="2378429" indent="-216221" algn="ctr" defTabSz="912933" eaLnBrk="0" fontAlgn="base" hangingPunct="0">
-              <a:spcBef>
-                <a:spcPct val="0"/>
-              </a:spcBef>
-              <a:spcAft>
-                <a:spcPct val="0"/>
-              </a:spcAft>
-              <a:defRPr sz="1500">
-                <a:solidFill>
-                  <a:schemeClr val="tx1"/>
-                </a:solidFill>
-                <a:latin typeface="Arial" charset="0"/>
-              </a:defRPr>
-            </a:lvl6pPr>
-            <a:lvl7pPr marL="2810870" indent="-216221" algn="ctr" defTabSz="912933" eaLnBrk="0" fontAlgn="base" hangingPunct="0">
-              <a:spcBef>
-                <a:spcPct val="0"/>
-              </a:spcBef>
-              <a:spcAft>
-                <a:spcPct val="0"/>
-              </a:spcAft>
-              <a:defRPr sz="1500">
-                <a:solidFill>
-                  <a:schemeClr val="tx1"/>
-                </a:solidFill>
-                <a:latin typeface="Arial" charset="0"/>
-              </a:defRPr>
-            </a:lvl7pPr>
-            <a:lvl8pPr marL="3243311" indent="-216221" algn="ctr" defTabSz="912933" eaLnBrk="0" fontAlgn="base" hangingPunct="0">
-              <a:spcBef>
-                <a:spcPct val="0"/>
-              </a:spcBef>
-              <a:spcAft>
-                <a:spcPct val="0"/>
-              </a:spcAft>
-              <a:defRPr sz="1500">
-                <a:solidFill>
-                  <a:schemeClr val="tx1"/>
-                </a:solidFill>
-                <a:latin typeface="Arial" charset="0"/>
-              </a:defRPr>
-            </a:lvl8pPr>
-            <a:lvl9pPr marL="3675754" indent="-216221" algn="ctr" defTabSz="912933" eaLnBrk="0" fontAlgn="base" hangingPunct="0">
-              <a:spcBef>
-                <a:spcPct val="0"/>
-              </a:spcBef>
-              <a:spcAft>
-                <a:spcPct val="0"/>
-              </a:spcAft>
-              <a:defRPr sz="1500">
-                <a:solidFill>
-                  <a:schemeClr val="tx1"/>
-                </a:solidFill>
-                <a:latin typeface="Arial" charset="0"/>
-              </a:defRPr>
-            </a:lvl9pPr>
-          </a:lstStyle>
-          <a:p>
-            <a:pPr eaLnBrk="1" hangingPunct="1"/>
-            <a:r>
-              <a:rPr lang="en-US" sz="1200">
-                <a:solidFill>
-                  <a:prstClr val="black"/>
-                </a:solidFill>
-              </a:rPr>
-              <a:t>Chapter 4. Access Control, Smashing the Stack</a:t>
-            </a:r>
-          </a:p>
-        </p:txBody>
-      </p:sp>
-      <p:sp>
-        <p:nvSpPr>
-          <p:cNvPr id="226308" name="Rectangle 6"/>
-          <p:cNvSpPr>
-            <a:spLocks noGrp="1" noChangeArrowheads="1"/>
-          </p:cNvSpPr>
-          <p:nvPr>
-            <p:ph type="ftr" sz="quarter" idx="4"/>
-          </p:nvPr>
-        </p:nvSpPr>
-        <p:spPr>
-          <a:noFill/>
-          <a:ln/>
-          <a:extLst>
-            <a:ext uri="{909E8E84-426E-40DD-AFC4-6F175D3DCCD1}">
-              <a14:hiddenFill xmlns:a14="http://schemas.microsoft.com/office/drawing/2010/main">
-                <a:solidFill>
-                  <a:srgbClr val="FFFFFF"/>
-                </a:solidFill>
-              </a14:hiddenFill>
-            </a:ext>
-            <a:ext uri="{91240B29-F687-4F45-9708-019B960494DF}">
-              <a14:hiddenLine xmlns:a14="http://schemas.microsoft.com/office/drawing/2010/main" w="9525">
-                <a:solidFill>
-                  <a:srgbClr val="000000"/>
-                </a:solidFill>
-                <a:miter lim="800000"/>
-                <a:headEnd/>
-                <a:tailEnd/>
-              </a14:hiddenLine>
-            </a:ext>
-          </a:extLst>
-        </p:spPr>
-        <p:txBody>
-          <a:bodyPr/>
-          <a:lstStyle>
-            <a:lvl1pPr defTabSz="912933" eaLnBrk="0" hangingPunct="0">
-              <a:defRPr sz="1500">
-                <a:solidFill>
-                  <a:schemeClr val="tx1"/>
-                </a:solidFill>
-                <a:latin typeface="Arial" charset="0"/>
-              </a:defRPr>
-            </a:lvl1pPr>
-            <a:lvl2pPr marL="702717" indent="-270277" defTabSz="912933" eaLnBrk="0" hangingPunct="0">
-              <a:defRPr sz="1500">
-                <a:solidFill>
-                  <a:schemeClr val="tx1"/>
-                </a:solidFill>
-                <a:latin typeface="Arial" charset="0"/>
-              </a:defRPr>
-            </a:lvl2pPr>
-            <a:lvl3pPr marL="1081104" indent="-216221" defTabSz="912933" eaLnBrk="0" hangingPunct="0">
-              <a:defRPr sz="1500">
-                <a:solidFill>
-                  <a:schemeClr val="tx1"/>
-                </a:solidFill>
-                <a:latin typeface="Arial" charset="0"/>
-              </a:defRPr>
-            </a:lvl3pPr>
-            <a:lvl4pPr marL="1513545" indent="-216221" defTabSz="912933" eaLnBrk="0" hangingPunct="0">
-              <a:defRPr sz="1500">
-                <a:solidFill>
-                  <a:schemeClr val="tx1"/>
-                </a:solidFill>
-                <a:latin typeface="Arial" charset="0"/>
-              </a:defRPr>
-            </a:lvl4pPr>
-            <a:lvl5pPr marL="1945988" indent="-216221" defTabSz="912933" eaLnBrk="0" hangingPunct="0">
-              <a:defRPr sz="1500">
-                <a:solidFill>
-                  <a:schemeClr val="tx1"/>
-                </a:solidFill>
-                <a:latin typeface="Arial" charset="0"/>
-              </a:defRPr>
-            </a:lvl5pPr>
-            <a:lvl6pPr marL="2378429" indent="-216221" algn="ctr" defTabSz="912933" eaLnBrk="0" fontAlgn="base" hangingPunct="0">
-              <a:spcBef>
-                <a:spcPct val="0"/>
-              </a:spcBef>
-              <a:spcAft>
-                <a:spcPct val="0"/>
-              </a:spcAft>
-              <a:defRPr sz="1500">
-                <a:solidFill>
-                  <a:schemeClr val="tx1"/>
-                </a:solidFill>
-                <a:latin typeface="Arial" charset="0"/>
-              </a:defRPr>
-            </a:lvl6pPr>
-            <a:lvl7pPr marL="2810870" indent="-216221" algn="ctr" defTabSz="912933" eaLnBrk="0" fontAlgn="base" hangingPunct="0">
-              <a:spcBef>
-                <a:spcPct val="0"/>
-              </a:spcBef>
-              <a:spcAft>
-                <a:spcPct val="0"/>
-              </a:spcAft>
-              <a:defRPr sz="1500">
-                <a:solidFill>
-                  <a:schemeClr val="tx1"/>
-                </a:solidFill>
-                <a:latin typeface="Arial" charset="0"/>
-              </a:defRPr>
-            </a:lvl7pPr>
-            <a:lvl8pPr marL="3243311" indent="-216221" algn="ctr" defTabSz="912933" eaLnBrk="0" fontAlgn="base" hangingPunct="0">
-              <a:spcBef>
-                <a:spcPct val="0"/>
-              </a:spcBef>
-              <a:spcAft>
-                <a:spcPct val="0"/>
-              </a:spcAft>
-              <a:defRPr sz="1500">
-                <a:solidFill>
-                  <a:schemeClr val="tx1"/>
-                </a:solidFill>
-                <a:latin typeface="Arial" charset="0"/>
-              </a:defRPr>
-            </a:lvl8pPr>
-            <a:lvl9pPr marL="3675754" indent="-216221" algn="ctr" defTabSz="912933" eaLnBrk="0" fontAlgn="base" hangingPunct="0">
-              <a:spcBef>
-                <a:spcPct val="0"/>
-              </a:spcBef>
-              <a:spcAft>
-                <a:spcPct val="0"/>
-              </a:spcAft>
-              <a:defRPr sz="1500">
-                <a:solidFill>
-                  <a:schemeClr val="tx1"/>
-                </a:solidFill>
-                <a:latin typeface="Arial" charset="0"/>
-              </a:defRPr>
-            </a:lvl9pPr>
-          </a:lstStyle>
-          <a:p>
-            <a:pPr eaLnBrk="1" hangingPunct="1"/>
-            <a:r>
-              <a:rPr lang="en-US" sz="1200">
-                <a:solidFill>
-                  <a:prstClr val="black"/>
-                </a:solidFill>
-              </a:rPr>
-              <a:t>© 2006  by Wayne R. Dyksen.  All Rights Reserved.</a:t>
-            </a:r>
-          </a:p>
-        </p:txBody>
-      </p:sp>
-      <p:sp>
-        <p:nvSpPr>
-          <p:cNvPr id="226309" name="Rectangle 7"/>
-          <p:cNvSpPr>
-            <a:spLocks noGrp="1" noChangeArrowheads="1"/>
-          </p:cNvSpPr>
-          <p:nvPr>
-            <p:ph type="sldNum" sz="quarter" idx="5"/>
-          </p:nvPr>
-        </p:nvSpPr>
-        <p:spPr>
-          <a:noFill/>
-          <a:ln/>
-          <a:extLst>
-            <a:ext uri="{909E8E84-426E-40DD-AFC4-6F175D3DCCD1}">
-              <a14:hiddenFill xmlns:a14="http://schemas.microsoft.com/office/drawing/2010/main">
-                <a:solidFill>
-                  <a:srgbClr val="FFFFFF"/>
-                </a:solidFill>
-              </a14:hiddenFill>
-            </a:ext>
-            <a:ext uri="{91240B29-F687-4F45-9708-019B960494DF}">
-              <a14:hiddenLine xmlns:a14="http://schemas.microsoft.com/office/drawing/2010/main" w="9525">
-                <a:solidFill>
-                  <a:srgbClr val="000000"/>
-                </a:solidFill>
-                <a:miter lim="800000"/>
-                <a:headEnd/>
-                <a:tailEnd/>
-              </a14:hiddenLine>
-            </a:ext>
-          </a:extLst>
-        </p:spPr>
-        <p:txBody>
-          <a:bodyPr/>
-          <a:lstStyle>
-            <a:lvl1pPr defTabSz="912933" eaLnBrk="0" hangingPunct="0">
-              <a:defRPr sz="1500">
-                <a:solidFill>
-                  <a:schemeClr val="tx1"/>
-                </a:solidFill>
-                <a:latin typeface="Arial" charset="0"/>
-              </a:defRPr>
-            </a:lvl1pPr>
-            <a:lvl2pPr marL="702717" indent="-270277" defTabSz="912933" eaLnBrk="0" hangingPunct="0">
-              <a:defRPr sz="1500">
-                <a:solidFill>
-                  <a:schemeClr val="tx1"/>
-                </a:solidFill>
-                <a:latin typeface="Arial" charset="0"/>
-              </a:defRPr>
-            </a:lvl2pPr>
-            <a:lvl3pPr marL="1081104" indent="-216221" defTabSz="912933" eaLnBrk="0" hangingPunct="0">
-              <a:defRPr sz="1500">
-                <a:solidFill>
-                  <a:schemeClr val="tx1"/>
-                </a:solidFill>
-                <a:latin typeface="Arial" charset="0"/>
-              </a:defRPr>
-            </a:lvl3pPr>
-            <a:lvl4pPr marL="1513545" indent="-216221" defTabSz="912933" eaLnBrk="0" hangingPunct="0">
-              <a:defRPr sz="1500">
-                <a:solidFill>
-                  <a:schemeClr val="tx1"/>
-                </a:solidFill>
-                <a:latin typeface="Arial" charset="0"/>
-              </a:defRPr>
-            </a:lvl4pPr>
-            <a:lvl5pPr marL="1945988" indent="-216221" defTabSz="912933" eaLnBrk="0" hangingPunct="0">
-              <a:defRPr sz="1500">
-                <a:solidFill>
-                  <a:schemeClr val="tx1"/>
-                </a:solidFill>
-                <a:latin typeface="Arial" charset="0"/>
-              </a:defRPr>
-            </a:lvl5pPr>
-            <a:lvl6pPr marL="2378429" indent="-216221" algn="ctr" defTabSz="912933" eaLnBrk="0" fontAlgn="base" hangingPunct="0">
-              <a:spcBef>
-                <a:spcPct val="0"/>
-              </a:spcBef>
-              <a:spcAft>
-                <a:spcPct val="0"/>
-              </a:spcAft>
-              <a:defRPr sz="1500">
-                <a:solidFill>
-                  <a:schemeClr val="tx1"/>
-                </a:solidFill>
-                <a:latin typeface="Arial" charset="0"/>
-              </a:defRPr>
-            </a:lvl6pPr>
-            <a:lvl7pPr marL="2810870" indent="-216221" algn="ctr" defTabSz="912933" eaLnBrk="0" fontAlgn="base" hangingPunct="0">
-              <a:spcBef>
-                <a:spcPct val="0"/>
-              </a:spcBef>
-              <a:spcAft>
-                <a:spcPct val="0"/>
-              </a:spcAft>
-              <a:defRPr sz="1500">
-                <a:solidFill>
-                  <a:schemeClr val="tx1"/>
-                </a:solidFill>
-                <a:latin typeface="Arial" charset="0"/>
-              </a:defRPr>
-            </a:lvl7pPr>
-            <a:lvl8pPr marL="3243311" indent="-216221" algn="ctr" defTabSz="912933" eaLnBrk="0" fontAlgn="base" hangingPunct="0">
-              <a:spcBef>
-                <a:spcPct val="0"/>
-              </a:spcBef>
-              <a:spcAft>
-                <a:spcPct val="0"/>
-              </a:spcAft>
-              <a:defRPr sz="1500">
-                <a:solidFill>
-                  <a:schemeClr val="tx1"/>
-                </a:solidFill>
-                <a:latin typeface="Arial" charset="0"/>
-              </a:defRPr>
-            </a:lvl8pPr>
-            <a:lvl9pPr marL="3675754" indent="-216221" algn="ctr" defTabSz="912933" eaLnBrk="0" fontAlgn="base" hangingPunct="0">
-              <a:spcBef>
-                <a:spcPct val="0"/>
-              </a:spcBef>
-              <a:spcAft>
-                <a:spcPct val="0"/>
-              </a:spcAft>
-              <a:defRPr sz="1500">
-                <a:solidFill>
-                  <a:schemeClr val="tx1"/>
-                </a:solidFill>
-                <a:latin typeface="Arial" charset="0"/>
-              </a:defRPr>
-            </a:lvl9pPr>
-          </a:lstStyle>
-          <a:p>
-            <a:pPr eaLnBrk="1" hangingPunct="1"/>
-            <a:fld id="{48564DCC-794F-43F8-A5EC-CFD5C5642118}" type="slidenum">
-              <a:rPr lang="en-US" sz="1200">
-                <a:solidFill>
-                  <a:prstClr val="black"/>
-                </a:solidFill>
-              </a:rPr>
-              <a:pPr eaLnBrk="1" hangingPunct="1"/>
-              <a:t>23</a:t>
-            </a:fld>
-            <a:endParaRPr lang="en-US" sz="1200">
-              <a:solidFill>
-                <a:prstClr val="black"/>
-              </a:solidFill>
-            </a:endParaRPr>
-          </a:p>
-        </p:txBody>
-      </p:sp>
-      <p:sp>
-        <p:nvSpPr>
-          <p:cNvPr id="226310" name="Rectangle 2"/>
-          <p:cNvSpPr>
-            <a:spLocks noGrp="1" noRot="1" noChangeAspect="1" noChangeArrowheads="1" noTextEdit="1"/>
-          </p:cNvSpPr>
-          <p:nvPr>
-            <p:ph type="sldImg"/>
-          </p:nvPr>
-        </p:nvSpPr>
-        <p:spPr>
-          <a:ln/>
-        </p:spPr>
-      </p:sp>
-      <p:sp>
-        <p:nvSpPr>
-          <p:cNvPr id="226311" name="Rectangle 3"/>
-          <p:cNvSpPr>
-            <a:spLocks noGrp="1" noChangeArrowheads="1"/>
-          </p:cNvSpPr>
-          <p:nvPr>
-            <p:ph type="body" idx="1"/>
-          </p:nvPr>
-        </p:nvSpPr>
-        <p:spPr>
-          <a:noFill/>
-          <a:ln/>
-          <a:extLst>
-            <a:ext uri="{909E8E84-426E-40DD-AFC4-6F175D3DCCD1}">
-              <a14:hiddenFill xmlns:a14="http://schemas.microsoft.com/office/drawing/2010/main">
-                <a:solidFill>
-                  <a:srgbClr val="FFFFFF"/>
-                </a:solidFill>
-              </a14:hiddenFill>
-            </a:ext>
-            <a:ext uri="{91240B29-F687-4F45-9708-019B960494DF}">
-              <a14:hiddenLine xmlns:a14="http://schemas.microsoft.com/office/drawing/2010/main" w="9525">
-                <a:solidFill>
-                  <a:srgbClr val="000000"/>
-                </a:solidFill>
-                <a:miter lim="800000"/>
-                <a:headEnd/>
-                <a:tailEnd/>
-              </a14:hiddenLine>
-            </a:ext>
-          </a:extLst>
-        </p:spPr>
-        <p:txBody>
-          <a:bodyPr/>
-          <a:lstStyle/>
-          <a:p>
-            <a:pPr eaLnBrk="1" hangingPunct="1"/>
-            <a:r>
-              <a:rPr lang="en-US" smtClean="0"/>
-              <a:t>pop %eip pops the value of the Return Address off of the stack and load is into %eip, thereby causing the program execution to jump to the Return Address.</a:t>
-            </a:r>
-          </a:p>
-          <a:p>
-            <a:pPr eaLnBrk="1" hangingPunct="1"/>
-            <a:endParaRPr lang="en-US" smtClean="0"/>
           </a:p>
         </p:txBody>
       </p:sp>
@@ -8165,7 +8249,7 @@
           <a:p>
             <a:fld id="{FB76FE03-F4FF-4405-A4BA-F447F9618E72}" type="datetimeFigureOut">
               <a:rPr lang="en-US" smtClean="0"/>
-              <a:t>4/24/2012</a:t>
+              <a:t>4/25/2012</a:t>
             </a:fld>
             <a:endParaRPr lang="en-US"/>
           </a:p>
@@ -8430,7 +8514,7 @@
           <a:p>
             <a:fld id="{FB76FE03-F4FF-4405-A4BA-F447F9618E72}" type="datetimeFigureOut">
               <a:rPr lang="en-US" smtClean="0"/>
-              <a:t>4/24/2012</a:t>
+              <a:t>4/25/2012</a:t>
             </a:fld>
             <a:endParaRPr lang="en-US"/>
           </a:p>
@@ -8704,7 +8788,7 @@
           <a:p>
             <a:fld id="{FB76FE03-F4FF-4405-A4BA-F447F9618E72}" type="datetimeFigureOut">
               <a:rPr lang="en-US" smtClean="0"/>
-              <a:t>4/24/2012</a:t>
+              <a:t>4/25/2012</a:t>
             </a:fld>
             <a:endParaRPr lang="en-US"/>
           </a:p>
@@ -8921,7 +9005,7 @@
           <a:p>
             <a:fld id="{FB76FE03-F4FF-4405-A4BA-F447F9618E72}" type="datetimeFigureOut">
               <a:rPr lang="en-US" smtClean="0"/>
-              <a:t>4/24/2012</a:t>
+              <a:t>4/25/2012</a:t>
             </a:fld>
             <a:endParaRPr lang="en-US"/>
           </a:p>
@@ -9308,7 +9392,7 @@
           <a:p>
             <a:fld id="{FB76FE03-F4FF-4405-A4BA-F447F9618E72}" type="datetimeFigureOut">
               <a:rPr lang="en-US" smtClean="0"/>
-              <a:t>4/24/2012</a:t>
+              <a:t>4/25/2012</a:t>
             </a:fld>
             <a:endParaRPr lang="en-US"/>
           </a:p>
@@ -9689,7 +9773,7 @@
           <a:p>
             <a:fld id="{FB76FE03-F4FF-4405-A4BA-F447F9618E72}" type="datetimeFigureOut">
               <a:rPr lang="en-US" smtClean="0"/>
-              <a:t>4/24/2012</a:t>
+              <a:t>4/25/2012</a:t>
             </a:fld>
             <a:endParaRPr lang="en-US"/>
           </a:p>
@@ -10106,7 +10190,7 @@
           <a:p>
             <a:fld id="{FB76FE03-F4FF-4405-A4BA-F447F9618E72}" type="datetimeFigureOut">
               <a:rPr lang="en-US" smtClean="0"/>
-              <a:t>4/24/2012</a:t>
+              <a:t>4/25/2012</a:t>
             </a:fld>
             <a:endParaRPr lang="en-US"/>
           </a:p>
@@ -10219,7 +10303,7 @@
           <a:p>
             <a:fld id="{FB76FE03-F4FF-4405-A4BA-F447F9618E72}" type="datetimeFigureOut">
               <a:rPr lang="en-US" smtClean="0"/>
-              <a:t>4/24/2012</a:t>
+              <a:t>4/25/2012</a:t>
             </a:fld>
             <a:endParaRPr lang="en-US"/>
           </a:p>
@@ -10309,7 +10393,7 @@
           <a:p>
             <a:fld id="{FB76FE03-F4FF-4405-A4BA-F447F9618E72}" type="datetimeFigureOut">
               <a:rPr lang="en-US" smtClean="0"/>
-              <a:t>4/24/2012</a:t>
+              <a:t>4/25/2012</a:t>
             </a:fld>
             <a:endParaRPr lang="en-US"/>
           </a:p>
@@ -10518,7 +10602,7 @@
           <a:p>
             <a:fld id="{FB76FE03-F4FF-4405-A4BA-F447F9618E72}" type="datetimeFigureOut">
               <a:rPr lang="en-US" smtClean="0"/>
-              <a:t>4/24/2012</a:t>
+              <a:t>4/25/2012</a:t>
             </a:fld>
             <a:endParaRPr lang="en-US"/>
           </a:p>
@@ -10895,7 +10979,7 @@
           <a:p>
             <a:fld id="{FB76FE03-F4FF-4405-A4BA-F447F9618E72}" type="datetimeFigureOut">
               <a:rPr lang="en-US" smtClean="0"/>
-              <a:t>4/24/2012</a:t>
+              <a:t>4/25/2012</a:t>
             </a:fld>
             <a:endParaRPr lang="en-US"/>
           </a:p>
@@ -11442,7 +11526,7 @@
           <a:p>
             <a:fld id="{FB76FE03-F4FF-4405-A4BA-F447F9618E72}" type="datetimeFigureOut">
               <a:rPr lang="en-US" smtClean="0"/>
-              <a:t>4/24/2012</a:t>
+              <a:t>4/25/2012</a:t>
             </a:fld>
             <a:endParaRPr lang="en-US"/>
           </a:p>
@@ -26526,7 +26610,7 @@
           <p:nvPr/>
         </p:nvPicPr>
         <p:blipFill>
-          <a:blip r:embed="rId2">
+          <a:blip r:embed="rId3">
             <a:extLst>
               <a:ext uri="{28A0092B-C50C-407E-A947-70E740481C1C}">
                 <a14:useLocalDpi xmlns:a14="http://schemas.microsoft.com/office/drawing/2010/main" val="0"/>
@@ -35785,6 +35869,154 @@
           <a:lstStyle/>
           <a:p>
             <a:r>
+              <a:rPr lang="en-US" dirty="0" err="1" smtClean="0"/>
+              <a:t>Shellcoding</a:t>
+            </a:r>
+            <a:endParaRPr lang="en-US" dirty="0"/>
+          </a:p>
+        </p:txBody>
+      </p:sp>
+      <p:sp>
+        <p:nvSpPr>
+          <p:cNvPr id="3" name="Content Placeholder 2"/>
+          <p:cNvSpPr>
+            <a:spLocks noGrp="1"/>
+          </p:cNvSpPr>
+          <p:nvPr>
+            <p:ph idx="1"/>
+          </p:nvPr>
+        </p:nvSpPr>
+        <p:spPr/>
+        <p:txBody>
+          <a:bodyPr>
+            <a:normAutofit/>
+          </a:bodyPr>
+          <a:lstStyle/>
+          <a:p>
+            <a:r>
+              <a:rPr lang="en-US" dirty="0" smtClean="0"/>
+              <a:t>Find a solid assembly base (unless you want to write it all yourself…)</a:t>
+            </a:r>
+          </a:p>
+          <a:p>
+            <a:r>
+              <a:rPr lang="en-US" dirty="0" smtClean="0"/>
+              <a:t>Find your system call memory addresses with </a:t>
+            </a:r>
+            <a:r>
+              <a:rPr lang="en-US" dirty="0" err="1" smtClean="0"/>
+              <a:t>arwin</a:t>
+            </a:r>
+            <a:endParaRPr lang="en-US" dirty="0" smtClean="0"/>
+          </a:p>
+          <a:p>
+            <a:r>
+              <a:rPr lang="en-US" dirty="0" smtClean="0"/>
+              <a:t>Decide what you want to do</a:t>
+            </a:r>
+          </a:p>
+          <a:p>
+            <a:r>
+              <a:rPr lang="en-US" dirty="0" err="1" smtClean="0"/>
+              <a:t>nasm</a:t>
+            </a:r>
+            <a:r>
+              <a:rPr lang="en-US" dirty="0" smtClean="0"/>
+              <a:t> into </a:t>
+            </a:r>
+            <a:r>
+              <a:rPr lang="en-US" dirty="0" err="1" smtClean="0"/>
+              <a:t>bytecode</a:t>
+            </a:r>
+            <a:endParaRPr lang="en-US" dirty="0" smtClean="0"/>
+          </a:p>
+          <a:p>
+            <a:r>
+              <a:rPr lang="en-US" dirty="0" err="1" smtClean="0"/>
+              <a:t>Objdump</a:t>
+            </a:r>
+            <a:r>
+              <a:rPr lang="en-US" dirty="0" smtClean="0"/>
+              <a:t> to get the </a:t>
+            </a:r>
+            <a:r>
+              <a:rPr lang="en-US" dirty="0" err="1" smtClean="0"/>
+              <a:t>bytecode</a:t>
+            </a:r>
+            <a:r>
+              <a:rPr lang="en-US" dirty="0" smtClean="0"/>
+              <a:t> in text format</a:t>
+            </a:r>
+          </a:p>
+          <a:p>
+            <a:r>
+              <a:rPr lang="en-US" dirty="0" smtClean="0"/>
+              <a:t>Determine big-endian or little-endian (this is </a:t>
+            </a:r>
+            <a:r>
+              <a:rPr lang="en-US" smtClean="0"/>
+              <a:t>where that matters)</a:t>
+            </a:r>
+            <a:endParaRPr lang="en-US" dirty="0" smtClean="0"/>
+          </a:p>
+          <a:p>
+            <a:endParaRPr lang="en-US" dirty="0"/>
+          </a:p>
+        </p:txBody>
+      </p:sp>
+    </p:spTree>
+    <p:extLst>
+      <p:ext uri="{BB962C8B-B14F-4D97-AF65-F5344CB8AC3E}">
+        <p14:creationId xmlns:p14="http://schemas.microsoft.com/office/powerpoint/2010/main" val="2666020825"/>
+      </p:ext>
+    </p:extLst>
+  </p:cSld>
+  <p:clrMapOvr>
+    <a:masterClrMapping/>
+  </p:clrMapOvr>
+  <p:timing>
+    <p:tnLst>
+      <p:par>
+        <p:cTn id="1" dur="indefinite" restart="never" nodeType="tmRoot"/>
+      </p:par>
+    </p:tnLst>
+  </p:timing>
+</p:sld>
+</file>
+
+<file path=ppt/slides/slide33.xml><?xml version="1.0" encoding="utf-8"?>
+<p:sld xmlns:a="http://schemas.openxmlformats.org/drawingml/2006/main" xmlns:r="http://schemas.openxmlformats.org/officeDocument/2006/relationships" xmlns:p="http://schemas.openxmlformats.org/presentationml/2006/main">
+  <p:cSld>
+    <p:spTree>
+      <p:nvGrpSpPr>
+        <p:cNvPr id="1" name=""/>
+        <p:cNvGrpSpPr/>
+        <p:nvPr/>
+      </p:nvGrpSpPr>
+      <p:grpSpPr>
+        <a:xfrm>
+          <a:off x="0" y="0"/>
+          <a:ext cx="0" cy="0"/>
+          <a:chOff x="0" y="0"/>
+          <a:chExt cx="0" cy="0"/>
+        </a:xfrm>
+      </p:grpSpPr>
+      <p:sp>
+        <p:nvSpPr>
+          <p:cNvPr id="2" name="Title 1"/>
+          <p:cNvSpPr>
+            <a:spLocks noGrp="1"/>
+          </p:cNvSpPr>
+          <p:nvPr>
+            <p:ph type="title"/>
+          </p:nvPr>
+        </p:nvSpPr>
+        <p:spPr/>
+        <p:txBody>
+          <a:bodyPr/>
+          <a:lstStyle/>
+          <a:p>
+            <a:r>
               <a:rPr lang="en-US" dirty="0" smtClean="0"/>
               <a:t>General Overview Unix</a:t>
             </a:r>
@@ -36074,211 +36306,6 @@
 </p:sld>
 </file>
 
-<file path=ppt/slides/slide33.xml><?xml version="1.0" encoding="utf-8"?>
-<p:sld xmlns:a="http://schemas.openxmlformats.org/drawingml/2006/main" xmlns:r="http://schemas.openxmlformats.org/officeDocument/2006/relationships" xmlns:p="http://schemas.openxmlformats.org/presentationml/2006/main">
-  <p:cSld>
-    <p:spTree>
-      <p:nvGrpSpPr>
-        <p:cNvPr id="1" name=""/>
-        <p:cNvGrpSpPr/>
-        <p:nvPr/>
-      </p:nvGrpSpPr>
-      <p:grpSpPr>
-        <a:xfrm>
-          <a:off x="0" y="0"/>
-          <a:ext cx="0" cy="0"/>
-          <a:chOff x="0" y="0"/>
-          <a:chExt cx="0" cy="0"/>
-        </a:xfrm>
-      </p:grpSpPr>
-      <p:sp>
-        <p:nvSpPr>
-          <p:cNvPr id="2" name="Title 1"/>
-          <p:cNvSpPr>
-            <a:spLocks noGrp="1"/>
-          </p:cNvSpPr>
-          <p:nvPr>
-            <p:ph type="title"/>
-          </p:nvPr>
-        </p:nvSpPr>
-        <p:spPr/>
-        <p:txBody>
-          <a:bodyPr/>
-          <a:lstStyle/>
-          <a:p>
-            <a:r>
-              <a:rPr lang="en-US" dirty="0" smtClean="0"/>
-              <a:t>Protection Linux</a:t>
-            </a:r>
-            <a:endParaRPr lang="en-US" dirty="0"/>
-          </a:p>
-        </p:txBody>
-      </p:sp>
-      <p:sp>
-        <p:nvSpPr>
-          <p:cNvPr id="3" name="Content Placeholder 2"/>
-          <p:cNvSpPr>
-            <a:spLocks noGrp="1"/>
-          </p:cNvSpPr>
-          <p:nvPr>
-            <p:ph idx="1"/>
-          </p:nvPr>
-        </p:nvSpPr>
-        <p:spPr/>
-        <p:txBody>
-          <a:bodyPr/>
-          <a:lstStyle/>
-          <a:p>
-            <a:r>
-              <a:rPr lang="en-US" dirty="0" smtClean="0"/>
-              <a:t>Turn off ASLR</a:t>
-            </a:r>
-          </a:p>
-          <a:p>
-            <a:pPr lvl="1"/>
-            <a:r>
-              <a:rPr lang="en-US" sz="1800" dirty="0" err="1" smtClean="0">
-                <a:latin typeface="Consolas" pitchFamily="49" charset="0"/>
-                <a:cs typeface="Consolas" pitchFamily="49" charset="0"/>
-              </a:rPr>
-              <a:t>sudo</a:t>
-            </a:r>
-            <a:r>
-              <a:rPr lang="en-US" sz="1800" dirty="0" smtClean="0">
-                <a:latin typeface="Consolas" pitchFamily="49" charset="0"/>
-                <a:cs typeface="Consolas" pitchFamily="49" charset="0"/>
-              </a:rPr>
-              <a:t> </a:t>
-            </a:r>
-            <a:r>
-              <a:rPr lang="en-US" sz="1800" dirty="0" err="1" smtClean="0">
-                <a:latin typeface="Consolas" pitchFamily="49" charset="0"/>
-                <a:cs typeface="Consolas" pitchFamily="49" charset="0"/>
-              </a:rPr>
-              <a:t>sh</a:t>
-            </a:r>
-            <a:r>
-              <a:rPr lang="en-US" sz="1800" dirty="0" smtClean="0">
-                <a:latin typeface="Consolas" pitchFamily="49" charset="0"/>
-                <a:cs typeface="Consolas" pitchFamily="49" charset="0"/>
-              </a:rPr>
-              <a:t> –c ‘echo 0 &gt; /</a:t>
-            </a:r>
-            <a:r>
-              <a:rPr lang="en-US" sz="1800" dirty="0" err="1" smtClean="0">
-                <a:latin typeface="Consolas" pitchFamily="49" charset="0"/>
-                <a:cs typeface="Consolas" pitchFamily="49" charset="0"/>
-              </a:rPr>
-              <a:t>proc</a:t>
-            </a:r>
-            <a:r>
-              <a:rPr lang="en-US" sz="1800" dirty="0" smtClean="0">
-                <a:latin typeface="Consolas" pitchFamily="49" charset="0"/>
-                <a:cs typeface="Consolas" pitchFamily="49" charset="0"/>
-              </a:rPr>
-              <a:t>/sys/kernel/</a:t>
-            </a:r>
-            <a:r>
-              <a:rPr lang="en-US" sz="1800" dirty="0" err="1" smtClean="0">
-                <a:latin typeface="Consolas" pitchFamily="49" charset="0"/>
-                <a:cs typeface="Consolas" pitchFamily="49" charset="0"/>
-              </a:rPr>
-              <a:t>randomize_va_space</a:t>
-            </a:r>
-            <a:r>
-              <a:rPr lang="en-US" sz="1800" dirty="0" smtClean="0">
-                <a:latin typeface="Consolas" pitchFamily="49" charset="0"/>
-                <a:cs typeface="Consolas" pitchFamily="49" charset="0"/>
-              </a:rPr>
-              <a:t>’</a:t>
-            </a:r>
-          </a:p>
-          <a:p>
-            <a:pPr lvl="1"/>
-            <a:r>
-              <a:rPr lang="en-US" sz="1800" dirty="0" smtClean="0">
-                <a:cs typeface="Consolas" pitchFamily="49" charset="0"/>
-              </a:rPr>
-              <a:t>Don’t randomize the address space in which programs execute</a:t>
-            </a:r>
-          </a:p>
-          <a:p>
-            <a:pPr lvl="1"/>
-            <a:endParaRPr lang="en-US" dirty="0"/>
-          </a:p>
-          <a:p>
-            <a:pPr lvl="1"/>
-            <a:endParaRPr lang="en-US" dirty="0" smtClean="0"/>
-          </a:p>
-          <a:p>
-            <a:r>
-              <a:rPr lang="en-US" dirty="0" err="1" smtClean="0"/>
-              <a:t>excecstack</a:t>
-            </a:r>
-            <a:r>
-              <a:rPr lang="en-US" dirty="0" smtClean="0"/>
-              <a:t> your binary</a:t>
-            </a:r>
-          </a:p>
-          <a:p>
-            <a:pPr lvl="1"/>
-            <a:r>
-              <a:rPr lang="en-US" dirty="0" smtClean="0"/>
-              <a:t>We couldn’t find a system-wide setting for turning off DEP on Linux</a:t>
-            </a:r>
-          </a:p>
-          <a:p>
-            <a:pPr lvl="1"/>
-            <a:r>
-              <a:rPr lang="en-US" dirty="0" smtClean="0"/>
-              <a:t>Workaround – </a:t>
-            </a:r>
-            <a:r>
-              <a:rPr lang="en-US" dirty="0" err="1" smtClean="0">
-                <a:latin typeface="Consolas" pitchFamily="49" charset="0"/>
-                <a:cs typeface="Consolas" pitchFamily="49" charset="0"/>
-              </a:rPr>
-              <a:t>execstack</a:t>
-            </a:r>
-            <a:r>
-              <a:rPr lang="en-US" dirty="0" smtClean="0">
-                <a:latin typeface="Consolas" pitchFamily="49" charset="0"/>
-                <a:cs typeface="Consolas" pitchFamily="49" charset="0"/>
-              </a:rPr>
-              <a:t> -s &lt;my binary&gt;</a:t>
-            </a:r>
-          </a:p>
-          <a:p>
-            <a:pPr lvl="1"/>
-            <a:r>
-              <a:rPr lang="en-US" dirty="0" smtClean="0">
-                <a:cs typeface="Consolas" pitchFamily="49" charset="0"/>
-              </a:rPr>
-              <a:t>Formally tells the OS that you’re a terrible programmer and you don’t care if code you didn’t write executes on your behalf</a:t>
-            </a:r>
-          </a:p>
-        </p:txBody>
-      </p:sp>
-    </p:spTree>
-    <p:extLst>
-      <p:ext uri="{BB962C8B-B14F-4D97-AF65-F5344CB8AC3E}">
-        <p14:creationId xmlns:p14="http://schemas.microsoft.com/office/powerpoint/2010/main" val="792965249"/>
-      </p:ext>
-    </p:extLst>
-  </p:cSld>
-  <p:clrMapOvr>
-    <a:masterClrMapping/>
-  </p:clrMapOvr>
-  <p:timing>
-    <p:tnLst>
-      <p:par>
-        <p:cTn id="1" dur="indefinite" restart="never" nodeType="tmRoot"/>
-      </p:par>
-    </p:tnLst>
-  </p:timing>
-</p:sld>
-</file>
-
 <file path=ppt/slides/slide34.xml><?xml version="1.0" encoding="utf-8"?>
 <p:sld xmlns:a="http://schemas.openxmlformats.org/drawingml/2006/main" xmlns:r="http://schemas.openxmlformats.org/officeDocument/2006/relationships" xmlns:p="http://schemas.openxmlformats.org/presentationml/2006/main">
   <p:cSld>
@@ -36313,7 +36340,7 @@
           <a:p>
             <a:r>
               <a:rPr lang="en-US" dirty="0" smtClean="0"/>
-              <a:t>Tools - Unix</a:t>
+              <a:t>Protection Linux</a:t>
             </a:r>
             <a:endParaRPr lang="en-US" dirty="0"/>
           </a:p>
@@ -36331,70 +36358,143 @@
         </p:nvSpPr>
         <p:spPr/>
         <p:txBody>
-          <a:bodyPr>
-            <a:normAutofit/>
-          </a:bodyPr>
+          <a:bodyPr/>
           <a:lstStyle/>
           <a:p>
             <a:r>
+              <a:rPr lang="en-US" dirty="0" smtClean="0"/>
+              <a:t>Turn off ASLR</a:t>
+            </a:r>
+          </a:p>
+          <a:p>
+            <a:pPr lvl="1"/>
+            <a:r>
+              <a:rPr lang="en-US" sz="1800" dirty="0" err="1" smtClean="0">
+                <a:latin typeface="Consolas" pitchFamily="49" charset="0"/>
+                <a:cs typeface="Consolas" pitchFamily="49" charset="0"/>
+              </a:rPr>
+              <a:t>sudo</a:t>
+            </a:r>
+            <a:r>
+              <a:rPr lang="en-US" sz="1800" dirty="0" smtClean="0">
+                <a:latin typeface="Consolas" pitchFamily="49" charset="0"/>
+                <a:cs typeface="Consolas" pitchFamily="49" charset="0"/>
+              </a:rPr>
+              <a:t> </a:t>
+            </a:r>
+            <a:r>
+              <a:rPr lang="en-US" sz="1800" dirty="0" err="1" smtClean="0">
+                <a:latin typeface="Consolas" pitchFamily="49" charset="0"/>
+                <a:cs typeface="Consolas" pitchFamily="49" charset="0"/>
+              </a:rPr>
+              <a:t>sh</a:t>
+            </a:r>
+            <a:r>
+              <a:rPr lang="en-US" sz="1800" dirty="0" smtClean="0">
+                <a:latin typeface="Consolas" pitchFamily="49" charset="0"/>
+                <a:cs typeface="Consolas" pitchFamily="49" charset="0"/>
+              </a:rPr>
+              <a:t> –c ‘echo 0 &gt; /</a:t>
+            </a:r>
+            <a:r>
+              <a:rPr lang="en-US" sz="1800" dirty="0" err="1" smtClean="0">
+                <a:latin typeface="Consolas" pitchFamily="49" charset="0"/>
+                <a:cs typeface="Consolas" pitchFamily="49" charset="0"/>
+              </a:rPr>
+              <a:t>proc</a:t>
+            </a:r>
+            <a:r>
+              <a:rPr lang="en-US" sz="1800" dirty="0" smtClean="0">
+                <a:latin typeface="Consolas" pitchFamily="49" charset="0"/>
+                <a:cs typeface="Consolas" pitchFamily="49" charset="0"/>
+              </a:rPr>
+              <a:t>/sys/kernel/</a:t>
+            </a:r>
+            <a:r>
+              <a:rPr lang="en-US" sz="1800" dirty="0" err="1" smtClean="0">
+                <a:latin typeface="Consolas" pitchFamily="49" charset="0"/>
+                <a:cs typeface="Consolas" pitchFamily="49" charset="0"/>
+              </a:rPr>
+              <a:t>randomize_va_space</a:t>
+            </a:r>
+            <a:r>
+              <a:rPr lang="en-US" sz="1800" dirty="0" smtClean="0">
+                <a:latin typeface="Consolas" pitchFamily="49" charset="0"/>
+                <a:cs typeface="Consolas" pitchFamily="49" charset="0"/>
+              </a:rPr>
+              <a:t>’</a:t>
+            </a:r>
+          </a:p>
+          <a:p>
+            <a:pPr lvl="1"/>
+            <a:r>
+              <a:rPr lang="en-US" sz="1800" dirty="0" smtClean="0">
+                <a:cs typeface="Consolas" pitchFamily="49" charset="0"/>
+              </a:rPr>
+              <a:t>Don’t randomize the address space in which programs execute</a:t>
+            </a:r>
+          </a:p>
+          <a:p>
+            <a:pPr lvl="1"/>
+            <a:endParaRPr lang="en-US" dirty="0"/>
+          </a:p>
+          <a:p>
+            <a:pPr lvl="1"/>
+            <a:endParaRPr lang="en-US" dirty="0" smtClean="0"/>
+          </a:p>
+          <a:p>
+            <a:r>
+              <a:rPr lang="en-US" dirty="0" err="1" smtClean="0"/>
+              <a:t>excecstack</a:t>
+            </a:r>
+            <a:r>
+              <a:rPr lang="en-US" dirty="0" smtClean="0"/>
+              <a:t> your binary</a:t>
+            </a:r>
+          </a:p>
+          <a:p>
+            <a:pPr lvl="1"/>
+            <a:r>
+              <a:rPr lang="en-US" dirty="0" smtClean="0"/>
+              <a:t>We couldn’t find a system-wide setting for turning off DEP on Linux</a:t>
+            </a:r>
+          </a:p>
+          <a:p>
+            <a:pPr lvl="1"/>
+            <a:r>
+              <a:rPr lang="en-US" dirty="0" smtClean="0"/>
+              <a:t>Workaround – </a:t>
+            </a:r>
+            <a:r>
+              <a:rPr lang="en-US" dirty="0" err="1" smtClean="0">
+                <a:latin typeface="Consolas" pitchFamily="49" charset="0"/>
+                <a:cs typeface="Consolas" pitchFamily="49" charset="0"/>
+              </a:rPr>
+              <a:t>execstack</a:t>
+            </a:r>
+            <a:r>
               <a:rPr lang="en-US" dirty="0" smtClean="0">
-                <a:hlinkClick r:id="rId2"/>
-              </a:rPr>
-              <a:t>GCC</a:t>
-            </a:r>
-            <a:endParaRPr lang="en-US" dirty="0" smtClean="0"/>
-          </a:p>
-          <a:p>
+                <a:latin typeface="Consolas" pitchFamily="49" charset="0"/>
+                <a:cs typeface="Consolas" pitchFamily="49" charset="0"/>
+              </a:rPr>
+              <a:t> -s &lt;my binary&gt;</a:t>
+            </a:r>
+          </a:p>
+          <a:p>
+            <a:pPr lvl="1"/>
             <a:r>
               <a:rPr lang="en-US" dirty="0" smtClean="0">
-                <a:hlinkClick r:id="rId3"/>
-              </a:rPr>
-              <a:t>GDB</a:t>
-            </a:r>
-            <a:endParaRPr lang="en-US" dirty="0" smtClean="0"/>
-          </a:p>
-          <a:p>
-            <a:endParaRPr lang="en-US" dirty="0" smtClean="0"/>
-          </a:p>
-          <a:p>
-            <a:endParaRPr lang="en-US" dirty="0" smtClean="0"/>
-          </a:p>
-          <a:p>
-            <a:r>
-              <a:rPr lang="en-US" dirty="0" smtClean="0"/>
-              <a:t>Additional Tools</a:t>
-            </a:r>
-          </a:p>
-          <a:p>
-            <a:pPr lvl="1"/>
-            <a:r>
-              <a:rPr lang="en-US" dirty="0" err="1" smtClean="0"/>
-              <a:t>objdump</a:t>
-            </a:r>
-            <a:endParaRPr lang="en-US" dirty="0"/>
-          </a:p>
-          <a:p>
-            <a:pPr lvl="1"/>
-            <a:r>
-              <a:rPr lang="en-US" dirty="0" err="1" smtClean="0"/>
-              <a:t>nasm</a:t>
-            </a:r>
-            <a:endParaRPr lang="en-US" dirty="0" smtClean="0"/>
-          </a:p>
-          <a:p>
-            <a:pPr lvl="1"/>
-            <a:r>
-              <a:rPr lang="en-US" dirty="0" err="1" smtClean="0"/>
-              <a:t>execstack</a:t>
-            </a:r>
-            <a:endParaRPr lang="en-US" dirty="0" smtClean="0"/>
+                <a:cs typeface="Consolas" pitchFamily="49" charset="0"/>
+              </a:rPr>
+              <a:t>Formally tells the OS that you’re a terrible programmer and you don’t care if code you didn’t write executes on your behalf</a:t>
+            </a:r>
           </a:p>
         </p:txBody>
       </p:sp>
     </p:spTree>
     <p:extLst>
       <p:ext uri="{BB962C8B-B14F-4D97-AF65-F5344CB8AC3E}">
-        <p14:creationId xmlns:p14="http://schemas.microsoft.com/office/powerpoint/2010/main" val="2226267564"/>
+        <p14:creationId xmlns:p14="http://schemas.microsoft.com/office/powerpoint/2010/main" val="792965249"/>
       </p:ext>
     </p:extLst>
   </p:cSld>
@@ -36440,14 +36540,12 @@
         </p:nvSpPr>
         <p:spPr/>
         <p:txBody>
-          <a:bodyPr>
-            <a:normAutofit/>
-          </a:bodyPr>
+          <a:bodyPr/>
           <a:lstStyle/>
           <a:p>
             <a:r>
               <a:rPr lang="en-US" dirty="0" smtClean="0"/>
-              <a:t>GCC &amp; GDB</a:t>
+              <a:t>Tools - Unix</a:t>
             </a:r>
             <a:endParaRPr lang="en-US" dirty="0"/>
           </a:p>
@@ -36465,16 +36563,53 @@
         </p:nvSpPr>
         <p:spPr/>
         <p:txBody>
-          <a:bodyPr/>
+          <a:bodyPr>
+            <a:normAutofit/>
+          </a:bodyPr>
           <a:lstStyle/>
           <a:p>
             <a:r>
+              <a:rPr lang="en-US" dirty="0" smtClean="0">
+                <a:hlinkClick r:id="rId2"/>
+              </a:rPr>
+              <a:t>GCC</a:t>
+            </a:r>
+            <a:endParaRPr lang="en-US" dirty="0" smtClean="0"/>
+          </a:p>
+          <a:p>
+            <a:r>
+              <a:rPr lang="en-US" dirty="0" smtClean="0">
+                <a:hlinkClick r:id="rId3"/>
+              </a:rPr>
+              <a:t>GDB</a:t>
+            </a:r>
+            <a:endParaRPr lang="en-US" dirty="0" smtClean="0"/>
+          </a:p>
+          <a:p>
+            <a:endParaRPr lang="en-US" dirty="0" smtClean="0"/>
+          </a:p>
+          <a:p>
+            <a:endParaRPr lang="en-US" dirty="0" smtClean="0"/>
+          </a:p>
+          <a:p>
+            <a:r>
               <a:rPr lang="en-US" dirty="0" smtClean="0"/>
-              <a:t>Making your program </a:t>
-            </a:r>
+              <a:t>Additional Tools</a:t>
+            </a:r>
+          </a:p>
+          <a:p>
+            <a:pPr lvl="1"/>
             <a:r>
               <a:rPr lang="en-US" dirty="0" err="1" smtClean="0"/>
-              <a:t>debuggable</a:t>
+              <a:t>objdump</a:t>
+            </a:r>
+            <a:endParaRPr lang="en-US" dirty="0"/>
+          </a:p>
+          <a:p>
+            <a:pPr lvl="1"/>
+            <a:r>
+              <a:rPr lang="en-US" dirty="0" err="1" smtClean="0"/>
+              <a:t>nasm</a:t>
             </a:r>
             <a:endParaRPr lang="en-US" dirty="0" smtClean="0"/>
           </a:p>
@@ -36482,228 +36617,16 @@
             <a:pPr lvl="1"/>
             <a:r>
               <a:rPr lang="en-US" dirty="0" err="1" smtClean="0"/>
-              <a:t>gcc</a:t>
-            </a:r>
-            <a:r>
-              <a:rPr lang="en-US" dirty="0" smtClean="0"/>
-              <a:t> </a:t>
-            </a:r>
-            <a:r>
-              <a:rPr lang="en-US" b="1" dirty="0" smtClean="0">
-                <a:solidFill>
-                  <a:srgbClr val="FF0000"/>
-                </a:solidFill>
-              </a:rPr>
-              <a:t>-g  </a:t>
-            </a:r>
-            <a:r>
-              <a:rPr lang="en-US" dirty="0" smtClean="0">
-                <a:solidFill>
-                  <a:schemeClr val="accent2">
-                    <a:lumMod val="50000"/>
-                  </a:schemeClr>
-                </a:solidFill>
-              </a:rPr>
-              <a:t>-o  </a:t>
-            </a:r>
-            <a:r>
-              <a:rPr lang="en-US" dirty="0" err="1" smtClean="0">
-                <a:solidFill>
-                  <a:schemeClr val="accent2">
-                    <a:lumMod val="50000"/>
-                  </a:schemeClr>
-                </a:solidFill>
-              </a:rPr>
-              <a:t>my_program</a:t>
-            </a:r>
-            <a:r>
-              <a:rPr lang="en-US" dirty="0" smtClean="0">
-                <a:solidFill>
-                  <a:schemeClr val="accent2">
-                    <a:lumMod val="50000"/>
-                  </a:schemeClr>
-                </a:solidFill>
-              </a:rPr>
-              <a:t> </a:t>
-            </a:r>
-            <a:r>
-              <a:rPr lang="en-US" dirty="0" err="1" smtClean="0">
-                <a:solidFill>
-                  <a:schemeClr val="accent2">
-                    <a:lumMod val="50000"/>
-                  </a:schemeClr>
-                </a:solidFill>
-              </a:rPr>
-              <a:t>my_program.c</a:t>
-            </a:r>
-            <a:endParaRPr lang="en-US" dirty="0" smtClean="0">
-              <a:solidFill>
-                <a:schemeClr val="accent2">
-                  <a:lumMod val="50000"/>
-                </a:schemeClr>
-              </a:solidFill>
-            </a:endParaRPr>
-          </a:p>
-          <a:p>
-            <a:endParaRPr lang="en-US" dirty="0">
-              <a:solidFill>
-                <a:schemeClr val="accent2">
-                  <a:lumMod val="50000"/>
-                </a:schemeClr>
-              </a:solidFill>
-            </a:endParaRPr>
-          </a:p>
-          <a:p>
-            <a:r>
-              <a:rPr lang="en-US" dirty="0" smtClean="0">
-                <a:solidFill>
-                  <a:schemeClr val="accent2">
-                    <a:lumMod val="50000"/>
-                  </a:schemeClr>
-                </a:solidFill>
-              </a:rPr>
-              <a:t>Debugging for overflows</a:t>
-            </a:r>
-          </a:p>
-          <a:p>
-            <a:pPr lvl="1"/>
-            <a:r>
-              <a:rPr lang="en-US" dirty="0" smtClean="0">
-                <a:solidFill>
-                  <a:schemeClr val="accent2">
-                    <a:lumMod val="50000"/>
-                  </a:schemeClr>
-                </a:solidFill>
-              </a:rPr>
-              <a:t>break &lt;symbol&gt;</a:t>
-            </a:r>
-          </a:p>
-          <a:p>
-            <a:pPr lvl="2"/>
-            <a:r>
-              <a:rPr lang="en-US" dirty="0" smtClean="0">
-                <a:solidFill>
-                  <a:schemeClr val="accent2">
-                    <a:lumMod val="50000"/>
-                  </a:schemeClr>
-                </a:solidFill>
-              </a:rPr>
-              <a:t>Symbols include line number, function name, assembler label</a:t>
-            </a:r>
-          </a:p>
-          <a:p>
-            <a:pPr lvl="2"/>
-            <a:r>
-              <a:rPr lang="en-US" dirty="0">
-                <a:solidFill>
-                  <a:schemeClr val="accent2">
-                    <a:lumMod val="50000"/>
-                  </a:schemeClr>
-                </a:solidFill>
-              </a:rPr>
-              <a:t>C</a:t>
-            </a:r>
-            <a:r>
-              <a:rPr lang="en-US" dirty="0" smtClean="0">
-                <a:solidFill>
-                  <a:schemeClr val="accent2">
-                    <a:lumMod val="50000"/>
-                  </a:schemeClr>
-                </a:solidFill>
-              </a:rPr>
-              <a:t>ommand also mapped to character ‘b’</a:t>
-            </a:r>
-          </a:p>
-          <a:p>
-            <a:pPr lvl="2"/>
-            <a:endParaRPr lang="en-US" dirty="0">
-              <a:solidFill>
-                <a:schemeClr val="accent2">
-                  <a:lumMod val="50000"/>
-                </a:schemeClr>
-              </a:solidFill>
-            </a:endParaRPr>
-          </a:p>
-          <a:p>
-            <a:pPr lvl="2"/>
-            <a:endParaRPr lang="en-US" dirty="0" smtClean="0">
-              <a:solidFill>
-                <a:schemeClr val="accent2">
-                  <a:lumMod val="50000"/>
-                </a:schemeClr>
-              </a:solidFill>
-            </a:endParaRPr>
+              <a:t>execstack</a:t>
+            </a:r>
+            <a:endParaRPr lang="en-US" dirty="0" smtClean="0"/>
           </a:p>
         </p:txBody>
       </p:sp>
-      <p:pic>
-        <p:nvPicPr>
-          <p:cNvPr id="1026" name="Picture 2"/>
-          <p:cNvPicPr>
-            <a:picLocks noChangeAspect="1" noChangeArrowheads="1"/>
-          </p:cNvPicPr>
-          <p:nvPr/>
-        </p:nvPicPr>
-        <p:blipFill>
-          <a:blip r:embed="rId2">
-            <a:extLst>
-              <a:ext uri="{28A0092B-C50C-407E-A947-70E740481C1C}">
-                <a14:useLocalDpi xmlns:a14="http://schemas.microsoft.com/office/drawing/2010/main" val="0"/>
-              </a:ext>
-            </a:extLst>
-          </a:blip>
-          <a:srcRect/>
-          <a:stretch>
-            <a:fillRect/>
-          </a:stretch>
-        </p:blipFill>
-        <p:spPr bwMode="auto">
-          <a:xfrm>
-            <a:off x="817554" y="4343400"/>
-            <a:ext cx="7508893" cy="2362200"/>
-          </a:xfrm>
-          <a:prstGeom prst="rect">
-            <a:avLst/>
-          </a:prstGeom>
-          <a:noFill/>
-          <a:ln>
-            <a:noFill/>
-          </a:ln>
-          <a:effectLst/>
-          <a:extLst>
-            <a:ext uri="{909E8E84-426E-40DD-AFC4-6F175D3DCCD1}">
-              <a14:hiddenFill xmlns:a14="http://schemas.microsoft.com/office/drawing/2010/main">
-                <a:solidFill>
-                  <a:schemeClr val="accent1"/>
-                </a:solidFill>
-              </a14:hiddenFill>
-            </a:ext>
-            <a:ext uri="{91240B29-F687-4F45-9708-019B960494DF}">
-              <a14:hiddenLine xmlns:a14="http://schemas.microsoft.com/office/drawing/2010/main" w="9525">
-                <a:solidFill>
-                  <a:schemeClr val="tx1"/>
-                </a:solidFill>
-                <a:miter lim="800000"/>
-                <a:headEnd/>
-                <a:tailEnd/>
-              </a14:hiddenLine>
-            </a:ext>
-            <a:ext uri="{AF507438-7753-43E0-B8FC-AC1667EBCBE1}">
-              <a14:hiddenEffects xmlns:a14="http://schemas.microsoft.com/office/drawing/2010/main">
-                <a:effectLst>
-                  <a:outerShdw dist="35921" dir="2700000" algn="ctr" rotWithShape="0">
-                    <a:schemeClr val="bg2"/>
-                  </a:outerShdw>
-                </a:effectLst>
-              </a14:hiddenEffects>
-            </a:ext>
-          </a:extLst>
-        </p:spPr>
-      </p:pic>
     </p:spTree>
     <p:extLst>
       <p:ext uri="{BB962C8B-B14F-4D97-AF65-F5344CB8AC3E}">
-        <p14:creationId xmlns:p14="http://schemas.microsoft.com/office/powerpoint/2010/main" val="889830066"/>
+        <p14:creationId xmlns:p14="http://schemas.microsoft.com/office/powerpoint/2010/main" val="2226267564"/>
       </p:ext>
     </p:extLst>
   </p:cSld>
@@ -36884,34 +36807,34 @@
                   </a:schemeClr>
                 </a:solidFill>
               </a:rPr>
-              <a:t>info frame</a:t>
+              <a:t>break &lt;symbol&gt;</a:t>
             </a:r>
           </a:p>
           <a:p>
             <a:pPr lvl="2"/>
             <a:r>
-              <a:rPr lang="en-US" dirty="0">
+              <a:rPr lang="en-US" dirty="0" smtClean="0">
                 <a:solidFill>
                   <a:schemeClr val="accent2">
                     <a:lumMod val="50000"/>
                   </a:schemeClr>
                 </a:solidFill>
               </a:rPr>
-              <a:t>P</a:t>
-            </a:r>
-            <a:r>
-              <a:rPr lang="en-US" dirty="0" smtClean="0">
+              <a:t>Symbols include line number, function name, assembler label</a:t>
+            </a:r>
+          </a:p>
+          <a:p>
+            <a:pPr lvl="2"/>
+            <a:r>
+              <a:rPr lang="en-US" dirty="0">
                 <a:solidFill>
                   <a:schemeClr val="accent2">
                     <a:lumMod val="50000"/>
                   </a:schemeClr>
                 </a:solidFill>
               </a:rPr>
-              <a:t>rints everything the debugger knows about the current stack frame</a:t>
-            </a:r>
-          </a:p>
-          <a:p>
-            <a:pPr lvl="2"/>
+              <a:t>C</a:t>
+            </a:r>
             <a:r>
               <a:rPr lang="en-US" dirty="0" smtClean="0">
                 <a:solidFill>
@@ -36920,8 +36843,11 @@
                   </a:schemeClr>
                 </a:solidFill>
               </a:rPr>
-              <a:t>Program needs to be executing</a:t>
-            </a:r>
+              <a:t>ommand also mapped to character ‘b’</a:t>
+            </a:r>
+          </a:p>
+          <a:p>
+            <a:pPr lvl="2"/>
             <a:endParaRPr lang="en-US" dirty="0">
               <a:solidFill>
                 <a:schemeClr val="accent2">
@@ -36944,7 +36870,7 @@
       </p:sp>
       <p:pic>
         <p:nvPicPr>
-          <p:cNvPr id="2050" name="Picture 2"/>
+          <p:cNvPr id="1026" name="Picture 2"/>
           <p:cNvPicPr>
             <a:picLocks noChangeAspect="1" noChangeArrowheads="1"/>
           </p:cNvPicPr>
@@ -36965,8 +36891,8 @@
         </p:blipFill>
         <p:spPr bwMode="auto">
           <a:xfrm>
-            <a:off x="532776" y="4419600"/>
-            <a:ext cx="8078449" cy="2209800"/>
+            <a:off x="817554" y="4343400"/>
+            <a:ext cx="7508893" cy="2362200"/>
           </a:xfrm>
           <a:prstGeom prst="rect">
             <a:avLst/>
@@ -37009,7 +36935,7 @@
     </p:spTree>
     <p:extLst>
       <p:ext uri="{BB962C8B-B14F-4D97-AF65-F5344CB8AC3E}">
-        <p14:creationId xmlns:p14="http://schemas.microsoft.com/office/powerpoint/2010/main" val="2616460768"/>
+        <p14:creationId xmlns:p14="http://schemas.microsoft.com/office/powerpoint/2010/main" val="889830066"/>
       </p:ext>
     </p:extLst>
   </p:cSld>
@@ -37179,6 +37105,55 @@
               </a:rPr>
               <a:t>Debugging for overflows</a:t>
             </a:r>
+          </a:p>
+          <a:p>
+            <a:pPr lvl="1"/>
+            <a:r>
+              <a:rPr lang="en-US" dirty="0" smtClean="0">
+                <a:solidFill>
+                  <a:schemeClr val="accent2">
+                    <a:lumMod val="50000"/>
+                  </a:schemeClr>
+                </a:solidFill>
+              </a:rPr>
+              <a:t>info frame</a:t>
+            </a:r>
+          </a:p>
+          <a:p>
+            <a:pPr lvl="2"/>
+            <a:r>
+              <a:rPr lang="en-US" dirty="0">
+                <a:solidFill>
+                  <a:schemeClr val="accent2">
+                    <a:lumMod val="50000"/>
+                  </a:schemeClr>
+                </a:solidFill>
+              </a:rPr>
+              <a:t>P</a:t>
+            </a:r>
+            <a:r>
+              <a:rPr lang="en-US" dirty="0" smtClean="0">
+                <a:solidFill>
+                  <a:schemeClr val="accent2">
+                    <a:lumMod val="50000"/>
+                  </a:schemeClr>
+                </a:solidFill>
+              </a:rPr>
+              <a:t>rints everything the debugger knows about the current stack frame</a:t>
+            </a:r>
+          </a:p>
+          <a:p>
+            <a:pPr lvl="2"/>
+            <a:r>
+              <a:rPr lang="en-US" dirty="0" smtClean="0">
+                <a:solidFill>
+                  <a:schemeClr val="accent2">
+                    <a:lumMod val="50000"/>
+                  </a:schemeClr>
+                </a:solidFill>
+              </a:rPr>
+              <a:t>Program needs to be executing</a:t>
+            </a:r>
             <a:endParaRPr lang="en-US" dirty="0">
               <a:solidFill>
                 <a:schemeClr val="accent2">
@@ -37186,55 +37161,6 @@
                 </a:schemeClr>
               </a:solidFill>
             </a:endParaRPr>
-          </a:p>
-          <a:p>
-            <a:pPr lvl="1"/>
-            <a:r>
-              <a:rPr lang="en-US" dirty="0" smtClean="0">
-                <a:solidFill>
-                  <a:schemeClr val="accent2">
-                    <a:lumMod val="50000"/>
-                  </a:schemeClr>
-                </a:solidFill>
-              </a:rPr>
-              <a:t>print, x/x</a:t>
-            </a:r>
-          </a:p>
-          <a:p>
-            <a:pPr lvl="2"/>
-            <a:r>
-              <a:rPr lang="en-US" dirty="0">
-                <a:solidFill>
-                  <a:schemeClr val="accent2">
-                    <a:lumMod val="50000"/>
-                  </a:schemeClr>
-                </a:solidFill>
-              </a:rPr>
-              <a:t>P</a:t>
-            </a:r>
-            <a:r>
-              <a:rPr lang="en-US" dirty="0" smtClean="0">
-                <a:solidFill>
-                  <a:schemeClr val="accent2">
-                    <a:lumMod val="50000"/>
-                  </a:schemeClr>
-                </a:solidFill>
-              </a:rPr>
-              <a:t>rint the value of any symbol</a:t>
-            </a:r>
-          </a:p>
-          <a:p>
-            <a:pPr lvl="2"/>
-            <a:r>
-              <a:rPr lang="en-US" dirty="0" smtClean="0">
-                <a:solidFill>
-                  <a:schemeClr val="accent2">
-                    <a:lumMod val="50000"/>
-                  </a:schemeClr>
-                </a:solidFill>
-              </a:rPr>
-              <a:t>Incredibly powerful with options</a:t>
-            </a:r>
           </a:p>
           <a:p>
             <a:pPr lvl="2"/>
@@ -37250,7 +37176,7 @@
       </p:sp>
       <p:pic>
         <p:nvPicPr>
-          <p:cNvPr id="3074" name="Picture 2"/>
+          <p:cNvPr id="2050" name="Picture 2"/>
           <p:cNvPicPr>
             <a:picLocks noChangeAspect="1" noChangeArrowheads="1"/>
           </p:cNvPicPr>
@@ -37271,8 +37197,8 @@
         </p:blipFill>
         <p:spPr bwMode="auto">
           <a:xfrm>
-            <a:off x="885236" y="4343400"/>
-            <a:ext cx="7373529" cy="2390775"/>
+            <a:off x="532776" y="4419600"/>
+            <a:ext cx="8078449" cy="2209800"/>
           </a:xfrm>
           <a:prstGeom prst="rect">
             <a:avLst/>
@@ -37315,7 +37241,7 @@
     </p:spTree>
     <p:extLst>
       <p:ext uri="{BB962C8B-B14F-4D97-AF65-F5344CB8AC3E}">
-        <p14:creationId xmlns:p14="http://schemas.microsoft.com/office/powerpoint/2010/main" val="3352572252"/>
+        <p14:creationId xmlns:p14="http://schemas.microsoft.com/office/powerpoint/2010/main" val="2616460768"/>
       </p:ext>
     </p:extLst>
   </p:cSld>
@@ -37390,6 +37316,34 @@
           <a:lstStyle/>
           <a:p>
             <a:r>
+              <a:rPr lang="en-US" dirty="0" smtClean="0"/>
+              <a:t>Making your program </a:t>
+            </a:r>
+            <a:r>
+              <a:rPr lang="en-US" dirty="0" err="1" smtClean="0"/>
+              <a:t>debuggable</a:t>
+            </a:r>
+            <a:endParaRPr lang="en-US" dirty="0" smtClean="0"/>
+          </a:p>
+          <a:p>
+            <a:pPr lvl="1"/>
+            <a:r>
+              <a:rPr lang="en-US" dirty="0" err="1" smtClean="0"/>
+              <a:t>gcc</a:t>
+            </a:r>
+            <a:r>
+              <a:rPr lang="en-US" dirty="0" smtClean="0"/>
+              <a:t> </a:t>
+            </a:r>
+            <a:r>
+              <a:rPr lang="en-US" b="1" dirty="0" smtClean="0">
+                <a:solidFill>
+                  <a:srgbClr val="FF0000"/>
+                </a:solidFill>
+              </a:rPr>
+              <a:t>-g  </a:t>
+            </a:r>
+            <a:r>
               <a:rPr lang="en-US" dirty="0" smtClean="0">
                 <a:solidFill>
                   <a:schemeClr val="accent2">
@@ -37397,8 +37351,47 @@
                   </a:schemeClr>
                 </a:solidFill>
               </a:rPr>
-              <a:t>Debugging for overflows</a:t>
-            </a:r>
+              <a:t>-o  </a:t>
+            </a:r>
+            <a:r>
+              <a:rPr lang="en-US" dirty="0" err="1" smtClean="0">
+                <a:solidFill>
+                  <a:schemeClr val="accent2">
+                    <a:lumMod val="50000"/>
+                  </a:schemeClr>
+                </a:solidFill>
+              </a:rPr>
+              <a:t>my_program</a:t>
+            </a:r>
+            <a:r>
+              <a:rPr lang="en-US" dirty="0" smtClean="0">
+                <a:solidFill>
+                  <a:schemeClr val="accent2">
+                    <a:lumMod val="50000"/>
+                  </a:schemeClr>
+                </a:solidFill>
+              </a:rPr>
+              <a:t> </a:t>
+            </a:r>
+            <a:r>
+              <a:rPr lang="en-US" dirty="0" err="1" smtClean="0">
+                <a:solidFill>
+                  <a:schemeClr val="accent2">
+                    <a:lumMod val="50000"/>
+                  </a:schemeClr>
+                </a:solidFill>
+              </a:rPr>
+              <a:t>my_program.c</a:t>
+            </a:r>
+            <a:endParaRPr lang="en-US" dirty="0" smtClean="0">
+              <a:solidFill>
+                <a:schemeClr val="accent2">
+                  <a:lumMod val="50000"/>
+                </a:schemeClr>
+              </a:solidFill>
+            </a:endParaRPr>
+          </a:p>
+          <a:p>
             <a:endParaRPr lang="en-US" dirty="0">
               <a:solidFill>
                 <a:schemeClr val="accent2">
@@ -37408,7 +37401,6 @@
             </a:endParaRPr>
           </a:p>
           <a:p>
-            <a:pPr lvl="1"/>
             <a:r>
               <a:rPr lang="en-US" dirty="0" smtClean="0">
                 <a:solidFill>
@@ -37417,30 +37409,63 @@
                   </a:schemeClr>
                 </a:solidFill>
               </a:rPr>
-              <a:t>disassemble &lt;symbol&gt;</a:t>
-            </a:r>
-          </a:p>
-          <a:p>
-            <a:pPr lvl="2"/>
-            <a:r>
-              <a:rPr lang="en-US" dirty="0">
+              <a:t>Debugging for overflows</a:t>
+            </a:r>
+            <a:endParaRPr lang="en-US" dirty="0">
+              <a:solidFill>
+                <a:schemeClr val="accent2">
+                  <a:lumMod val="50000"/>
+                </a:schemeClr>
+              </a:solidFill>
+            </a:endParaRPr>
+          </a:p>
+          <a:p>
+            <a:pPr lvl="1"/>
+            <a:r>
+              <a:rPr lang="en-US" dirty="0" smtClean="0">
                 <a:solidFill>
                   <a:schemeClr val="accent2">
                     <a:lumMod val="50000"/>
                   </a:schemeClr>
                 </a:solidFill>
               </a:rPr>
-              <a:t>D</a:t>
-            </a:r>
-            <a:r>
-              <a:rPr lang="en-US" dirty="0" smtClean="0">
+              <a:t>print, x/x</a:t>
+            </a:r>
+          </a:p>
+          <a:p>
+            <a:pPr lvl="2"/>
+            <a:r>
+              <a:rPr lang="en-US" dirty="0">
                 <a:solidFill>
                   <a:schemeClr val="accent2">
                     <a:lumMod val="50000"/>
                   </a:schemeClr>
                 </a:solidFill>
               </a:rPr>
-              <a:t>umps the disassembly for a symbol</a:t>
+              <a:t>P</a:t>
+            </a:r>
+            <a:r>
+              <a:rPr lang="en-US" dirty="0" smtClean="0">
+                <a:solidFill>
+                  <a:schemeClr val="accent2">
+                    <a:lumMod val="50000"/>
+                  </a:schemeClr>
+                </a:solidFill>
+              </a:rPr>
+              <a:t>rint the value of any symbol</a:t>
+            </a:r>
+          </a:p>
+          <a:p>
+            <a:pPr lvl="2"/>
+            <a:r>
+              <a:rPr lang="en-US" dirty="0" smtClean="0">
+                <a:solidFill>
+                  <a:schemeClr val="accent2">
+                    <a:lumMod val="50000"/>
+                  </a:schemeClr>
+                </a:solidFill>
+              </a:rPr>
+              <a:t>Incredibly powerful with options</a:t>
             </a:r>
           </a:p>
           <a:p>
@@ -37457,7 +37482,7 @@
       </p:sp>
       <p:pic>
         <p:nvPicPr>
-          <p:cNvPr id="1026" name="Picture 2"/>
+          <p:cNvPr id="3074" name="Picture 2"/>
           <p:cNvPicPr>
             <a:picLocks noChangeAspect="1" noChangeArrowheads="1"/>
           </p:cNvPicPr>
@@ -37478,8 +37503,8 @@
         </p:blipFill>
         <p:spPr bwMode="auto">
           <a:xfrm>
-            <a:off x="1165736" y="2724150"/>
-            <a:ext cx="6812529" cy="4095750"/>
+            <a:off x="885236" y="4343400"/>
+            <a:ext cx="7373529" cy="2390775"/>
           </a:xfrm>
           <a:prstGeom prst="rect">
             <a:avLst/>
@@ -37522,7 +37547,7 @@
     </p:spTree>
     <p:extLst>
       <p:ext uri="{BB962C8B-B14F-4D97-AF65-F5344CB8AC3E}">
-        <p14:creationId xmlns:p14="http://schemas.microsoft.com/office/powerpoint/2010/main" val="778398437"/>
+        <p14:creationId xmlns:p14="http://schemas.microsoft.com/office/powerpoint/2010/main" val="3352572252"/>
       </p:ext>
     </p:extLst>
   </p:cSld>
@@ -37568,12 +37593,14 @@
         </p:nvSpPr>
         <p:spPr/>
         <p:txBody>
-          <a:bodyPr/>
+          <a:bodyPr>
+            <a:normAutofit/>
+          </a:bodyPr>
           <a:lstStyle/>
           <a:p>
             <a:r>
-              <a:rPr lang="en-US" dirty="0" err="1" smtClean="0"/>
-              <a:t>Shellcoding</a:t>
+              <a:rPr lang="en-US" dirty="0" smtClean="0"/>
+              <a:t>GCC &amp; GDB</a:t>
             </a:r>
             <a:endParaRPr lang="en-US" dirty="0"/>
           </a:p>
@@ -37591,86 +37618,143 @@
         </p:nvSpPr>
         <p:spPr/>
         <p:txBody>
-          <a:bodyPr>
-            <a:normAutofit/>
-          </a:bodyPr>
+          <a:bodyPr/>
           <a:lstStyle/>
           <a:p>
             <a:r>
-              <a:rPr lang="en-US" dirty="0" smtClean="0"/>
-              <a:t>Find a solid assembly base (unless you want to write it all yourself…)</a:t>
-            </a:r>
-          </a:p>
-          <a:p>
-            <a:r>
-              <a:rPr lang="en-US" dirty="0" smtClean="0"/>
-              <a:t>Find your system call memory addresses with </a:t>
-            </a:r>
-            <a:r>
-              <a:rPr lang="en-US" dirty="0" err="1" smtClean="0"/>
-              <a:t>arwin</a:t>
-            </a:r>
-            <a:endParaRPr lang="en-US" dirty="0" smtClean="0"/>
-          </a:p>
-          <a:p>
-            <a:r>
-              <a:rPr lang="en-US" dirty="0" smtClean="0"/>
-              <a:t>Decide what you want to do</a:t>
-            </a:r>
-          </a:p>
-          <a:p>
-            <a:r>
-              <a:rPr lang="en-US" dirty="0" err="1" smtClean="0"/>
-              <a:t>nasm</a:t>
-            </a:r>
-            <a:r>
-              <a:rPr lang="en-US" dirty="0" smtClean="0"/>
-              <a:t> into </a:t>
-            </a:r>
-            <a:r>
-              <a:rPr lang="en-US" dirty="0" err="1" smtClean="0"/>
-              <a:t>bytecode</a:t>
-            </a:r>
-            <a:endParaRPr lang="en-US" dirty="0" smtClean="0"/>
-          </a:p>
-          <a:p>
-            <a:r>
-              <a:rPr lang="en-US" dirty="0" err="1" smtClean="0"/>
-              <a:t>Objdump</a:t>
-            </a:r>
-            <a:r>
-              <a:rPr lang="en-US" dirty="0" smtClean="0"/>
-              <a:t> to get the </a:t>
-            </a:r>
-            <a:r>
-              <a:rPr lang="en-US" dirty="0" err="1" smtClean="0"/>
-              <a:t>bytecode</a:t>
-            </a:r>
-            <a:r>
-              <a:rPr lang="en-US" dirty="0" smtClean="0"/>
-              <a:t> in text format</a:t>
-            </a:r>
-          </a:p>
-          <a:p>
-            <a:r>
-              <a:rPr lang="en-US" dirty="0" smtClean="0"/>
-              <a:t>Determine big-endian or little-endian (this is </a:t>
-            </a:r>
-            <a:r>
-              <a:rPr lang="en-US" smtClean="0"/>
-              <a:t>where that matters)</a:t>
-            </a:r>
-            <a:endParaRPr lang="en-US" dirty="0" smtClean="0"/>
-          </a:p>
-          <a:p>
-            <a:endParaRPr lang="en-US" dirty="0"/>
+              <a:rPr lang="en-US" dirty="0" smtClean="0">
+                <a:solidFill>
+                  <a:schemeClr val="accent2">
+                    <a:lumMod val="50000"/>
+                  </a:schemeClr>
+                </a:solidFill>
+              </a:rPr>
+              <a:t>Debugging for overflows</a:t>
+            </a:r>
+            <a:endParaRPr lang="en-US" dirty="0">
+              <a:solidFill>
+                <a:schemeClr val="accent2">
+                  <a:lumMod val="50000"/>
+                </a:schemeClr>
+              </a:solidFill>
+            </a:endParaRPr>
+          </a:p>
+          <a:p>
+            <a:pPr lvl="1"/>
+            <a:r>
+              <a:rPr lang="en-US" dirty="0" smtClean="0">
+                <a:solidFill>
+                  <a:schemeClr val="accent2">
+                    <a:lumMod val="50000"/>
+                  </a:schemeClr>
+                </a:solidFill>
+              </a:rPr>
+              <a:t>disassemble &lt;symbol&gt;</a:t>
+            </a:r>
+          </a:p>
+          <a:p>
+            <a:pPr lvl="2"/>
+            <a:r>
+              <a:rPr lang="en-US" dirty="0">
+                <a:solidFill>
+                  <a:schemeClr val="accent2">
+                    <a:lumMod val="50000"/>
+                  </a:schemeClr>
+                </a:solidFill>
+              </a:rPr>
+              <a:t>D</a:t>
+            </a:r>
+            <a:r>
+              <a:rPr lang="en-US" dirty="0" smtClean="0">
+                <a:solidFill>
+                  <a:schemeClr val="accent2">
+                    <a:lumMod val="50000"/>
+                  </a:schemeClr>
+                </a:solidFill>
+              </a:rPr>
+              <a:t>umps the disassembly for a symbol</a:t>
+            </a:r>
+          </a:p>
+          <a:p>
+            <a:pPr lvl="2"/>
+            <a:endParaRPr lang="en-US" dirty="0" smtClean="0">
+              <a:solidFill>
+                <a:schemeClr val="accent2">
+                  <a:lumMod val="50000"/>
+                </a:schemeClr>
+              </a:solidFill>
+            </a:endParaRPr>
           </a:p>
         </p:txBody>
       </p:sp>
+      <p:pic>
+        <p:nvPicPr>
+          <p:cNvPr id="1026" name="Picture 2"/>
+          <p:cNvPicPr>
+            <a:picLocks noChangeAspect="1" noChangeArrowheads="1"/>
+          </p:cNvPicPr>
+          <p:nvPr/>
+        </p:nvPicPr>
+        <p:blipFill>
+          <a:blip r:embed="rId2">
+            <a:extLst>
+              <a:ext uri="{28A0092B-C50C-407E-A947-70E740481C1C}">
+                <a14:useLocalDpi xmlns:a14="http://schemas.microsoft.com/office/drawing/2010/main" val="0"/>
+              </a:ext>
+            </a:extLst>
+          </a:blip>
+          <a:srcRect/>
+          <a:stretch>
+            <a:fillRect/>
+          </a:stretch>
+        </p:blipFill>
+        <p:spPr bwMode="auto">
+          <a:xfrm>
+            <a:off x="1165736" y="2724150"/>
+            <a:ext cx="6812529" cy="4095750"/>
+          </a:xfrm>
+          <a:prstGeom prst="rect">
+            <a:avLst/>
+          </a:prstGeom>
+          <a:noFill/>
+          <a:ln>
+            <a:noFill/>
+          </a:ln>
+          <a:effectLst/>
+          <a:extLst>
+            <a:ext uri="{909E8E84-426E-40DD-AFC4-6F175D3DCCD1}">
+              <a14:hiddenFill xmlns:a14="http://schemas.microsoft.com/office/drawing/2010/main">
+                <a:solidFill>
+                  <a:schemeClr val="accent1"/>
+                </a:solidFill>
+              </a14:hiddenFill>
+            </a:ext>
+            <a:ext uri="{91240B29-F687-4F45-9708-019B960494DF}">
+              <a14:hiddenLine xmlns:a14="http://schemas.microsoft.com/office/drawing/2010/main" w="9525">
+                <a:solidFill>
+                  <a:schemeClr val="tx1"/>
+                </a:solidFill>
+                <a:miter lim="800000"/>
+                <a:headEnd/>
+                <a:tailEnd/>
+              </a14:hiddenLine>
+            </a:ext>
+            <a:ext uri="{AF507438-7753-43E0-B8FC-AC1667EBCBE1}">
+              <a14:hiddenEffects xmlns:a14="http://schemas.microsoft.com/office/drawing/2010/main">
+                <a:effectLst>
+                  <a:outerShdw dist="35921" dir="2700000" algn="ctr" rotWithShape="0">
+                    <a:schemeClr val="bg2"/>
+                  </a:outerShdw>
+                </a:effectLst>
+              </a14:hiddenEffects>
+            </a:ext>
+          </a:extLst>
+        </p:spPr>
+      </p:pic>
     </p:spTree>
     <p:extLst>
       <p:ext uri="{BB962C8B-B14F-4D97-AF65-F5344CB8AC3E}">
-        <p14:creationId xmlns:p14="http://schemas.microsoft.com/office/powerpoint/2010/main" val="1144610127"/>
+        <p14:creationId xmlns:p14="http://schemas.microsoft.com/office/powerpoint/2010/main" val="778398437"/>
       </p:ext>
     </p:extLst>
   </p:cSld>

</xml_diff>

<commit_message>
adding a slide to talk about the matrix
</commit_message>
<xml_diff>
--- a/Buffer Overflow Attacks.pptx
+++ b/Buffer Overflow Attacks.pptx
@@ -5,7 +5,7 @@
     <p:sldMasterId id="2147483672" r:id="rId1"/>
   </p:sldMasterIdLst>
   <p:notesMasterIdLst>
-    <p:notesMasterId r:id="rId53"/>
+    <p:notesMasterId r:id="rId54"/>
   </p:notesMasterIdLst>
   <p:sldIdLst>
     <p:sldId id="256" r:id="rId2"/>
@@ -59,6 +59,7 @@
     <p:sldId id="315" r:id="rId50"/>
     <p:sldId id="323" r:id="rId51"/>
     <p:sldId id="324" r:id="rId52"/>
+    <p:sldId id="329" r:id="rId53"/>
   </p:sldIdLst>
   <p:sldSz cx="9144000" cy="6858000" type="screen4x3"/>
   <p:notesSz cx="6858000" cy="9144000"/>
@@ -217,6 +218,7 @@
             <p14:sldId id="315"/>
             <p14:sldId id="323"/>
             <p14:sldId id="324"/>
+            <p14:sldId id="329"/>
           </p14:sldIdLst>
         </p14:section>
       </p14:sectionLst>
@@ -307,7 +309,7 @@
           <a:p>
             <a:fld id="{9DED5714-D740-4F89-AAD5-E3BC8B06EDCA}" type="datetimeFigureOut">
               <a:rPr lang="en-US" smtClean="0"/>
-              <a:t>4/25/2012</a:t>
+              <a:t>5/1/2012</a:t>
             </a:fld>
             <a:endParaRPr lang="en-US"/>
           </a:p>
@@ -8249,7 +8251,7 @@
           <a:p>
             <a:fld id="{FB76FE03-F4FF-4405-A4BA-F447F9618E72}" type="datetimeFigureOut">
               <a:rPr lang="en-US" smtClean="0"/>
-              <a:t>4/25/2012</a:t>
+              <a:t>5/1/2012</a:t>
             </a:fld>
             <a:endParaRPr lang="en-US"/>
           </a:p>
@@ -8514,7 +8516,7 @@
           <a:p>
             <a:fld id="{FB76FE03-F4FF-4405-A4BA-F447F9618E72}" type="datetimeFigureOut">
               <a:rPr lang="en-US" smtClean="0"/>
-              <a:t>4/25/2012</a:t>
+              <a:t>5/1/2012</a:t>
             </a:fld>
             <a:endParaRPr lang="en-US"/>
           </a:p>
@@ -8788,7 +8790,7 @@
           <a:p>
             <a:fld id="{FB76FE03-F4FF-4405-A4BA-F447F9618E72}" type="datetimeFigureOut">
               <a:rPr lang="en-US" smtClean="0"/>
-              <a:t>4/25/2012</a:t>
+              <a:t>5/1/2012</a:t>
             </a:fld>
             <a:endParaRPr lang="en-US"/>
           </a:p>
@@ -9005,7 +9007,7 @@
           <a:p>
             <a:fld id="{FB76FE03-F4FF-4405-A4BA-F447F9618E72}" type="datetimeFigureOut">
               <a:rPr lang="en-US" smtClean="0"/>
-              <a:t>4/25/2012</a:t>
+              <a:t>5/1/2012</a:t>
             </a:fld>
             <a:endParaRPr lang="en-US"/>
           </a:p>
@@ -9392,7 +9394,7 @@
           <a:p>
             <a:fld id="{FB76FE03-F4FF-4405-A4BA-F447F9618E72}" type="datetimeFigureOut">
               <a:rPr lang="en-US" smtClean="0"/>
-              <a:t>4/25/2012</a:t>
+              <a:t>5/1/2012</a:t>
             </a:fld>
             <a:endParaRPr lang="en-US"/>
           </a:p>
@@ -9773,7 +9775,7 @@
           <a:p>
             <a:fld id="{FB76FE03-F4FF-4405-A4BA-F447F9618E72}" type="datetimeFigureOut">
               <a:rPr lang="en-US" smtClean="0"/>
-              <a:t>4/25/2012</a:t>
+              <a:t>5/1/2012</a:t>
             </a:fld>
             <a:endParaRPr lang="en-US"/>
           </a:p>
@@ -10190,7 +10192,7 @@
           <a:p>
             <a:fld id="{FB76FE03-F4FF-4405-A4BA-F447F9618E72}" type="datetimeFigureOut">
               <a:rPr lang="en-US" smtClean="0"/>
-              <a:t>4/25/2012</a:t>
+              <a:t>5/1/2012</a:t>
             </a:fld>
             <a:endParaRPr lang="en-US"/>
           </a:p>
@@ -10303,7 +10305,7 @@
           <a:p>
             <a:fld id="{FB76FE03-F4FF-4405-A4BA-F447F9618E72}" type="datetimeFigureOut">
               <a:rPr lang="en-US" smtClean="0"/>
-              <a:t>4/25/2012</a:t>
+              <a:t>5/1/2012</a:t>
             </a:fld>
             <a:endParaRPr lang="en-US"/>
           </a:p>
@@ -10393,7 +10395,7 @@
           <a:p>
             <a:fld id="{FB76FE03-F4FF-4405-A4BA-F447F9618E72}" type="datetimeFigureOut">
               <a:rPr lang="en-US" smtClean="0"/>
-              <a:t>4/25/2012</a:t>
+              <a:t>5/1/2012</a:t>
             </a:fld>
             <a:endParaRPr lang="en-US"/>
           </a:p>
@@ -10602,7 +10604,7 @@
           <a:p>
             <a:fld id="{FB76FE03-F4FF-4405-A4BA-F447F9618E72}" type="datetimeFigureOut">
               <a:rPr lang="en-US" smtClean="0"/>
-              <a:t>4/25/2012</a:t>
+              <a:t>5/1/2012</a:t>
             </a:fld>
             <a:endParaRPr lang="en-US"/>
           </a:p>
@@ -10979,7 +10981,7 @@
           <a:p>
             <a:fld id="{FB76FE03-F4FF-4405-A4BA-F447F9618E72}" type="datetimeFigureOut">
               <a:rPr lang="en-US" smtClean="0"/>
-              <a:t>4/25/2012</a:t>
+              <a:t>5/1/2012</a:t>
             </a:fld>
             <a:endParaRPr lang="en-US"/>
           </a:p>
@@ -11526,7 +11528,7 @@
           <a:p>
             <a:fld id="{FB76FE03-F4FF-4405-A4BA-F447F9618E72}" type="datetimeFigureOut">
               <a:rPr lang="en-US" smtClean="0"/>
-              <a:t>4/25/2012</a:t>
+              <a:t>5/1/2012</a:t>
             </a:fld>
             <a:endParaRPr lang="en-US"/>
           </a:p>
@@ -40444,6 +40446,277 @@
 </p:sld>
 </file>
 
+<file path=ppt/slides/slide52.xml><?xml version="1.0" encoding="utf-8"?>
+<p:sld xmlns:a="http://schemas.openxmlformats.org/drawingml/2006/main" xmlns:r="http://schemas.openxmlformats.org/officeDocument/2006/relationships" xmlns:p="http://schemas.openxmlformats.org/presentationml/2006/main">
+  <p:cSld>
+    <p:spTree>
+      <p:nvGrpSpPr>
+        <p:cNvPr id="1" name=""/>
+        <p:cNvGrpSpPr/>
+        <p:nvPr/>
+      </p:nvGrpSpPr>
+      <p:grpSpPr>
+        <a:xfrm>
+          <a:off x="0" y="0"/>
+          <a:ext cx="0" cy="0"/>
+          <a:chOff x="0" y="0"/>
+          <a:chExt cx="0" cy="0"/>
+        </a:xfrm>
+      </p:grpSpPr>
+      <p:sp>
+        <p:nvSpPr>
+          <p:cNvPr id="2" name="Title 1"/>
+          <p:cNvSpPr>
+            <a:spLocks noGrp="1"/>
+          </p:cNvSpPr>
+          <p:nvPr>
+            <p:ph type="title"/>
+          </p:nvPr>
+        </p:nvSpPr>
+        <p:spPr/>
+        <p:txBody>
+          <a:bodyPr/>
+          <a:lstStyle/>
+          <a:p>
+            <a:r>
+              <a:rPr lang="en-US" dirty="0" smtClean="0"/>
+              <a:t>Still Relevant in 2199</a:t>
+            </a:r>
+            <a:endParaRPr lang="en-US" dirty="0"/>
+          </a:p>
+        </p:txBody>
+      </p:sp>
+      <p:sp>
+        <p:nvSpPr>
+          <p:cNvPr id="3" name="Content Placeholder 2"/>
+          <p:cNvSpPr>
+            <a:spLocks noGrp="1"/>
+          </p:cNvSpPr>
+          <p:nvPr>
+            <p:ph idx="1"/>
+          </p:nvPr>
+        </p:nvSpPr>
+        <p:spPr/>
+        <p:txBody>
+          <a:bodyPr/>
+          <a:lstStyle/>
+          <a:p>
+            <a:r>
+              <a:rPr lang="en-US" dirty="0">
+                <a:hlinkClick r:id="rId2"/>
+              </a:rPr>
+              <a:t>http://www.youtube.com/watch?v=51lGCTgqE_w</a:t>
+            </a:r>
+            <a:endParaRPr lang="en-US" dirty="0"/>
+          </a:p>
+        </p:txBody>
+      </p:sp>
+      <p:pic>
+        <p:nvPicPr>
+          <p:cNvPr id="1026" name="Picture 2"/>
+          <p:cNvPicPr>
+            <a:picLocks noChangeAspect="1" noChangeArrowheads="1"/>
+          </p:cNvPicPr>
+          <p:nvPr/>
+        </p:nvPicPr>
+        <p:blipFill>
+          <a:blip r:embed="rId3">
+            <a:extLst>
+              <a:ext uri="{28A0092B-C50C-407E-A947-70E740481C1C}">
+                <a14:useLocalDpi xmlns:a14="http://schemas.microsoft.com/office/drawing/2010/main" val="0"/>
+              </a:ext>
+            </a:extLst>
+          </a:blip>
+          <a:srcRect/>
+          <a:stretch>
+            <a:fillRect/>
+          </a:stretch>
+        </p:blipFill>
+        <p:spPr bwMode="auto">
+          <a:xfrm>
+            <a:off x="495300" y="2133600"/>
+            <a:ext cx="8153400" cy="4518289"/>
+          </a:xfrm>
+          <a:prstGeom prst="rect">
+            <a:avLst/>
+          </a:prstGeom>
+          <a:noFill/>
+          <a:ln>
+            <a:noFill/>
+          </a:ln>
+          <a:effectLst/>
+          <a:extLst>
+            <a:ext uri="{909E8E84-426E-40DD-AFC4-6F175D3DCCD1}">
+              <a14:hiddenFill xmlns:a14="http://schemas.microsoft.com/office/drawing/2010/main">
+                <a:solidFill>
+                  <a:schemeClr val="accent1"/>
+                </a:solidFill>
+              </a14:hiddenFill>
+            </a:ext>
+            <a:ext uri="{91240B29-F687-4F45-9708-019B960494DF}">
+              <a14:hiddenLine xmlns:a14="http://schemas.microsoft.com/office/drawing/2010/main" w="9525">
+                <a:solidFill>
+                  <a:schemeClr val="tx1"/>
+                </a:solidFill>
+                <a:miter lim="800000"/>
+                <a:headEnd/>
+                <a:tailEnd/>
+              </a14:hiddenLine>
+            </a:ext>
+            <a:ext uri="{AF507438-7753-43E0-B8FC-AC1667EBCBE1}">
+              <a14:hiddenEffects xmlns:a14="http://schemas.microsoft.com/office/drawing/2010/main">
+                <a:effectLst>
+                  <a:outerShdw dist="35921" dir="2700000" algn="ctr" rotWithShape="0">
+                    <a:schemeClr val="bg2"/>
+                  </a:outerShdw>
+                </a:effectLst>
+              </a14:hiddenEffects>
+            </a:ext>
+          </a:extLst>
+        </p:spPr>
+      </p:pic>
+    </p:spTree>
+    <p:extLst>
+      <p:ext uri="{BB962C8B-B14F-4D97-AF65-F5344CB8AC3E}">
+        <p14:creationId xmlns:p14="http://schemas.microsoft.com/office/powerpoint/2010/main" val="3973421287"/>
+      </p:ext>
+    </p:extLst>
+  </p:cSld>
+  <p:clrMapOvr>
+    <a:masterClrMapping/>
+  </p:clrMapOvr>
+  <p:timing>
+    <p:tnLst>
+      <p:par>
+        <p:cTn id="1" dur="indefinite" restart="never" nodeType="tmRoot">
+          <p:childTnLst>
+            <p:seq concurrent="1" nextAc="seek">
+              <p:cTn id="2" dur="indefinite" nodeType="mainSeq">
+                <p:childTnLst>
+                  <p:par>
+                    <p:cTn id="3" fill="hold">
+                      <p:stCondLst>
+                        <p:cond delay="indefinite"/>
+                      </p:stCondLst>
+                      <p:childTnLst>
+                        <p:par>
+                          <p:cTn id="4" fill="hold">
+                            <p:stCondLst>
+                              <p:cond delay="0"/>
+                            </p:stCondLst>
+                            <p:childTnLst>
+                              <p:par>
+                                <p:cTn id="5" presetID="42" presetClass="entr" presetSubtype="0" fill="hold" nodeType="clickEffect">
+                                  <p:stCondLst>
+                                    <p:cond delay="0"/>
+                                  </p:stCondLst>
+                                  <p:childTnLst>
+                                    <p:set>
+                                      <p:cBhvr>
+                                        <p:cTn id="6" dur="1" fill="hold">
+                                          <p:stCondLst>
+                                            <p:cond delay="0"/>
+                                          </p:stCondLst>
+                                        </p:cTn>
+                                        <p:tgtEl>
+                                          <p:spTgt spid="1026"/>
+                                        </p:tgtEl>
+                                        <p:attrNameLst>
+                                          <p:attrName>style.visibility</p:attrName>
+                                        </p:attrNameLst>
+                                      </p:cBhvr>
+                                      <p:to>
+                                        <p:strVal val="visible"/>
+                                      </p:to>
+                                    </p:set>
+                                    <p:animEffect transition="in" filter="fade">
+                                      <p:cBhvr>
+                                        <p:cTn id="7" dur="1000"/>
+                                        <p:tgtEl>
+                                          <p:spTgt spid="1026"/>
+                                        </p:tgtEl>
+                                      </p:cBhvr>
+                                    </p:animEffect>
+                                    <p:anim calcmode="lin" valueType="num">
+                                      <p:cBhvr>
+                                        <p:cTn id="8" dur="1000" fill="hold"/>
+                                        <p:tgtEl>
+                                          <p:spTgt spid="1026"/>
+                                        </p:tgtEl>
+                                        <p:attrNameLst>
+                                          <p:attrName>ppt_x</p:attrName>
+                                        </p:attrNameLst>
+                                      </p:cBhvr>
+                                      <p:tavLst>
+                                        <p:tav tm="0">
+                                          <p:val>
+                                            <p:strVal val="#ppt_x"/>
+                                          </p:val>
+                                        </p:tav>
+                                        <p:tav tm="100000">
+                                          <p:val>
+                                            <p:strVal val="#ppt_x"/>
+                                          </p:val>
+                                        </p:tav>
+                                      </p:tavLst>
+                                    </p:anim>
+                                    <p:anim calcmode="lin" valueType="num">
+                                      <p:cBhvr>
+                                        <p:cTn id="9" dur="1000" fill="hold"/>
+                                        <p:tgtEl>
+                                          <p:spTgt spid="1026"/>
+                                        </p:tgtEl>
+                                        <p:attrNameLst>
+                                          <p:attrName>ppt_y</p:attrName>
+                                        </p:attrNameLst>
+                                      </p:cBhvr>
+                                      <p:tavLst>
+                                        <p:tav tm="0">
+                                          <p:val>
+                                            <p:strVal val="#ppt_y+.1"/>
+                                          </p:val>
+                                        </p:tav>
+                                        <p:tav tm="100000">
+                                          <p:val>
+                                            <p:strVal val="#ppt_y"/>
+                                          </p:val>
+                                        </p:tav>
+                                      </p:tavLst>
+                                    </p:anim>
+                                  </p:childTnLst>
+                                </p:cTn>
+                              </p:par>
+                            </p:childTnLst>
+                          </p:cTn>
+                        </p:par>
+                      </p:childTnLst>
+                    </p:cTn>
+                  </p:par>
+                </p:childTnLst>
+              </p:cTn>
+              <p:prevCondLst>
+                <p:cond evt="onPrev" delay="0">
+                  <p:tgtEl>
+                    <p:sldTgt/>
+                  </p:tgtEl>
+                </p:cond>
+              </p:prevCondLst>
+              <p:nextCondLst>
+                <p:cond evt="onNext" delay="0">
+                  <p:tgtEl>
+                    <p:sldTgt/>
+                  </p:tgtEl>
+                </p:cond>
+              </p:nextCondLst>
+            </p:seq>
+          </p:childTnLst>
+        </p:cTn>
+      </p:par>
+    </p:tnLst>
+  </p:timing>
+</p:sld>
+</file>
+
 <file path=ppt/slides/slide6.xml><?xml version="1.0" encoding="utf-8"?>
 <p:sld xmlns:a="http://schemas.openxmlformats.org/drawingml/2006/main" xmlns:r="http://schemas.openxmlformats.org/officeDocument/2006/relationships" xmlns:p="http://schemas.openxmlformats.org/presentationml/2006/main">
   <p:cSld>

</xml_diff>

<commit_message>
Added Pro-Police to the ppt and docx file.
</commit_message>
<xml_diff>
--- a/Buffer Overflow Attacks.pptx
+++ b/Buffer Overflow Attacks.pptx
@@ -5,7 +5,7 @@
     <p:sldMasterId id="2147483672" r:id="rId1"/>
   </p:sldMasterIdLst>
   <p:notesMasterIdLst>
-    <p:notesMasterId r:id="rId53"/>
+    <p:notesMasterId r:id="rId55"/>
   </p:notesMasterIdLst>
   <p:sldIdLst>
     <p:sldId id="256" r:id="rId2"/>
@@ -53,12 +53,14 @@
     <p:sldId id="327" r:id="rId44"/>
     <p:sldId id="326" r:id="rId45"/>
     <p:sldId id="322" r:id="rId46"/>
-    <p:sldId id="318" r:id="rId47"/>
-    <p:sldId id="319" r:id="rId48"/>
-    <p:sldId id="320" r:id="rId49"/>
-    <p:sldId id="315" r:id="rId50"/>
-    <p:sldId id="323" r:id="rId51"/>
-    <p:sldId id="324" r:id="rId52"/>
+    <p:sldId id="329" r:id="rId47"/>
+    <p:sldId id="318" r:id="rId48"/>
+    <p:sldId id="319" r:id="rId49"/>
+    <p:sldId id="320" r:id="rId50"/>
+    <p:sldId id="330" r:id="rId51"/>
+    <p:sldId id="315" r:id="rId52"/>
+    <p:sldId id="323" r:id="rId53"/>
+    <p:sldId id="324" r:id="rId54"/>
   </p:sldIdLst>
   <p:sldSz cx="9144000" cy="6858000" type="screen4x3"/>
   <p:notesSz cx="6858000" cy="9144000"/>
@@ -211,9 +213,11 @@
             <p14:sldId id="327"/>
             <p14:sldId id="326"/>
             <p14:sldId id="322"/>
+            <p14:sldId id="329"/>
             <p14:sldId id="318"/>
             <p14:sldId id="319"/>
             <p14:sldId id="320"/>
+            <p14:sldId id="330"/>
             <p14:sldId id="315"/>
             <p14:sldId id="323"/>
             <p14:sldId id="324"/>
@@ -307,7 +311,7 @@
           <a:p>
             <a:fld id="{9DED5714-D740-4F89-AAD5-E3BC8B06EDCA}" type="datetimeFigureOut">
               <a:rPr lang="en-US" smtClean="0"/>
-              <a:t>4/25/2012</a:t>
+              <a:t>5/2/2012</a:t>
             </a:fld>
             <a:endParaRPr lang="en-US"/>
           </a:p>
@@ -3023,7 +3027,7 @@
           <a:p>
             <a:fld id="{9D0B4A42-F062-4908-9C81-A569921BC8B1}" type="slidenum">
               <a:rPr lang="en-US" smtClean="0"/>
-              <a:t>46</a:t>
+              <a:t>47</a:t>
             </a:fld>
             <a:endParaRPr lang="en-US"/>
           </a:p>
@@ -3086,14 +3090,6 @@
           <a:bodyPr/>
           <a:lstStyle/>
           <a:p>
-            <a:r>
-              <a:rPr lang="en-US" dirty="0" smtClean="0"/>
-              <a:t>Is there ASLR</a:t>
-            </a:r>
-            <a:r>
-              <a:rPr lang="en-US" baseline="0" dirty="0" smtClean="0"/>
-              <a:t> in windows and if so how to turn it off? </a:t>
-            </a:r>
             <a:endParaRPr lang="en-US" dirty="0"/>
           </a:p>
         </p:txBody>
@@ -3115,7 +3111,7 @@
           <a:p>
             <a:fld id="{9D0B4A42-F062-4908-9C81-A569921BC8B1}" type="slidenum">
               <a:rPr lang="en-US" smtClean="0"/>
-              <a:t>47</a:t>
+              <a:t>48</a:t>
             </a:fld>
             <a:endParaRPr lang="en-US"/>
           </a:p>
@@ -3178,77 +3174,6 @@
           <a:bodyPr/>
           <a:lstStyle/>
           <a:p>
-            <a:r>
-              <a:rPr lang="en-US" dirty="0" smtClean="0"/>
-              <a:t>The worm took advantage of a buffer overflow in the </a:t>
-            </a:r>
-            <a:r>
-              <a:rPr lang="en-US" i="1" dirty="0" smtClean="0"/>
-              <a:t>finger</a:t>
-            </a:r>
-            <a:r>
-              <a:rPr lang="en-US" dirty="0" smtClean="0"/>
-              <a:t> service, a service that dispenses information about the set of users logged into a UNIX-based computer system.</a:t>
-            </a:r>
-            <a:r>
-              <a:rPr lang="en-US" sz="1200" b="0" i="0" u="none" strike="noStrike" kern="1200" baseline="0" dirty="0" smtClean="0">
-                <a:solidFill>
-                  <a:schemeClr val="tx1"/>
-                </a:solidFill>
-                <a:latin typeface="+mn-lt"/>
-                <a:ea typeface="+mn-ea"/>
-                <a:cs typeface="+mn-cs"/>
-              </a:rPr>
-              <a:t> Due to a coding error, it created new copies as</a:t>
-            </a:r>
-          </a:p>
-          <a:p>
-            <a:r>
-              <a:rPr lang="en-US" sz="1200" b="0" i="0" u="none" strike="noStrike" kern="1200" baseline="0" dirty="0" smtClean="0">
-                <a:solidFill>
-                  <a:schemeClr val="tx1"/>
-                </a:solidFill>
-                <a:latin typeface="+mn-lt"/>
-                <a:ea typeface="+mn-ea"/>
-                <a:cs typeface="+mn-cs"/>
-              </a:rPr>
-              <a:t>fast as it could and overloaded infected machines</a:t>
-            </a:r>
-            <a:endParaRPr lang="en-US" dirty="0" smtClean="0"/>
-          </a:p>
-          <a:p>
-            <a:r>
-              <a:rPr lang="en-US" dirty="0" smtClean="0"/>
-              <a:t>When Morris realized what was happening, he contacted a friend at Harvard to discuss a solution. Eventually, they sent an anonymous message from Harvard over the network, instructing programmers how to kill the worm and prevent reinfection. However, because the network route was clogged, this message did not get through until it was too late. Computers were affected at many sites, including universities, military sites, and medical research facilities. The estimated cost of dealing with the worm at each installation ranged from $200 to more than $53,000. </a:t>
-            </a:r>
-          </a:p>
-          <a:p>
-            <a:endParaRPr lang="en-US" dirty="0" smtClean="0"/>
-          </a:p>
-          <a:p>
-            <a:pPr marL="0" marR="0" indent="0" algn="l" defTabSz="914400" rtl="0" eaLnBrk="1" fontAlgn="auto" latinLnBrk="0" hangingPunct="1">
-              <a:lnSpc>
-                <a:spcPct val="100000"/>
-              </a:lnSpc>
-              <a:spcBef>
-                <a:spcPts val="0"/>
-              </a:spcBef>
-              <a:spcAft>
-                <a:spcPts val="0"/>
-              </a:spcAft>
-              <a:buClrTx/>
-              <a:buSzTx/>
-              <a:buFontTx/>
-              <a:buNone/>
-              <a:tabLst/>
-              <a:defRPr/>
-            </a:pPr>
-            <a:r>
-              <a:rPr lang="en-US" dirty="0" smtClean="0"/>
-              <a:t>Robert T. Morris was convicted of violating the computer Fraud and Abuse Act (Title 18), and sentenced to three years of probation, 400 hours of community service, a fine of $10,050, and the costs of his supervision. His appeal, filed in December, 1990, was rejected the following March. </a:t>
-            </a:r>
-          </a:p>
-          <a:p>
             <a:endParaRPr lang="en-US" dirty="0"/>
           </a:p>
         </p:txBody>
@@ -3270,7 +3195,7 @@
           <a:p>
             <a:fld id="{9D0B4A42-F062-4908-9C81-A569921BC8B1}" type="slidenum">
               <a:rPr lang="en-US" smtClean="0"/>
-              <a:t>50</a:t>
+              <a:t>49</a:t>
             </a:fld>
             <a:endParaRPr lang="en-US"/>
           </a:p>
@@ -3279,7 +3204,7 @@
     </p:spTree>
     <p:extLst>
       <p:ext uri="{BB962C8B-B14F-4D97-AF65-F5344CB8AC3E}">
-        <p14:creationId xmlns:p14="http://schemas.microsoft.com/office/powerpoint/2010/main" val="2501222839"/>
+        <p14:creationId xmlns:p14="http://schemas.microsoft.com/office/powerpoint/2010/main" val="1447182109"/>
       </p:ext>
     </p:extLst>
   </p:cSld>
@@ -3333,108 +3258,7 @@
           <a:bodyPr/>
           <a:lstStyle/>
           <a:p>
-            <a:r>
-              <a:rPr lang="en-US" sz="1200" b="0" i="0" u="none" strike="noStrike" kern="1200" baseline="0" dirty="0" smtClean="0">
-                <a:solidFill>
-                  <a:schemeClr val="tx1"/>
-                </a:solidFill>
-                <a:latin typeface="+mn-lt"/>
-                <a:ea typeface="+mn-ea"/>
-                <a:cs typeface="+mn-cs"/>
-              </a:rPr>
-              <a:t>The worm scanned the internet, identified vulnerable systems and infected these</a:t>
-            </a:r>
-          </a:p>
-          <a:p>
-            <a:r>
-              <a:rPr lang="en-US" sz="1200" b="0" i="0" u="none" strike="noStrike" kern="1200" baseline="0" dirty="0" smtClean="0">
-                <a:solidFill>
-                  <a:schemeClr val="tx1"/>
-                </a:solidFill>
-                <a:latin typeface="+mn-lt"/>
-                <a:ea typeface="+mn-ea"/>
-                <a:cs typeface="+mn-cs"/>
-              </a:rPr>
-              <a:t>systems by installing itself. The rate of scanning grew rapidly because each newly</a:t>
-            </a:r>
-          </a:p>
-          <a:p>
-            <a:r>
-              <a:rPr lang="en-US" sz="1200" b="0" i="0" u="none" strike="noStrike" kern="1200" baseline="0" dirty="0" smtClean="0">
-                <a:solidFill>
-                  <a:schemeClr val="tx1"/>
-                </a:solidFill>
-                <a:latin typeface="+mn-lt"/>
-                <a:ea typeface="+mn-ea"/>
-                <a:cs typeface="+mn-cs"/>
-              </a:rPr>
-              <a:t>installed worm joined others already in existence. Not only did the worm result in</a:t>
-            </a:r>
-          </a:p>
-          <a:p>
-            <a:r>
-              <a:rPr lang="en-US" sz="1200" b="0" i="0" u="none" strike="noStrike" kern="1200" baseline="0" dirty="0" smtClean="0">
-                <a:solidFill>
-                  <a:schemeClr val="tx1"/>
-                </a:solidFill>
-                <a:latin typeface="+mn-lt"/>
-                <a:ea typeface="+mn-ea"/>
-                <a:cs typeface="+mn-cs"/>
-              </a:rPr>
-              <a:t>defaced web pages on the systems it infected, but its uncontrolled growth in scanning</a:t>
-            </a:r>
-          </a:p>
-          <a:p>
-            <a:r>
-              <a:rPr lang="en-US" sz="1200" b="0" i="0" u="none" strike="noStrike" kern="1200" baseline="0" dirty="0" smtClean="0">
-                <a:solidFill>
-                  <a:schemeClr val="tx1"/>
-                </a:solidFill>
-                <a:latin typeface="+mn-lt"/>
-                <a:ea typeface="+mn-ea"/>
-                <a:cs typeface="+mn-cs"/>
-              </a:rPr>
-              <a:t>resulted in a decrease of speed across the internet—a denial of service attack—and led</a:t>
-            </a:r>
-          </a:p>
-          <a:p>
-            <a:r>
-              <a:rPr lang="en-US" sz="1200" b="0" i="0" u="none" strike="noStrike" kern="1200" baseline="0" dirty="0" smtClean="0">
-                <a:solidFill>
-                  <a:schemeClr val="tx1"/>
-                </a:solidFill>
-                <a:latin typeface="+mn-lt"/>
-                <a:ea typeface="+mn-ea"/>
-                <a:cs typeface="+mn-cs"/>
-              </a:rPr>
-              <a:t>to widespread outages among all types of systems, not just the Microsoft Internet</a:t>
-            </a:r>
-          </a:p>
-          <a:p>
-            <a:r>
-              <a:rPr lang="en-US" sz="1200" b="0" i="0" u="none" strike="noStrike" kern="1200" baseline="0" dirty="0" smtClean="0">
-                <a:solidFill>
-                  <a:schemeClr val="tx1"/>
-                </a:solidFill>
-                <a:latin typeface="+mn-lt"/>
-                <a:ea typeface="+mn-ea"/>
-                <a:cs typeface="+mn-cs"/>
-              </a:rPr>
-              <a:t>Information Server (IIS) systems it infected directly.</a:t>
-            </a:r>
-          </a:p>
-          <a:p>
-            <a:endParaRPr lang="en-US" sz="1200" b="0" i="0" u="none" strike="noStrike" kern="1200" baseline="0" dirty="0" smtClean="0">
-              <a:solidFill>
-                <a:schemeClr val="tx1"/>
-              </a:solidFill>
-              <a:latin typeface="+mn-lt"/>
-              <a:ea typeface="+mn-ea"/>
-              <a:cs typeface="+mn-cs"/>
-            </a:endParaRPr>
-          </a:p>
-          <a:p>
-            <a:pPr marL="0" marR="0" indent="0" algn="l" defTabSz="914400" rtl="0" eaLnBrk="1" fontAlgn="auto" latinLnBrk="0" hangingPunct="1">
+            <a:pPr marL="0" marR="0" lvl="0" indent="0" algn="l" defTabSz="914400" rtl="0" eaLnBrk="1" fontAlgn="auto" latinLnBrk="0" hangingPunct="1">
               <a:lnSpc>
                 <a:spcPct val="100000"/>
               </a:lnSpc>
@@ -3452,17 +3276,29 @@
               <a:defRPr/>
             </a:pPr>
             <a:r>
-              <a:rPr lang="en-US" sz="1200" kern="1200" dirty="0" smtClean="0">
+              <a:rPr lang="en-US" sz="1200" kern="1200" dirty="0" err="1" smtClean="0">
                 <a:solidFill>
                   <a:schemeClr val="tx1"/>
                 </a:solidFill>
+                <a:effectLst/>
                 <a:latin typeface="+mn-lt"/>
                 <a:ea typeface="+mn-ea"/>
                 <a:cs typeface="+mn-cs"/>
               </a:rPr>
-              <a:t>This graph shows the rapid spread of the Code Red infestation. The worm was programmed to switch from an "infection phase" to an "attack phase" at midnight GMT on July 20. The abrupt leveling off of the infection appears to be due to this switch. </a:t>
-            </a:r>
-            <a:endParaRPr lang="en-US" dirty="0" smtClean="0"/>
+              <a:t>ProPolice</a:t>
+            </a:r>
+            <a:r>
+              <a:rPr lang="en-US" sz="1200" kern="1200" dirty="0" smtClean="0">
+                <a:solidFill>
+                  <a:schemeClr val="tx1"/>
+                </a:solidFill>
+                <a:effectLst/>
+                <a:latin typeface="+mn-lt"/>
+                <a:ea typeface="+mn-ea"/>
+                <a:cs typeface="+mn-cs"/>
+              </a:rPr>
+              <a:t>, in addition to canary protection, also sorts array variables (where possible) to the highest part of the stack frame, to make it more difficult to overflow them and corrupt other variables. It also creates copies of arguments of the function, and relocates them together with local variables, effectively protecting the arguments.</a:t>
+            </a:r>
           </a:p>
           <a:p>
             <a:endParaRPr lang="en-US" dirty="0"/>
@@ -3486,7 +3322,175 @@
           <a:p>
             <a:fld id="{9D0B4A42-F062-4908-9C81-A569921BC8B1}" type="slidenum">
               <a:rPr lang="en-US" smtClean="0"/>
-              <a:t>51</a:t>
+              <a:t>50</a:t>
+            </a:fld>
+            <a:endParaRPr lang="en-US"/>
+          </a:p>
+        </p:txBody>
+      </p:sp>
+    </p:spTree>
+    <p:extLst>
+      <p:ext uri="{BB962C8B-B14F-4D97-AF65-F5344CB8AC3E}">
+        <p14:creationId xmlns:p14="http://schemas.microsoft.com/office/powerpoint/2010/main" val="4114649987"/>
+      </p:ext>
+    </p:extLst>
+  </p:cSld>
+  <p:clrMapOvr>
+    <a:masterClrMapping/>
+  </p:clrMapOvr>
+</p:notes>
+</file>
+
+<file path=ppt/notesSlides/notesSlide18.xml><?xml version="1.0" encoding="utf-8"?>
+<p:notes xmlns:a="http://schemas.openxmlformats.org/drawingml/2006/main" xmlns:r="http://schemas.openxmlformats.org/officeDocument/2006/relationships" xmlns:p="http://schemas.openxmlformats.org/presentationml/2006/main">
+  <p:cSld>
+    <p:spTree>
+      <p:nvGrpSpPr>
+        <p:cNvPr id="1" name=""/>
+        <p:cNvGrpSpPr/>
+        <p:nvPr/>
+      </p:nvGrpSpPr>
+      <p:grpSpPr>
+        <a:xfrm>
+          <a:off x="0" y="0"/>
+          <a:ext cx="0" cy="0"/>
+          <a:chOff x="0" y="0"/>
+          <a:chExt cx="0" cy="0"/>
+        </a:xfrm>
+      </p:grpSpPr>
+      <p:sp>
+        <p:nvSpPr>
+          <p:cNvPr id="2" name="Slide Image Placeholder 1"/>
+          <p:cNvSpPr>
+            <a:spLocks noGrp="1" noRot="1" noChangeAspect="1"/>
+          </p:cNvSpPr>
+          <p:nvPr>
+            <p:ph type="sldImg"/>
+          </p:nvPr>
+        </p:nvSpPr>
+        <p:spPr/>
+      </p:sp>
+      <p:sp>
+        <p:nvSpPr>
+          <p:cNvPr id="3" name="Notes Placeholder 2"/>
+          <p:cNvSpPr>
+            <a:spLocks noGrp="1"/>
+          </p:cNvSpPr>
+          <p:nvPr>
+            <p:ph type="body" idx="1"/>
+          </p:nvPr>
+        </p:nvSpPr>
+        <p:spPr/>
+        <p:txBody>
+          <a:bodyPr/>
+          <a:lstStyle/>
+          <a:p>
+            <a:endParaRPr lang="en-US" dirty="0"/>
+          </a:p>
+        </p:txBody>
+      </p:sp>
+      <p:sp>
+        <p:nvSpPr>
+          <p:cNvPr id="4" name="Slide Number Placeholder 3"/>
+          <p:cNvSpPr>
+            <a:spLocks noGrp="1"/>
+          </p:cNvSpPr>
+          <p:nvPr>
+            <p:ph type="sldNum" sz="quarter" idx="10"/>
+          </p:nvPr>
+        </p:nvSpPr>
+        <p:spPr/>
+        <p:txBody>
+          <a:bodyPr/>
+          <a:lstStyle/>
+          <a:p>
+            <a:fld id="{9D0B4A42-F062-4908-9C81-A569921BC8B1}" type="slidenum">
+              <a:rPr lang="en-US" smtClean="0"/>
+              <a:t>52</a:t>
+            </a:fld>
+            <a:endParaRPr lang="en-US"/>
+          </a:p>
+        </p:txBody>
+      </p:sp>
+    </p:spTree>
+    <p:extLst>
+      <p:ext uri="{BB962C8B-B14F-4D97-AF65-F5344CB8AC3E}">
+        <p14:creationId xmlns:p14="http://schemas.microsoft.com/office/powerpoint/2010/main" val="2501222839"/>
+      </p:ext>
+    </p:extLst>
+  </p:cSld>
+  <p:clrMapOvr>
+    <a:masterClrMapping/>
+  </p:clrMapOvr>
+</p:notes>
+</file>
+
+<file path=ppt/notesSlides/notesSlide19.xml><?xml version="1.0" encoding="utf-8"?>
+<p:notes xmlns:a="http://schemas.openxmlformats.org/drawingml/2006/main" xmlns:r="http://schemas.openxmlformats.org/officeDocument/2006/relationships" xmlns:p="http://schemas.openxmlformats.org/presentationml/2006/main">
+  <p:cSld>
+    <p:spTree>
+      <p:nvGrpSpPr>
+        <p:cNvPr id="1" name=""/>
+        <p:cNvGrpSpPr/>
+        <p:nvPr/>
+      </p:nvGrpSpPr>
+      <p:grpSpPr>
+        <a:xfrm>
+          <a:off x="0" y="0"/>
+          <a:ext cx="0" cy="0"/>
+          <a:chOff x="0" y="0"/>
+          <a:chExt cx="0" cy="0"/>
+        </a:xfrm>
+      </p:grpSpPr>
+      <p:sp>
+        <p:nvSpPr>
+          <p:cNvPr id="2" name="Slide Image Placeholder 1"/>
+          <p:cNvSpPr>
+            <a:spLocks noGrp="1" noRot="1" noChangeAspect="1"/>
+          </p:cNvSpPr>
+          <p:nvPr>
+            <p:ph type="sldImg"/>
+          </p:nvPr>
+        </p:nvSpPr>
+        <p:spPr/>
+      </p:sp>
+      <p:sp>
+        <p:nvSpPr>
+          <p:cNvPr id="3" name="Notes Placeholder 2"/>
+          <p:cNvSpPr>
+            <a:spLocks noGrp="1"/>
+          </p:cNvSpPr>
+          <p:nvPr>
+            <p:ph type="body" idx="1"/>
+          </p:nvPr>
+        </p:nvSpPr>
+        <p:spPr/>
+        <p:txBody>
+          <a:bodyPr/>
+          <a:lstStyle/>
+          <a:p>
+            <a:endParaRPr lang="en-US" dirty="0"/>
+          </a:p>
+        </p:txBody>
+      </p:sp>
+      <p:sp>
+        <p:nvSpPr>
+          <p:cNvPr id="4" name="Slide Number Placeholder 3"/>
+          <p:cNvSpPr>
+            <a:spLocks noGrp="1"/>
+          </p:cNvSpPr>
+          <p:nvPr>
+            <p:ph type="sldNum" sz="quarter" idx="10"/>
+          </p:nvPr>
+        </p:nvSpPr>
+        <p:spPr/>
+        <p:txBody>
+          <a:bodyPr/>
+          <a:lstStyle/>
+          <a:p>
+            <a:fld id="{9D0B4A42-F062-4908-9C81-A569921BC8B1}" type="slidenum">
+              <a:rPr lang="en-US" smtClean="0"/>
+              <a:t>53</a:t>
             </a:fld>
             <a:endParaRPr lang="en-US"/>
           </a:p>
@@ -8249,7 +8253,7 @@
           <a:p>
             <a:fld id="{FB76FE03-F4FF-4405-A4BA-F447F9618E72}" type="datetimeFigureOut">
               <a:rPr lang="en-US" smtClean="0"/>
-              <a:t>4/25/2012</a:t>
+              <a:t>5/2/2012</a:t>
             </a:fld>
             <a:endParaRPr lang="en-US"/>
           </a:p>
@@ -8514,7 +8518,7 @@
           <a:p>
             <a:fld id="{FB76FE03-F4FF-4405-A4BA-F447F9618E72}" type="datetimeFigureOut">
               <a:rPr lang="en-US" smtClean="0"/>
-              <a:t>4/25/2012</a:t>
+              <a:t>5/2/2012</a:t>
             </a:fld>
             <a:endParaRPr lang="en-US"/>
           </a:p>
@@ -8788,7 +8792,7 @@
           <a:p>
             <a:fld id="{FB76FE03-F4FF-4405-A4BA-F447F9618E72}" type="datetimeFigureOut">
               <a:rPr lang="en-US" smtClean="0"/>
-              <a:t>4/25/2012</a:t>
+              <a:t>5/2/2012</a:t>
             </a:fld>
             <a:endParaRPr lang="en-US"/>
           </a:p>
@@ -9005,7 +9009,7 @@
           <a:p>
             <a:fld id="{FB76FE03-F4FF-4405-A4BA-F447F9618E72}" type="datetimeFigureOut">
               <a:rPr lang="en-US" smtClean="0"/>
-              <a:t>4/25/2012</a:t>
+              <a:t>5/2/2012</a:t>
             </a:fld>
             <a:endParaRPr lang="en-US"/>
           </a:p>
@@ -9392,7 +9396,7 @@
           <a:p>
             <a:fld id="{FB76FE03-F4FF-4405-A4BA-F447F9618E72}" type="datetimeFigureOut">
               <a:rPr lang="en-US" smtClean="0"/>
-              <a:t>4/25/2012</a:t>
+              <a:t>5/2/2012</a:t>
             </a:fld>
             <a:endParaRPr lang="en-US"/>
           </a:p>
@@ -9773,7 +9777,7 @@
           <a:p>
             <a:fld id="{FB76FE03-F4FF-4405-A4BA-F447F9618E72}" type="datetimeFigureOut">
               <a:rPr lang="en-US" smtClean="0"/>
-              <a:t>4/25/2012</a:t>
+              <a:t>5/2/2012</a:t>
             </a:fld>
             <a:endParaRPr lang="en-US"/>
           </a:p>
@@ -10190,7 +10194,7 @@
           <a:p>
             <a:fld id="{FB76FE03-F4FF-4405-A4BA-F447F9618E72}" type="datetimeFigureOut">
               <a:rPr lang="en-US" smtClean="0"/>
-              <a:t>4/25/2012</a:t>
+              <a:t>5/2/2012</a:t>
             </a:fld>
             <a:endParaRPr lang="en-US"/>
           </a:p>
@@ -10303,7 +10307,7 @@
           <a:p>
             <a:fld id="{FB76FE03-F4FF-4405-A4BA-F447F9618E72}" type="datetimeFigureOut">
               <a:rPr lang="en-US" smtClean="0"/>
-              <a:t>4/25/2012</a:t>
+              <a:t>5/2/2012</a:t>
             </a:fld>
             <a:endParaRPr lang="en-US"/>
           </a:p>
@@ -10393,7 +10397,7 @@
           <a:p>
             <a:fld id="{FB76FE03-F4FF-4405-A4BA-F447F9618E72}" type="datetimeFigureOut">
               <a:rPr lang="en-US" smtClean="0"/>
-              <a:t>4/25/2012</a:t>
+              <a:t>5/2/2012</a:t>
             </a:fld>
             <a:endParaRPr lang="en-US"/>
           </a:p>
@@ -10602,7 +10606,7 @@
           <a:p>
             <a:fld id="{FB76FE03-F4FF-4405-A4BA-F447F9618E72}" type="datetimeFigureOut">
               <a:rPr lang="en-US" smtClean="0"/>
-              <a:t>4/25/2012</a:t>
+              <a:t>5/2/2012</a:t>
             </a:fld>
             <a:endParaRPr lang="en-US"/>
           </a:p>
@@ -10979,7 +10983,7 @@
           <a:p>
             <a:fld id="{FB76FE03-F4FF-4405-A4BA-F447F9618E72}" type="datetimeFigureOut">
               <a:rPr lang="en-US" smtClean="0"/>
-              <a:t>4/25/2012</a:t>
+              <a:t>5/2/2012</a:t>
             </a:fld>
             <a:endParaRPr lang="en-US"/>
           </a:p>
@@ -11526,7 +11530,7 @@
           <a:p>
             <a:fld id="{FB76FE03-F4FF-4405-A4BA-F447F9618E72}" type="datetimeFigureOut">
               <a:rPr lang="en-US" smtClean="0"/>
-              <a:t>4/25/2012</a:t>
+              <a:t>5/2/2012</a:t>
             </a:fld>
             <a:endParaRPr lang="en-US"/>
           </a:p>
@@ -38862,6 +38866,13 @@
   <p:clrMapOvr>
     <a:masterClrMapping/>
   </p:clrMapOvr>
+  <p:timing>
+    <p:tnLst>
+      <p:par>
+        <p:cTn id="1" dur="indefinite" restart="never" nodeType="tmRoot"/>
+      </p:par>
+    </p:tnLst>
+  </p:timing>
 </p:sld>
 </file>
 
@@ -38956,6 +38967,13 @@
   <p:clrMapOvr>
     <a:masterClrMapping/>
   </p:clrMapOvr>
+  <p:timing>
+    <p:tnLst>
+      <p:par>
+        <p:cTn id="1" dur="indefinite" restart="never" nodeType="tmRoot"/>
+      </p:par>
+    </p:tnLst>
+  </p:timing>
 </p:sld>
 </file>
 
@@ -39201,7 +39219,7 @@
           <a:p>
             <a:r>
               <a:rPr lang="en-US" dirty="0" smtClean="0"/>
-              <a:t>Protection Against Buffer Overflows</a:t>
+              <a:t>Ret2LibC Demo</a:t>
             </a:r>
             <a:endParaRPr lang="en-US" dirty="0"/>
           </a:p>
@@ -39209,12 +39227,12 @@
       </p:sp>
       <p:sp>
         <p:nvSpPr>
-          <p:cNvPr id="3" name="Content Placeholder 2"/>
+          <p:cNvPr id="4" name="Text Placeholder 3"/>
           <p:cNvSpPr>
             <a:spLocks noGrp="1"/>
           </p:cNvSpPr>
           <p:nvPr>
-            <p:ph idx="1"/>
+            <p:ph type="body" idx="1"/>
           </p:nvPr>
         </p:nvSpPr>
         <p:spPr/>
@@ -39222,105 +39240,6 @@
           <a:bodyPr/>
           <a:lstStyle/>
           <a:p>
-            <a:r>
-              <a:rPr lang="en-US" dirty="0" smtClean="0"/>
-              <a:t>Data Execution Prevention</a:t>
-            </a:r>
-          </a:p>
-          <a:p>
-            <a:pPr lvl="1"/>
-            <a:r>
-              <a:rPr lang="en-US" dirty="0" smtClean="0"/>
-              <a:t>Linux, Mac, Windows</a:t>
-            </a:r>
-          </a:p>
-          <a:p>
-            <a:pPr lvl="1"/>
-            <a:r>
-              <a:rPr lang="en-US" dirty="0" smtClean="0"/>
-              <a:t>Hardware Marks all locations in a process as non-executable unless the location explicitly contains executable code. </a:t>
-            </a:r>
-          </a:p>
-          <a:p>
-            <a:pPr lvl="1"/>
-            <a:r>
-              <a:rPr lang="en-US" dirty="0" smtClean="0"/>
-              <a:t>If an app tries to run this code, an error is thrown, calling process terminated</a:t>
-            </a:r>
-          </a:p>
-          <a:p>
-            <a:r>
-              <a:rPr lang="en-US" dirty="0" smtClean="0"/>
-              <a:t>To Disable DEP –</a:t>
-            </a:r>
-          </a:p>
-          <a:p>
-            <a:pPr lvl="1"/>
-            <a:r>
-              <a:rPr lang="en-US" dirty="0" smtClean="0"/>
-              <a:t>Windows – recovery and startup sessions, edit the system startup, replace the line </a:t>
-            </a:r>
-            <a:r>
-              <a:rPr lang="en-US" dirty="0" err="1" smtClean="0"/>
-              <a:t>OptIn</a:t>
-            </a:r>
-            <a:r>
-              <a:rPr lang="en-US" dirty="0" smtClean="0"/>
-              <a:t> with always out (/</a:t>
-            </a:r>
-            <a:r>
-              <a:rPr lang="en-US" dirty="0" err="1" smtClean="0"/>
-              <a:t>noexecute</a:t>
-            </a:r>
-            <a:r>
-              <a:rPr lang="en-US" dirty="0" smtClean="0"/>
-              <a:t>=</a:t>
-            </a:r>
-            <a:r>
-              <a:rPr lang="en-US" dirty="0" err="1" smtClean="0"/>
-              <a:t>AlwaysOff</a:t>
-            </a:r>
-            <a:r>
-              <a:rPr lang="en-US" dirty="0" smtClean="0"/>
-              <a:t>)</a:t>
-            </a:r>
-          </a:p>
-          <a:p>
-            <a:pPr lvl="1"/>
-            <a:r>
-              <a:rPr lang="en-US" dirty="0" smtClean="0"/>
-              <a:t>Linux –</a:t>
-            </a:r>
-          </a:p>
-          <a:p>
-            <a:pPr lvl="2"/>
-            <a:r>
-              <a:rPr lang="en-US" dirty="0" smtClean="0"/>
-              <a:t>Echo 0 &gt; /</a:t>
-            </a:r>
-            <a:r>
-              <a:rPr lang="en-US" dirty="0" err="1" smtClean="0"/>
-              <a:t>proc</a:t>
-            </a:r>
-            <a:r>
-              <a:rPr lang="en-US" dirty="0" smtClean="0"/>
-              <a:t>/sys/kernel/exec-shield</a:t>
-            </a:r>
-          </a:p>
-          <a:p>
-            <a:pPr lvl="2"/>
-            <a:r>
-              <a:rPr lang="en-US" dirty="0" smtClean="0"/>
-              <a:t>Echo 0 &gt; /</a:t>
-            </a:r>
-            <a:r>
-              <a:rPr lang="en-US" dirty="0" err="1" smtClean="0"/>
-              <a:t>proc</a:t>
-            </a:r>
-            <a:r>
-              <a:rPr lang="en-US" dirty="0" smtClean="0"/>
-              <a:t>/sys/kernel/exec-shield-randomize</a:t>
-            </a:r>
             <a:endParaRPr lang="en-US" dirty="0"/>
           </a:p>
         </p:txBody>
@@ -39328,7 +39247,7 @@
     </p:spTree>
     <p:extLst>
       <p:ext uri="{BB962C8B-B14F-4D97-AF65-F5344CB8AC3E}">
-        <p14:creationId xmlns:p14="http://schemas.microsoft.com/office/powerpoint/2010/main" val="1819619996"/>
+        <p14:creationId xmlns:p14="http://schemas.microsoft.com/office/powerpoint/2010/main" val="520070988"/>
       </p:ext>
     </p:extLst>
   </p:cSld>
@@ -39379,7 +39298,7 @@
           <a:p>
             <a:r>
               <a:rPr lang="en-US" dirty="0" smtClean="0"/>
-              <a:t>Protection Continued</a:t>
+              <a:t>Protection Against Buffer Overflows</a:t>
             </a:r>
             <a:endParaRPr lang="en-US" dirty="0"/>
           </a:p>
@@ -39402,57 +39321,79 @@
           <a:p>
             <a:r>
               <a:rPr lang="en-US" dirty="0" smtClean="0"/>
-              <a:t>Address Space Layout Randomization</a:t>
+              <a:t>Data Execution Prevention</a:t>
             </a:r>
           </a:p>
           <a:p>
             <a:pPr lvl="1"/>
             <a:r>
               <a:rPr lang="en-US" dirty="0" smtClean="0"/>
-              <a:t>Randomly arranges the positions of key data areas</a:t>
+              <a:t>Linux, Mac, Windows</a:t>
+            </a:r>
+          </a:p>
+          <a:p>
+            <a:pPr lvl="1"/>
+            <a:r>
+              <a:rPr lang="en-US" dirty="0" smtClean="0"/>
+              <a:t>Hardware Marks all locations in a process as non-executable unless the location explicitly contains executable code. </a:t>
+            </a:r>
+          </a:p>
+          <a:p>
+            <a:pPr lvl="1"/>
+            <a:r>
+              <a:rPr lang="en-US" dirty="0" smtClean="0"/>
+              <a:t>If an app tries to run this code, an error is thrown, calling process terminated</a:t>
+            </a:r>
+          </a:p>
+          <a:p>
+            <a:r>
+              <a:rPr lang="en-US" dirty="0" smtClean="0"/>
+              <a:t>To Disable DEP –</a:t>
+            </a:r>
+          </a:p>
+          <a:p>
+            <a:pPr lvl="1"/>
+            <a:r>
+              <a:rPr lang="en-US" dirty="0" smtClean="0"/>
+              <a:t>Windows – recovery and startup sessions, edit the system startup, replace the line </a:t>
+            </a:r>
+            <a:r>
+              <a:rPr lang="en-US" dirty="0" err="1" smtClean="0"/>
+              <a:t>OptIn</a:t>
+            </a:r>
+            <a:r>
+              <a:rPr lang="en-US" dirty="0" smtClean="0"/>
+              <a:t> with always out (/</a:t>
+            </a:r>
+            <a:r>
+              <a:rPr lang="en-US" dirty="0" err="1" smtClean="0"/>
+              <a:t>noexecute</a:t>
+            </a:r>
+            <a:r>
+              <a:rPr lang="en-US" dirty="0" smtClean="0"/>
+              <a:t>=</a:t>
+            </a:r>
+            <a:r>
+              <a:rPr lang="en-US" dirty="0" err="1" smtClean="0"/>
+              <a:t>AlwaysOff</a:t>
+            </a:r>
+            <a:r>
+              <a:rPr lang="en-US" dirty="0" smtClean="0"/>
+              <a:t>)</a:t>
+            </a:r>
+          </a:p>
+          <a:p>
+            <a:pPr lvl="1"/>
+            <a:r>
+              <a:rPr lang="en-US" dirty="0" smtClean="0"/>
+              <a:t>Linux –</a:t>
             </a:r>
           </a:p>
           <a:p>
             <a:pPr lvl="2"/>
             <a:r>
               <a:rPr lang="en-US" dirty="0" smtClean="0"/>
-              <a:t>E.g. positions of library, heap, stack</a:t>
-            </a:r>
-          </a:p>
-          <a:p>
-            <a:pPr lvl="1"/>
-            <a:r>
-              <a:rPr lang="en-US" dirty="0" smtClean="0"/>
-              <a:t>If the location of </a:t>
-            </a:r>
-            <a:r>
-              <a:rPr lang="en-US" dirty="0" err="1" smtClean="0"/>
-              <a:t>lib.c</a:t>
-            </a:r>
-            <a:r>
-              <a:rPr lang="en-US" dirty="0" smtClean="0"/>
-              <a:t> changes </a:t>
-            </a:r>
-            <a:r>
-              <a:rPr lang="en-US" dirty="0" err="1" smtClean="0"/>
-              <a:t>everytime</a:t>
-            </a:r>
-            <a:r>
-              <a:rPr lang="en-US" dirty="0" smtClean="0"/>
-              <a:t>, then it will be hard to find the exact locations of different functions</a:t>
-            </a:r>
-          </a:p>
-          <a:p>
-            <a:r>
-              <a:rPr lang="en-US" dirty="0" smtClean="0"/>
-              <a:t>Turn off ASLR </a:t>
-            </a:r>
-          </a:p>
-          <a:p>
-            <a:pPr lvl="1"/>
-            <a:r>
-              <a:rPr lang="en-US" dirty="0" smtClean="0"/>
-              <a:t>Linux – echo 0 &gt; /</a:t>
+              <a:t>Echo 0 &gt; /</a:t>
             </a:r>
             <a:r>
               <a:rPr lang="en-US" dirty="0" err="1" smtClean="0"/>
@@ -39460,11 +39401,22 @@
             </a:r>
             <a:r>
               <a:rPr lang="en-US" dirty="0" smtClean="0"/>
-              <a:t>/sys/kernel/</a:t>
+              <a:t>/sys/kernel/exec-shield</a:t>
+            </a:r>
+          </a:p>
+          <a:p>
+            <a:pPr lvl="2"/>
+            <a:r>
+              <a:rPr lang="en-US" dirty="0" smtClean="0"/>
+              <a:t>Echo 0 &gt; /</a:t>
             </a:r>
             <a:r>
               <a:rPr lang="en-US" dirty="0" err="1" smtClean="0"/>
-              <a:t>randomize_va_space</a:t>
+              <a:t>proc</a:t>
+            </a:r>
+            <a:r>
+              <a:rPr lang="en-US" dirty="0" smtClean="0"/>
+              <a:t>/sys/kernel/exec-shield-randomize</a:t>
             </a:r>
             <a:endParaRPr lang="en-US" dirty="0"/>
           </a:p>
@@ -39473,7 +39425,7 @@
     </p:spTree>
     <p:extLst>
       <p:ext uri="{BB962C8B-B14F-4D97-AF65-F5344CB8AC3E}">
-        <p14:creationId xmlns:p14="http://schemas.microsoft.com/office/powerpoint/2010/main" val="1940961802"/>
+        <p14:creationId xmlns:p14="http://schemas.microsoft.com/office/powerpoint/2010/main" val="1819619996"/>
       </p:ext>
     </p:extLst>
   </p:cSld>
@@ -39524,6 +39476,163 @@
           <a:p>
             <a:r>
               <a:rPr lang="en-US" dirty="0" smtClean="0"/>
+              <a:t>Protection Continued</a:t>
+            </a:r>
+            <a:endParaRPr lang="en-US" dirty="0"/>
+          </a:p>
+        </p:txBody>
+      </p:sp>
+      <p:sp>
+        <p:nvSpPr>
+          <p:cNvPr id="3" name="Content Placeholder 2"/>
+          <p:cNvSpPr>
+            <a:spLocks noGrp="1"/>
+          </p:cNvSpPr>
+          <p:nvPr>
+            <p:ph idx="1"/>
+          </p:nvPr>
+        </p:nvSpPr>
+        <p:spPr/>
+        <p:txBody>
+          <a:bodyPr/>
+          <a:lstStyle/>
+          <a:p>
+            <a:r>
+              <a:rPr lang="en-US" dirty="0" smtClean="0"/>
+              <a:t>Address Space Layout Randomization</a:t>
+            </a:r>
+          </a:p>
+          <a:p>
+            <a:pPr lvl="1"/>
+            <a:r>
+              <a:rPr lang="en-US" dirty="0" smtClean="0"/>
+              <a:t>Randomly arranges the positions of key data areas</a:t>
+            </a:r>
+          </a:p>
+          <a:p>
+            <a:pPr lvl="2"/>
+            <a:r>
+              <a:rPr lang="en-US" dirty="0" smtClean="0"/>
+              <a:t>E.g. positions of library, heap, stack</a:t>
+            </a:r>
+          </a:p>
+          <a:p>
+            <a:pPr lvl="1"/>
+            <a:r>
+              <a:rPr lang="en-US" dirty="0" smtClean="0"/>
+              <a:t>If the location of </a:t>
+            </a:r>
+            <a:r>
+              <a:rPr lang="en-US" dirty="0" err="1" smtClean="0"/>
+              <a:t>lib.c</a:t>
+            </a:r>
+            <a:r>
+              <a:rPr lang="en-US" dirty="0" smtClean="0"/>
+              <a:t> changes </a:t>
+            </a:r>
+            <a:r>
+              <a:rPr lang="en-US" dirty="0" err="1" smtClean="0"/>
+              <a:t>everytime</a:t>
+            </a:r>
+            <a:r>
+              <a:rPr lang="en-US" dirty="0" smtClean="0"/>
+              <a:t>, then it will be hard to find the exact locations of different functions</a:t>
+            </a:r>
+          </a:p>
+          <a:p>
+            <a:r>
+              <a:rPr lang="en-US" dirty="0" smtClean="0"/>
+              <a:t>Turn off ASLR </a:t>
+            </a:r>
+          </a:p>
+          <a:p>
+            <a:pPr lvl="1"/>
+            <a:r>
+              <a:rPr lang="en-US" dirty="0" smtClean="0"/>
+              <a:t>Linux – echo 0 &gt; /</a:t>
+            </a:r>
+            <a:r>
+              <a:rPr lang="en-US" dirty="0" err="1" smtClean="0"/>
+              <a:t>proc</a:t>
+            </a:r>
+            <a:r>
+              <a:rPr lang="en-US" dirty="0" smtClean="0"/>
+              <a:t>/sys/kernel/</a:t>
+            </a:r>
+            <a:r>
+              <a:rPr lang="en-US" dirty="0" err="1" smtClean="0"/>
+              <a:t>randomize_va_space</a:t>
+            </a:r>
+            <a:endParaRPr lang="en-US" dirty="0" smtClean="0"/>
+          </a:p>
+          <a:p>
+            <a:pPr lvl="1"/>
+            <a:r>
+              <a:rPr lang="en-US" dirty="0" smtClean="0"/>
+              <a:t>Windows 7 --  use </a:t>
+            </a:r>
+            <a:r>
+              <a:rPr lang="en-US" dirty="0"/>
+              <a:t>the Enhanced Mitigation Experience Toolkit</a:t>
+            </a:r>
+            <a:endParaRPr lang="en-US" dirty="0"/>
+          </a:p>
+        </p:txBody>
+      </p:sp>
+    </p:spTree>
+    <p:extLst>
+      <p:ext uri="{BB962C8B-B14F-4D97-AF65-F5344CB8AC3E}">
+        <p14:creationId xmlns:p14="http://schemas.microsoft.com/office/powerpoint/2010/main" val="1940961802"/>
+      </p:ext>
+    </p:extLst>
+  </p:cSld>
+  <p:clrMapOvr>
+    <a:masterClrMapping/>
+  </p:clrMapOvr>
+  <p:timing>
+    <p:tnLst>
+      <p:par>
+        <p:cTn id="1" dur="indefinite" restart="never" nodeType="tmRoot"/>
+      </p:par>
+    </p:tnLst>
+  </p:timing>
+</p:sld>
+</file>
+
+<file path=ppt/slides/slide49.xml><?xml version="1.0" encoding="utf-8"?>
+<p:sld xmlns:a="http://schemas.openxmlformats.org/drawingml/2006/main" xmlns:r="http://schemas.openxmlformats.org/officeDocument/2006/relationships" xmlns:p="http://schemas.openxmlformats.org/presentationml/2006/main">
+  <p:cSld>
+    <p:spTree>
+      <p:nvGrpSpPr>
+        <p:cNvPr id="1" name=""/>
+        <p:cNvGrpSpPr/>
+        <p:nvPr/>
+      </p:nvGrpSpPr>
+      <p:grpSpPr>
+        <a:xfrm>
+          <a:off x="0" y="0"/>
+          <a:ext cx="0" cy="0"/>
+          <a:chOff x="0" y="0"/>
+          <a:chExt cx="0" cy="0"/>
+        </a:xfrm>
+      </p:grpSpPr>
+      <p:sp>
+        <p:nvSpPr>
+          <p:cNvPr id="2" name="Title 1"/>
+          <p:cNvSpPr>
+            <a:spLocks noGrp="1"/>
+          </p:cNvSpPr>
+          <p:nvPr>
+            <p:ph type="title"/>
+          </p:nvPr>
+        </p:nvSpPr>
+        <p:spPr/>
+        <p:txBody>
+          <a:bodyPr/>
+          <a:lstStyle/>
+          <a:p>
+            <a:r>
+              <a:rPr lang="en-US" dirty="0" smtClean="0"/>
               <a:t>Canaries</a:t>
             </a:r>
             <a:endParaRPr lang="en-US" dirty="0"/>
@@ -39595,7 +39704,312 @@
 </p:sld>
 </file>
 
-<file path=ppt/slides/slide49.xml><?xml version="1.0" encoding="utf-8"?>
+<file path=ppt/slides/slide5.xml><?xml version="1.0" encoding="utf-8"?>
+<p:sld xmlns:a="http://schemas.openxmlformats.org/drawingml/2006/main" xmlns:r="http://schemas.openxmlformats.org/officeDocument/2006/relationships" xmlns:p="http://schemas.openxmlformats.org/presentationml/2006/main">
+  <p:cSld>
+    <p:spTree>
+      <p:nvGrpSpPr>
+        <p:cNvPr id="1" name=""/>
+        <p:cNvGrpSpPr/>
+        <p:nvPr/>
+      </p:nvGrpSpPr>
+      <p:grpSpPr>
+        <a:xfrm>
+          <a:off x="0" y="0"/>
+          <a:ext cx="0" cy="0"/>
+          <a:chOff x="0" y="0"/>
+          <a:chExt cx="0" cy="0"/>
+        </a:xfrm>
+      </p:grpSpPr>
+      <p:sp>
+        <p:nvSpPr>
+          <p:cNvPr id="2" name="Title 1"/>
+          <p:cNvSpPr>
+            <a:spLocks noGrp="1"/>
+          </p:cNvSpPr>
+          <p:nvPr>
+            <p:ph type="title"/>
+          </p:nvPr>
+        </p:nvSpPr>
+        <p:spPr/>
+        <p:txBody>
+          <a:bodyPr/>
+          <a:lstStyle/>
+          <a:p>
+            <a:r>
+              <a:rPr lang="en-US" dirty="0" smtClean="0"/>
+              <a:t>Flavors of the Attack </a:t>
+            </a:r>
+            <a:endParaRPr lang="en-US" dirty="0"/>
+          </a:p>
+        </p:txBody>
+      </p:sp>
+      <p:sp>
+        <p:nvSpPr>
+          <p:cNvPr id="3" name="Content Placeholder 2"/>
+          <p:cNvSpPr>
+            <a:spLocks noGrp="1"/>
+          </p:cNvSpPr>
+          <p:nvPr>
+            <p:ph idx="1"/>
+          </p:nvPr>
+        </p:nvSpPr>
+        <p:spPr/>
+        <p:txBody>
+          <a:bodyPr/>
+          <a:lstStyle/>
+          <a:p>
+            <a:r>
+              <a:rPr lang="en-US" dirty="0" smtClean="0"/>
+              <a:t>Stack Overflow</a:t>
+            </a:r>
+          </a:p>
+          <a:p>
+            <a:pPr lvl="1"/>
+            <a:r>
+              <a:rPr lang="en-US" dirty="0" smtClean="0"/>
+              <a:t>Buffer allocated on the stack</a:t>
+            </a:r>
+          </a:p>
+          <a:p>
+            <a:pPr lvl="1"/>
+            <a:r>
+              <a:rPr lang="en-US" dirty="0" smtClean="0"/>
+              <a:t>Bounds aren’t checked on user input</a:t>
+            </a:r>
+          </a:p>
+          <a:p>
+            <a:pPr lvl="1"/>
+            <a:r>
+              <a:rPr lang="en-US" dirty="0" smtClean="0"/>
+              <a:t>Input is copied using an unsafe method ( ‘gets’, ‘</a:t>
+            </a:r>
+            <a:r>
+              <a:rPr lang="en-US" dirty="0" err="1" smtClean="0"/>
+              <a:t>strcpy</a:t>
+            </a:r>
+            <a:r>
+              <a:rPr lang="en-US" dirty="0" smtClean="0"/>
+              <a:t>’, ‘</a:t>
+            </a:r>
+            <a:r>
+              <a:rPr lang="en-US" dirty="0" err="1" smtClean="0"/>
+              <a:t>strcat</a:t>
+            </a:r>
+            <a:r>
+              <a:rPr lang="en-US" dirty="0" smtClean="0"/>
+              <a:t>’ )</a:t>
+            </a:r>
+          </a:p>
+          <a:p>
+            <a:pPr lvl="1"/>
+            <a:r>
+              <a:rPr lang="en-US" dirty="0" smtClean="0"/>
+              <a:t>Memory outside the allocated buffer is overwritten</a:t>
+            </a:r>
+          </a:p>
+          <a:p>
+            <a:r>
+              <a:rPr lang="en-US" dirty="0" smtClean="0">
+                <a:solidFill>
+                  <a:schemeClr val="bg1">
+                    <a:lumMod val="65000"/>
+                  </a:schemeClr>
+                </a:solidFill>
+              </a:rPr>
+              <a:t>Heap Overflow</a:t>
+            </a:r>
+          </a:p>
+          <a:p>
+            <a:r>
+              <a:rPr lang="en-US" dirty="0" smtClean="0">
+                <a:solidFill>
+                  <a:schemeClr val="bg1">
+                    <a:lumMod val="65000"/>
+                  </a:schemeClr>
+                </a:solidFill>
+              </a:rPr>
+              <a:t>Integer Overflow</a:t>
+            </a:r>
+          </a:p>
+          <a:p>
+            <a:r>
+              <a:rPr lang="en-US" dirty="0" smtClean="0">
+                <a:solidFill>
+                  <a:schemeClr val="bg1">
+                    <a:lumMod val="65000"/>
+                  </a:schemeClr>
+                </a:solidFill>
+              </a:rPr>
+              <a:t>String Format Abuse</a:t>
+            </a:r>
+            <a:endParaRPr lang="en-US" dirty="0">
+              <a:solidFill>
+                <a:schemeClr val="bg1">
+                  <a:lumMod val="65000"/>
+                </a:schemeClr>
+              </a:solidFill>
+            </a:endParaRPr>
+          </a:p>
+        </p:txBody>
+      </p:sp>
+    </p:spTree>
+    <p:extLst>
+      <p:ext uri="{BB962C8B-B14F-4D97-AF65-F5344CB8AC3E}">
+        <p14:creationId xmlns:p14="http://schemas.microsoft.com/office/powerpoint/2010/main" val="979594186"/>
+      </p:ext>
+    </p:extLst>
+  </p:cSld>
+  <p:clrMapOvr>
+    <a:masterClrMapping/>
+  </p:clrMapOvr>
+  <p:timing>
+    <p:tnLst>
+      <p:par>
+        <p:cTn id="1" dur="indefinite" restart="never" nodeType="tmRoot"/>
+      </p:par>
+    </p:tnLst>
+  </p:timing>
+</p:sld>
+</file>
+
+<file path=ppt/slides/slide50.xml><?xml version="1.0" encoding="utf-8"?>
+<p:sld xmlns:a="http://schemas.openxmlformats.org/drawingml/2006/main" xmlns:r="http://schemas.openxmlformats.org/officeDocument/2006/relationships" xmlns:p="http://schemas.openxmlformats.org/presentationml/2006/main">
+  <p:cSld>
+    <p:spTree>
+      <p:nvGrpSpPr>
+        <p:cNvPr id="1" name=""/>
+        <p:cNvGrpSpPr/>
+        <p:nvPr/>
+      </p:nvGrpSpPr>
+      <p:grpSpPr>
+        <a:xfrm>
+          <a:off x="0" y="0"/>
+          <a:ext cx="0" cy="0"/>
+          <a:chOff x="0" y="0"/>
+          <a:chExt cx="0" cy="0"/>
+        </a:xfrm>
+      </p:grpSpPr>
+      <p:sp>
+        <p:nvSpPr>
+          <p:cNvPr id="2" name="Title 1"/>
+          <p:cNvSpPr>
+            <a:spLocks noGrp="1"/>
+          </p:cNvSpPr>
+          <p:nvPr>
+            <p:ph type="title"/>
+          </p:nvPr>
+        </p:nvSpPr>
+        <p:spPr/>
+        <p:txBody>
+          <a:bodyPr/>
+          <a:lstStyle/>
+          <a:p>
+            <a:r>
+              <a:rPr lang="en-US" dirty="0" smtClean="0"/>
+              <a:t>Pro Police</a:t>
+            </a:r>
+            <a:endParaRPr lang="en-US" dirty="0"/>
+          </a:p>
+        </p:txBody>
+      </p:sp>
+      <p:sp>
+        <p:nvSpPr>
+          <p:cNvPr id="3" name="Content Placeholder 2"/>
+          <p:cNvSpPr>
+            <a:spLocks noGrp="1"/>
+          </p:cNvSpPr>
+          <p:nvPr>
+            <p:ph idx="1"/>
+          </p:nvPr>
+        </p:nvSpPr>
+        <p:spPr/>
+        <p:txBody>
+          <a:bodyPr/>
+          <a:lstStyle/>
+          <a:p>
+            <a:r>
+              <a:rPr lang="en-US" dirty="0" smtClean="0"/>
+              <a:t>Stack Smashing Protector</a:t>
+            </a:r>
+          </a:p>
+          <a:p>
+            <a:pPr lvl="1"/>
+            <a:r>
+              <a:rPr lang="en-US" dirty="0" smtClean="0"/>
+              <a:t>Designed for GCC to protect the stack</a:t>
+            </a:r>
+          </a:p>
+          <a:p>
+            <a:r>
+              <a:rPr lang="en-US" dirty="0" smtClean="0"/>
+              <a:t>Extension of the Canary</a:t>
+            </a:r>
+          </a:p>
+          <a:p>
+            <a:pPr lvl="1"/>
+            <a:r>
+              <a:rPr lang="en-US" dirty="0" smtClean="0"/>
+              <a:t>Places a “Canary” word next to the stack</a:t>
+            </a:r>
+          </a:p>
+          <a:p>
+            <a:pPr lvl="1"/>
+            <a:r>
+              <a:rPr lang="en-US" dirty="0" smtClean="0"/>
+              <a:t>If altered; knows that the system has been tampered with</a:t>
+            </a:r>
+          </a:p>
+          <a:p>
+            <a:r>
+              <a:rPr lang="en-US" dirty="0" smtClean="0"/>
+              <a:t>Also sorts variables to the highest part of the stack frame</a:t>
+            </a:r>
+          </a:p>
+          <a:p>
+            <a:pPr lvl="1"/>
+            <a:r>
+              <a:rPr lang="en-US" dirty="0" smtClean="0"/>
+              <a:t>Difficult to corrupt other variables</a:t>
+            </a:r>
+          </a:p>
+          <a:p>
+            <a:r>
+              <a:rPr lang="en-US" dirty="0" smtClean="0"/>
+              <a:t>To Turn Off</a:t>
+            </a:r>
+          </a:p>
+          <a:p>
+            <a:pPr lvl="1"/>
+            <a:r>
+              <a:rPr lang="en-US" dirty="0" smtClean="0"/>
+              <a:t>-</a:t>
+            </a:r>
+            <a:r>
+              <a:rPr lang="en-US" dirty="0" err="1"/>
+              <a:t>fno</a:t>
+            </a:r>
+            <a:r>
+              <a:rPr lang="en-US" dirty="0"/>
+              <a:t>-stack-protector </a:t>
+            </a:r>
+          </a:p>
+        </p:txBody>
+      </p:sp>
+    </p:spTree>
+    <p:extLst>
+      <p:ext uri="{BB962C8B-B14F-4D97-AF65-F5344CB8AC3E}">
+        <p14:creationId xmlns:p14="http://schemas.microsoft.com/office/powerpoint/2010/main" val="2624158683"/>
+      </p:ext>
+    </p:extLst>
+  </p:cSld>
+  <p:clrMapOvr>
+    <a:masterClrMapping/>
+  </p:clrMapOvr>
+</p:sld>
+</file>
+
+<file path=ppt/slides/slide51.xml><?xml version="1.0" encoding="utf-8"?>
 <p:sld xmlns:a="http://schemas.openxmlformats.org/drawingml/2006/main" xmlns:r="http://schemas.openxmlformats.org/officeDocument/2006/relationships" xmlns:p="http://schemas.openxmlformats.org/presentationml/2006/main">
   <p:cSld>
     <p:spTree>
@@ -39844,176 +40258,7 @@
 </p:sld>
 </file>
 
-<file path=ppt/slides/slide5.xml><?xml version="1.0" encoding="utf-8"?>
-<p:sld xmlns:a="http://schemas.openxmlformats.org/drawingml/2006/main" xmlns:r="http://schemas.openxmlformats.org/officeDocument/2006/relationships" xmlns:p="http://schemas.openxmlformats.org/presentationml/2006/main">
-  <p:cSld>
-    <p:spTree>
-      <p:nvGrpSpPr>
-        <p:cNvPr id="1" name=""/>
-        <p:cNvGrpSpPr/>
-        <p:nvPr/>
-      </p:nvGrpSpPr>
-      <p:grpSpPr>
-        <a:xfrm>
-          <a:off x="0" y="0"/>
-          <a:ext cx="0" cy="0"/>
-          <a:chOff x="0" y="0"/>
-          <a:chExt cx="0" cy="0"/>
-        </a:xfrm>
-      </p:grpSpPr>
-      <p:sp>
-        <p:nvSpPr>
-          <p:cNvPr id="2" name="Title 1"/>
-          <p:cNvSpPr>
-            <a:spLocks noGrp="1"/>
-          </p:cNvSpPr>
-          <p:nvPr>
-            <p:ph type="title"/>
-          </p:nvPr>
-        </p:nvSpPr>
-        <p:spPr/>
-        <p:txBody>
-          <a:bodyPr/>
-          <a:lstStyle/>
-          <a:p>
-            <a:r>
-              <a:rPr lang="en-US" dirty="0" smtClean="0"/>
-              <a:t>Flavors of the Attack </a:t>
-            </a:r>
-            <a:endParaRPr lang="en-US" dirty="0"/>
-          </a:p>
-        </p:txBody>
-      </p:sp>
-      <p:sp>
-        <p:nvSpPr>
-          <p:cNvPr id="3" name="Content Placeholder 2"/>
-          <p:cNvSpPr>
-            <a:spLocks noGrp="1"/>
-          </p:cNvSpPr>
-          <p:nvPr>
-            <p:ph idx="1"/>
-          </p:nvPr>
-        </p:nvSpPr>
-        <p:spPr/>
-        <p:txBody>
-          <a:bodyPr/>
-          <a:lstStyle/>
-          <a:p>
-            <a:r>
-              <a:rPr lang="en-US" dirty="0" smtClean="0"/>
-              <a:t>Stack Overflow</a:t>
-            </a:r>
-          </a:p>
-          <a:p>
-            <a:pPr lvl="1"/>
-            <a:r>
-              <a:rPr lang="en-US" dirty="0" smtClean="0"/>
-              <a:t>Buffer allocated on the stack</a:t>
-            </a:r>
-          </a:p>
-          <a:p>
-            <a:pPr lvl="1"/>
-            <a:r>
-              <a:rPr lang="en-US" dirty="0" smtClean="0"/>
-              <a:t>Bounds aren’t checked on user input</a:t>
-            </a:r>
-          </a:p>
-          <a:p>
-            <a:pPr lvl="1"/>
-            <a:r>
-              <a:rPr lang="en-US" dirty="0" smtClean="0"/>
-              <a:t>Input is copied using an unsafe method ( ‘gets’, ‘</a:t>
-            </a:r>
-            <a:r>
-              <a:rPr lang="en-US" dirty="0" err="1" smtClean="0"/>
-              <a:t>strcpy</a:t>
-            </a:r>
-            <a:r>
-              <a:rPr lang="en-US" dirty="0" smtClean="0"/>
-              <a:t>’, ‘</a:t>
-            </a:r>
-            <a:r>
-              <a:rPr lang="en-US" dirty="0" err="1" smtClean="0"/>
-              <a:t>strcat</a:t>
-            </a:r>
-            <a:r>
-              <a:rPr lang="en-US" dirty="0" smtClean="0"/>
-              <a:t>’ )</a:t>
-            </a:r>
-          </a:p>
-          <a:p>
-            <a:pPr lvl="1"/>
-            <a:r>
-              <a:rPr lang="en-US" dirty="0" smtClean="0"/>
-              <a:t>Memory outside the allocated buffer is overwritten</a:t>
-            </a:r>
-          </a:p>
-          <a:p>
-            <a:r>
-              <a:rPr lang="en-US" dirty="0" smtClean="0">
-                <a:solidFill>
-                  <a:schemeClr val="bg1">
-                    <a:lumMod val="65000"/>
-                  </a:schemeClr>
-                </a:solidFill>
-              </a:rPr>
-              <a:t>Heap Overflow</a:t>
-            </a:r>
-          </a:p>
-          <a:p>
-            <a:r>
-              <a:rPr lang="en-US" dirty="0" smtClean="0">
-                <a:solidFill>
-                  <a:schemeClr val="bg1">
-                    <a:lumMod val="65000"/>
-                  </a:schemeClr>
-                </a:solidFill>
-              </a:rPr>
-              <a:t>Integer Overflow</a:t>
-            </a:r>
-          </a:p>
-          <a:p>
-            <a:r>
-              <a:rPr lang="en-US" dirty="0" smtClean="0">
-                <a:solidFill>
-                  <a:schemeClr val="bg1">
-                    <a:lumMod val="65000"/>
-                  </a:schemeClr>
-                </a:solidFill>
-              </a:rPr>
-              <a:t>String Format Abuse</a:t>
-            </a:r>
-            <a:endParaRPr lang="en-US" dirty="0">
-              <a:solidFill>
-                <a:schemeClr val="bg1">
-                  <a:lumMod val="65000"/>
-                </a:schemeClr>
-              </a:solidFill>
-            </a:endParaRPr>
-          </a:p>
-        </p:txBody>
-      </p:sp>
-    </p:spTree>
-    <p:extLst>
-      <p:ext uri="{BB962C8B-B14F-4D97-AF65-F5344CB8AC3E}">
-        <p14:creationId xmlns:p14="http://schemas.microsoft.com/office/powerpoint/2010/main" val="979594186"/>
-      </p:ext>
-    </p:extLst>
-  </p:cSld>
-  <p:clrMapOvr>
-    <a:masterClrMapping/>
-  </p:clrMapOvr>
-  <p:timing>
-    <p:tnLst>
-      <p:par>
-        <p:cTn id="1" dur="indefinite" restart="never" nodeType="tmRoot"/>
-      </p:par>
-    </p:tnLst>
-  </p:timing>
-</p:sld>
-</file>
-
-<file path=ppt/slides/slide50.xml><?xml version="1.0" encoding="utf-8"?>
+<file path=ppt/slides/slide52.xml><?xml version="1.0" encoding="utf-8"?>
 <p:sld xmlns:a="http://schemas.openxmlformats.org/drawingml/2006/main" xmlns:r="http://schemas.openxmlformats.org/officeDocument/2006/relationships" xmlns:p="http://schemas.openxmlformats.org/presentationml/2006/main">
   <p:cSld>
     <p:spTree>
@@ -40239,7 +40484,7 @@
 </p:sld>
 </file>
 
-<file path=ppt/slides/slide51.xml><?xml version="1.0" encoding="utf-8"?>
+<file path=ppt/slides/slide53.xml><?xml version="1.0" encoding="utf-8"?>
 <p:sld xmlns:a="http://schemas.openxmlformats.org/drawingml/2006/main" xmlns:r="http://schemas.openxmlformats.org/officeDocument/2006/relationships" xmlns:p="http://schemas.openxmlformats.org/presentationml/2006/main">
   <p:cSld>
     <p:spTree>

</xml_diff>

<commit_message>
adding a slide for the matrix
</commit_message>
<xml_diff>
--- a/Buffer Overflow Attacks.pptx
+++ b/Buffer Overflow Attacks.pptx
@@ -5,7 +5,7 @@
     <p:sldMasterId id="2147483672" r:id="rId1"/>
   </p:sldMasterIdLst>
   <p:notesMasterIdLst>
-    <p:notesMasterId r:id="rId55"/>
+    <p:notesMasterId r:id="rId56"/>
   </p:notesMasterIdLst>
   <p:sldIdLst>
     <p:sldId id="256" r:id="rId2"/>
@@ -61,6 +61,7 @@
     <p:sldId id="315" r:id="rId52"/>
     <p:sldId id="323" r:id="rId53"/>
     <p:sldId id="324" r:id="rId54"/>
+    <p:sldId id="331" r:id="rId55"/>
   </p:sldIdLst>
   <p:sldSz cx="9144000" cy="6858000" type="screen4x3"/>
   <p:notesSz cx="6858000" cy="9144000"/>
@@ -221,6 +222,7 @@
             <p14:sldId id="315"/>
             <p14:sldId id="323"/>
             <p14:sldId id="324"/>
+            <p14:sldId id="331"/>
           </p14:sldIdLst>
         </p14:section>
       </p14:sectionLst>
@@ -311,7 +313,7 @@
           <a:p>
             <a:fld id="{9DED5714-D740-4F89-AAD5-E3BC8B06EDCA}" type="datetimeFigureOut">
               <a:rPr lang="en-US" smtClean="0"/>
-              <a:t>5/2/2012</a:t>
+              <a:t>5/3/2012</a:t>
             </a:fld>
             <a:endParaRPr lang="en-US"/>
           </a:p>
@@ -8253,7 +8255,7 @@
           <a:p>
             <a:fld id="{FB76FE03-F4FF-4405-A4BA-F447F9618E72}" type="datetimeFigureOut">
               <a:rPr lang="en-US" smtClean="0"/>
-              <a:t>5/2/2012</a:t>
+              <a:t>5/3/2012</a:t>
             </a:fld>
             <a:endParaRPr lang="en-US"/>
           </a:p>
@@ -8518,7 +8520,7 @@
           <a:p>
             <a:fld id="{FB76FE03-F4FF-4405-A4BA-F447F9618E72}" type="datetimeFigureOut">
               <a:rPr lang="en-US" smtClean="0"/>
-              <a:t>5/2/2012</a:t>
+              <a:t>5/3/2012</a:t>
             </a:fld>
             <a:endParaRPr lang="en-US"/>
           </a:p>
@@ -8792,7 +8794,7 @@
           <a:p>
             <a:fld id="{FB76FE03-F4FF-4405-A4BA-F447F9618E72}" type="datetimeFigureOut">
               <a:rPr lang="en-US" smtClean="0"/>
-              <a:t>5/2/2012</a:t>
+              <a:t>5/3/2012</a:t>
             </a:fld>
             <a:endParaRPr lang="en-US"/>
           </a:p>
@@ -9009,7 +9011,7 @@
           <a:p>
             <a:fld id="{FB76FE03-F4FF-4405-A4BA-F447F9618E72}" type="datetimeFigureOut">
               <a:rPr lang="en-US" smtClean="0"/>
-              <a:t>5/2/2012</a:t>
+              <a:t>5/3/2012</a:t>
             </a:fld>
             <a:endParaRPr lang="en-US"/>
           </a:p>
@@ -9396,7 +9398,7 @@
           <a:p>
             <a:fld id="{FB76FE03-F4FF-4405-A4BA-F447F9618E72}" type="datetimeFigureOut">
               <a:rPr lang="en-US" smtClean="0"/>
-              <a:t>5/2/2012</a:t>
+              <a:t>5/3/2012</a:t>
             </a:fld>
             <a:endParaRPr lang="en-US"/>
           </a:p>
@@ -9777,7 +9779,7 @@
           <a:p>
             <a:fld id="{FB76FE03-F4FF-4405-A4BA-F447F9618E72}" type="datetimeFigureOut">
               <a:rPr lang="en-US" smtClean="0"/>
-              <a:t>5/2/2012</a:t>
+              <a:t>5/3/2012</a:t>
             </a:fld>
             <a:endParaRPr lang="en-US"/>
           </a:p>
@@ -10194,7 +10196,7 @@
           <a:p>
             <a:fld id="{FB76FE03-F4FF-4405-A4BA-F447F9618E72}" type="datetimeFigureOut">
               <a:rPr lang="en-US" smtClean="0"/>
-              <a:t>5/2/2012</a:t>
+              <a:t>5/3/2012</a:t>
             </a:fld>
             <a:endParaRPr lang="en-US"/>
           </a:p>
@@ -10307,7 +10309,7 @@
           <a:p>
             <a:fld id="{FB76FE03-F4FF-4405-A4BA-F447F9618E72}" type="datetimeFigureOut">
               <a:rPr lang="en-US" smtClean="0"/>
-              <a:t>5/2/2012</a:t>
+              <a:t>5/3/2012</a:t>
             </a:fld>
             <a:endParaRPr lang="en-US"/>
           </a:p>
@@ -10397,7 +10399,7 @@
           <a:p>
             <a:fld id="{FB76FE03-F4FF-4405-A4BA-F447F9618E72}" type="datetimeFigureOut">
               <a:rPr lang="en-US" smtClean="0"/>
-              <a:t>5/2/2012</a:t>
+              <a:t>5/3/2012</a:t>
             </a:fld>
             <a:endParaRPr lang="en-US"/>
           </a:p>
@@ -10606,7 +10608,7 @@
           <a:p>
             <a:fld id="{FB76FE03-F4FF-4405-A4BA-F447F9618E72}" type="datetimeFigureOut">
               <a:rPr lang="en-US" smtClean="0"/>
-              <a:t>5/2/2012</a:t>
+              <a:t>5/3/2012</a:t>
             </a:fld>
             <a:endParaRPr lang="en-US"/>
           </a:p>
@@ -10983,7 +10985,7 @@
           <a:p>
             <a:fld id="{FB76FE03-F4FF-4405-A4BA-F447F9618E72}" type="datetimeFigureOut">
               <a:rPr lang="en-US" smtClean="0"/>
-              <a:t>5/2/2012</a:t>
+              <a:t>5/3/2012</a:t>
             </a:fld>
             <a:endParaRPr lang="en-US"/>
           </a:p>
@@ -11530,7 +11532,7 @@
           <a:p>
             <a:fld id="{FB76FE03-F4FF-4405-A4BA-F447F9618E72}" type="datetimeFigureOut">
               <a:rPr lang="en-US" smtClean="0"/>
-              <a:t>5/2/2012</a:t>
+              <a:t>5/3/2012</a:t>
             </a:fld>
             <a:endParaRPr lang="en-US"/>
           </a:p>
@@ -39575,7 +39577,6 @@
               <a:rPr lang="en-US" dirty="0"/>
               <a:t>the Enhanced Mitigation Experience Toolkit</a:t>
             </a:r>
-            <a:endParaRPr lang="en-US" dirty="0"/>
           </a:p>
         </p:txBody>
       </p:sp>
@@ -40686,6 +40687,277 @@
   <p:clrMapOvr>
     <a:masterClrMapping/>
   </p:clrMapOvr>
+</p:sld>
+</file>
+
+<file path=ppt/slides/slide54.xml><?xml version="1.0" encoding="utf-8"?>
+<p:sld xmlns:a="http://schemas.openxmlformats.org/drawingml/2006/main" xmlns:r="http://schemas.openxmlformats.org/officeDocument/2006/relationships" xmlns:p="http://schemas.openxmlformats.org/presentationml/2006/main">
+  <p:cSld>
+    <p:spTree>
+      <p:nvGrpSpPr>
+        <p:cNvPr id="1" name=""/>
+        <p:cNvGrpSpPr/>
+        <p:nvPr/>
+      </p:nvGrpSpPr>
+      <p:grpSpPr>
+        <a:xfrm>
+          <a:off x="0" y="0"/>
+          <a:ext cx="0" cy="0"/>
+          <a:chOff x="0" y="0"/>
+          <a:chExt cx="0" cy="0"/>
+        </a:xfrm>
+      </p:grpSpPr>
+      <p:sp>
+        <p:nvSpPr>
+          <p:cNvPr id="2" name="Title 1"/>
+          <p:cNvSpPr>
+            <a:spLocks noGrp="1"/>
+          </p:cNvSpPr>
+          <p:nvPr>
+            <p:ph type="title"/>
+          </p:nvPr>
+        </p:nvSpPr>
+        <p:spPr/>
+        <p:txBody>
+          <a:bodyPr/>
+          <a:lstStyle/>
+          <a:p>
+            <a:r>
+              <a:rPr lang="en-US" dirty="0" smtClean="0"/>
+              <a:t>Still Relevant in 2199</a:t>
+            </a:r>
+            <a:endParaRPr lang="en-US" dirty="0"/>
+          </a:p>
+        </p:txBody>
+      </p:sp>
+      <p:sp>
+        <p:nvSpPr>
+          <p:cNvPr id="3" name="Content Placeholder 2"/>
+          <p:cNvSpPr>
+            <a:spLocks noGrp="1"/>
+          </p:cNvSpPr>
+          <p:nvPr>
+            <p:ph idx="1"/>
+          </p:nvPr>
+        </p:nvSpPr>
+        <p:spPr/>
+        <p:txBody>
+          <a:bodyPr/>
+          <a:lstStyle/>
+          <a:p>
+            <a:r>
+              <a:rPr lang="en-US" dirty="0">
+                <a:hlinkClick r:id="rId2"/>
+              </a:rPr>
+              <a:t>http://www.youtube.com/watch?v=51lGCTgqE_w</a:t>
+            </a:r>
+            <a:endParaRPr lang="en-US" dirty="0"/>
+          </a:p>
+        </p:txBody>
+      </p:sp>
+      <p:pic>
+        <p:nvPicPr>
+          <p:cNvPr id="1026" name="Picture 2"/>
+          <p:cNvPicPr>
+            <a:picLocks noChangeAspect="1" noChangeArrowheads="1"/>
+          </p:cNvPicPr>
+          <p:nvPr/>
+        </p:nvPicPr>
+        <p:blipFill>
+          <a:blip r:embed="rId3">
+            <a:extLst>
+              <a:ext uri="{28A0092B-C50C-407E-A947-70E740481C1C}">
+                <a14:useLocalDpi xmlns:a14="http://schemas.microsoft.com/office/drawing/2010/main" val="0"/>
+              </a:ext>
+            </a:extLst>
+          </a:blip>
+          <a:srcRect/>
+          <a:stretch>
+            <a:fillRect/>
+          </a:stretch>
+        </p:blipFill>
+        <p:spPr bwMode="auto">
+          <a:xfrm>
+            <a:off x="495300" y="2133600"/>
+            <a:ext cx="8153400" cy="4518289"/>
+          </a:xfrm>
+          <a:prstGeom prst="rect">
+            <a:avLst/>
+          </a:prstGeom>
+          <a:noFill/>
+          <a:ln>
+            <a:noFill/>
+          </a:ln>
+          <a:effectLst/>
+          <a:extLst>
+            <a:ext uri="{909E8E84-426E-40DD-AFC4-6F175D3DCCD1}">
+              <a14:hiddenFill xmlns:a14="http://schemas.microsoft.com/office/drawing/2010/main">
+                <a:solidFill>
+                  <a:schemeClr val="accent1"/>
+                </a:solidFill>
+              </a14:hiddenFill>
+            </a:ext>
+            <a:ext uri="{91240B29-F687-4F45-9708-019B960494DF}">
+              <a14:hiddenLine xmlns:a14="http://schemas.microsoft.com/office/drawing/2010/main" w="9525">
+                <a:solidFill>
+                  <a:schemeClr val="tx1"/>
+                </a:solidFill>
+                <a:miter lim="800000"/>
+                <a:headEnd/>
+                <a:tailEnd/>
+              </a14:hiddenLine>
+            </a:ext>
+            <a:ext uri="{AF507438-7753-43E0-B8FC-AC1667EBCBE1}">
+              <a14:hiddenEffects xmlns:a14="http://schemas.microsoft.com/office/drawing/2010/main">
+                <a:effectLst>
+                  <a:outerShdw dist="35921" dir="2700000" algn="ctr" rotWithShape="0">
+                    <a:schemeClr val="bg2"/>
+                  </a:outerShdw>
+                </a:effectLst>
+              </a14:hiddenEffects>
+            </a:ext>
+          </a:extLst>
+        </p:spPr>
+      </p:pic>
+    </p:spTree>
+    <p:extLst>
+      <p:ext uri="{BB962C8B-B14F-4D97-AF65-F5344CB8AC3E}">
+        <p14:creationId xmlns:p14="http://schemas.microsoft.com/office/powerpoint/2010/main" val="2058425607"/>
+      </p:ext>
+    </p:extLst>
+  </p:cSld>
+  <p:clrMapOvr>
+    <a:masterClrMapping/>
+  </p:clrMapOvr>
+  <p:timing>
+    <p:tnLst>
+      <p:par>
+        <p:cTn id="1" dur="indefinite" restart="never" nodeType="tmRoot">
+          <p:childTnLst>
+            <p:seq concurrent="1" nextAc="seek">
+              <p:cTn id="2" dur="indefinite" nodeType="mainSeq">
+                <p:childTnLst>
+                  <p:par>
+                    <p:cTn id="3" fill="hold">
+                      <p:stCondLst>
+                        <p:cond delay="indefinite"/>
+                      </p:stCondLst>
+                      <p:childTnLst>
+                        <p:par>
+                          <p:cTn id="4" fill="hold">
+                            <p:stCondLst>
+                              <p:cond delay="0"/>
+                            </p:stCondLst>
+                            <p:childTnLst>
+                              <p:par>
+                                <p:cTn id="5" presetID="42" presetClass="entr" presetSubtype="0" fill="hold" nodeType="clickEffect">
+                                  <p:stCondLst>
+                                    <p:cond delay="0"/>
+                                  </p:stCondLst>
+                                  <p:childTnLst>
+                                    <p:set>
+                                      <p:cBhvr>
+                                        <p:cTn id="6" dur="1" fill="hold">
+                                          <p:stCondLst>
+                                            <p:cond delay="0"/>
+                                          </p:stCondLst>
+                                        </p:cTn>
+                                        <p:tgtEl>
+                                          <p:spTgt spid="1026"/>
+                                        </p:tgtEl>
+                                        <p:attrNameLst>
+                                          <p:attrName>style.visibility</p:attrName>
+                                        </p:attrNameLst>
+                                      </p:cBhvr>
+                                      <p:to>
+                                        <p:strVal val="visible"/>
+                                      </p:to>
+                                    </p:set>
+                                    <p:animEffect transition="in" filter="fade">
+                                      <p:cBhvr>
+                                        <p:cTn id="7" dur="1000"/>
+                                        <p:tgtEl>
+                                          <p:spTgt spid="1026"/>
+                                        </p:tgtEl>
+                                      </p:cBhvr>
+                                    </p:animEffect>
+                                    <p:anim calcmode="lin" valueType="num">
+                                      <p:cBhvr>
+                                        <p:cTn id="8" dur="1000" fill="hold"/>
+                                        <p:tgtEl>
+                                          <p:spTgt spid="1026"/>
+                                        </p:tgtEl>
+                                        <p:attrNameLst>
+                                          <p:attrName>ppt_x</p:attrName>
+                                        </p:attrNameLst>
+                                      </p:cBhvr>
+                                      <p:tavLst>
+                                        <p:tav tm="0">
+                                          <p:val>
+                                            <p:strVal val="#ppt_x"/>
+                                          </p:val>
+                                        </p:tav>
+                                        <p:tav tm="100000">
+                                          <p:val>
+                                            <p:strVal val="#ppt_x"/>
+                                          </p:val>
+                                        </p:tav>
+                                      </p:tavLst>
+                                    </p:anim>
+                                    <p:anim calcmode="lin" valueType="num">
+                                      <p:cBhvr>
+                                        <p:cTn id="9" dur="1000" fill="hold"/>
+                                        <p:tgtEl>
+                                          <p:spTgt spid="1026"/>
+                                        </p:tgtEl>
+                                        <p:attrNameLst>
+                                          <p:attrName>ppt_y</p:attrName>
+                                        </p:attrNameLst>
+                                      </p:cBhvr>
+                                      <p:tavLst>
+                                        <p:tav tm="0">
+                                          <p:val>
+                                            <p:strVal val="#ppt_y+.1"/>
+                                          </p:val>
+                                        </p:tav>
+                                        <p:tav tm="100000">
+                                          <p:val>
+                                            <p:strVal val="#ppt_y"/>
+                                          </p:val>
+                                        </p:tav>
+                                      </p:tavLst>
+                                    </p:anim>
+                                  </p:childTnLst>
+                                </p:cTn>
+                              </p:par>
+                            </p:childTnLst>
+                          </p:cTn>
+                        </p:par>
+                      </p:childTnLst>
+                    </p:cTn>
+                  </p:par>
+                </p:childTnLst>
+              </p:cTn>
+              <p:prevCondLst>
+                <p:cond evt="onPrev" delay="0">
+                  <p:tgtEl>
+                    <p:sldTgt/>
+                  </p:tgtEl>
+                </p:cond>
+              </p:prevCondLst>
+              <p:nextCondLst>
+                <p:cond evt="onNext" delay="0">
+                  <p:tgtEl>
+                    <p:sldTgt/>
+                  </p:tgtEl>
+                </p:cond>
+              </p:nextCondLst>
+            </p:seq>
+          </p:childTnLst>
+        </p:cTn>
+      </p:par>
+    </p:tnLst>
+  </p:timing>
 </p:sld>
 </file>
 

</xml_diff>